<commit_message>
added language drop down menu
</commit_message>
<xml_diff>
--- a/assets/buttons.pptx
+++ b/assets/buttons.pptx
@@ -111,6 +111,11 @@
       </a:defRPr>
     </a:lvl9pPr>
   </p:defaultTextStyle>
+  <p:extLst>
+    <p:ext uri="{EFAFB233-063F-42B5-8137-9DF3F51BA10A}">
+      <p15:sldGuideLst xmlns:p15="http://schemas.microsoft.com/office/powerpoint/2012/main"/>
+    </p:ext>
+  </p:extLst>
 </p:presentation>
 </file>
 
@@ -245,7 +250,7 @@
           <a:p>
             <a:fld id="{2E40D743-7CB8-4D0B-882D-D502BAAD38FE}" type="datetimeFigureOut">
               <a:rPr lang="en-US" smtClean="0"/>
-              <a:t>3/22/2021</a:t>
+              <a:t>4/9/2021</a:t>
             </a:fld>
             <a:endParaRPr lang="en-US"/>
           </a:p>
@@ -415,7 +420,7 @@
           <a:p>
             <a:fld id="{2E40D743-7CB8-4D0B-882D-D502BAAD38FE}" type="datetimeFigureOut">
               <a:rPr lang="en-US" smtClean="0"/>
-              <a:t>3/22/2021</a:t>
+              <a:t>4/9/2021</a:t>
             </a:fld>
             <a:endParaRPr lang="en-US"/>
           </a:p>
@@ -595,7 +600,7 @@
           <a:p>
             <a:fld id="{2E40D743-7CB8-4D0B-882D-D502BAAD38FE}" type="datetimeFigureOut">
               <a:rPr lang="en-US" smtClean="0"/>
-              <a:t>3/22/2021</a:t>
+              <a:t>4/9/2021</a:t>
             </a:fld>
             <a:endParaRPr lang="en-US"/>
           </a:p>
@@ -765,7 +770,7 @@
           <a:p>
             <a:fld id="{2E40D743-7CB8-4D0B-882D-D502BAAD38FE}" type="datetimeFigureOut">
               <a:rPr lang="en-US" smtClean="0"/>
-              <a:t>3/22/2021</a:t>
+              <a:t>4/9/2021</a:t>
             </a:fld>
             <a:endParaRPr lang="en-US"/>
           </a:p>
@@ -1011,7 +1016,7 @@
           <a:p>
             <a:fld id="{2E40D743-7CB8-4D0B-882D-D502BAAD38FE}" type="datetimeFigureOut">
               <a:rPr lang="en-US" smtClean="0"/>
-              <a:t>3/22/2021</a:t>
+              <a:t>4/9/2021</a:t>
             </a:fld>
             <a:endParaRPr lang="en-US"/>
           </a:p>
@@ -1243,7 +1248,7 @@
           <a:p>
             <a:fld id="{2E40D743-7CB8-4D0B-882D-D502BAAD38FE}" type="datetimeFigureOut">
               <a:rPr lang="en-US" smtClean="0"/>
-              <a:t>3/22/2021</a:t>
+              <a:t>4/9/2021</a:t>
             </a:fld>
             <a:endParaRPr lang="en-US"/>
           </a:p>
@@ -1610,7 +1615,7 @@
           <a:p>
             <a:fld id="{2E40D743-7CB8-4D0B-882D-D502BAAD38FE}" type="datetimeFigureOut">
               <a:rPr lang="en-US" smtClean="0"/>
-              <a:t>3/22/2021</a:t>
+              <a:t>4/9/2021</a:t>
             </a:fld>
             <a:endParaRPr lang="en-US"/>
           </a:p>
@@ -1728,7 +1733,7 @@
           <a:p>
             <a:fld id="{2E40D743-7CB8-4D0B-882D-D502BAAD38FE}" type="datetimeFigureOut">
               <a:rPr lang="en-US" smtClean="0"/>
-              <a:t>3/22/2021</a:t>
+              <a:t>4/9/2021</a:t>
             </a:fld>
             <a:endParaRPr lang="en-US"/>
           </a:p>
@@ -1823,7 +1828,7 @@
           <a:p>
             <a:fld id="{2E40D743-7CB8-4D0B-882D-D502BAAD38FE}" type="datetimeFigureOut">
               <a:rPr lang="en-US" smtClean="0"/>
-              <a:t>3/22/2021</a:t>
+              <a:t>4/9/2021</a:t>
             </a:fld>
             <a:endParaRPr lang="en-US"/>
           </a:p>
@@ -2100,7 +2105,7 @@
           <a:p>
             <a:fld id="{2E40D743-7CB8-4D0B-882D-D502BAAD38FE}" type="datetimeFigureOut">
               <a:rPr lang="en-US" smtClean="0"/>
-              <a:t>3/22/2021</a:t>
+              <a:t>4/9/2021</a:t>
             </a:fld>
             <a:endParaRPr lang="en-US"/>
           </a:p>
@@ -2353,7 +2358,7 @@
           <a:p>
             <a:fld id="{2E40D743-7CB8-4D0B-882D-D502BAAD38FE}" type="datetimeFigureOut">
               <a:rPr lang="en-US" smtClean="0"/>
-              <a:t>3/22/2021</a:t>
+              <a:t>4/9/2021</a:t>
             </a:fld>
             <a:endParaRPr lang="en-US"/>
           </a:p>
@@ -2566,7 +2571,7 @@
           <a:p>
             <a:fld id="{2E40D743-7CB8-4D0B-882D-D502BAAD38FE}" type="datetimeFigureOut">
               <a:rPr lang="en-US" smtClean="0"/>
-              <a:t>3/22/2021</a:t>
+              <a:t>4/9/2021</a:t>
             </a:fld>
             <a:endParaRPr lang="en-US"/>
           </a:p>
@@ -3046,6 +3051,358 @@
           </a:p>
         </p:txBody>
       </p:sp>
+      <p:sp>
+        <p:nvSpPr>
+          <p:cNvPr id="3" name="Rectangle à coins arrondis 2"/>
+          <p:cNvSpPr/>
+          <p:nvPr/>
+        </p:nvSpPr>
+        <p:spPr>
+          <a:xfrm>
+            <a:off x="1444483" y="1052225"/>
+            <a:ext cx="2828924" cy="538163"/>
+          </a:xfrm>
+          <a:prstGeom prst="roundRect">
+            <a:avLst>
+              <a:gd name="adj" fmla="val 42851"/>
+            </a:avLst>
+          </a:prstGeom>
+          <a:gradFill>
+            <a:gsLst>
+              <a:gs pos="0">
+                <a:schemeClr val="accent1">
+                  <a:lumMod val="5000"/>
+                  <a:lumOff val="95000"/>
+                </a:schemeClr>
+              </a:gs>
+              <a:gs pos="10000">
+                <a:schemeClr val="bg2">
+                  <a:lumMod val="10000"/>
+                </a:schemeClr>
+              </a:gs>
+            </a:gsLst>
+            <a:lin ang="5400000" scaled="1"/>
+          </a:gradFill>
+          <a:ln>
+            <a:solidFill>
+              <a:schemeClr val="bg2">
+                <a:lumMod val="10000"/>
+              </a:schemeClr>
+            </a:solidFill>
+          </a:ln>
+        </p:spPr>
+        <p:style>
+          <a:lnRef idx="2">
+            <a:schemeClr val="accent1">
+              <a:shade val="50000"/>
+            </a:schemeClr>
+          </a:lnRef>
+          <a:fillRef idx="1">
+            <a:schemeClr val="accent1"/>
+          </a:fillRef>
+          <a:effectRef idx="0">
+            <a:schemeClr val="accent1"/>
+          </a:effectRef>
+          <a:fontRef idx="minor">
+            <a:schemeClr val="lt1"/>
+          </a:fontRef>
+        </p:style>
+        <p:txBody>
+          <a:bodyPr rtlCol="0" anchor="ctr"/>
+          <a:lstStyle/>
+          <a:p>
+            <a:pPr algn="ctr"/>
+            <a:r>
+              <a:rPr lang="fr-FR" dirty="0" err="1" smtClean="0">
+                <a:latin typeface="Segoe UI Black" panose="020B0A02040204020203" pitchFamily="34" charset="0"/>
+                <a:ea typeface="Segoe UI Black" panose="020B0A02040204020203" pitchFamily="34" charset="0"/>
+              </a:rPr>
+              <a:t>Ingene</a:t>
+            </a:r>
+            <a:r>
+              <a:rPr lang="fr-FR" dirty="0" smtClean="0">
+                <a:latin typeface="Segoe UI Black" panose="020B0A02040204020203" pitchFamily="34" charset="0"/>
+                <a:ea typeface="Segoe UI Black" panose="020B0A02040204020203" pitchFamily="34" charset="0"/>
+              </a:rPr>
+              <a:t> </a:t>
+            </a:r>
+            <a:r>
+              <a:rPr lang="fr-FR" dirty="0" err="1">
+                <a:latin typeface="Segoe UI Black" panose="020B0A02040204020203" pitchFamily="34" charset="0"/>
+                <a:ea typeface="Segoe UI Black" panose="020B0A02040204020203" pitchFamily="34" charset="0"/>
+              </a:rPr>
+              <a:t>B</a:t>
+            </a:r>
+            <a:r>
+              <a:rPr lang="fr-FR" dirty="0" err="1" smtClean="0">
+                <a:latin typeface="Segoe UI Black" panose="020B0A02040204020203" pitchFamily="34" charset="0"/>
+                <a:ea typeface="Segoe UI Black" panose="020B0A02040204020203" pitchFamily="34" charset="0"/>
+              </a:rPr>
+              <a:t>akina</a:t>
+            </a:r>
+            <a:endParaRPr lang="en-US" dirty="0">
+              <a:latin typeface="Segoe UI Black" panose="020B0A02040204020203" pitchFamily="34" charset="0"/>
+              <a:ea typeface="Segoe UI Black" panose="020B0A02040204020203" pitchFamily="34" charset="0"/>
+            </a:endParaRPr>
+          </a:p>
+        </p:txBody>
+      </p:sp>
+      <p:sp>
+        <p:nvSpPr>
+          <p:cNvPr id="5" name="Rectangle à coins arrondis 4"/>
+          <p:cNvSpPr/>
+          <p:nvPr/>
+        </p:nvSpPr>
+        <p:spPr>
+          <a:xfrm>
+            <a:off x="7905319" y="1042987"/>
+            <a:ext cx="2828924" cy="538163"/>
+          </a:xfrm>
+          <a:prstGeom prst="roundRect">
+            <a:avLst>
+              <a:gd name="adj" fmla="val 42851"/>
+            </a:avLst>
+          </a:prstGeom>
+          <a:gradFill>
+            <a:gsLst>
+              <a:gs pos="0">
+                <a:schemeClr val="accent1">
+                  <a:lumMod val="5000"/>
+                  <a:lumOff val="95000"/>
+                </a:schemeClr>
+              </a:gs>
+              <a:gs pos="10000">
+                <a:schemeClr val="bg2">
+                  <a:lumMod val="10000"/>
+                </a:schemeClr>
+              </a:gs>
+            </a:gsLst>
+            <a:lin ang="5400000" scaled="1"/>
+          </a:gradFill>
+          <a:ln>
+            <a:solidFill>
+              <a:schemeClr val="bg2">
+                <a:lumMod val="10000"/>
+              </a:schemeClr>
+            </a:solidFill>
+          </a:ln>
+        </p:spPr>
+        <p:style>
+          <a:lnRef idx="2">
+            <a:schemeClr val="accent1">
+              <a:shade val="50000"/>
+            </a:schemeClr>
+          </a:lnRef>
+          <a:fillRef idx="1">
+            <a:schemeClr val="accent1"/>
+          </a:fillRef>
+          <a:effectRef idx="0">
+            <a:schemeClr val="accent1"/>
+          </a:effectRef>
+          <a:fontRef idx="minor">
+            <a:schemeClr val="lt1"/>
+          </a:fontRef>
+        </p:style>
+        <p:txBody>
+          <a:bodyPr rtlCol="0" anchor="ctr"/>
+          <a:lstStyle/>
+          <a:p>
+            <a:pPr algn="ctr"/>
+            <a:r>
+              <a:rPr lang="fr-FR" dirty="0" err="1" smtClean="0">
+                <a:latin typeface="Segoe UI Black" panose="020B0A02040204020203" pitchFamily="34" charset="0"/>
+                <a:ea typeface="Segoe UI Black" panose="020B0A02040204020203" pitchFamily="34" charset="0"/>
+              </a:rPr>
+              <a:t>Dukenyure</a:t>
+            </a:r>
+            <a:endParaRPr lang="en-US" dirty="0">
+              <a:latin typeface="Segoe UI Black" panose="020B0A02040204020203" pitchFamily="34" charset="0"/>
+              <a:ea typeface="Segoe UI Black" panose="020B0A02040204020203" pitchFamily="34" charset="0"/>
+            </a:endParaRPr>
+          </a:p>
+        </p:txBody>
+      </p:sp>
+      <p:sp>
+        <p:nvSpPr>
+          <p:cNvPr id="6" name="Rectangle à coins arrondis 5"/>
+          <p:cNvSpPr/>
+          <p:nvPr/>
+        </p:nvSpPr>
+        <p:spPr>
+          <a:xfrm>
+            <a:off x="1444483" y="2155970"/>
+            <a:ext cx="2828924" cy="538163"/>
+          </a:xfrm>
+          <a:prstGeom prst="roundRect">
+            <a:avLst>
+              <a:gd name="adj" fmla="val 42851"/>
+            </a:avLst>
+          </a:prstGeom>
+          <a:gradFill>
+            <a:gsLst>
+              <a:gs pos="0">
+                <a:schemeClr val="accent1">
+                  <a:lumMod val="5000"/>
+                  <a:lumOff val="95000"/>
+                </a:schemeClr>
+              </a:gs>
+              <a:gs pos="10000">
+                <a:schemeClr val="bg2">
+                  <a:lumMod val="10000"/>
+                </a:schemeClr>
+              </a:gs>
+            </a:gsLst>
+            <a:lin ang="5400000" scaled="1"/>
+          </a:gradFill>
+          <a:ln>
+            <a:solidFill>
+              <a:schemeClr val="bg2">
+                <a:lumMod val="10000"/>
+              </a:schemeClr>
+            </a:solidFill>
+          </a:ln>
+        </p:spPr>
+        <p:style>
+          <a:lnRef idx="2">
+            <a:schemeClr val="accent1">
+              <a:shade val="50000"/>
+            </a:schemeClr>
+          </a:lnRef>
+          <a:fillRef idx="1">
+            <a:schemeClr val="accent1"/>
+          </a:fillRef>
+          <a:effectRef idx="0">
+            <a:schemeClr val="accent1"/>
+          </a:effectRef>
+          <a:fontRef idx="minor">
+            <a:schemeClr val="lt1"/>
+          </a:fontRef>
+        </p:style>
+        <p:txBody>
+          <a:bodyPr rtlCol="0" anchor="ctr"/>
+          <a:lstStyle/>
+          <a:p>
+            <a:pPr algn="ctr"/>
+            <a:r>
+              <a:rPr lang="fr-FR" dirty="0" err="1" smtClean="0">
+                <a:latin typeface="Segoe UI Black" panose="020B0A02040204020203" pitchFamily="34" charset="0"/>
+                <a:ea typeface="Segoe UI Black" panose="020B0A02040204020203" pitchFamily="34" charset="0"/>
+              </a:rPr>
+              <a:t>Kina</a:t>
+            </a:r>
+            <a:r>
+              <a:rPr lang="fr-FR" dirty="0" smtClean="0">
+                <a:latin typeface="Segoe UI Black" panose="020B0A02040204020203" pitchFamily="34" charset="0"/>
+                <a:ea typeface="Segoe UI Black" panose="020B0A02040204020203" pitchFamily="34" charset="0"/>
+              </a:rPr>
+              <a:t> n’i </a:t>
+            </a:r>
+            <a:r>
+              <a:rPr lang="fr-FR" dirty="0" err="1">
+                <a:latin typeface="Segoe UI Black" panose="020B0A02040204020203" pitchFamily="34" charset="0"/>
+                <a:ea typeface="Segoe UI Black" panose="020B0A02040204020203" pitchFamily="34" charset="0"/>
+              </a:rPr>
+              <a:t>M</a:t>
+            </a:r>
+            <a:r>
+              <a:rPr lang="fr-FR" dirty="0" err="1" smtClean="0">
+                <a:latin typeface="Segoe UI Black" panose="020B0A02040204020203" pitchFamily="34" charset="0"/>
+                <a:ea typeface="Segoe UI Black" panose="020B0A02040204020203" pitchFamily="34" charset="0"/>
+              </a:rPr>
+              <a:t>achini</a:t>
+            </a:r>
+            <a:endParaRPr lang="en-US" dirty="0">
+              <a:latin typeface="Segoe UI Black" panose="020B0A02040204020203" pitchFamily="34" charset="0"/>
+              <a:ea typeface="Segoe UI Black" panose="020B0A02040204020203" pitchFamily="34" charset="0"/>
+            </a:endParaRPr>
+          </a:p>
+        </p:txBody>
+      </p:sp>
+      <p:sp>
+        <p:nvSpPr>
+          <p:cNvPr id="7" name="Rectangle à coins arrondis 6"/>
+          <p:cNvSpPr/>
+          <p:nvPr/>
+        </p:nvSpPr>
+        <p:spPr>
+          <a:xfrm>
+            <a:off x="4617175" y="2128263"/>
+            <a:ext cx="2828924" cy="538163"/>
+          </a:xfrm>
+          <a:prstGeom prst="roundRect">
+            <a:avLst>
+              <a:gd name="adj" fmla="val 42851"/>
+            </a:avLst>
+          </a:prstGeom>
+          <a:gradFill>
+            <a:gsLst>
+              <a:gs pos="0">
+                <a:schemeClr val="accent1">
+                  <a:lumMod val="5000"/>
+                  <a:lumOff val="95000"/>
+                </a:schemeClr>
+              </a:gs>
+              <a:gs pos="2000">
+                <a:schemeClr val="bg2">
+                  <a:lumMod val="10000"/>
+                </a:schemeClr>
+              </a:gs>
+            </a:gsLst>
+            <a:lin ang="5400000" scaled="1"/>
+          </a:gradFill>
+          <a:ln>
+            <a:solidFill>
+              <a:schemeClr val="bg2">
+                <a:lumMod val="10000"/>
+              </a:schemeClr>
+            </a:solidFill>
+          </a:ln>
+        </p:spPr>
+        <p:style>
+          <a:lnRef idx="2">
+            <a:schemeClr val="accent1">
+              <a:shade val="50000"/>
+            </a:schemeClr>
+          </a:lnRef>
+          <a:fillRef idx="1">
+            <a:schemeClr val="accent1"/>
+          </a:fillRef>
+          <a:effectRef idx="0">
+            <a:schemeClr val="accent1"/>
+          </a:effectRef>
+          <a:fontRef idx="minor">
+            <a:schemeClr val="lt1"/>
+          </a:fontRef>
+        </p:style>
+        <p:txBody>
+          <a:bodyPr rtlCol="0" anchor="ctr"/>
+          <a:lstStyle/>
+          <a:p>
+            <a:pPr algn="ctr"/>
+            <a:r>
+              <a:rPr lang="fr-FR" dirty="0" err="1" smtClean="0">
+                <a:solidFill>
+                  <a:schemeClr val="bg1">
+                    <a:lumMod val="50000"/>
+                  </a:schemeClr>
+                </a:solidFill>
+                <a:latin typeface="Segoe UI Black" panose="020B0A02040204020203" pitchFamily="34" charset="0"/>
+                <a:ea typeface="Segoe UI Black" panose="020B0A02040204020203" pitchFamily="34" charset="0"/>
+              </a:rPr>
+              <a:t>Dukine</a:t>
+            </a:r>
+            <a:endParaRPr lang="en-US" dirty="0">
+              <a:solidFill>
+                <a:schemeClr val="bg1">
+                  <a:lumMod val="50000"/>
+                </a:schemeClr>
+              </a:solidFill>
+              <a:latin typeface="Segoe UI Black" panose="020B0A02040204020203" pitchFamily="34" charset="0"/>
+              <a:ea typeface="Segoe UI Black" panose="020B0A02040204020203" pitchFamily="34" charset="0"/>
+            </a:endParaRPr>
+          </a:p>
+        </p:txBody>
+      </p:sp>
     </p:spTree>
     <p:extLst>
       <p:ext uri="{BB962C8B-B14F-4D97-AF65-F5344CB8AC3E}">
@@ -3181,102 +3538,129 @@
           <a:chExt cx="0" cy="0"/>
         </a:xfrm>
       </p:grpSpPr>
-      <p:sp>
-        <p:nvSpPr>
-          <p:cNvPr id="4" name="Rectangle à coins arrondis 3"/>
-          <p:cNvSpPr/>
+      <p:pic>
+        <p:nvPicPr>
+          <p:cNvPr id="1026" name="Picture 2" descr="Drapeau de la France — Wikipédia"/>
+          <p:cNvPicPr>
+            <a:picLocks noChangeAspect="1" noChangeArrowheads="1"/>
+          </p:cNvPicPr>
           <p:nvPr/>
-        </p:nvSpPr>
-        <p:spPr>
+        </p:nvPicPr>
+        <p:blipFill>
+          <a:blip r:embed="rId2" cstate="print">
+            <a:extLst>
+              <a:ext uri="{28A0092B-C50C-407E-A947-70E740481C1C}">
+                <a14:useLocalDpi xmlns:a14="http://schemas.microsoft.com/office/drawing/2010/main" val="0"/>
+              </a:ext>
+            </a:extLst>
+          </a:blip>
+          <a:srcRect/>
+          <a:stretch>
+            <a:fillRect/>
+          </a:stretch>
+        </p:blipFill>
+        <p:spPr bwMode="auto">
           <a:xfrm>
-            <a:off x="4538665" y="1042988"/>
-            <a:ext cx="2828924" cy="538163"/>
+            <a:off x="1042266" y="794327"/>
+            <a:ext cx="1959552" cy="1145309"/>
           </a:xfrm>
-          <a:prstGeom prst="roundRect">
-            <a:avLst>
-              <a:gd name="adj" fmla="val 42851"/>
-            </a:avLst>
+          <a:prstGeom prst="rect">
+            <a:avLst/>
           </a:prstGeom>
-          <a:gradFill>
-            <a:gsLst>
-              <a:gs pos="0">
-                <a:schemeClr val="accent1">
-                  <a:lumMod val="5000"/>
-                  <a:lumOff val="95000"/>
-                </a:schemeClr>
-              </a:gs>
-              <a:gs pos="10000">
-                <a:schemeClr val="bg2">
-                  <a:lumMod val="10000"/>
-                </a:schemeClr>
-              </a:gs>
-            </a:gsLst>
-            <a:lin ang="5400000" scaled="1"/>
-          </a:gradFill>
-          <a:ln>
-            <a:solidFill>
-              <a:schemeClr val="bg2">
-                <a:lumMod val="10000"/>
-              </a:schemeClr>
-            </a:solidFill>
-          </a:ln>
+          <a:noFill/>
+          <a:extLst>
+            <a:ext uri="{909E8E84-426E-40DD-AFC4-6F175D3DCCD1}">
+              <a14:hiddenFill xmlns:a14="http://schemas.microsoft.com/office/drawing/2010/main">
+                <a:solidFill>
+                  <a:srgbClr val="FFFFFF"/>
+                </a:solidFill>
+              </a14:hiddenFill>
+            </a:ext>
+          </a:extLst>
         </p:spPr>
-        <p:style>
-          <a:lnRef idx="2">
-            <a:schemeClr val="accent1">
-              <a:shade val="50000"/>
-            </a:schemeClr>
-          </a:lnRef>
-          <a:fillRef idx="1">
-            <a:schemeClr val="accent1"/>
-          </a:fillRef>
-          <a:effectRef idx="0">
-            <a:schemeClr val="accent1"/>
-          </a:effectRef>
-          <a:fontRef idx="minor">
-            <a:schemeClr val="lt1"/>
-          </a:fontRef>
-        </p:style>
-        <p:txBody>
-          <a:bodyPr rtlCol="0" anchor="ctr"/>
-          <a:lstStyle/>
-          <a:p>
-            <a:pPr algn="ctr"/>
-            <a:r>
-              <a:rPr lang="fr-FR" dirty="0" err="1" smtClean="0">
-                <a:latin typeface="Segoe UI Black" panose="020B0A02040204020203" pitchFamily="34" charset="0"/>
-                <a:ea typeface="Segoe UI Black" panose="020B0A02040204020203" pitchFamily="34" charset="0"/>
-              </a:rPr>
-              <a:t>Ingene</a:t>
-            </a:r>
-            <a:r>
-              <a:rPr lang="fr-FR" dirty="0" smtClean="0">
-                <a:latin typeface="Segoe UI Black" panose="020B0A02040204020203" pitchFamily="34" charset="0"/>
-                <a:ea typeface="Segoe UI Black" panose="020B0A02040204020203" pitchFamily="34" charset="0"/>
-              </a:rPr>
-              <a:t> </a:t>
-            </a:r>
-            <a:r>
-              <a:rPr lang="fr-FR" dirty="0" err="1">
-                <a:latin typeface="Segoe UI Black" panose="020B0A02040204020203" pitchFamily="34" charset="0"/>
-                <a:ea typeface="Segoe UI Black" panose="020B0A02040204020203" pitchFamily="34" charset="0"/>
-              </a:rPr>
-              <a:t>B</a:t>
-            </a:r>
-            <a:r>
-              <a:rPr lang="fr-FR" dirty="0" err="1" smtClean="0">
-                <a:latin typeface="Segoe UI Black" panose="020B0A02040204020203" pitchFamily="34" charset="0"/>
-                <a:ea typeface="Segoe UI Black" panose="020B0A02040204020203" pitchFamily="34" charset="0"/>
-              </a:rPr>
-              <a:t>akina</a:t>
-            </a:r>
-            <a:endParaRPr lang="en-US" dirty="0">
-              <a:latin typeface="Segoe UI Black" panose="020B0A02040204020203" pitchFamily="34" charset="0"/>
-              <a:ea typeface="Segoe UI Black" panose="020B0A02040204020203" pitchFamily="34" charset="0"/>
-            </a:endParaRPr>
-          </a:p>
-        </p:txBody>
-      </p:sp>
+      </p:pic>
+      <p:pic>
+        <p:nvPicPr>
+          <p:cNvPr id="1028" name="Picture 4" descr="File:Flag of Burundi.svg"/>
+          <p:cNvPicPr>
+            <a:picLocks noChangeAspect="1" noChangeArrowheads="1"/>
+          </p:cNvPicPr>
+          <p:nvPr/>
+        </p:nvPicPr>
+        <p:blipFill>
+          <a:blip r:embed="rId3" cstate="print">
+            <a:extLst>
+              <a:ext uri="{28A0092B-C50C-407E-A947-70E740481C1C}">
+                <a14:useLocalDpi xmlns:a14="http://schemas.microsoft.com/office/drawing/2010/main" val="0"/>
+              </a:ext>
+            </a:extLst>
+          </a:blip>
+          <a:srcRect/>
+          <a:stretch>
+            <a:fillRect/>
+          </a:stretch>
+        </p:blipFill>
+        <p:spPr bwMode="auto">
+          <a:xfrm>
+            <a:off x="3416011" y="2382982"/>
+            <a:ext cx="1959552" cy="1145309"/>
+          </a:xfrm>
+          <a:prstGeom prst="rect">
+            <a:avLst/>
+          </a:prstGeom>
+          <a:noFill/>
+          <a:extLst>
+            <a:ext uri="{909E8E84-426E-40DD-AFC4-6F175D3DCCD1}">
+              <a14:hiddenFill xmlns:a14="http://schemas.microsoft.com/office/drawing/2010/main">
+                <a:solidFill>
+                  <a:srgbClr val="FFFFFF"/>
+                </a:solidFill>
+              </a14:hiddenFill>
+            </a:ext>
+          </a:extLst>
+        </p:spPr>
+      </p:pic>
+      <p:pic>
+        <p:nvPicPr>
+          <p:cNvPr id="1030" name="Picture 6" descr="Fichier:Flag of the United States.svg — Wikipédia"/>
+          <p:cNvPicPr>
+            <a:picLocks noChangeAspect="1" noChangeArrowheads="1"/>
+          </p:cNvPicPr>
+          <p:nvPr/>
+        </p:nvPicPr>
+        <p:blipFill>
+          <a:blip r:embed="rId4" cstate="print">
+            <a:extLst>
+              <a:ext uri="{28A0092B-C50C-407E-A947-70E740481C1C}">
+                <a14:useLocalDpi xmlns:a14="http://schemas.microsoft.com/office/drawing/2010/main" val="0"/>
+              </a:ext>
+            </a:extLst>
+          </a:blip>
+          <a:srcRect/>
+          <a:stretch>
+            <a:fillRect/>
+          </a:stretch>
+        </p:blipFill>
+        <p:spPr bwMode="auto">
+          <a:xfrm>
+            <a:off x="5725102" y="794327"/>
+            <a:ext cx="1959552" cy="1145309"/>
+          </a:xfrm>
+          <a:prstGeom prst="rect">
+            <a:avLst/>
+          </a:prstGeom>
+          <a:noFill/>
+          <a:extLst>
+            <a:ext uri="{909E8E84-426E-40DD-AFC4-6F175D3DCCD1}">
+              <a14:hiddenFill xmlns:a14="http://schemas.microsoft.com/office/drawing/2010/main">
+                <a:solidFill>
+                  <a:srgbClr val="FFFFFF"/>
+                </a:solidFill>
+              </a14:hiddenFill>
+            </a:ext>
+          </a:extLst>
+        </p:spPr>
+      </p:pic>
     </p:spTree>
     <p:extLst>
       <p:ext uri="{BB962C8B-B14F-4D97-AF65-F5344CB8AC3E}">
@@ -3307,102 +3691,6 @@
           <a:chExt cx="0" cy="0"/>
         </a:xfrm>
       </p:grpSpPr>
-      <p:sp>
-        <p:nvSpPr>
-          <p:cNvPr id="4" name="Rectangle à coins arrondis 3"/>
-          <p:cNvSpPr/>
-          <p:nvPr/>
-        </p:nvSpPr>
-        <p:spPr>
-          <a:xfrm>
-            <a:off x="4538665" y="1042988"/>
-            <a:ext cx="2828924" cy="538163"/>
-          </a:xfrm>
-          <a:prstGeom prst="roundRect">
-            <a:avLst>
-              <a:gd name="adj" fmla="val 42851"/>
-            </a:avLst>
-          </a:prstGeom>
-          <a:gradFill>
-            <a:gsLst>
-              <a:gs pos="0">
-                <a:schemeClr val="accent1">
-                  <a:lumMod val="5000"/>
-                  <a:lumOff val="95000"/>
-                </a:schemeClr>
-              </a:gs>
-              <a:gs pos="10000">
-                <a:schemeClr val="bg2">
-                  <a:lumMod val="10000"/>
-                </a:schemeClr>
-              </a:gs>
-            </a:gsLst>
-            <a:lin ang="5400000" scaled="1"/>
-          </a:gradFill>
-          <a:ln>
-            <a:solidFill>
-              <a:schemeClr val="bg2">
-                <a:lumMod val="10000"/>
-              </a:schemeClr>
-            </a:solidFill>
-          </a:ln>
-        </p:spPr>
-        <p:style>
-          <a:lnRef idx="2">
-            <a:schemeClr val="accent1">
-              <a:shade val="50000"/>
-            </a:schemeClr>
-          </a:lnRef>
-          <a:fillRef idx="1">
-            <a:schemeClr val="accent1"/>
-          </a:fillRef>
-          <a:effectRef idx="0">
-            <a:schemeClr val="accent1"/>
-          </a:effectRef>
-          <a:fontRef idx="minor">
-            <a:schemeClr val="lt1"/>
-          </a:fontRef>
-        </p:style>
-        <p:txBody>
-          <a:bodyPr rtlCol="0" anchor="ctr"/>
-          <a:lstStyle/>
-          <a:p>
-            <a:pPr algn="ctr"/>
-            <a:r>
-              <a:rPr lang="fr-FR" dirty="0" err="1" smtClean="0">
-                <a:latin typeface="Segoe UI Black" panose="020B0A02040204020203" pitchFamily="34" charset="0"/>
-                <a:ea typeface="Segoe UI Black" panose="020B0A02040204020203" pitchFamily="34" charset="0"/>
-              </a:rPr>
-              <a:t>Kina</a:t>
-            </a:r>
-            <a:r>
-              <a:rPr lang="fr-FR" dirty="0" smtClean="0">
-                <a:latin typeface="Segoe UI Black" panose="020B0A02040204020203" pitchFamily="34" charset="0"/>
-                <a:ea typeface="Segoe UI Black" panose="020B0A02040204020203" pitchFamily="34" charset="0"/>
-              </a:rPr>
-              <a:t> n’i </a:t>
-            </a:r>
-            <a:r>
-              <a:rPr lang="fr-FR" dirty="0" err="1">
-                <a:latin typeface="Segoe UI Black" panose="020B0A02040204020203" pitchFamily="34" charset="0"/>
-                <a:ea typeface="Segoe UI Black" panose="020B0A02040204020203" pitchFamily="34" charset="0"/>
-              </a:rPr>
-              <a:t>M</a:t>
-            </a:r>
-            <a:r>
-              <a:rPr lang="fr-FR" dirty="0" err="1" smtClean="0">
-                <a:latin typeface="Segoe UI Black" panose="020B0A02040204020203" pitchFamily="34" charset="0"/>
-                <a:ea typeface="Segoe UI Black" panose="020B0A02040204020203" pitchFamily="34" charset="0"/>
-              </a:rPr>
-              <a:t>achini</a:t>
-            </a:r>
-            <a:endParaRPr lang="en-US" dirty="0">
-              <a:latin typeface="Segoe UI Black" panose="020B0A02040204020203" pitchFamily="34" charset="0"/>
-              <a:ea typeface="Segoe UI Black" panose="020B0A02040204020203" pitchFamily="34" charset="0"/>
-            </a:endParaRPr>
-          </a:p>
-        </p:txBody>
-      </p:sp>
     </p:spTree>
     <p:extLst>
       <p:ext uri="{BB962C8B-B14F-4D97-AF65-F5344CB8AC3E}">
@@ -3433,91 +3721,6 @@
           <a:chExt cx="0" cy="0"/>
         </a:xfrm>
       </p:grpSpPr>
-      <p:sp>
-        <p:nvSpPr>
-          <p:cNvPr id="4" name="Rectangle à coins arrondis 3"/>
-          <p:cNvSpPr/>
-          <p:nvPr/>
-        </p:nvSpPr>
-        <p:spPr>
-          <a:xfrm>
-            <a:off x="4538665" y="1042988"/>
-            <a:ext cx="2828924" cy="538163"/>
-          </a:xfrm>
-          <a:prstGeom prst="roundRect">
-            <a:avLst>
-              <a:gd name="adj" fmla="val 42851"/>
-            </a:avLst>
-          </a:prstGeom>
-          <a:gradFill>
-            <a:gsLst>
-              <a:gs pos="0">
-                <a:schemeClr val="accent1">
-                  <a:lumMod val="5000"/>
-                  <a:lumOff val="95000"/>
-                </a:schemeClr>
-              </a:gs>
-              <a:gs pos="2000">
-                <a:schemeClr val="bg2">
-                  <a:lumMod val="10000"/>
-                </a:schemeClr>
-              </a:gs>
-            </a:gsLst>
-            <a:lin ang="5400000" scaled="1"/>
-          </a:gradFill>
-          <a:ln>
-            <a:solidFill>
-              <a:schemeClr val="bg2">
-                <a:lumMod val="10000"/>
-              </a:schemeClr>
-            </a:solidFill>
-          </a:ln>
-        </p:spPr>
-        <p:style>
-          <a:lnRef idx="2">
-            <a:schemeClr val="accent1">
-              <a:shade val="50000"/>
-            </a:schemeClr>
-          </a:lnRef>
-          <a:fillRef idx="1">
-            <a:schemeClr val="accent1"/>
-          </a:fillRef>
-          <a:effectRef idx="0">
-            <a:schemeClr val="accent1"/>
-          </a:effectRef>
-          <a:fontRef idx="minor">
-            <a:schemeClr val="lt1"/>
-          </a:fontRef>
-        </p:style>
-        <p:txBody>
-          <a:bodyPr rtlCol="0" anchor="ctr"/>
-          <a:lstStyle/>
-          <a:p>
-            <a:pPr algn="ctr"/>
-            <a:r>
-              <a:rPr lang="fr-FR" dirty="0" err="1" smtClean="0">
-                <a:solidFill>
-                  <a:schemeClr val="bg1">
-                    <a:lumMod val="50000"/>
-                  </a:schemeClr>
-                </a:solidFill>
-                <a:latin typeface="Segoe UI Black" panose="020B0A02040204020203" pitchFamily="34" charset="0"/>
-                <a:ea typeface="Segoe UI Black" panose="020B0A02040204020203" pitchFamily="34" charset="0"/>
-              </a:rPr>
-              <a:t>Dukine</a:t>
-            </a:r>
-            <a:endParaRPr lang="en-US" dirty="0">
-              <a:solidFill>
-                <a:schemeClr val="bg1">
-                  <a:lumMod val="50000"/>
-                </a:schemeClr>
-              </a:solidFill>
-              <a:latin typeface="Segoe UI Black" panose="020B0A02040204020203" pitchFamily="34" charset="0"/>
-              <a:ea typeface="Segoe UI Black" panose="020B0A02040204020203" pitchFamily="34" charset="0"/>
-            </a:endParaRPr>
-          </a:p>
-        </p:txBody>
-      </p:sp>
     </p:spTree>
     <p:extLst>
       <p:ext uri="{BB962C8B-B14F-4D97-AF65-F5344CB8AC3E}">

</xml_diff>

<commit_message>
refactoring assets into design categories
</commit_message>
<xml_diff>
--- a/assets/buttons.pptx
+++ b/assets/buttons.pptx
@@ -7,10 +7,10 @@
   <p:sldIdLst>
     <p:sldId id="265" r:id="rId2"/>
     <p:sldId id="266" r:id="rId3"/>
-    <p:sldId id="260" r:id="rId4"/>
-    <p:sldId id="259" r:id="rId5"/>
-    <p:sldId id="258" r:id="rId6"/>
-    <p:sldId id="261" r:id="rId7"/>
+    <p:sldId id="261" r:id="rId4"/>
+    <p:sldId id="260" r:id="rId5"/>
+    <p:sldId id="259" r:id="rId6"/>
+    <p:sldId id="258" r:id="rId7"/>
     <p:sldId id="256" r:id="rId8"/>
     <p:sldId id="262" r:id="rId9"/>
     <p:sldId id="263" r:id="rId10"/>
@@ -251,7 +251,7 @@
           <a:p>
             <a:fld id="{2E40D743-7CB8-4D0B-882D-D502BAAD38FE}" type="datetimeFigureOut">
               <a:rPr lang="en-US" smtClean="0"/>
-              <a:t>4/10/2021</a:t>
+              <a:t>4/11/2021</a:t>
             </a:fld>
             <a:endParaRPr lang="en-US"/>
           </a:p>
@@ -421,7 +421,7 @@
           <a:p>
             <a:fld id="{2E40D743-7CB8-4D0B-882D-D502BAAD38FE}" type="datetimeFigureOut">
               <a:rPr lang="en-US" smtClean="0"/>
-              <a:t>4/10/2021</a:t>
+              <a:t>4/11/2021</a:t>
             </a:fld>
             <a:endParaRPr lang="en-US"/>
           </a:p>
@@ -601,7 +601,7 @@
           <a:p>
             <a:fld id="{2E40D743-7CB8-4D0B-882D-D502BAAD38FE}" type="datetimeFigureOut">
               <a:rPr lang="en-US" smtClean="0"/>
-              <a:t>4/10/2021</a:t>
+              <a:t>4/11/2021</a:t>
             </a:fld>
             <a:endParaRPr lang="en-US"/>
           </a:p>
@@ -771,7 +771,7 @@
           <a:p>
             <a:fld id="{2E40D743-7CB8-4D0B-882D-D502BAAD38FE}" type="datetimeFigureOut">
               <a:rPr lang="en-US" smtClean="0"/>
-              <a:t>4/10/2021</a:t>
+              <a:t>4/11/2021</a:t>
             </a:fld>
             <a:endParaRPr lang="en-US"/>
           </a:p>
@@ -1017,7 +1017,7 @@
           <a:p>
             <a:fld id="{2E40D743-7CB8-4D0B-882D-D502BAAD38FE}" type="datetimeFigureOut">
               <a:rPr lang="en-US" smtClean="0"/>
-              <a:t>4/10/2021</a:t>
+              <a:t>4/11/2021</a:t>
             </a:fld>
             <a:endParaRPr lang="en-US"/>
           </a:p>
@@ -1249,7 +1249,7 @@
           <a:p>
             <a:fld id="{2E40D743-7CB8-4D0B-882D-D502BAAD38FE}" type="datetimeFigureOut">
               <a:rPr lang="en-US" smtClean="0"/>
-              <a:t>4/10/2021</a:t>
+              <a:t>4/11/2021</a:t>
             </a:fld>
             <a:endParaRPr lang="en-US"/>
           </a:p>
@@ -1616,7 +1616,7 @@
           <a:p>
             <a:fld id="{2E40D743-7CB8-4D0B-882D-D502BAAD38FE}" type="datetimeFigureOut">
               <a:rPr lang="en-US" smtClean="0"/>
-              <a:t>4/10/2021</a:t>
+              <a:t>4/11/2021</a:t>
             </a:fld>
             <a:endParaRPr lang="en-US"/>
           </a:p>
@@ -1734,7 +1734,7 @@
           <a:p>
             <a:fld id="{2E40D743-7CB8-4D0B-882D-D502BAAD38FE}" type="datetimeFigureOut">
               <a:rPr lang="en-US" smtClean="0"/>
-              <a:t>4/10/2021</a:t>
+              <a:t>4/11/2021</a:t>
             </a:fld>
             <a:endParaRPr lang="en-US"/>
           </a:p>
@@ -1829,7 +1829,7 @@
           <a:p>
             <a:fld id="{2E40D743-7CB8-4D0B-882D-D502BAAD38FE}" type="datetimeFigureOut">
               <a:rPr lang="en-US" smtClean="0"/>
-              <a:t>4/10/2021</a:t>
+              <a:t>4/11/2021</a:t>
             </a:fld>
             <a:endParaRPr lang="en-US"/>
           </a:p>
@@ -2106,7 +2106,7 @@
           <a:p>
             <a:fld id="{2E40D743-7CB8-4D0B-882D-D502BAAD38FE}" type="datetimeFigureOut">
               <a:rPr lang="en-US" smtClean="0"/>
-              <a:t>4/10/2021</a:t>
+              <a:t>4/11/2021</a:t>
             </a:fld>
             <a:endParaRPr lang="en-US"/>
           </a:p>
@@ -2359,7 +2359,7 @@
           <a:p>
             <a:fld id="{2E40D743-7CB8-4D0B-882D-D502BAAD38FE}" type="datetimeFigureOut">
               <a:rPr lang="en-US" smtClean="0"/>
-              <a:t>4/10/2021</a:t>
+              <a:t>4/11/2021</a:t>
             </a:fld>
             <a:endParaRPr lang="en-US"/>
           </a:p>
@@ -2572,7 +2572,7 @@
           <a:p>
             <a:fld id="{2E40D743-7CB8-4D0B-882D-D502BAAD38FE}" type="datetimeFigureOut">
               <a:rPr lang="en-US" smtClean="0"/>
-              <a:t>4/10/2021</a:t>
+              <a:t>4/11/2021</a:t>
             </a:fld>
             <a:endParaRPr lang="en-US"/>
           </a:p>
@@ -3390,7 +3390,29 @@
                 <a:latin typeface="Segoe UI Black" panose="020B0A02040204020203" pitchFamily="34" charset="0"/>
                 <a:ea typeface="Segoe UI Black" panose="020B0A02040204020203" pitchFamily="34" charset="0"/>
               </a:rPr>
-              <a:t>Dukine</a:t>
+              <a:t>Du</a:t>
+            </a:r>
+            <a:r>
+              <a:rPr lang="fr-FR" dirty="0" err="1" smtClean="0">
+                <a:solidFill>
+                  <a:srgbClr val="7F7F7F"/>
+                </a:solidFill>
+                <a:latin typeface="Segoe UI Black" panose="020B0A02040204020203" pitchFamily="34" charset="0"/>
+                <a:ea typeface="Segoe UI Black" panose="020B0A02040204020203" pitchFamily="34" charset="0"/>
+              </a:rPr>
+              <a:t>ki</a:t>
+            </a:r>
+            <a:r>
+              <a:rPr lang="fr-FR" dirty="0" err="1" smtClean="0">
+                <a:solidFill>
+                  <a:schemeClr val="bg1">
+                    <a:lumMod val="50000"/>
+                  </a:schemeClr>
+                </a:solidFill>
+                <a:latin typeface="Segoe UI Black" panose="020B0A02040204020203" pitchFamily="34" charset="0"/>
+                <a:ea typeface="Segoe UI Black" panose="020B0A02040204020203" pitchFamily="34" charset="0"/>
+              </a:rPr>
+              <a:t>ne</a:t>
             </a:r>
             <a:endParaRPr lang="en-US" dirty="0">
               <a:solidFill>
@@ -7495,57 +7517,132 @@
       </p:grpSpPr>
       <p:grpSp>
         <p:nvGrpSpPr>
-          <p:cNvPr id="29" name="Groupe 28"/>
+          <p:cNvPr id="21" name="Groupe 20"/>
           <p:cNvGrpSpPr/>
           <p:nvPr/>
         </p:nvGrpSpPr>
         <p:grpSpPr>
           <a:xfrm>
-            <a:off x="6862368" y="3532878"/>
-            <a:ext cx="1069061" cy="1333575"/>
-            <a:chOff x="7100316" y="2883380"/>
-            <a:chExt cx="1069061" cy="1333575"/>
+            <a:off x="1022597" y="1279236"/>
+            <a:ext cx="1393371" cy="783771"/>
+            <a:chOff x="2380343" y="3149600"/>
+            <a:chExt cx="1393371" cy="783771"/>
           </a:xfrm>
         </p:grpSpPr>
+        <p:grpSp>
+          <p:nvGrpSpPr>
+            <p:cNvPr id="12" name="Groupe 11"/>
+            <p:cNvGrpSpPr/>
+            <p:nvPr/>
+          </p:nvGrpSpPr>
+          <p:grpSpPr>
+            <a:xfrm>
+              <a:off x="2732641" y="3257550"/>
+              <a:ext cx="759280" cy="508908"/>
+              <a:chOff x="2177143" y="1538523"/>
+              <a:chExt cx="3657600" cy="2641591"/>
+            </a:xfrm>
+          </p:grpSpPr>
+          <p:cxnSp>
+            <p:nvCxnSpPr>
+              <p:cNvPr id="3" name="Connecteur droit 2"/>
+              <p:cNvCxnSpPr/>
+              <p:nvPr/>
+            </p:nvCxnSpPr>
+            <p:spPr>
+              <a:xfrm flipH="1" flipV="1">
+                <a:off x="2177143" y="3018972"/>
+                <a:ext cx="1117600" cy="1161142"/>
+              </a:xfrm>
+              <a:prstGeom prst="line">
+                <a:avLst/>
+              </a:prstGeom>
+              <a:ln w="57150">
+                <a:solidFill>
+                  <a:schemeClr val="tx1"/>
+                </a:solidFill>
+              </a:ln>
+            </p:spPr>
+            <p:style>
+              <a:lnRef idx="1">
+                <a:schemeClr val="accent1"/>
+              </a:lnRef>
+              <a:fillRef idx="0">
+                <a:schemeClr val="accent1"/>
+              </a:fillRef>
+              <a:effectRef idx="0">
+                <a:schemeClr val="accent1"/>
+              </a:effectRef>
+              <a:fontRef idx="minor">
+                <a:schemeClr val="tx1"/>
+              </a:fontRef>
+            </p:style>
+          </p:cxnSp>
+          <p:cxnSp>
+            <p:nvCxnSpPr>
+              <p:cNvPr id="6" name="Connecteur droit 5"/>
+              <p:cNvCxnSpPr/>
+              <p:nvPr/>
+            </p:nvCxnSpPr>
+            <p:spPr>
+              <a:xfrm flipV="1">
+                <a:off x="3081711" y="1538523"/>
+                <a:ext cx="2753032" cy="2641591"/>
+              </a:xfrm>
+              <a:prstGeom prst="line">
+                <a:avLst/>
+              </a:prstGeom>
+              <a:ln w="57150">
+                <a:solidFill>
+                  <a:schemeClr val="tx1"/>
+                </a:solidFill>
+              </a:ln>
+            </p:spPr>
+            <p:style>
+              <a:lnRef idx="1">
+                <a:schemeClr val="accent1"/>
+              </a:lnRef>
+              <a:fillRef idx="0">
+                <a:schemeClr val="accent1"/>
+              </a:fillRef>
+              <a:effectRef idx="0">
+                <a:schemeClr val="accent1"/>
+              </a:effectRef>
+              <a:fontRef idx="minor">
+                <a:schemeClr val="tx1"/>
+              </a:fontRef>
+            </p:style>
+          </p:cxnSp>
+        </p:grpSp>
         <p:sp>
           <p:nvSpPr>
-            <p:cNvPr id="13" name="Rectangle à coins arrondis 12"/>
+            <p:cNvPr id="13" name="Rectangle 12"/>
             <p:cNvSpPr/>
             <p:nvPr/>
           </p:nvSpPr>
           <p:spPr>
             <a:xfrm>
-              <a:off x="7100316" y="2883380"/>
-              <a:ext cx="1061441" cy="1333575"/>
+              <a:off x="2380343" y="3149600"/>
+              <a:ext cx="1393371" cy="783771"/>
             </a:xfrm>
-            <a:prstGeom prst="roundRect">
-              <a:avLst>
-                <a:gd name="adj" fmla="val 9407"/>
-              </a:avLst>
+            <a:prstGeom prst="rect">
+              <a:avLst/>
             </a:prstGeom>
-            <a:solidFill>
-              <a:schemeClr val="bg1"/>
-            </a:solidFill>
-            <a:ln w="38100">
-              <a:solidFill>
-                <a:schemeClr val="tx1"/>
-              </a:solidFill>
-            </a:ln>
+            <a:noFill/>
+            <a:ln w="19050"/>
           </p:spPr>
           <p:style>
             <a:lnRef idx="2">
-              <a:schemeClr val="accent1">
-                <a:shade val="50000"/>
-              </a:schemeClr>
+              <a:schemeClr val="dk1"/>
             </a:lnRef>
             <a:fillRef idx="1">
-              <a:schemeClr val="accent1"/>
+              <a:schemeClr val="lt1"/>
             </a:fillRef>
             <a:effectRef idx="0">
-              <a:schemeClr val="accent1"/>
+              <a:schemeClr val="dk1"/>
             </a:effectRef>
             <a:fontRef idx="minor">
-              <a:schemeClr val="lt1"/>
+              <a:schemeClr val="dk1"/>
             </a:fontRef>
           </p:style>
           <p:txBody>
@@ -7557,42 +7654,1385 @@
             </a:p>
           </p:txBody>
         </p:sp>
-        <p:cxnSp>
-          <p:nvCxnSpPr>
-            <p:cNvPr id="25" name="Connecteur droit 24"/>
-            <p:cNvCxnSpPr/>
+      </p:grpSp>
+      <p:grpSp>
+        <p:nvGrpSpPr>
+          <p:cNvPr id="22" name="Groupe 21"/>
+          <p:cNvGrpSpPr/>
+          <p:nvPr/>
+        </p:nvGrpSpPr>
+        <p:grpSpPr>
+          <a:xfrm>
+            <a:off x="1022596" y="2493526"/>
+            <a:ext cx="1393371" cy="783771"/>
+            <a:chOff x="2380343" y="3149600"/>
+            <a:chExt cx="1393371" cy="783771"/>
+          </a:xfrm>
+        </p:grpSpPr>
+        <p:sp>
+          <p:nvSpPr>
+            <p:cNvPr id="24" name="Rectangle 23"/>
+            <p:cNvSpPr/>
             <p:nvPr/>
-          </p:nvCxnSpPr>
+          </p:nvSpPr>
           <p:spPr>
             <a:xfrm>
-              <a:off x="7101840" y="3754687"/>
-              <a:ext cx="1067537" cy="1"/>
+              <a:off x="2380343" y="3149600"/>
+              <a:ext cx="1393371" cy="783771"/>
             </a:xfrm>
-            <a:prstGeom prst="line">
+            <a:prstGeom prst="rect">
               <a:avLst/>
             </a:prstGeom>
-            <a:ln w="38100">
-              <a:solidFill>
-                <a:schemeClr val="tx1"/>
-              </a:solidFill>
-            </a:ln>
+            <a:solidFill>
+              <a:schemeClr val="tx1"/>
+            </a:solidFill>
+            <a:ln w="19050"/>
           </p:spPr>
           <p:style>
-            <a:lnRef idx="1">
-              <a:schemeClr val="accent1"/>
+            <a:lnRef idx="2">
+              <a:schemeClr val="dk1"/>
             </a:lnRef>
-            <a:fillRef idx="0">
-              <a:schemeClr val="accent1"/>
+            <a:fillRef idx="1">
+              <a:schemeClr val="lt1"/>
             </a:fillRef>
             <a:effectRef idx="0">
-              <a:schemeClr val="accent1"/>
+              <a:schemeClr val="dk1"/>
             </a:effectRef>
             <a:fontRef idx="minor">
-              <a:schemeClr val="tx1"/>
+              <a:schemeClr val="dk1"/>
             </a:fontRef>
           </p:style>
-        </p:cxnSp>
+          <p:txBody>
+            <a:bodyPr rtlCol="0" anchor="ctr"/>
+            <a:lstStyle/>
+            <a:p>
+              <a:pPr algn="ctr"/>
+              <a:endParaRPr lang="en-US"/>
+            </a:p>
+          </p:txBody>
+        </p:sp>
+        <p:grpSp>
+          <p:nvGrpSpPr>
+            <p:cNvPr id="23" name="Groupe 22"/>
+            <p:cNvGrpSpPr/>
+            <p:nvPr/>
+          </p:nvGrpSpPr>
+          <p:grpSpPr>
+            <a:xfrm>
+              <a:off x="2732641" y="3257550"/>
+              <a:ext cx="759280" cy="508908"/>
+              <a:chOff x="2177143" y="1538523"/>
+              <a:chExt cx="3657600" cy="2641591"/>
+            </a:xfrm>
+          </p:grpSpPr>
+          <p:cxnSp>
+            <p:nvCxnSpPr>
+              <p:cNvPr id="25" name="Connecteur droit 24"/>
+              <p:cNvCxnSpPr/>
+              <p:nvPr/>
+            </p:nvCxnSpPr>
+            <p:spPr>
+              <a:xfrm flipH="1" flipV="1">
+                <a:off x="2177143" y="3018972"/>
+                <a:ext cx="1117600" cy="1161142"/>
+              </a:xfrm>
+              <a:prstGeom prst="line">
+                <a:avLst/>
+              </a:prstGeom>
+              <a:ln w="57150">
+                <a:solidFill>
+                  <a:schemeClr val="bg1"/>
+                </a:solidFill>
+              </a:ln>
+            </p:spPr>
+            <p:style>
+              <a:lnRef idx="1">
+                <a:schemeClr val="accent1"/>
+              </a:lnRef>
+              <a:fillRef idx="0">
+                <a:schemeClr val="accent1"/>
+              </a:fillRef>
+              <a:effectRef idx="0">
+                <a:schemeClr val="accent1"/>
+              </a:effectRef>
+              <a:fontRef idx="minor">
+                <a:schemeClr val="tx1"/>
+              </a:fontRef>
+            </p:style>
+          </p:cxnSp>
+          <p:cxnSp>
+            <p:nvCxnSpPr>
+              <p:cNvPr id="26" name="Connecteur droit 25"/>
+              <p:cNvCxnSpPr/>
+              <p:nvPr/>
+            </p:nvCxnSpPr>
+            <p:spPr>
+              <a:xfrm flipV="1">
+                <a:off x="3081711" y="1538523"/>
+                <a:ext cx="2753032" cy="2641591"/>
+              </a:xfrm>
+              <a:prstGeom prst="line">
+                <a:avLst/>
+              </a:prstGeom>
+              <a:ln w="57150">
+                <a:solidFill>
+                  <a:schemeClr val="bg1"/>
+                </a:solidFill>
+              </a:ln>
+            </p:spPr>
+            <p:style>
+              <a:lnRef idx="1">
+                <a:schemeClr val="accent1"/>
+              </a:lnRef>
+              <a:fillRef idx="0">
+                <a:schemeClr val="accent1"/>
+              </a:fillRef>
+              <a:effectRef idx="0">
+                <a:schemeClr val="accent1"/>
+              </a:effectRef>
+              <a:fontRef idx="minor">
+                <a:schemeClr val="tx1"/>
+              </a:fontRef>
+            </p:style>
+          </p:cxnSp>
+        </p:grpSp>
       </p:grpSp>
+      <p:sp>
+        <p:nvSpPr>
+          <p:cNvPr id="27" name="Rectangle à coins arrondis 26"/>
+          <p:cNvSpPr/>
+          <p:nvPr/>
+        </p:nvSpPr>
+        <p:spPr>
+          <a:xfrm>
+            <a:off x="9443806" y="1279235"/>
+            <a:ext cx="1393372" cy="783772"/>
+          </a:xfrm>
+          <a:prstGeom prst="roundRect">
+            <a:avLst>
+              <a:gd name="adj" fmla="val 42851"/>
+            </a:avLst>
+          </a:prstGeom>
+          <a:gradFill>
+            <a:gsLst>
+              <a:gs pos="0">
+                <a:schemeClr val="accent1">
+                  <a:lumMod val="5000"/>
+                  <a:lumOff val="95000"/>
+                </a:schemeClr>
+              </a:gs>
+              <a:gs pos="10000">
+                <a:schemeClr val="bg2">
+                  <a:lumMod val="10000"/>
+                </a:schemeClr>
+              </a:gs>
+            </a:gsLst>
+            <a:lin ang="5400000" scaled="1"/>
+          </a:gradFill>
+          <a:ln>
+            <a:solidFill>
+              <a:schemeClr val="bg2">
+                <a:lumMod val="10000"/>
+              </a:schemeClr>
+            </a:solidFill>
+          </a:ln>
+        </p:spPr>
+        <p:style>
+          <a:lnRef idx="2">
+            <a:schemeClr val="accent1">
+              <a:shade val="50000"/>
+            </a:schemeClr>
+          </a:lnRef>
+          <a:fillRef idx="1">
+            <a:schemeClr val="accent1"/>
+          </a:fillRef>
+          <a:effectRef idx="0">
+            <a:schemeClr val="accent1"/>
+          </a:effectRef>
+          <a:fontRef idx="minor">
+            <a:schemeClr val="lt1"/>
+          </a:fontRef>
+        </p:style>
+        <p:txBody>
+          <a:bodyPr rtlCol="0" anchor="ctr"/>
+          <a:lstStyle/>
+          <a:p>
+            <a:pPr algn="ctr"/>
+            <a:endParaRPr lang="en-US" dirty="0">
+              <a:latin typeface="Segoe UI Black" panose="020B0A02040204020203" pitchFamily="34" charset="0"/>
+              <a:ea typeface="Segoe UI Black" panose="020B0A02040204020203" pitchFamily="34" charset="0"/>
+            </a:endParaRPr>
+          </a:p>
+        </p:txBody>
+      </p:sp>
+      <p:cxnSp>
+        <p:nvCxnSpPr>
+          <p:cNvPr id="28" name="Connecteur droit 27"/>
+          <p:cNvCxnSpPr/>
+          <p:nvPr/>
+        </p:nvCxnSpPr>
+        <p:spPr>
+          <a:xfrm flipH="1" flipV="1">
+            <a:off x="9750539" y="1672397"/>
+            <a:ext cx="232002" cy="223696"/>
+          </a:xfrm>
+          <a:prstGeom prst="line">
+            <a:avLst/>
+          </a:prstGeom>
+          <a:ln w="57150">
+            <a:solidFill>
+              <a:schemeClr val="bg1"/>
+            </a:solidFill>
+          </a:ln>
+        </p:spPr>
+        <p:style>
+          <a:lnRef idx="1">
+            <a:schemeClr val="accent1"/>
+          </a:lnRef>
+          <a:fillRef idx="0">
+            <a:schemeClr val="accent1"/>
+          </a:fillRef>
+          <a:effectRef idx="0">
+            <a:schemeClr val="accent1"/>
+          </a:effectRef>
+          <a:fontRef idx="minor">
+            <a:schemeClr val="tx1"/>
+          </a:fontRef>
+        </p:style>
+      </p:cxnSp>
+      <p:cxnSp>
+        <p:nvCxnSpPr>
+          <p:cNvPr id="29" name="Connecteur droit 28"/>
+          <p:cNvCxnSpPr/>
+          <p:nvPr/>
+        </p:nvCxnSpPr>
+        <p:spPr>
+          <a:xfrm flipV="1">
+            <a:off x="9938318" y="1387185"/>
+            <a:ext cx="571501" cy="508908"/>
+          </a:xfrm>
+          <a:prstGeom prst="line">
+            <a:avLst/>
+          </a:prstGeom>
+          <a:ln w="57150">
+            <a:solidFill>
+              <a:schemeClr val="bg1"/>
+            </a:solidFill>
+          </a:ln>
+        </p:spPr>
+        <p:style>
+          <a:lnRef idx="1">
+            <a:schemeClr val="accent1"/>
+          </a:lnRef>
+          <a:fillRef idx="0">
+            <a:schemeClr val="accent1"/>
+          </a:fillRef>
+          <a:effectRef idx="0">
+            <a:schemeClr val="accent1"/>
+          </a:effectRef>
+          <a:fontRef idx="minor">
+            <a:schemeClr val="tx1"/>
+          </a:fontRef>
+        </p:style>
+      </p:cxnSp>
+      <p:sp>
+        <p:nvSpPr>
+          <p:cNvPr id="30" name="Rectangle à coins arrondis 29"/>
+          <p:cNvSpPr/>
+          <p:nvPr/>
+        </p:nvSpPr>
+        <p:spPr>
+          <a:xfrm>
+            <a:off x="9443806" y="2494142"/>
+            <a:ext cx="1393372" cy="785091"/>
+          </a:xfrm>
+          <a:prstGeom prst="roundRect">
+            <a:avLst>
+              <a:gd name="adj" fmla="val 42851"/>
+            </a:avLst>
+          </a:prstGeom>
+          <a:gradFill>
+            <a:gsLst>
+              <a:gs pos="0">
+                <a:schemeClr val="accent1">
+                  <a:lumMod val="5000"/>
+                  <a:lumOff val="95000"/>
+                </a:schemeClr>
+              </a:gs>
+              <a:gs pos="2000">
+                <a:schemeClr val="bg2">
+                  <a:lumMod val="10000"/>
+                </a:schemeClr>
+              </a:gs>
+            </a:gsLst>
+            <a:lin ang="5400000" scaled="1"/>
+          </a:gradFill>
+          <a:ln>
+            <a:solidFill>
+              <a:schemeClr val="bg2">
+                <a:lumMod val="10000"/>
+              </a:schemeClr>
+            </a:solidFill>
+          </a:ln>
+        </p:spPr>
+        <p:style>
+          <a:lnRef idx="2">
+            <a:schemeClr val="accent1">
+              <a:shade val="50000"/>
+            </a:schemeClr>
+          </a:lnRef>
+          <a:fillRef idx="1">
+            <a:schemeClr val="accent1"/>
+          </a:fillRef>
+          <a:effectRef idx="0">
+            <a:schemeClr val="accent1"/>
+          </a:effectRef>
+          <a:fontRef idx="minor">
+            <a:schemeClr val="lt1"/>
+          </a:fontRef>
+        </p:style>
+        <p:txBody>
+          <a:bodyPr rtlCol="0" anchor="ctr"/>
+          <a:lstStyle/>
+          <a:p>
+            <a:pPr algn="ctr"/>
+            <a:endParaRPr lang="en-US" dirty="0">
+              <a:solidFill>
+                <a:schemeClr val="bg1">
+                  <a:lumMod val="50000"/>
+                </a:schemeClr>
+              </a:solidFill>
+              <a:latin typeface="Segoe UI Black" panose="020B0A02040204020203" pitchFamily="34" charset="0"/>
+              <a:ea typeface="Segoe UI Black" panose="020B0A02040204020203" pitchFamily="34" charset="0"/>
+            </a:endParaRPr>
+          </a:p>
+        </p:txBody>
+      </p:sp>
+      <p:cxnSp>
+        <p:nvCxnSpPr>
+          <p:cNvPr id="31" name="Connecteur droit 30"/>
+          <p:cNvCxnSpPr/>
+          <p:nvPr/>
+        </p:nvCxnSpPr>
+        <p:spPr>
+          <a:xfrm flipH="1" flipV="1">
+            <a:off x="9750539" y="2886688"/>
+            <a:ext cx="232002" cy="223696"/>
+          </a:xfrm>
+          <a:prstGeom prst="line">
+            <a:avLst/>
+          </a:prstGeom>
+          <a:ln w="57150">
+            <a:solidFill>
+              <a:srgbClr val="7F7F7F"/>
+            </a:solidFill>
+          </a:ln>
+        </p:spPr>
+        <p:style>
+          <a:lnRef idx="1">
+            <a:schemeClr val="accent1"/>
+          </a:lnRef>
+          <a:fillRef idx="0">
+            <a:schemeClr val="accent1"/>
+          </a:fillRef>
+          <a:effectRef idx="0">
+            <a:schemeClr val="accent1"/>
+          </a:effectRef>
+          <a:fontRef idx="minor">
+            <a:schemeClr val="tx1"/>
+          </a:fontRef>
+        </p:style>
+      </p:cxnSp>
+      <p:cxnSp>
+        <p:nvCxnSpPr>
+          <p:cNvPr id="32" name="Connecteur droit 31"/>
+          <p:cNvCxnSpPr/>
+          <p:nvPr/>
+        </p:nvCxnSpPr>
+        <p:spPr>
+          <a:xfrm flipV="1">
+            <a:off x="9938318" y="2601476"/>
+            <a:ext cx="571501" cy="508908"/>
+          </a:xfrm>
+          <a:prstGeom prst="line">
+            <a:avLst/>
+          </a:prstGeom>
+          <a:ln w="57150">
+            <a:solidFill>
+              <a:srgbClr val="7F7F7F"/>
+            </a:solidFill>
+          </a:ln>
+        </p:spPr>
+        <p:style>
+          <a:lnRef idx="1">
+            <a:schemeClr val="accent1"/>
+          </a:lnRef>
+          <a:fillRef idx="0">
+            <a:schemeClr val="accent1"/>
+          </a:fillRef>
+          <a:effectRef idx="0">
+            <a:schemeClr val="accent1"/>
+          </a:effectRef>
+          <a:fontRef idx="minor">
+            <a:schemeClr val="tx1"/>
+          </a:fontRef>
+        </p:style>
+      </p:cxnSp>
+      <p:sp>
+        <p:nvSpPr>
+          <p:cNvPr id="33" name="Rectangle à coins arrondis 32"/>
+          <p:cNvSpPr/>
+          <p:nvPr/>
+        </p:nvSpPr>
+        <p:spPr>
+          <a:xfrm>
+            <a:off x="6205813" y="3956060"/>
+            <a:ext cx="1393373" cy="783771"/>
+          </a:xfrm>
+          <a:prstGeom prst="roundRect">
+            <a:avLst>
+              <a:gd name="adj" fmla="val 42851"/>
+            </a:avLst>
+          </a:prstGeom>
+          <a:gradFill>
+            <a:gsLst>
+              <a:gs pos="0">
+                <a:schemeClr val="accent1">
+                  <a:lumMod val="5000"/>
+                  <a:lumOff val="95000"/>
+                </a:schemeClr>
+              </a:gs>
+              <a:gs pos="10000">
+                <a:schemeClr val="bg2">
+                  <a:lumMod val="10000"/>
+                </a:schemeClr>
+              </a:gs>
+            </a:gsLst>
+            <a:lin ang="5400000" scaled="1"/>
+          </a:gradFill>
+          <a:ln>
+            <a:solidFill>
+              <a:schemeClr val="bg2">
+                <a:lumMod val="10000"/>
+              </a:schemeClr>
+            </a:solidFill>
+          </a:ln>
+        </p:spPr>
+        <p:style>
+          <a:lnRef idx="2">
+            <a:schemeClr val="accent1">
+              <a:shade val="50000"/>
+            </a:schemeClr>
+          </a:lnRef>
+          <a:fillRef idx="1">
+            <a:schemeClr val="accent1"/>
+          </a:fillRef>
+          <a:effectRef idx="0">
+            <a:schemeClr val="accent1"/>
+          </a:effectRef>
+          <a:fontRef idx="minor">
+            <a:schemeClr val="lt1"/>
+          </a:fontRef>
+        </p:style>
+        <p:txBody>
+          <a:bodyPr rtlCol="0" anchor="ctr"/>
+          <a:lstStyle/>
+          <a:p>
+            <a:pPr algn="ctr"/>
+            <a:r>
+              <a:rPr lang="fr-FR" dirty="0" smtClean="0">
+                <a:latin typeface="Segoe UI Black" panose="020B0A02040204020203" pitchFamily="34" charset="0"/>
+                <a:ea typeface="Segoe UI Black" panose="020B0A02040204020203" pitchFamily="34" charset="0"/>
+              </a:rPr>
+              <a:t>Default</a:t>
+            </a:r>
+            <a:endParaRPr lang="en-US" dirty="0">
+              <a:latin typeface="Segoe UI Black" panose="020B0A02040204020203" pitchFamily="34" charset="0"/>
+              <a:ea typeface="Segoe UI Black" panose="020B0A02040204020203" pitchFamily="34" charset="0"/>
+            </a:endParaRPr>
+          </a:p>
+        </p:txBody>
+      </p:sp>
+      <p:sp>
+        <p:nvSpPr>
+          <p:cNvPr id="34" name="Rectangle à coins arrondis 33"/>
+          <p:cNvSpPr/>
+          <p:nvPr/>
+        </p:nvSpPr>
+        <p:spPr>
+          <a:xfrm>
+            <a:off x="6205812" y="5170352"/>
+            <a:ext cx="1393373" cy="783770"/>
+          </a:xfrm>
+          <a:prstGeom prst="roundRect">
+            <a:avLst>
+              <a:gd name="adj" fmla="val 42851"/>
+            </a:avLst>
+          </a:prstGeom>
+          <a:gradFill>
+            <a:gsLst>
+              <a:gs pos="0">
+                <a:schemeClr val="accent1">
+                  <a:lumMod val="5000"/>
+                  <a:lumOff val="95000"/>
+                </a:schemeClr>
+              </a:gs>
+              <a:gs pos="2000">
+                <a:schemeClr val="bg2">
+                  <a:lumMod val="10000"/>
+                </a:schemeClr>
+              </a:gs>
+            </a:gsLst>
+            <a:lin ang="5400000" scaled="1"/>
+          </a:gradFill>
+          <a:ln>
+            <a:solidFill>
+              <a:schemeClr val="bg2">
+                <a:lumMod val="10000"/>
+              </a:schemeClr>
+            </a:solidFill>
+          </a:ln>
+        </p:spPr>
+        <p:style>
+          <a:lnRef idx="2">
+            <a:schemeClr val="accent1">
+              <a:shade val="50000"/>
+            </a:schemeClr>
+          </a:lnRef>
+          <a:fillRef idx="1">
+            <a:schemeClr val="accent1"/>
+          </a:fillRef>
+          <a:effectRef idx="0">
+            <a:schemeClr val="accent1"/>
+          </a:effectRef>
+          <a:fontRef idx="minor">
+            <a:schemeClr val="lt1"/>
+          </a:fontRef>
+        </p:style>
+        <p:txBody>
+          <a:bodyPr rtlCol="0" anchor="ctr"/>
+          <a:lstStyle/>
+          <a:p>
+            <a:pPr algn="ctr"/>
+            <a:r>
+              <a:rPr lang="fr-FR" dirty="0" smtClean="0">
+                <a:solidFill>
+                  <a:schemeClr val="bg1">
+                    <a:lumMod val="50000"/>
+                  </a:schemeClr>
+                </a:solidFill>
+                <a:latin typeface="Segoe UI Black" panose="020B0A02040204020203" pitchFamily="34" charset="0"/>
+                <a:ea typeface="Segoe UI Black" panose="020B0A02040204020203" pitchFamily="34" charset="0"/>
+              </a:rPr>
+              <a:t>Default</a:t>
+            </a:r>
+            <a:endParaRPr lang="en-US" dirty="0">
+              <a:solidFill>
+                <a:schemeClr val="bg1">
+                  <a:lumMod val="50000"/>
+                </a:schemeClr>
+              </a:solidFill>
+              <a:latin typeface="Segoe UI Black" panose="020B0A02040204020203" pitchFamily="34" charset="0"/>
+              <a:ea typeface="Segoe UI Black" panose="020B0A02040204020203" pitchFamily="34" charset="0"/>
+            </a:endParaRPr>
+          </a:p>
+        </p:txBody>
+      </p:sp>
+      <p:sp>
+        <p:nvSpPr>
+          <p:cNvPr id="35" name="Rectangle à coins arrondis 34"/>
+          <p:cNvSpPr/>
+          <p:nvPr/>
+        </p:nvSpPr>
+        <p:spPr>
+          <a:xfrm>
+            <a:off x="4260592" y="3956060"/>
+            <a:ext cx="1393373" cy="783771"/>
+          </a:xfrm>
+          <a:prstGeom prst="roundRect">
+            <a:avLst>
+              <a:gd name="adj" fmla="val 0"/>
+            </a:avLst>
+          </a:prstGeom>
+          <a:ln/>
+        </p:spPr>
+        <p:style>
+          <a:lnRef idx="2">
+            <a:schemeClr val="dk1"/>
+          </a:lnRef>
+          <a:fillRef idx="1">
+            <a:schemeClr val="lt1"/>
+          </a:fillRef>
+          <a:effectRef idx="0">
+            <a:schemeClr val="dk1"/>
+          </a:effectRef>
+          <a:fontRef idx="minor">
+            <a:schemeClr val="dk1"/>
+          </a:fontRef>
+        </p:style>
+        <p:txBody>
+          <a:bodyPr rtlCol="0" anchor="ctr"/>
+          <a:lstStyle/>
+          <a:p>
+            <a:pPr algn="ctr"/>
+            <a:r>
+              <a:rPr lang="fr-FR" dirty="0" err="1" smtClean="0">
+                <a:latin typeface="Segoe UI Black" panose="020B0A02040204020203" pitchFamily="34" charset="0"/>
+                <a:ea typeface="Segoe UI Black" panose="020B0A02040204020203" pitchFamily="34" charset="0"/>
+              </a:rPr>
+              <a:t>Ibisanzwe</a:t>
+            </a:r>
+            <a:endParaRPr lang="en-US" dirty="0">
+              <a:latin typeface="Segoe UI Black" panose="020B0A02040204020203" pitchFamily="34" charset="0"/>
+              <a:ea typeface="Segoe UI Black" panose="020B0A02040204020203" pitchFamily="34" charset="0"/>
+            </a:endParaRPr>
+          </a:p>
+        </p:txBody>
+      </p:sp>
+      <p:sp>
+        <p:nvSpPr>
+          <p:cNvPr id="36" name="Rectangle à coins arrondis 35"/>
+          <p:cNvSpPr/>
+          <p:nvPr/>
+        </p:nvSpPr>
+        <p:spPr>
+          <a:xfrm>
+            <a:off x="4260592" y="5165658"/>
+            <a:ext cx="1393373" cy="783770"/>
+          </a:xfrm>
+          <a:prstGeom prst="roundRect">
+            <a:avLst>
+              <a:gd name="adj" fmla="val 0"/>
+            </a:avLst>
+          </a:prstGeom>
+          <a:ln/>
+        </p:spPr>
+        <p:style>
+          <a:lnRef idx="2">
+            <a:schemeClr val="dk1">
+              <a:shade val="50000"/>
+            </a:schemeClr>
+          </a:lnRef>
+          <a:fillRef idx="1">
+            <a:schemeClr val="dk1"/>
+          </a:fillRef>
+          <a:effectRef idx="0">
+            <a:schemeClr val="dk1"/>
+          </a:effectRef>
+          <a:fontRef idx="minor">
+            <a:schemeClr val="lt1"/>
+          </a:fontRef>
+        </p:style>
+        <p:txBody>
+          <a:bodyPr rtlCol="0" anchor="ctr"/>
+          <a:lstStyle/>
+          <a:p>
+            <a:pPr algn="ctr"/>
+            <a:r>
+              <a:rPr lang="fr-FR" dirty="0" err="1" smtClean="0">
+                <a:solidFill>
+                  <a:schemeClr val="bg1"/>
+                </a:solidFill>
+                <a:latin typeface="Segoe UI Black" panose="020B0A02040204020203" pitchFamily="34" charset="0"/>
+                <a:ea typeface="Segoe UI Black" panose="020B0A02040204020203" pitchFamily="34" charset="0"/>
+              </a:rPr>
+              <a:t>Ibisanzwe</a:t>
+            </a:r>
+            <a:endParaRPr lang="en-US" dirty="0">
+              <a:solidFill>
+                <a:schemeClr val="bg1"/>
+              </a:solidFill>
+              <a:latin typeface="Segoe UI Black" panose="020B0A02040204020203" pitchFamily="34" charset="0"/>
+              <a:ea typeface="Segoe UI Black" panose="020B0A02040204020203" pitchFamily="34" charset="0"/>
+            </a:endParaRPr>
+          </a:p>
+        </p:txBody>
+      </p:sp>
+      <p:sp>
+        <p:nvSpPr>
+          <p:cNvPr id="37" name="Rectangle à coins arrondis 36"/>
+          <p:cNvSpPr/>
+          <p:nvPr/>
+        </p:nvSpPr>
+        <p:spPr>
+          <a:xfrm>
+            <a:off x="2641594" y="3956060"/>
+            <a:ext cx="1393373" cy="783771"/>
+          </a:xfrm>
+          <a:prstGeom prst="roundRect">
+            <a:avLst>
+              <a:gd name="adj" fmla="val 0"/>
+            </a:avLst>
+          </a:prstGeom>
+          <a:ln/>
+        </p:spPr>
+        <p:style>
+          <a:lnRef idx="2">
+            <a:schemeClr val="dk1"/>
+          </a:lnRef>
+          <a:fillRef idx="1">
+            <a:schemeClr val="lt1"/>
+          </a:fillRef>
+          <a:effectRef idx="0">
+            <a:schemeClr val="dk1"/>
+          </a:effectRef>
+          <a:fontRef idx="minor">
+            <a:schemeClr val="dk1"/>
+          </a:fontRef>
+        </p:style>
+        <p:txBody>
+          <a:bodyPr rtlCol="0" anchor="ctr"/>
+          <a:lstStyle/>
+          <a:p>
+            <a:pPr algn="ctr"/>
+            <a:r>
+              <a:rPr lang="fr-FR" dirty="0" smtClean="0">
+                <a:latin typeface="Segoe UI Black" panose="020B0A02040204020203" pitchFamily="34" charset="0"/>
+                <a:ea typeface="Segoe UI Black" panose="020B0A02040204020203" pitchFamily="34" charset="0"/>
+              </a:rPr>
+              <a:t>Basique</a:t>
+            </a:r>
+            <a:endParaRPr lang="en-US" dirty="0">
+              <a:latin typeface="Segoe UI Black" panose="020B0A02040204020203" pitchFamily="34" charset="0"/>
+              <a:ea typeface="Segoe UI Black" panose="020B0A02040204020203" pitchFamily="34" charset="0"/>
+            </a:endParaRPr>
+          </a:p>
+        </p:txBody>
+      </p:sp>
+      <p:sp>
+        <p:nvSpPr>
+          <p:cNvPr id="38" name="Rectangle à coins arrondis 37"/>
+          <p:cNvSpPr/>
+          <p:nvPr/>
+        </p:nvSpPr>
+        <p:spPr>
+          <a:xfrm>
+            <a:off x="2641594" y="5165658"/>
+            <a:ext cx="1393373" cy="783770"/>
+          </a:xfrm>
+          <a:prstGeom prst="roundRect">
+            <a:avLst>
+              <a:gd name="adj" fmla="val 0"/>
+            </a:avLst>
+          </a:prstGeom>
+        </p:spPr>
+        <p:style>
+          <a:lnRef idx="2">
+            <a:schemeClr val="dk1">
+              <a:shade val="50000"/>
+            </a:schemeClr>
+          </a:lnRef>
+          <a:fillRef idx="1">
+            <a:schemeClr val="dk1"/>
+          </a:fillRef>
+          <a:effectRef idx="0">
+            <a:schemeClr val="dk1"/>
+          </a:effectRef>
+          <a:fontRef idx="minor">
+            <a:schemeClr val="lt1"/>
+          </a:fontRef>
+        </p:style>
+        <p:txBody>
+          <a:bodyPr rtlCol="0" anchor="ctr"/>
+          <a:lstStyle/>
+          <a:p>
+            <a:pPr algn="ctr"/>
+            <a:r>
+              <a:rPr lang="fr-FR" dirty="0" smtClean="0">
+                <a:solidFill>
+                  <a:schemeClr val="bg1"/>
+                </a:solidFill>
+                <a:latin typeface="Segoe UI Black" panose="020B0A02040204020203" pitchFamily="34" charset="0"/>
+                <a:ea typeface="Segoe UI Black" panose="020B0A02040204020203" pitchFamily="34" charset="0"/>
+              </a:rPr>
+              <a:t>Basique</a:t>
+            </a:r>
+            <a:endParaRPr lang="en-US" dirty="0">
+              <a:solidFill>
+                <a:schemeClr val="bg1"/>
+              </a:solidFill>
+              <a:latin typeface="Segoe UI Black" panose="020B0A02040204020203" pitchFamily="34" charset="0"/>
+              <a:ea typeface="Segoe UI Black" panose="020B0A02040204020203" pitchFamily="34" charset="0"/>
+            </a:endParaRPr>
+          </a:p>
+        </p:txBody>
+      </p:sp>
+      <p:sp>
+        <p:nvSpPr>
+          <p:cNvPr id="39" name="Rectangle à coins arrondis 38"/>
+          <p:cNvSpPr/>
+          <p:nvPr/>
+        </p:nvSpPr>
+        <p:spPr>
+          <a:xfrm>
+            <a:off x="1022596" y="3956060"/>
+            <a:ext cx="1393373" cy="783771"/>
+          </a:xfrm>
+          <a:prstGeom prst="roundRect">
+            <a:avLst>
+              <a:gd name="adj" fmla="val 0"/>
+            </a:avLst>
+          </a:prstGeom>
+          <a:ln/>
+        </p:spPr>
+        <p:style>
+          <a:lnRef idx="2">
+            <a:schemeClr val="dk1"/>
+          </a:lnRef>
+          <a:fillRef idx="1">
+            <a:schemeClr val="lt1"/>
+          </a:fillRef>
+          <a:effectRef idx="0">
+            <a:schemeClr val="dk1"/>
+          </a:effectRef>
+          <a:fontRef idx="minor">
+            <a:schemeClr val="dk1"/>
+          </a:fontRef>
+        </p:style>
+        <p:txBody>
+          <a:bodyPr rtlCol="0" anchor="ctr"/>
+          <a:lstStyle/>
+          <a:p>
+            <a:pPr algn="ctr"/>
+            <a:r>
+              <a:rPr lang="fr-FR" dirty="0" smtClean="0">
+                <a:latin typeface="Segoe UI Black" panose="020B0A02040204020203" pitchFamily="34" charset="0"/>
+                <a:ea typeface="Segoe UI Black" panose="020B0A02040204020203" pitchFamily="34" charset="0"/>
+              </a:rPr>
+              <a:t>Default</a:t>
+            </a:r>
+            <a:endParaRPr lang="en-US" dirty="0">
+              <a:latin typeface="Segoe UI Black" panose="020B0A02040204020203" pitchFamily="34" charset="0"/>
+              <a:ea typeface="Segoe UI Black" panose="020B0A02040204020203" pitchFamily="34" charset="0"/>
+            </a:endParaRPr>
+          </a:p>
+        </p:txBody>
+      </p:sp>
+      <p:sp>
+        <p:nvSpPr>
+          <p:cNvPr id="40" name="Rectangle à coins arrondis 39"/>
+          <p:cNvSpPr/>
+          <p:nvPr/>
+        </p:nvSpPr>
+        <p:spPr>
+          <a:xfrm>
+            <a:off x="1022596" y="5165658"/>
+            <a:ext cx="1393373" cy="783770"/>
+          </a:xfrm>
+          <a:prstGeom prst="roundRect">
+            <a:avLst>
+              <a:gd name="adj" fmla="val 0"/>
+            </a:avLst>
+          </a:prstGeom>
+          <a:ln/>
+        </p:spPr>
+        <p:style>
+          <a:lnRef idx="2">
+            <a:schemeClr val="dk1">
+              <a:shade val="50000"/>
+            </a:schemeClr>
+          </a:lnRef>
+          <a:fillRef idx="1">
+            <a:schemeClr val="dk1"/>
+          </a:fillRef>
+          <a:effectRef idx="0">
+            <a:schemeClr val="dk1"/>
+          </a:effectRef>
+          <a:fontRef idx="minor">
+            <a:schemeClr val="lt1"/>
+          </a:fontRef>
+        </p:style>
+        <p:txBody>
+          <a:bodyPr rtlCol="0" anchor="ctr"/>
+          <a:lstStyle/>
+          <a:p>
+            <a:pPr algn="ctr"/>
+            <a:r>
+              <a:rPr lang="fr-FR" dirty="0" smtClean="0">
+                <a:solidFill>
+                  <a:schemeClr val="bg1"/>
+                </a:solidFill>
+                <a:latin typeface="Segoe UI Black" panose="020B0A02040204020203" pitchFamily="34" charset="0"/>
+                <a:ea typeface="Segoe UI Black" panose="020B0A02040204020203" pitchFamily="34" charset="0"/>
+              </a:rPr>
+              <a:t>Default</a:t>
+            </a:r>
+            <a:endParaRPr lang="en-US" dirty="0">
+              <a:solidFill>
+                <a:schemeClr val="bg1"/>
+              </a:solidFill>
+              <a:latin typeface="Segoe UI Black" panose="020B0A02040204020203" pitchFamily="34" charset="0"/>
+              <a:ea typeface="Segoe UI Black" panose="020B0A02040204020203" pitchFamily="34" charset="0"/>
+            </a:endParaRPr>
+          </a:p>
+        </p:txBody>
+      </p:sp>
+      <p:sp>
+        <p:nvSpPr>
+          <p:cNvPr id="41" name="Rectangle à coins arrondis 40"/>
+          <p:cNvSpPr/>
+          <p:nvPr/>
+        </p:nvSpPr>
+        <p:spPr>
+          <a:xfrm>
+            <a:off x="7824809" y="3951365"/>
+            <a:ext cx="1393373" cy="783771"/>
+          </a:xfrm>
+          <a:prstGeom prst="roundRect">
+            <a:avLst>
+              <a:gd name="adj" fmla="val 42851"/>
+            </a:avLst>
+          </a:prstGeom>
+          <a:gradFill>
+            <a:gsLst>
+              <a:gs pos="0">
+                <a:schemeClr val="accent1">
+                  <a:lumMod val="5000"/>
+                  <a:lumOff val="95000"/>
+                </a:schemeClr>
+              </a:gs>
+              <a:gs pos="10000">
+                <a:schemeClr val="bg2">
+                  <a:lumMod val="10000"/>
+                </a:schemeClr>
+              </a:gs>
+            </a:gsLst>
+            <a:lin ang="5400000" scaled="1"/>
+          </a:gradFill>
+          <a:ln>
+            <a:solidFill>
+              <a:schemeClr val="bg2">
+                <a:lumMod val="10000"/>
+              </a:schemeClr>
+            </a:solidFill>
+          </a:ln>
+        </p:spPr>
+        <p:style>
+          <a:lnRef idx="2">
+            <a:schemeClr val="accent1">
+              <a:shade val="50000"/>
+            </a:schemeClr>
+          </a:lnRef>
+          <a:fillRef idx="1">
+            <a:schemeClr val="accent1"/>
+          </a:fillRef>
+          <a:effectRef idx="0">
+            <a:schemeClr val="accent1"/>
+          </a:effectRef>
+          <a:fontRef idx="minor">
+            <a:schemeClr val="lt1"/>
+          </a:fontRef>
+        </p:style>
+        <p:txBody>
+          <a:bodyPr rtlCol="0" anchor="ctr"/>
+          <a:lstStyle/>
+          <a:p>
+            <a:pPr algn="ctr"/>
+            <a:r>
+              <a:rPr lang="fr-FR" dirty="0" smtClean="0">
+                <a:latin typeface="Segoe UI Black" panose="020B0A02040204020203" pitchFamily="34" charset="0"/>
+                <a:ea typeface="Segoe UI Black" panose="020B0A02040204020203" pitchFamily="34" charset="0"/>
+              </a:rPr>
+              <a:t>Basique</a:t>
+            </a:r>
+            <a:endParaRPr lang="en-US" dirty="0">
+              <a:latin typeface="Segoe UI Black" panose="020B0A02040204020203" pitchFamily="34" charset="0"/>
+              <a:ea typeface="Segoe UI Black" panose="020B0A02040204020203" pitchFamily="34" charset="0"/>
+            </a:endParaRPr>
+          </a:p>
+        </p:txBody>
+      </p:sp>
+      <p:sp>
+        <p:nvSpPr>
+          <p:cNvPr id="42" name="Rectangle à coins arrondis 41"/>
+          <p:cNvSpPr/>
+          <p:nvPr/>
+        </p:nvSpPr>
+        <p:spPr>
+          <a:xfrm>
+            <a:off x="7824809" y="5170352"/>
+            <a:ext cx="1393373" cy="783770"/>
+          </a:xfrm>
+          <a:prstGeom prst="roundRect">
+            <a:avLst>
+              <a:gd name="adj" fmla="val 42851"/>
+            </a:avLst>
+          </a:prstGeom>
+          <a:gradFill>
+            <a:gsLst>
+              <a:gs pos="0">
+                <a:schemeClr val="accent1">
+                  <a:lumMod val="5000"/>
+                  <a:lumOff val="95000"/>
+                </a:schemeClr>
+              </a:gs>
+              <a:gs pos="2000">
+                <a:schemeClr val="bg2">
+                  <a:lumMod val="10000"/>
+                </a:schemeClr>
+              </a:gs>
+            </a:gsLst>
+            <a:lin ang="5400000" scaled="1"/>
+          </a:gradFill>
+          <a:ln>
+            <a:solidFill>
+              <a:schemeClr val="bg2">
+                <a:lumMod val="10000"/>
+              </a:schemeClr>
+            </a:solidFill>
+          </a:ln>
+        </p:spPr>
+        <p:style>
+          <a:lnRef idx="2">
+            <a:schemeClr val="accent1">
+              <a:shade val="50000"/>
+            </a:schemeClr>
+          </a:lnRef>
+          <a:fillRef idx="1">
+            <a:schemeClr val="accent1"/>
+          </a:fillRef>
+          <a:effectRef idx="0">
+            <a:schemeClr val="accent1"/>
+          </a:effectRef>
+          <a:fontRef idx="minor">
+            <a:schemeClr val="lt1"/>
+          </a:fontRef>
+        </p:style>
+        <p:txBody>
+          <a:bodyPr rtlCol="0" anchor="ctr"/>
+          <a:lstStyle/>
+          <a:p>
+            <a:pPr algn="ctr"/>
+            <a:r>
+              <a:rPr lang="fr-FR" dirty="0" smtClean="0">
+                <a:solidFill>
+                  <a:schemeClr val="bg1">
+                    <a:lumMod val="50000"/>
+                  </a:schemeClr>
+                </a:solidFill>
+                <a:latin typeface="Segoe UI Black" panose="020B0A02040204020203" pitchFamily="34" charset="0"/>
+                <a:ea typeface="Segoe UI Black" panose="020B0A02040204020203" pitchFamily="34" charset="0"/>
+              </a:rPr>
+              <a:t>Basique</a:t>
+            </a:r>
+            <a:endParaRPr lang="en-US" dirty="0">
+              <a:solidFill>
+                <a:schemeClr val="bg1">
+                  <a:lumMod val="50000"/>
+                </a:schemeClr>
+              </a:solidFill>
+              <a:latin typeface="Segoe UI Black" panose="020B0A02040204020203" pitchFamily="34" charset="0"/>
+              <a:ea typeface="Segoe UI Black" panose="020B0A02040204020203" pitchFamily="34" charset="0"/>
+            </a:endParaRPr>
+          </a:p>
+        </p:txBody>
+      </p:sp>
+      <p:sp>
+        <p:nvSpPr>
+          <p:cNvPr id="43" name="Rectangle à coins arrondis 42"/>
+          <p:cNvSpPr/>
+          <p:nvPr/>
+        </p:nvSpPr>
+        <p:spPr>
+          <a:xfrm>
+            <a:off x="9443807" y="3951366"/>
+            <a:ext cx="1528993" cy="783771"/>
+          </a:xfrm>
+          <a:prstGeom prst="roundRect">
+            <a:avLst>
+              <a:gd name="adj" fmla="val 42851"/>
+            </a:avLst>
+          </a:prstGeom>
+          <a:gradFill>
+            <a:gsLst>
+              <a:gs pos="0">
+                <a:schemeClr val="accent1">
+                  <a:lumMod val="5000"/>
+                  <a:lumOff val="95000"/>
+                </a:schemeClr>
+              </a:gs>
+              <a:gs pos="10000">
+                <a:schemeClr val="bg2">
+                  <a:lumMod val="10000"/>
+                </a:schemeClr>
+              </a:gs>
+            </a:gsLst>
+            <a:lin ang="5400000" scaled="1"/>
+          </a:gradFill>
+          <a:ln>
+            <a:solidFill>
+              <a:schemeClr val="bg2">
+                <a:lumMod val="10000"/>
+              </a:schemeClr>
+            </a:solidFill>
+          </a:ln>
+        </p:spPr>
+        <p:style>
+          <a:lnRef idx="2">
+            <a:schemeClr val="accent1">
+              <a:shade val="50000"/>
+            </a:schemeClr>
+          </a:lnRef>
+          <a:fillRef idx="1">
+            <a:schemeClr val="accent1"/>
+          </a:fillRef>
+          <a:effectRef idx="0">
+            <a:schemeClr val="accent1"/>
+          </a:effectRef>
+          <a:fontRef idx="minor">
+            <a:schemeClr val="lt1"/>
+          </a:fontRef>
+        </p:style>
+        <p:txBody>
+          <a:bodyPr rtlCol="0" anchor="ctr"/>
+          <a:lstStyle/>
+          <a:p>
+            <a:pPr algn="ctr"/>
+            <a:r>
+              <a:rPr lang="fr-FR" dirty="0" err="1" smtClean="0">
+                <a:latin typeface="Segoe UI Black" panose="020B0A02040204020203" pitchFamily="34" charset="0"/>
+                <a:ea typeface="Segoe UI Black" panose="020B0A02040204020203" pitchFamily="34" charset="0"/>
+              </a:rPr>
+              <a:t>Ibisanzwe</a:t>
+            </a:r>
+            <a:endParaRPr lang="en-US" dirty="0">
+              <a:latin typeface="Segoe UI Black" panose="020B0A02040204020203" pitchFamily="34" charset="0"/>
+              <a:ea typeface="Segoe UI Black" panose="020B0A02040204020203" pitchFamily="34" charset="0"/>
+            </a:endParaRPr>
+          </a:p>
+        </p:txBody>
+      </p:sp>
+      <p:sp>
+        <p:nvSpPr>
+          <p:cNvPr id="44" name="Rectangle à coins arrondis 43"/>
+          <p:cNvSpPr/>
+          <p:nvPr/>
+        </p:nvSpPr>
+        <p:spPr>
+          <a:xfrm>
+            <a:off x="9443806" y="5165658"/>
+            <a:ext cx="1528994" cy="783770"/>
+          </a:xfrm>
+          <a:prstGeom prst="roundRect">
+            <a:avLst>
+              <a:gd name="adj" fmla="val 42851"/>
+            </a:avLst>
+          </a:prstGeom>
+          <a:gradFill>
+            <a:gsLst>
+              <a:gs pos="0">
+                <a:schemeClr val="accent1">
+                  <a:lumMod val="5000"/>
+                  <a:lumOff val="95000"/>
+                </a:schemeClr>
+              </a:gs>
+              <a:gs pos="2000">
+                <a:schemeClr val="bg2">
+                  <a:lumMod val="10000"/>
+                </a:schemeClr>
+              </a:gs>
+            </a:gsLst>
+            <a:lin ang="5400000" scaled="1"/>
+          </a:gradFill>
+          <a:ln>
+            <a:solidFill>
+              <a:schemeClr val="bg2">
+                <a:lumMod val="10000"/>
+              </a:schemeClr>
+            </a:solidFill>
+          </a:ln>
+        </p:spPr>
+        <p:style>
+          <a:lnRef idx="2">
+            <a:schemeClr val="accent1">
+              <a:shade val="50000"/>
+            </a:schemeClr>
+          </a:lnRef>
+          <a:fillRef idx="1">
+            <a:schemeClr val="accent1"/>
+          </a:fillRef>
+          <a:effectRef idx="0">
+            <a:schemeClr val="accent1"/>
+          </a:effectRef>
+          <a:fontRef idx="minor">
+            <a:schemeClr val="lt1"/>
+          </a:fontRef>
+        </p:style>
+        <p:txBody>
+          <a:bodyPr rtlCol="0" anchor="ctr"/>
+          <a:lstStyle/>
+          <a:p>
+            <a:pPr algn="ctr"/>
+            <a:r>
+              <a:rPr lang="fr-FR" dirty="0" err="1" smtClean="0">
+                <a:solidFill>
+                  <a:schemeClr val="bg1">
+                    <a:lumMod val="50000"/>
+                  </a:schemeClr>
+                </a:solidFill>
+                <a:latin typeface="Segoe UI Black" panose="020B0A02040204020203" pitchFamily="34" charset="0"/>
+                <a:ea typeface="Segoe UI Black" panose="020B0A02040204020203" pitchFamily="34" charset="0"/>
+              </a:rPr>
+              <a:t>Ibisanzwe</a:t>
+            </a:r>
+            <a:endParaRPr lang="en-US" dirty="0">
+              <a:solidFill>
+                <a:schemeClr val="bg1">
+                  <a:lumMod val="50000"/>
+                </a:schemeClr>
+              </a:solidFill>
+              <a:latin typeface="Segoe UI Black" panose="020B0A02040204020203" pitchFamily="34" charset="0"/>
+              <a:ea typeface="Segoe UI Black" panose="020B0A02040204020203" pitchFamily="34" charset="0"/>
+            </a:endParaRPr>
+          </a:p>
+        </p:txBody>
+      </p:sp>
+    </p:spTree>
+    <p:extLst>
+      <p:ext uri="{BB962C8B-B14F-4D97-AF65-F5344CB8AC3E}">
+        <p14:creationId xmlns:p14="http://schemas.microsoft.com/office/powerpoint/2010/main" val="4191504023"/>
+      </p:ext>
+    </p:extLst>
+  </p:cSld>
+  <p:clrMapOvr>
+    <a:masterClrMapping/>
+  </p:clrMapOvr>
+  <p:timing>
+    <p:tnLst>
+      <p:par>
+        <p:cTn id="1" dur="indefinite" restart="never" nodeType="tmRoot"/>
+      </p:par>
+    </p:tnLst>
+  </p:timing>
+</p:sld>
+</file>
+
+<file path=ppt/slides/slide4.xml><?xml version="1.0" encoding="utf-8"?>
+<p:sld xmlns:a="http://schemas.openxmlformats.org/drawingml/2006/main" xmlns:r="http://schemas.openxmlformats.org/officeDocument/2006/relationships" xmlns:p="http://schemas.openxmlformats.org/presentationml/2006/main">
+  <p:cSld>
+    <p:spTree>
+      <p:nvGrpSpPr>
+        <p:cNvPr id="1" name=""/>
+        <p:cNvGrpSpPr/>
+        <p:nvPr/>
+      </p:nvGrpSpPr>
+      <p:grpSpPr>
+        <a:xfrm>
+          <a:off x="0" y="0"/>
+          <a:ext cx="0" cy="0"/>
+          <a:chOff x="0" y="0"/>
+          <a:chExt cx="0" cy="0"/>
+        </a:xfrm>
+      </p:grpSpPr>
+      <p:pic>
+        <p:nvPicPr>
+          <p:cNvPr id="16" name="Image 15"/>
+          <p:cNvPicPr>
+            <a:picLocks noChangeAspect="1"/>
+          </p:cNvPicPr>
+          <p:nvPr/>
+        </p:nvPicPr>
+        <p:blipFill>
+          <a:blip r:embed="rId2"/>
+          <a:stretch>
+            <a:fillRect/>
+          </a:stretch>
+        </p:blipFill>
+        <p:spPr>
+          <a:xfrm>
+            <a:off x="5881319" y="4269283"/>
+            <a:ext cx="1110031" cy="1450224"/>
+          </a:xfrm>
+          <a:prstGeom prst="rect">
+            <a:avLst/>
+          </a:prstGeom>
+        </p:spPr>
+      </p:pic>
+      <p:sp>
+        <p:nvSpPr>
+          <p:cNvPr id="13" name="Rectangle à coins arrondis 12"/>
+          <p:cNvSpPr/>
+          <p:nvPr/>
+        </p:nvSpPr>
+        <p:spPr>
+          <a:xfrm>
+            <a:off x="9631432" y="5346423"/>
+            <a:ext cx="1061441" cy="1333575"/>
+          </a:xfrm>
+          <a:prstGeom prst="roundRect">
+            <a:avLst>
+              <a:gd name="adj" fmla="val 9407"/>
+            </a:avLst>
+          </a:prstGeom>
+          <a:solidFill>
+            <a:schemeClr val="bg1"/>
+          </a:solidFill>
+          <a:ln w="38100">
+            <a:solidFill>
+              <a:schemeClr val="tx1"/>
+            </a:solidFill>
+          </a:ln>
+        </p:spPr>
+        <p:style>
+          <a:lnRef idx="2">
+            <a:schemeClr val="accent1">
+              <a:shade val="50000"/>
+            </a:schemeClr>
+          </a:lnRef>
+          <a:fillRef idx="1">
+            <a:schemeClr val="accent1"/>
+          </a:fillRef>
+          <a:effectRef idx="0">
+            <a:schemeClr val="accent1"/>
+          </a:effectRef>
+          <a:fontRef idx="minor">
+            <a:schemeClr val="lt1"/>
+          </a:fontRef>
+        </p:style>
+        <p:txBody>
+          <a:bodyPr rtlCol="0" anchor="ctr"/>
+          <a:lstStyle/>
+          <a:p>
+            <a:pPr algn="ctr"/>
+            <a:endParaRPr lang="en-US"/>
+          </a:p>
+        </p:txBody>
+      </p:sp>
+      <p:cxnSp>
+        <p:nvCxnSpPr>
+          <p:cNvPr id="25" name="Connecteur droit 24"/>
+          <p:cNvCxnSpPr/>
+          <p:nvPr/>
+        </p:nvCxnSpPr>
+        <p:spPr>
+          <a:xfrm>
+            <a:off x="7903373" y="5961884"/>
+            <a:ext cx="1067537" cy="1"/>
+          </a:xfrm>
+          <a:prstGeom prst="line">
+            <a:avLst/>
+          </a:prstGeom>
+          <a:ln w="38100">
+            <a:solidFill>
+              <a:schemeClr val="tx1"/>
+            </a:solidFill>
+          </a:ln>
+        </p:spPr>
+        <p:style>
+          <a:lnRef idx="1">
+            <a:schemeClr val="accent1"/>
+          </a:lnRef>
+          <a:fillRef idx="0">
+            <a:schemeClr val="accent1"/>
+          </a:fillRef>
+          <a:effectRef idx="0">
+            <a:schemeClr val="accent1"/>
+          </a:effectRef>
+          <a:fontRef idx="minor">
+            <a:schemeClr val="tx1"/>
+          </a:fontRef>
+        </p:style>
+      </p:cxnSp>
       <p:sp>
         <p:nvSpPr>
           <p:cNvPr id="3" name="Rectangle 2"/>
@@ -7601,7 +9041,7 @@
         </p:nvSpPr>
         <p:spPr>
           <a:xfrm>
-            <a:off x="2382981" y="3029525"/>
+            <a:off x="8440881" y="1528302"/>
             <a:ext cx="2262909" cy="461818"/>
           </a:xfrm>
           <a:prstGeom prst="rect">
@@ -8141,6 +9581,1050 @@
           </a:p>
         </p:txBody>
       </p:sp>
+      <p:grpSp>
+        <p:nvGrpSpPr>
+          <p:cNvPr id="19" name="Groupe 18"/>
+          <p:cNvGrpSpPr/>
+          <p:nvPr/>
+        </p:nvGrpSpPr>
+        <p:grpSpPr>
+          <a:xfrm>
+            <a:off x="974824" y="3275579"/>
+            <a:ext cx="1069061" cy="1333575"/>
+            <a:chOff x="7100316" y="2883380"/>
+            <a:chExt cx="1069061" cy="1333575"/>
+          </a:xfrm>
+        </p:grpSpPr>
+        <p:sp>
+          <p:nvSpPr>
+            <p:cNvPr id="21" name="Rectangle à coins arrondis 20"/>
+            <p:cNvSpPr/>
+            <p:nvPr/>
+          </p:nvSpPr>
+          <p:spPr>
+            <a:xfrm>
+              <a:off x="7100316" y="2883380"/>
+              <a:ext cx="1061441" cy="1333575"/>
+            </a:xfrm>
+            <a:prstGeom prst="roundRect">
+              <a:avLst>
+                <a:gd name="adj" fmla="val 0"/>
+              </a:avLst>
+            </a:prstGeom>
+            <a:solidFill>
+              <a:schemeClr val="bg1"/>
+            </a:solidFill>
+            <a:ln w="38100">
+              <a:solidFill>
+                <a:schemeClr val="tx1"/>
+              </a:solidFill>
+            </a:ln>
+          </p:spPr>
+          <p:style>
+            <a:lnRef idx="2">
+              <a:schemeClr val="accent1">
+                <a:shade val="50000"/>
+              </a:schemeClr>
+            </a:lnRef>
+            <a:fillRef idx="1">
+              <a:schemeClr val="accent1"/>
+            </a:fillRef>
+            <a:effectRef idx="0">
+              <a:schemeClr val="accent1"/>
+            </a:effectRef>
+            <a:fontRef idx="minor">
+              <a:schemeClr val="lt1"/>
+            </a:fontRef>
+          </p:style>
+          <p:txBody>
+            <a:bodyPr rtlCol="0" anchor="ctr"/>
+            <a:lstStyle/>
+            <a:p>
+              <a:pPr algn="ctr"/>
+              <a:endParaRPr lang="en-US"/>
+            </a:p>
+          </p:txBody>
+        </p:sp>
+        <p:cxnSp>
+          <p:nvCxnSpPr>
+            <p:cNvPr id="22" name="Connecteur droit 21"/>
+            <p:cNvCxnSpPr/>
+            <p:nvPr/>
+          </p:nvCxnSpPr>
+          <p:spPr>
+            <a:xfrm>
+              <a:off x="7101840" y="3754687"/>
+              <a:ext cx="1067537" cy="1"/>
+            </a:xfrm>
+            <a:prstGeom prst="line">
+              <a:avLst/>
+            </a:prstGeom>
+            <a:ln w="38100">
+              <a:solidFill>
+                <a:schemeClr val="tx1"/>
+              </a:solidFill>
+            </a:ln>
+          </p:spPr>
+          <p:style>
+            <a:lnRef idx="1">
+              <a:schemeClr val="accent1"/>
+            </a:lnRef>
+            <a:fillRef idx="0">
+              <a:schemeClr val="accent1"/>
+            </a:fillRef>
+            <a:effectRef idx="0">
+              <a:schemeClr val="accent1"/>
+            </a:effectRef>
+            <a:fontRef idx="minor">
+              <a:schemeClr val="tx1"/>
+            </a:fontRef>
+          </p:style>
+        </p:cxnSp>
+      </p:grpSp>
+      <p:grpSp>
+        <p:nvGrpSpPr>
+          <p:cNvPr id="24" name="Groupe 23"/>
+          <p:cNvGrpSpPr/>
+          <p:nvPr/>
+        </p:nvGrpSpPr>
+        <p:grpSpPr>
+          <a:xfrm>
+            <a:off x="974824" y="2342980"/>
+            <a:ext cx="1067538" cy="461818"/>
+            <a:chOff x="9223248" y="1563163"/>
+            <a:chExt cx="1067538" cy="461818"/>
+          </a:xfrm>
+        </p:grpSpPr>
+        <p:sp>
+          <p:nvSpPr>
+            <p:cNvPr id="26" name="Rectangle à coins arrondis 25"/>
+            <p:cNvSpPr/>
+            <p:nvPr/>
+          </p:nvSpPr>
+          <p:spPr>
+            <a:xfrm>
+              <a:off x="9223248" y="1563163"/>
+              <a:ext cx="1067538" cy="461818"/>
+            </a:xfrm>
+            <a:prstGeom prst="roundRect">
+              <a:avLst>
+                <a:gd name="adj" fmla="val 0"/>
+              </a:avLst>
+            </a:prstGeom>
+            <a:solidFill>
+              <a:schemeClr val="bg1"/>
+            </a:solidFill>
+            <a:ln w="28575">
+              <a:solidFill>
+                <a:schemeClr val="tx1"/>
+              </a:solidFill>
+            </a:ln>
+          </p:spPr>
+          <p:style>
+            <a:lnRef idx="2">
+              <a:schemeClr val="accent1">
+                <a:shade val="50000"/>
+              </a:schemeClr>
+            </a:lnRef>
+            <a:fillRef idx="1">
+              <a:schemeClr val="accent1"/>
+            </a:fillRef>
+            <a:effectRef idx="0">
+              <a:schemeClr val="accent1"/>
+            </a:effectRef>
+            <a:fontRef idx="minor">
+              <a:schemeClr val="lt1"/>
+            </a:fontRef>
+          </p:style>
+          <p:txBody>
+            <a:bodyPr rtlCol="0" anchor="ctr"/>
+            <a:lstStyle/>
+            <a:p>
+              <a:pPr algn="ctr"/>
+              <a:endParaRPr lang="en-US"/>
+            </a:p>
+          </p:txBody>
+        </p:sp>
+        <p:sp>
+          <p:nvSpPr>
+            <p:cNvPr id="27" name="Rectangle à coins arrondis 26"/>
+            <p:cNvSpPr/>
+            <p:nvPr/>
+          </p:nvSpPr>
+          <p:spPr>
+            <a:xfrm>
+              <a:off x="9935187" y="1563163"/>
+              <a:ext cx="355599" cy="461818"/>
+            </a:xfrm>
+            <a:prstGeom prst="roundRect">
+              <a:avLst>
+                <a:gd name="adj" fmla="val 0"/>
+              </a:avLst>
+            </a:prstGeom>
+            <a:noFill/>
+            <a:ln w="28575">
+              <a:solidFill>
+                <a:schemeClr val="tx1"/>
+              </a:solidFill>
+            </a:ln>
+          </p:spPr>
+          <p:style>
+            <a:lnRef idx="2">
+              <a:schemeClr val="accent1">
+                <a:shade val="50000"/>
+              </a:schemeClr>
+            </a:lnRef>
+            <a:fillRef idx="1">
+              <a:schemeClr val="accent1"/>
+            </a:fillRef>
+            <a:effectRef idx="0">
+              <a:schemeClr val="accent1"/>
+            </a:effectRef>
+            <a:fontRef idx="minor">
+              <a:schemeClr val="lt1"/>
+            </a:fontRef>
+          </p:style>
+          <p:txBody>
+            <a:bodyPr rtlCol="0" anchor="ctr"/>
+            <a:lstStyle/>
+            <a:p>
+              <a:pPr algn="ctr"/>
+              <a:endParaRPr lang="en-US"/>
+            </a:p>
+          </p:txBody>
+        </p:sp>
+        <p:sp>
+          <p:nvSpPr>
+            <p:cNvPr id="28" name="Triangle isocèle 27"/>
+            <p:cNvSpPr/>
+            <p:nvPr/>
+          </p:nvSpPr>
+          <p:spPr>
+            <a:xfrm rot="10800000">
+              <a:off x="10054363" y="1749290"/>
+              <a:ext cx="117245" cy="89564"/>
+            </a:xfrm>
+            <a:prstGeom prst="triangle">
+              <a:avLst/>
+            </a:prstGeom>
+            <a:solidFill>
+              <a:schemeClr val="tx1"/>
+            </a:solidFill>
+            <a:ln>
+              <a:solidFill>
+                <a:schemeClr val="tx1"/>
+              </a:solidFill>
+            </a:ln>
+          </p:spPr>
+          <p:style>
+            <a:lnRef idx="2">
+              <a:schemeClr val="accent1">
+                <a:shade val="50000"/>
+              </a:schemeClr>
+            </a:lnRef>
+            <a:fillRef idx="1">
+              <a:schemeClr val="accent1"/>
+            </a:fillRef>
+            <a:effectRef idx="0">
+              <a:schemeClr val="accent1"/>
+            </a:effectRef>
+            <a:fontRef idx="minor">
+              <a:schemeClr val="lt1"/>
+            </a:fontRef>
+          </p:style>
+          <p:txBody>
+            <a:bodyPr rtlCol="0" anchor="ctr"/>
+            <a:lstStyle/>
+            <a:p>
+              <a:pPr algn="ctr"/>
+              <a:endParaRPr lang="en-US"/>
+            </a:p>
+          </p:txBody>
+        </p:sp>
+      </p:grpSp>
+      <p:grpSp>
+        <p:nvGrpSpPr>
+          <p:cNvPr id="32" name="Groupe 31"/>
+          <p:cNvGrpSpPr/>
+          <p:nvPr/>
+        </p:nvGrpSpPr>
+        <p:grpSpPr>
+          <a:xfrm>
+            <a:off x="2617254" y="2347421"/>
+            <a:ext cx="1067538" cy="461818"/>
+            <a:chOff x="7101840" y="2806747"/>
+            <a:chExt cx="1067538" cy="461818"/>
+          </a:xfrm>
+        </p:grpSpPr>
+        <p:sp>
+          <p:nvSpPr>
+            <p:cNvPr id="33" name="Rectangle à coins arrondis 32"/>
+            <p:cNvSpPr/>
+            <p:nvPr/>
+          </p:nvSpPr>
+          <p:spPr>
+            <a:xfrm>
+              <a:off x="7101840" y="2806747"/>
+              <a:ext cx="1067537" cy="461818"/>
+            </a:xfrm>
+            <a:prstGeom prst="roundRect">
+              <a:avLst>
+                <a:gd name="adj" fmla="val 0"/>
+              </a:avLst>
+            </a:prstGeom>
+            <a:solidFill>
+              <a:schemeClr val="bg1"/>
+            </a:solidFill>
+            <a:ln w="28575">
+              <a:solidFill>
+                <a:schemeClr val="tx1"/>
+              </a:solidFill>
+            </a:ln>
+          </p:spPr>
+          <p:style>
+            <a:lnRef idx="2">
+              <a:schemeClr val="accent1">
+                <a:shade val="50000"/>
+              </a:schemeClr>
+            </a:lnRef>
+            <a:fillRef idx="1">
+              <a:schemeClr val="accent1"/>
+            </a:fillRef>
+            <a:effectRef idx="0">
+              <a:schemeClr val="accent1"/>
+            </a:effectRef>
+            <a:fontRef idx="minor">
+              <a:schemeClr val="lt1"/>
+            </a:fontRef>
+          </p:style>
+          <p:txBody>
+            <a:bodyPr rtlCol="0" anchor="ctr"/>
+            <a:lstStyle/>
+            <a:p>
+              <a:pPr algn="ctr"/>
+              <a:endParaRPr lang="en-US"/>
+            </a:p>
+          </p:txBody>
+        </p:sp>
+        <p:sp>
+          <p:nvSpPr>
+            <p:cNvPr id="34" name="Rectangle à coins arrondis 33"/>
+            <p:cNvSpPr/>
+            <p:nvPr/>
+          </p:nvSpPr>
+          <p:spPr>
+            <a:xfrm>
+              <a:off x="7813779" y="2806747"/>
+              <a:ext cx="355599" cy="461818"/>
+            </a:xfrm>
+            <a:prstGeom prst="roundRect">
+              <a:avLst>
+                <a:gd name="adj" fmla="val 0"/>
+              </a:avLst>
+            </a:prstGeom>
+            <a:solidFill>
+              <a:schemeClr val="tx1"/>
+            </a:solidFill>
+            <a:ln w="28575">
+              <a:solidFill>
+                <a:schemeClr val="tx1"/>
+              </a:solidFill>
+            </a:ln>
+          </p:spPr>
+          <p:style>
+            <a:lnRef idx="2">
+              <a:schemeClr val="accent1">
+                <a:shade val="50000"/>
+              </a:schemeClr>
+            </a:lnRef>
+            <a:fillRef idx="1">
+              <a:schemeClr val="accent1"/>
+            </a:fillRef>
+            <a:effectRef idx="0">
+              <a:schemeClr val="accent1"/>
+            </a:effectRef>
+            <a:fontRef idx="minor">
+              <a:schemeClr val="lt1"/>
+            </a:fontRef>
+          </p:style>
+          <p:txBody>
+            <a:bodyPr rtlCol="0" anchor="ctr"/>
+            <a:lstStyle/>
+            <a:p>
+              <a:pPr algn="ctr"/>
+              <a:endParaRPr lang="en-US"/>
+            </a:p>
+          </p:txBody>
+        </p:sp>
+        <p:sp>
+          <p:nvSpPr>
+            <p:cNvPr id="35" name="Triangle isocèle 34"/>
+            <p:cNvSpPr/>
+            <p:nvPr/>
+          </p:nvSpPr>
+          <p:spPr>
+            <a:xfrm rot="10800000">
+              <a:off x="7922164" y="2992874"/>
+              <a:ext cx="128035" cy="89564"/>
+            </a:xfrm>
+            <a:prstGeom prst="triangle">
+              <a:avLst/>
+            </a:prstGeom>
+            <a:solidFill>
+              <a:schemeClr val="bg1"/>
+            </a:solidFill>
+            <a:ln>
+              <a:solidFill>
+                <a:schemeClr val="bg1"/>
+              </a:solidFill>
+            </a:ln>
+          </p:spPr>
+          <p:style>
+            <a:lnRef idx="2">
+              <a:schemeClr val="accent1">
+                <a:shade val="50000"/>
+              </a:schemeClr>
+            </a:lnRef>
+            <a:fillRef idx="1">
+              <a:schemeClr val="accent1"/>
+            </a:fillRef>
+            <a:effectRef idx="0">
+              <a:schemeClr val="accent1"/>
+            </a:effectRef>
+            <a:fontRef idx="minor">
+              <a:schemeClr val="lt1"/>
+            </a:fontRef>
+          </p:style>
+          <p:txBody>
+            <a:bodyPr rtlCol="0" anchor="ctr"/>
+            <a:lstStyle/>
+            <a:p>
+              <a:pPr algn="ctr"/>
+              <a:endParaRPr lang="en-US"/>
+            </a:p>
+          </p:txBody>
+        </p:sp>
+      </p:grpSp>
+      <p:pic>
+        <p:nvPicPr>
+          <p:cNvPr id="18" name="Image 17"/>
+          <p:cNvPicPr>
+            <a:picLocks noChangeAspect="1"/>
+          </p:cNvPicPr>
+          <p:nvPr/>
+        </p:nvPicPr>
+        <p:blipFill>
+          <a:blip r:embed="rId3"/>
+          <a:stretch>
+            <a:fillRect/>
+          </a:stretch>
+        </p:blipFill>
+        <p:spPr>
+          <a:xfrm>
+            <a:off x="4502816" y="4833913"/>
+            <a:ext cx="1069041" cy="1332814"/>
+          </a:xfrm>
+          <a:prstGeom prst="rect">
+            <a:avLst/>
+          </a:prstGeom>
+        </p:spPr>
+      </p:pic>
+      <p:grpSp>
+        <p:nvGrpSpPr>
+          <p:cNvPr id="15" name="Groupe 14"/>
+          <p:cNvGrpSpPr/>
+          <p:nvPr/>
+        </p:nvGrpSpPr>
+        <p:grpSpPr>
+          <a:xfrm>
+            <a:off x="4012760" y="4191087"/>
+            <a:ext cx="1081476" cy="494537"/>
+            <a:chOff x="5178773" y="4703249"/>
+            <a:chExt cx="1081476" cy="494537"/>
+          </a:xfrm>
+        </p:grpSpPr>
+        <p:grpSp>
+          <p:nvGrpSpPr>
+            <p:cNvPr id="5" name="Groupe 4"/>
+            <p:cNvGrpSpPr/>
+            <p:nvPr/>
+          </p:nvGrpSpPr>
+          <p:grpSpPr>
+            <a:xfrm>
+              <a:off x="5178773" y="4703249"/>
+              <a:ext cx="1081476" cy="494537"/>
+              <a:chOff x="9879701" y="3130124"/>
+              <a:chExt cx="1081476" cy="494537"/>
+            </a:xfrm>
+          </p:grpSpPr>
+          <p:grpSp>
+            <p:nvGrpSpPr>
+              <p:cNvPr id="44" name="Groupe 43"/>
+              <p:cNvGrpSpPr/>
+              <p:nvPr/>
+            </p:nvGrpSpPr>
+            <p:grpSpPr>
+              <a:xfrm>
+                <a:off x="9879701" y="3146484"/>
+                <a:ext cx="948358" cy="461818"/>
+                <a:chOff x="7101841" y="2806747"/>
+                <a:chExt cx="948358" cy="461818"/>
+              </a:xfrm>
+            </p:grpSpPr>
+            <p:sp>
+              <p:nvSpPr>
+                <p:cNvPr id="45" name="Rectangle à coins arrondis 44"/>
+                <p:cNvSpPr/>
+                <p:nvPr/>
+              </p:nvSpPr>
+              <p:spPr>
+                <a:xfrm>
+                  <a:off x="7101841" y="2806747"/>
+                  <a:ext cx="707834" cy="461818"/>
+                </a:xfrm>
+                <a:prstGeom prst="roundRect">
+                  <a:avLst/>
+                </a:prstGeom>
+                <a:solidFill>
+                  <a:schemeClr val="bg1"/>
+                </a:solidFill>
+                <a:ln w="28575">
+                  <a:solidFill>
+                    <a:schemeClr val="tx1"/>
+                  </a:solidFill>
+                </a:ln>
+              </p:spPr>
+              <p:style>
+                <a:lnRef idx="2">
+                  <a:schemeClr val="accent1">
+                    <a:shade val="50000"/>
+                  </a:schemeClr>
+                </a:lnRef>
+                <a:fillRef idx="1">
+                  <a:schemeClr val="accent1"/>
+                </a:fillRef>
+                <a:effectRef idx="0">
+                  <a:schemeClr val="accent1"/>
+                </a:effectRef>
+                <a:fontRef idx="minor">
+                  <a:schemeClr val="lt1"/>
+                </a:fontRef>
+              </p:style>
+              <p:txBody>
+                <a:bodyPr rtlCol="0" anchor="ctr"/>
+                <a:lstStyle/>
+                <a:p>
+                  <a:pPr algn="ctr"/>
+                  <a:endParaRPr lang="en-US"/>
+                </a:p>
+              </p:txBody>
+            </p:sp>
+            <p:sp>
+              <p:nvSpPr>
+                <p:cNvPr id="47" name="Triangle isocèle 46"/>
+                <p:cNvSpPr/>
+                <p:nvPr/>
+              </p:nvSpPr>
+              <p:spPr>
+                <a:xfrm rot="10800000">
+                  <a:off x="7922164" y="2992874"/>
+                  <a:ext cx="128035" cy="89564"/>
+                </a:xfrm>
+                <a:prstGeom prst="triangle">
+                  <a:avLst/>
+                </a:prstGeom>
+                <a:solidFill>
+                  <a:schemeClr val="bg1"/>
+                </a:solidFill>
+                <a:ln>
+                  <a:solidFill>
+                    <a:schemeClr val="bg1"/>
+                  </a:solidFill>
+                </a:ln>
+              </p:spPr>
+              <p:style>
+                <a:lnRef idx="2">
+                  <a:schemeClr val="accent1">
+                    <a:shade val="50000"/>
+                  </a:schemeClr>
+                </a:lnRef>
+                <a:fillRef idx="1">
+                  <a:schemeClr val="accent1"/>
+                </a:fillRef>
+                <a:effectRef idx="0">
+                  <a:schemeClr val="accent1"/>
+                </a:effectRef>
+                <a:fontRef idx="minor">
+                  <a:schemeClr val="lt1"/>
+                </a:fontRef>
+              </p:style>
+              <p:txBody>
+                <a:bodyPr rtlCol="0" anchor="ctr"/>
+                <a:lstStyle/>
+                <a:p>
+                  <a:pPr algn="ctr"/>
+                  <a:endParaRPr lang="en-US"/>
+                </a:p>
+              </p:txBody>
+            </p:sp>
+          </p:grpSp>
+          <p:sp>
+            <p:nvSpPr>
+              <p:cNvPr id="43" name="Rectangle à coins arrondis 42"/>
+              <p:cNvSpPr/>
+              <p:nvPr/>
+            </p:nvSpPr>
+            <p:spPr>
+              <a:xfrm>
+                <a:off x="10592335" y="3130124"/>
+                <a:ext cx="368842" cy="494537"/>
+              </a:xfrm>
+              <a:prstGeom prst="roundRect">
+                <a:avLst>
+                  <a:gd name="adj" fmla="val 22839"/>
+                </a:avLst>
+              </a:prstGeom>
+              <a:gradFill>
+                <a:gsLst>
+                  <a:gs pos="0">
+                    <a:schemeClr val="accent1">
+                      <a:lumMod val="5000"/>
+                      <a:lumOff val="95000"/>
+                    </a:schemeClr>
+                  </a:gs>
+                  <a:gs pos="2000">
+                    <a:schemeClr val="bg2">
+                      <a:lumMod val="10000"/>
+                    </a:schemeClr>
+                  </a:gs>
+                </a:gsLst>
+                <a:lin ang="5400000" scaled="1"/>
+              </a:gradFill>
+              <a:ln>
+                <a:noFill/>
+              </a:ln>
+            </p:spPr>
+            <p:style>
+              <a:lnRef idx="2">
+                <a:schemeClr val="accent1">
+                  <a:shade val="50000"/>
+                </a:schemeClr>
+              </a:lnRef>
+              <a:fillRef idx="1">
+                <a:schemeClr val="accent1"/>
+              </a:fillRef>
+              <a:effectRef idx="0">
+                <a:schemeClr val="accent1"/>
+              </a:effectRef>
+              <a:fontRef idx="minor">
+                <a:schemeClr val="lt1"/>
+              </a:fontRef>
+            </p:style>
+            <p:txBody>
+              <a:bodyPr rtlCol="0" anchor="ctr"/>
+              <a:lstStyle/>
+              <a:p>
+                <a:pPr algn="ctr"/>
+                <a:endParaRPr lang="en-US" dirty="0">
+                  <a:solidFill>
+                    <a:schemeClr val="bg1">
+                      <a:lumMod val="50000"/>
+                    </a:schemeClr>
+                  </a:solidFill>
+                  <a:latin typeface="Segoe UI Black" panose="020B0A02040204020203" pitchFamily="34" charset="0"/>
+                  <a:ea typeface="Segoe UI Black" panose="020B0A02040204020203" pitchFamily="34" charset="0"/>
+                </a:endParaRPr>
+              </a:p>
+            </p:txBody>
+          </p:sp>
+        </p:grpSp>
+        <p:sp>
+          <p:nvSpPr>
+            <p:cNvPr id="48" name="Triangle isocèle 47"/>
+            <p:cNvSpPr/>
+            <p:nvPr/>
+          </p:nvSpPr>
+          <p:spPr>
+            <a:xfrm rot="10800000">
+              <a:off x="6006066" y="4905735"/>
+              <a:ext cx="128035" cy="89564"/>
+            </a:xfrm>
+            <a:prstGeom prst="triangle">
+              <a:avLst/>
+            </a:prstGeom>
+            <a:solidFill>
+              <a:srgbClr val="7F7F7F"/>
+            </a:solidFill>
+            <a:ln>
+              <a:solidFill>
+                <a:srgbClr val="7F7F7F"/>
+              </a:solidFill>
+            </a:ln>
+          </p:spPr>
+          <p:style>
+            <a:lnRef idx="2">
+              <a:schemeClr val="accent1">
+                <a:shade val="50000"/>
+              </a:schemeClr>
+            </a:lnRef>
+            <a:fillRef idx="1">
+              <a:schemeClr val="accent1"/>
+            </a:fillRef>
+            <a:effectRef idx="0">
+              <a:schemeClr val="accent1"/>
+            </a:effectRef>
+            <a:fontRef idx="minor">
+              <a:schemeClr val="lt1"/>
+            </a:fontRef>
+          </p:style>
+          <p:txBody>
+            <a:bodyPr rtlCol="0" anchor="ctr"/>
+            <a:lstStyle/>
+            <a:p>
+              <a:pPr algn="ctr"/>
+              <a:endParaRPr lang="en-US"/>
+            </a:p>
+          </p:txBody>
+        </p:sp>
+      </p:grpSp>
+      <p:grpSp>
+        <p:nvGrpSpPr>
+          <p:cNvPr id="12" name="Groupe 11"/>
+          <p:cNvGrpSpPr/>
+          <p:nvPr/>
+        </p:nvGrpSpPr>
+        <p:grpSpPr>
+          <a:xfrm>
+            <a:off x="5890844" y="4252922"/>
+            <a:ext cx="1085968" cy="495085"/>
+            <a:chOff x="5176239" y="5367552"/>
+            <a:chExt cx="1085968" cy="495085"/>
+          </a:xfrm>
+        </p:grpSpPr>
+        <p:grpSp>
+          <p:nvGrpSpPr>
+            <p:cNvPr id="50" name="Groupe 49"/>
+            <p:cNvGrpSpPr/>
+            <p:nvPr/>
+          </p:nvGrpSpPr>
+          <p:grpSpPr>
+            <a:xfrm>
+              <a:off x="5176239" y="5383913"/>
+              <a:ext cx="948358" cy="461818"/>
+              <a:chOff x="7101841" y="2806747"/>
+              <a:chExt cx="948358" cy="461818"/>
+            </a:xfrm>
+          </p:grpSpPr>
+          <p:sp>
+            <p:nvSpPr>
+              <p:cNvPr id="52" name="Rectangle à coins arrondis 51"/>
+              <p:cNvSpPr/>
+              <p:nvPr/>
+            </p:nvSpPr>
+            <p:spPr>
+              <a:xfrm>
+                <a:off x="7101841" y="2806747"/>
+                <a:ext cx="707834" cy="461818"/>
+              </a:xfrm>
+              <a:prstGeom prst="roundRect">
+                <a:avLst/>
+              </a:prstGeom>
+              <a:solidFill>
+                <a:schemeClr val="bg1"/>
+              </a:solidFill>
+              <a:ln w="28575">
+                <a:solidFill>
+                  <a:schemeClr val="tx1"/>
+                </a:solidFill>
+              </a:ln>
+            </p:spPr>
+            <p:style>
+              <a:lnRef idx="2">
+                <a:schemeClr val="accent1">
+                  <a:shade val="50000"/>
+                </a:schemeClr>
+              </a:lnRef>
+              <a:fillRef idx="1">
+                <a:schemeClr val="accent1"/>
+              </a:fillRef>
+              <a:effectRef idx="0">
+                <a:schemeClr val="accent1"/>
+              </a:effectRef>
+              <a:fontRef idx="minor">
+                <a:schemeClr val="lt1"/>
+              </a:fontRef>
+            </p:style>
+            <p:txBody>
+              <a:bodyPr rtlCol="0" anchor="ctr"/>
+              <a:lstStyle/>
+              <a:p>
+                <a:pPr algn="ctr"/>
+                <a:endParaRPr lang="en-US"/>
+              </a:p>
+            </p:txBody>
+          </p:sp>
+          <p:sp>
+            <p:nvSpPr>
+              <p:cNvPr id="53" name="Triangle isocèle 52"/>
+              <p:cNvSpPr/>
+              <p:nvPr/>
+            </p:nvSpPr>
+            <p:spPr>
+              <a:xfrm rot="10800000">
+                <a:off x="7922164" y="2992874"/>
+                <a:ext cx="128035" cy="89564"/>
+              </a:xfrm>
+              <a:prstGeom prst="triangle">
+                <a:avLst/>
+              </a:prstGeom>
+              <a:solidFill>
+                <a:schemeClr val="bg1"/>
+              </a:solidFill>
+              <a:ln>
+                <a:solidFill>
+                  <a:schemeClr val="bg1"/>
+                </a:solidFill>
+              </a:ln>
+            </p:spPr>
+            <p:style>
+              <a:lnRef idx="2">
+                <a:schemeClr val="accent1">
+                  <a:shade val="50000"/>
+                </a:schemeClr>
+              </a:lnRef>
+              <a:fillRef idx="1">
+                <a:schemeClr val="accent1"/>
+              </a:fillRef>
+              <a:effectRef idx="0">
+                <a:schemeClr val="accent1"/>
+              </a:effectRef>
+              <a:fontRef idx="minor">
+                <a:schemeClr val="lt1"/>
+              </a:fontRef>
+            </p:style>
+            <p:txBody>
+              <a:bodyPr rtlCol="0" anchor="ctr"/>
+              <a:lstStyle/>
+              <a:p>
+                <a:pPr algn="ctr"/>
+                <a:endParaRPr lang="en-US"/>
+              </a:p>
+            </p:txBody>
+          </p:sp>
+        </p:grpSp>
+        <p:sp>
+          <p:nvSpPr>
+            <p:cNvPr id="42" name="Rectangle à coins arrondis 41"/>
+            <p:cNvSpPr/>
+            <p:nvPr/>
+          </p:nvSpPr>
+          <p:spPr>
+            <a:xfrm>
+              <a:off x="5884072" y="5367552"/>
+              <a:ext cx="378135" cy="495085"/>
+            </a:xfrm>
+            <a:prstGeom prst="roundRect">
+              <a:avLst>
+                <a:gd name="adj" fmla="val 26575"/>
+              </a:avLst>
+            </a:prstGeom>
+            <a:gradFill>
+              <a:gsLst>
+                <a:gs pos="0">
+                  <a:schemeClr val="accent1">
+                    <a:lumMod val="5000"/>
+                    <a:lumOff val="95000"/>
+                  </a:schemeClr>
+                </a:gs>
+                <a:gs pos="10000">
+                  <a:schemeClr val="bg2">
+                    <a:lumMod val="10000"/>
+                  </a:schemeClr>
+                </a:gs>
+              </a:gsLst>
+              <a:lin ang="5400000" scaled="1"/>
+            </a:gradFill>
+            <a:ln>
+              <a:noFill/>
+            </a:ln>
+          </p:spPr>
+          <p:style>
+            <a:lnRef idx="2">
+              <a:schemeClr val="accent1">
+                <a:shade val="50000"/>
+              </a:schemeClr>
+            </a:lnRef>
+            <a:fillRef idx="1">
+              <a:schemeClr val="accent1"/>
+            </a:fillRef>
+            <a:effectRef idx="0">
+              <a:schemeClr val="accent1"/>
+            </a:effectRef>
+            <a:fontRef idx="minor">
+              <a:schemeClr val="lt1"/>
+            </a:fontRef>
+          </p:style>
+          <p:txBody>
+            <a:bodyPr rtlCol="0" anchor="ctr"/>
+            <a:lstStyle/>
+            <a:p>
+              <a:pPr algn="ctr"/>
+              <a:endParaRPr lang="en-US" dirty="0">
+                <a:latin typeface="Segoe UI Black" panose="020B0A02040204020203" pitchFamily="34" charset="0"/>
+                <a:ea typeface="Segoe UI Black" panose="020B0A02040204020203" pitchFamily="34" charset="0"/>
+              </a:endParaRPr>
+            </a:p>
+          </p:txBody>
+        </p:sp>
+        <p:sp>
+          <p:nvSpPr>
+            <p:cNvPr id="54" name="Triangle isocèle 53"/>
+            <p:cNvSpPr/>
+            <p:nvPr/>
+          </p:nvSpPr>
+          <p:spPr>
+            <a:xfrm rot="10800000">
+              <a:off x="6003532" y="5570041"/>
+              <a:ext cx="128035" cy="89564"/>
+            </a:xfrm>
+            <a:prstGeom prst="triangle">
+              <a:avLst/>
+            </a:prstGeom>
+            <a:solidFill>
+              <a:schemeClr val="bg1"/>
+            </a:solidFill>
+            <a:ln>
+              <a:solidFill>
+                <a:schemeClr val="bg1"/>
+              </a:solidFill>
+            </a:ln>
+          </p:spPr>
+          <p:style>
+            <a:lnRef idx="2">
+              <a:schemeClr val="accent1">
+                <a:shade val="50000"/>
+              </a:schemeClr>
+            </a:lnRef>
+            <a:fillRef idx="1">
+              <a:schemeClr val="accent1"/>
+            </a:fillRef>
+            <a:effectRef idx="0">
+              <a:schemeClr val="accent1"/>
+            </a:effectRef>
+            <a:fontRef idx="minor">
+              <a:schemeClr val="lt1"/>
+            </a:fontRef>
+          </p:style>
+          <p:txBody>
+            <a:bodyPr rtlCol="0" anchor="ctr"/>
+            <a:lstStyle/>
+            <a:p>
+              <a:pPr algn="ctr"/>
+              <a:endParaRPr lang="en-US"/>
+            </a:p>
+          </p:txBody>
+        </p:sp>
+      </p:grpSp>
+      <p:grpSp>
+        <p:nvGrpSpPr>
+          <p:cNvPr id="55" name="Groupe 54"/>
+          <p:cNvGrpSpPr/>
+          <p:nvPr/>
+        </p:nvGrpSpPr>
+        <p:grpSpPr>
+          <a:xfrm>
+            <a:off x="10162153" y="2403844"/>
+            <a:ext cx="1069061" cy="1333575"/>
+            <a:chOff x="7100316" y="2883380"/>
+            <a:chExt cx="1069061" cy="1333575"/>
+          </a:xfrm>
+        </p:grpSpPr>
+        <p:sp>
+          <p:nvSpPr>
+            <p:cNvPr id="56" name="Rectangle à coins arrondis 55"/>
+            <p:cNvSpPr/>
+            <p:nvPr/>
+          </p:nvSpPr>
+          <p:spPr>
+            <a:xfrm>
+              <a:off x="7100316" y="2883380"/>
+              <a:ext cx="1061441" cy="1333575"/>
+            </a:xfrm>
+            <a:prstGeom prst="roundRect">
+              <a:avLst>
+                <a:gd name="adj" fmla="val 6094"/>
+              </a:avLst>
+            </a:prstGeom>
+            <a:solidFill>
+              <a:schemeClr val="bg1"/>
+            </a:solidFill>
+            <a:ln w="38100">
+              <a:solidFill>
+                <a:schemeClr val="tx1"/>
+              </a:solidFill>
+            </a:ln>
+          </p:spPr>
+          <p:style>
+            <a:lnRef idx="2">
+              <a:schemeClr val="accent1">
+                <a:shade val="50000"/>
+              </a:schemeClr>
+            </a:lnRef>
+            <a:fillRef idx="1">
+              <a:schemeClr val="accent1"/>
+            </a:fillRef>
+            <a:effectRef idx="0">
+              <a:schemeClr val="accent1"/>
+            </a:effectRef>
+            <a:fontRef idx="minor">
+              <a:schemeClr val="lt1"/>
+            </a:fontRef>
+          </p:style>
+          <p:txBody>
+            <a:bodyPr rtlCol="0" anchor="ctr"/>
+            <a:lstStyle/>
+            <a:p>
+              <a:pPr algn="ctr"/>
+              <a:endParaRPr lang="en-US"/>
+            </a:p>
+          </p:txBody>
+        </p:sp>
+        <p:cxnSp>
+          <p:nvCxnSpPr>
+            <p:cNvPr id="57" name="Connecteur droit 56"/>
+            <p:cNvCxnSpPr/>
+            <p:nvPr/>
+          </p:nvCxnSpPr>
+          <p:spPr>
+            <a:xfrm>
+              <a:off x="7101840" y="3754687"/>
+              <a:ext cx="1067537" cy="1"/>
+            </a:xfrm>
+            <a:prstGeom prst="line">
+              <a:avLst/>
+            </a:prstGeom>
+            <a:ln w="38100">
+              <a:solidFill>
+                <a:schemeClr val="tx1"/>
+              </a:solidFill>
+            </a:ln>
+          </p:spPr>
+          <p:style>
+            <a:lnRef idx="1">
+              <a:schemeClr val="accent1"/>
+            </a:lnRef>
+            <a:fillRef idx="0">
+              <a:schemeClr val="accent1"/>
+            </a:fillRef>
+            <a:effectRef idx="0">
+              <a:schemeClr val="accent1"/>
+            </a:effectRef>
+            <a:fontRef idx="minor">
+              <a:schemeClr val="tx1"/>
+            </a:fontRef>
+          </p:style>
+        </p:cxnSp>
+      </p:grpSp>
     </p:spTree>
     <p:extLst>
       <p:ext uri="{BB962C8B-B14F-4D97-AF65-F5344CB8AC3E}">
@@ -8201,23 +10685,99 @@
                             </p:childTnLst>
                           </p:cTn>
                         </p:par>
+                      </p:childTnLst>
+                    </p:cTn>
+                  </p:par>
+                  <p:par>
+                    <p:cTn id="7" fill="hold">
+                      <p:stCondLst>
+                        <p:cond delay="indefinite"/>
+                      </p:stCondLst>
+                      <p:childTnLst>
                         <p:par>
-                          <p:cTn id="7" fill="hold">
+                          <p:cTn id="8" fill="hold">
                             <p:stCondLst>
                               <p:cond delay="0"/>
                             </p:stCondLst>
                             <p:childTnLst>
                               <p:par>
-                                <p:cTn id="8" presetID="42" presetClass="path" presetSubtype="0" accel="50000" decel="50000" fill="hold" nodeType="afterEffect">
+                                <p:cTn id="9" presetID="1" presetClass="entr" presetSubtype="0" fill="hold" nodeType="clickEffect">
+                                  <p:stCondLst>
+                                    <p:cond delay="0"/>
+                                  </p:stCondLst>
+                                  <p:childTnLst>
+                                    <p:set>
+                                      <p:cBhvr>
+                                        <p:cTn id="10" dur="1" fill="hold">
+                                          <p:stCondLst>
+                                            <p:cond delay="0"/>
+                                          </p:stCondLst>
+                                        </p:cTn>
+                                        <p:tgtEl>
+                                          <p:spTgt spid="32"/>
+                                        </p:tgtEl>
+                                        <p:attrNameLst>
+                                          <p:attrName>style.visibility</p:attrName>
+                                        </p:attrNameLst>
+                                      </p:cBhvr>
+                                      <p:to>
+                                        <p:strVal val="visible"/>
+                                      </p:to>
+                                    </p:set>
+                                  </p:childTnLst>
+                                </p:cTn>
+                              </p:par>
+                            </p:childTnLst>
+                          </p:cTn>
+                        </p:par>
+                        <p:par>
+                          <p:cTn id="11" fill="hold">
+                            <p:stCondLst>
+                              <p:cond delay="0"/>
+                            </p:stCondLst>
+                            <p:childTnLst>
+                              <p:par>
+                                <p:cTn id="12" presetID="42" presetClass="path" presetSubtype="0" accel="50000" decel="50000" fill="hold" nodeType="afterEffect">
                                   <p:stCondLst>
                                     <p:cond delay="0"/>
                                   </p:stCondLst>
                                   <p:childTnLst>
                                     <p:animMotion origin="layout" path="M -1.45833E-6 -3.7037E-7 L 0.00065 0.13634 " pathEditMode="relative" rAng="0" ptsTypes="AA">
                                       <p:cBhvr>
-                                        <p:cTn id="9" dur="2000" fill="hold"/>
+                                        <p:cTn id="13" dur="2000" fill="hold"/>
                                         <p:tgtEl>
-                                          <p:spTgt spid="29"/>
+                                          <p:spTgt spid="19"/>
+                                        </p:tgtEl>
+                                        <p:attrNameLst>
+                                          <p:attrName>ppt_x</p:attrName>
+                                          <p:attrName>ppt_y</p:attrName>
+                                        </p:attrNameLst>
+                                      </p:cBhvr>
+                                      <p:rCtr x="26" y="6806"/>
+                                    </p:animMotion>
+                                  </p:childTnLst>
+                                </p:cTn>
+                              </p:par>
+                            </p:childTnLst>
+                          </p:cTn>
+                        </p:par>
+                        <p:par>
+                          <p:cTn id="14" fill="hold">
+                            <p:stCondLst>
+                              <p:cond delay="2000"/>
+                            </p:stCondLst>
+                            <p:childTnLst>
+                              <p:par>
+                                <p:cTn id="15" presetID="42" presetClass="path" presetSubtype="0" accel="50000" decel="50000" fill="hold" nodeType="afterEffect">
+                                  <p:stCondLst>
+                                    <p:cond delay="0"/>
+                                  </p:stCondLst>
+                                  <p:childTnLst>
+                                    <p:animMotion origin="layout" path="M -1.45833E-6 -3.7037E-7 L 0.00065 0.13634 " pathEditMode="relative" rAng="0" ptsTypes="AA">
+                                      <p:cBhvr>
+                                        <p:cTn id="16" dur="2000" fill="hold"/>
+                                        <p:tgtEl>
+                                          <p:spTgt spid="55"/>
                                         </p:tgtEl>
                                         <p:attrNameLst>
                                           <p:attrName>ppt_x</p:attrName>
@@ -8260,7 +10820,7 @@
 </p:sld>
 </file>
 
-<file path=ppt/slides/slide4.xml><?xml version="1.0" encoding="utf-8"?>
+<file path=ppt/slides/slide5.xml><?xml version="1.0" encoding="utf-8"?>
 <p:sld xmlns:a="http://schemas.openxmlformats.org/drawingml/2006/main" xmlns:r="http://schemas.openxmlformats.org/officeDocument/2006/relationships" xmlns:p="http://schemas.openxmlformats.org/presentationml/2006/main">
   <p:cSld>
     <p:spTree>
@@ -8444,36 +11004,6 @@
 </p:sld>
 </file>
 
-<file path=ppt/slides/slide5.xml><?xml version="1.0" encoding="utf-8"?>
-<p:sld xmlns:a="http://schemas.openxmlformats.org/drawingml/2006/main" xmlns:r="http://schemas.openxmlformats.org/officeDocument/2006/relationships" xmlns:p="http://schemas.openxmlformats.org/presentationml/2006/main">
-  <p:cSld>
-    <p:spTree>
-      <p:nvGrpSpPr>
-        <p:cNvPr id="1" name=""/>
-        <p:cNvGrpSpPr/>
-        <p:nvPr/>
-      </p:nvGrpSpPr>
-      <p:grpSpPr>
-        <a:xfrm>
-          <a:off x="0" y="0"/>
-          <a:ext cx="0" cy="0"/>
-          <a:chOff x="0" y="0"/>
-          <a:chExt cx="0" cy="0"/>
-        </a:xfrm>
-      </p:grpSpPr>
-    </p:spTree>
-    <p:extLst>
-      <p:ext uri="{BB962C8B-B14F-4D97-AF65-F5344CB8AC3E}">
-        <p14:creationId xmlns:p14="http://schemas.microsoft.com/office/powerpoint/2010/main" val="4159037437"/>
-      </p:ext>
-    </p:extLst>
-  </p:cSld>
-  <p:clrMapOvr>
-    <a:masterClrMapping/>
-  </p:clrMapOvr>
-</p:sld>
-</file>
-
 <file path=ppt/slides/slide6.xml><?xml version="1.0" encoding="utf-8"?>
 <p:sld xmlns:a="http://schemas.openxmlformats.org/drawingml/2006/main" xmlns:r="http://schemas.openxmlformats.org/officeDocument/2006/relationships" xmlns:p="http://schemas.openxmlformats.org/presentationml/2006/main">
   <p:cSld>
@@ -8491,23 +11021,175 @@
           <a:chExt cx="0" cy="0"/>
         </a:xfrm>
       </p:grpSpPr>
+      <p:grpSp>
+        <p:nvGrpSpPr>
+          <p:cNvPr id="5" name="Groupe 4"/>
+          <p:cNvGrpSpPr/>
+          <p:nvPr/>
+        </p:nvGrpSpPr>
+        <p:grpSpPr>
+          <a:xfrm>
+            <a:off x="2784762" y="1967345"/>
+            <a:ext cx="4478777" cy="2078182"/>
+            <a:chOff x="2784762" y="1967345"/>
+            <a:chExt cx="4478777" cy="2078182"/>
+          </a:xfrm>
+        </p:grpSpPr>
+        <p:sp>
+          <p:nvSpPr>
+            <p:cNvPr id="2" name="Rectangle 1"/>
+            <p:cNvSpPr/>
+            <p:nvPr/>
+          </p:nvSpPr>
+          <p:spPr>
+            <a:xfrm rot="2724865">
+              <a:off x="1870362" y="2881745"/>
+              <a:ext cx="2078182" cy="249382"/>
+            </a:xfrm>
+            <a:prstGeom prst="rect">
+              <a:avLst/>
+            </a:prstGeom>
+            <a:solidFill>
+              <a:schemeClr val="tx1"/>
+            </a:solidFill>
+            <a:ln>
+              <a:solidFill>
+                <a:schemeClr val="tx1"/>
+              </a:solidFill>
+            </a:ln>
+          </p:spPr>
+          <p:style>
+            <a:lnRef idx="2">
+              <a:schemeClr val="accent1">
+                <a:shade val="50000"/>
+              </a:schemeClr>
+            </a:lnRef>
+            <a:fillRef idx="1">
+              <a:schemeClr val="accent1"/>
+            </a:fillRef>
+            <a:effectRef idx="0">
+              <a:schemeClr val="accent1"/>
+            </a:effectRef>
+            <a:fontRef idx="minor">
+              <a:schemeClr val="lt1"/>
+            </a:fontRef>
+          </p:style>
+          <p:txBody>
+            <a:bodyPr rtlCol="0" anchor="ctr"/>
+            <a:lstStyle/>
+            <a:p>
+              <a:pPr algn="ctr"/>
+              <a:endParaRPr lang="en-US"/>
+            </a:p>
+          </p:txBody>
+        </p:sp>
+        <p:sp>
+          <p:nvSpPr>
+            <p:cNvPr id="3" name="Rectangle 2"/>
+            <p:cNvSpPr/>
+            <p:nvPr/>
+          </p:nvSpPr>
+          <p:spPr>
+            <a:xfrm rot="8123004">
+              <a:off x="2839281" y="2066852"/>
+              <a:ext cx="4424258" cy="249382"/>
+            </a:xfrm>
+            <a:prstGeom prst="rect">
+              <a:avLst/>
+            </a:prstGeom>
+            <a:solidFill>
+              <a:schemeClr val="tx1"/>
+            </a:solidFill>
+            <a:ln>
+              <a:solidFill>
+                <a:schemeClr val="tx1"/>
+              </a:solidFill>
+            </a:ln>
+          </p:spPr>
+          <p:style>
+            <a:lnRef idx="2">
+              <a:schemeClr val="accent1">
+                <a:shade val="50000"/>
+              </a:schemeClr>
+            </a:lnRef>
+            <a:fillRef idx="1">
+              <a:schemeClr val="accent1"/>
+            </a:fillRef>
+            <a:effectRef idx="0">
+              <a:schemeClr val="accent1"/>
+            </a:effectRef>
+            <a:fontRef idx="minor">
+              <a:schemeClr val="lt1"/>
+            </a:fontRef>
+          </p:style>
+          <p:txBody>
+            <a:bodyPr rtlCol="0" anchor="ctr"/>
+            <a:lstStyle/>
+            <a:p>
+              <a:pPr algn="ctr"/>
+              <a:endParaRPr lang="en-US"/>
+            </a:p>
+          </p:txBody>
+        </p:sp>
+      </p:grpSp>
+      <p:sp>
+        <p:nvSpPr>
+          <p:cNvPr id="6" name="Rectangle 5"/>
+          <p:cNvSpPr/>
+          <p:nvPr/>
+        </p:nvSpPr>
+        <p:spPr>
+          <a:xfrm>
+            <a:off x="827314" y="290286"/>
+            <a:ext cx="6313715" cy="3773714"/>
+          </a:xfrm>
+          <a:prstGeom prst="rect">
+            <a:avLst/>
+          </a:prstGeom>
+          <a:noFill/>
+          <a:ln w="9525" cap="flat" cmpd="sng" algn="ctr">
+            <a:solidFill>
+              <a:schemeClr val="dk1"/>
+            </a:solidFill>
+            <a:prstDash val="solid"/>
+            <a:round/>
+            <a:headEnd type="none" w="med" len="med"/>
+            <a:tailEnd type="none" w="med" len="med"/>
+          </a:ln>
+        </p:spPr>
+        <p:style>
+          <a:lnRef idx="0">
+            <a:scrgbClr r="0" g="0" b="0"/>
+          </a:lnRef>
+          <a:fillRef idx="0">
+            <a:scrgbClr r="0" g="0" b="0"/>
+          </a:fillRef>
+          <a:effectRef idx="0">
+            <a:scrgbClr r="0" g="0" b="0"/>
+          </a:effectRef>
+          <a:fontRef idx="minor">
+            <a:schemeClr val="dk1"/>
+          </a:fontRef>
+        </p:style>
+        <p:txBody>
+          <a:bodyPr rtlCol="0" anchor="ctr"/>
+          <a:lstStyle/>
+          <a:p>
+            <a:pPr algn="ctr"/>
+            <a:endParaRPr lang="en-US"/>
+          </a:p>
+        </p:txBody>
+      </p:sp>
     </p:spTree>
     <p:extLst>
       <p:ext uri="{BB962C8B-B14F-4D97-AF65-F5344CB8AC3E}">
-        <p14:creationId xmlns:p14="http://schemas.microsoft.com/office/powerpoint/2010/main" val="4191504023"/>
+        <p14:creationId xmlns:p14="http://schemas.microsoft.com/office/powerpoint/2010/main" val="4159037437"/>
       </p:ext>
     </p:extLst>
   </p:cSld>
   <p:clrMapOvr>
     <a:masterClrMapping/>
   </p:clrMapOvr>
-  <p:timing>
-    <p:tnLst>
-      <p:par>
-        <p:cTn id="1" dur="indefinite" restart="never" nodeType="tmRoot"/>
-      </p:par>
-    </p:tnLst>
-  </p:timing>
 </p:sld>
 </file>
 

</xml_diff>

<commit_message>
optimisation : updated play state appearance : back button and players banners.
</commit_message>
<xml_diff>
--- a/assets/buttons.pptx
+++ b/assets/buttons.pptx
@@ -10,9 +10,9 @@
     <p:sldId id="261" r:id="rId4"/>
     <p:sldId id="260" r:id="rId5"/>
     <p:sldId id="259" r:id="rId6"/>
-    <p:sldId id="258" r:id="rId7"/>
-    <p:sldId id="256" r:id="rId8"/>
-    <p:sldId id="262" r:id="rId9"/>
+    <p:sldId id="256" r:id="rId7"/>
+    <p:sldId id="262" r:id="rId8"/>
+    <p:sldId id="258" r:id="rId9"/>
     <p:sldId id="263" r:id="rId10"/>
   </p:sldIdLst>
   <p:sldSz cx="12192000" cy="6858000"/>
@@ -251,7 +251,7 @@
           <a:p>
             <a:fld id="{2E40D743-7CB8-4D0B-882D-D502BAAD38FE}" type="datetimeFigureOut">
               <a:rPr lang="en-US" smtClean="0"/>
-              <a:t>4/11/2021</a:t>
+              <a:t>4/12/2021</a:t>
             </a:fld>
             <a:endParaRPr lang="en-US"/>
           </a:p>
@@ -421,7 +421,7 @@
           <a:p>
             <a:fld id="{2E40D743-7CB8-4D0B-882D-D502BAAD38FE}" type="datetimeFigureOut">
               <a:rPr lang="en-US" smtClean="0"/>
-              <a:t>4/11/2021</a:t>
+              <a:t>4/12/2021</a:t>
             </a:fld>
             <a:endParaRPr lang="en-US"/>
           </a:p>
@@ -601,7 +601,7 @@
           <a:p>
             <a:fld id="{2E40D743-7CB8-4D0B-882D-D502BAAD38FE}" type="datetimeFigureOut">
               <a:rPr lang="en-US" smtClean="0"/>
-              <a:t>4/11/2021</a:t>
+              <a:t>4/12/2021</a:t>
             </a:fld>
             <a:endParaRPr lang="en-US"/>
           </a:p>
@@ -771,7 +771,7 @@
           <a:p>
             <a:fld id="{2E40D743-7CB8-4D0B-882D-D502BAAD38FE}" type="datetimeFigureOut">
               <a:rPr lang="en-US" smtClean="0"/>
-              <a:t>4/11/2021</a:t>
+              <a:t>4/12/2021</a:t>
             </a:fld>
             <a:endParaRPr lang="en-US"/>
           </a:p>
@@ -1017,7 +1017,7 @@
           <a:p>
             <a:fld id="{2E40D743-7CB8-4D0B-882D-D502BAAD38FE}" type="datetimeFigureOut">
               <a:rPr lang="en-US" smtClean="0"/>
-              <a:t>4/11/2021</a:t>
+              <a:t>4/12/2021</a:t>
             </a:fld>
             <a:endParaRPr lang="en-US"/>
           </a:p>
@@ -1249,7 +1249,7 @@
           <a:p>
             <a:fld id="{2E40D743-7CB8-4D0B-882D-D502BAAD38FE}" type="datetimeFigureOut">
               <a:rPr lang="en-US" smtClean="0"/>
-              <a:t>4/11/2021</a:t>
+              <a:t>4/12/2021</a:t>
             </a:fld>
             <a:endParaRPr lang="en-US"/>
           </a:p>
@@ -1616,7 +1616,7 @@
           <a:p>
             <a:fld id="{2E40D743-7CB8-4D0B-882D-D502BAAD38FE}" type="datetimeFigureOut">
               <a:rPr lang="en-US" smtClean="0"/>
-              <a:t>4/11/2021</a:t>
+              <a:t>4/12/2021</a:t>
             </a:fld>
             <a:endParaRPr lang="en-US"/>
           </a:p>
@@ -1734,7 +1734,7 @@
           <a:p>
             <a:fld id="{2E40D743-7CB8-4D0B-882D-D502BAAD38FE}" type="datetimeFigureOut">
               <a:rPr lang="en-US" smtClean="0"/>
-              <a:t>4/11/2021</a:t>
+              <a:t>4/12/2021</a:t>
             </a:fld>
             <a:endParaRPr lang="en-US"/>
           </a:p>
@@ -1829,7 +1829,7 @@
           <a:p>
             <a:fld id="{2E40D743-7CB8-4D0B-882D-D502BAAD38FE}" type="datetimeFigureOut">
               <a:rPr lang="en-US" smtClean="0"/>
-              <a:t>4/11/2021</a:t>
+              <a:t>4/12/2021</a:t>
             </a:fld>
             <a:endParaRPr lang="en-US"/>
           </a:p>
@@ -2106,7 +2106,7 @@
           <a:p>
             <a:fld id="{2E40D743-7CB8-4D0B-882D-D502BAAD38FE}" type="datetimeFigureOut">
               <a:rPr lang="en-US" smtClean="0"/>
-              <a:t>4/11/2021</a:t>
+              <a:t>4/12/2021</a:t>
             </a:fld>
             <a:endParaRPr lang="en-US"/>
           </a:p>
@@ -2359,7 +2359,7 @@
           <a:p>
             <a:fld id="{2E40D743-7CB8-4D0B-882D-D502BAAD38FE}" type="datetimeFigureOut">
               <a:rPr lang="en-US" smtClean="0"/>
-              <a:t>4/11/2021</a:t>
+              <a:t>4/12/2021</a:t>
             </a:fld>
             <a:endParaRPr lang="en-US"/>
           </a:p>
@@ -2572,7 +2572,7 @@
           <a:p>
             <a:fld id="{2E40D743-7CB8-4D0B-882D-D502BAAD38FE}" type="datetimeFigureOut">
               <a:rPr lang="en-US" smtClean="0"/>
-              <a:t>4/11/2021</a:t>
+              <a:t>4/12/2021</a:t>
             </a:fld>
             <a:endParaRPr lang="en-US"/>
           </a:p>
@@ -3746,10 +3746,14 @@
           <a:p>
             <a:pPr algn="ctr"/>
             <a:r>
-              <a:rPr lang="en-US" b="1" dirty="0" smtClean="0"/>
+              <a:rPr lang="en-US" b="1" u="sng" dirty="0" smtClean="0">
+                <a:latin typeface="Arial Black" panose="020B0A04020102020204" pitchFamily="34" charset="0"/>
+              </a:rPr>
               <a:t>Menu design 1</a:t>
             </a:r>
-            <a:endParaRPr lang="en-US" b="1" dirty="0"/>
+            <a:endParaRPr lang="en-US" b="1" u="sng" dirty="0">
+              <a:latin typeface="Arial Black" panose="020B0A04020102020204" pitchFamily="34" charset="0"/>
+            </a:endParaRPr>
           </a:p>
         </p:txBody>
       </p:sp>
@@ -5544,10 +5548,14 @@
           <a:p>
             <a:pPr algn="ctr"/>
             <a:r>
-              <a:rPr lang="en-US" b="1" dirty="0" smtClean="0"/>
+              <a:rPr lang="en-US" b="1" u="sng" dirty="0" smtClean="0">
+                <a:latin typeface="Arial Black" panose="020B0A04020102020204" pitchFamily="34" charset="0"/>
+              </a:rPr>
               <a:t>Menu design 2</a:t>
             </a:r>
-            <a:endParaRPr lang="en-US" b="1" dirty="0"/>
+            <a:endParaRPr lang="en-US" b="1" u="sng" dirty="0">
+              <a:latin typeface="Arial Black" panose="020B0A04020102020204" pitchFamily="34" charset="0"/>
+            </a:endParaRPr>
           </a:p>
         </p:txBody>
       </p:sp>
@@ -6773,12 +6781,10 @@
             </a:lvl1pPr>
           </a:lstStyle>
           <a:p>
-            <a:pPr algn="ctr"/>
-            <a:r>
-              <a:rPr lang="en-US" b="1" smtClean="0"/>
-              <a:t>Menu design 2</a:t>
-            </a:r>
-            <a:endParaRPr lang="en-US" b="1" dirty="0"/>
+            <a:pPr lvl="1" algn="ctr"/>
+            <a:endParaRPr lang="en-US" b="1" dirty="0">
+              <a:latin typeface="Arial Black" panose="020B0A04020102020204" pitchFamily="34" charset="0"/>
+            </a:endParaRPr>
           </a:p>
         </p:txBody>
       </p:sp>
@@ -7523,7 +7529,7 @@
         </p:nvGrpSpPr>
         <p:grpSpPr>
           <a:xfrm>
-            <a:off x="1022597" y="1279236"/>
+            <a:off x="1222292" y="1279236"/>
             <a:ext cx="1393371" cy="783771"/>
             <a:chOff x="2380343" y="3149600"/>
             <a:chExt cx="1393371" cy="783771"/>
@@ -7663,7 +7669,7 @@
         </p:nvGrpSpPr>
         <p:grpSpPr>
           <a:xfrm>
-            <a:off x="1022596" y="2493526"/>
+            <a:off x="1222291" y="2493526"/>
             <a:ext cx="1393371" cy="783771"/>
             <a:chOff x="2380343" y="3149600"/>
             <a:chExt cx="1393371" cy="783771"/>
@@ -7805,7 +7811,7 @@
         </p:nvSpPr>
         <p:spPr>
           <a:xfrm>
-            <a:off x="9443806" y="1279235"/>
+            <a:off x="9643501" y="1279235"/>
             <a:ext cx="1393372" cy="783772"/>
           </a:xfrm>
           <a:prstGeom prst="roundRect">
@@ -7873,7 +7879,7 @@
         </p:nvCxnSpPr>
         <p:spPr>
           <a:xfrm flipH="1" flipV="1">
-            <a:off x="9750539" y="1672397"/>
+            <a:off x="9950234" y="1672397"/>
             <a:ext cx="232002" cy="223696"/>
           </a:xfrm>
           <a:prstGeom prst="line">
@@ -7908,7 +7914,7 @@
         </p:nvCxnSpPr>
         <p:spPr>
           <a:xfrm flipV="1">
-            <a:off x="9938318" y="1387185"/>
+            <a:off x="10138013" y="1387185"/>
             <a:ext cx="571501" cy="508908"/>
           </a:xfrm>
           <a:prstGeom prst="line">
@@ -7943,7 +7949,7 @@
         </p:nvSpPr>
         <p:spPr>
           <a:xfrm>
-            <a:off x="9443806" y="2494142"/>
+            <a:off x="9643501" y="2494142"/>
             <a:ext cx="1393372" cy="785091"/>
           </a:xfrm>
           <a:prstGeom prst="roundRect">
@@ -8016,7 +8022,7 @@
         </p:nvCxnSpPr>
         <p:spPr>
           <a:xfrm flipH="1" flipV="1">
-            <a:off x="9750539" y="2886688"/>
+            <a:off x="9950234" y="2886688"/>
             <a:ext cx="232002" cy="223696"/>
           </a:xfrm>
           <a:prstGeom prst="line">
@@ -8051,7 +8057,7 @@
         </p:nvCxnSpPr>
         <p:spPr>
           <a:xfrm flipV="1">
-            <a:off x="9938318" y="2601476"/>
+            <a:off x="10138013" y="2601476"/>
             <a:ext cx="571501" cy="508908"/>
           </a:xfrm>
           <a:prstGeom prst="line">
@@ -8086,7 +8092,7 @@
         </p:nvSpPr>
         <p:spPr>
           <a:xfrm>
-            <a:off x="6205813" y="3956060"/>
+            <a:off x="6405508" y="3956060"/>
             <a:ext cx="1393373" cy="783771"/>
           </a:xfrm>
           <a:prstGeom prst="roundRect">
@@ -8161,7 +8167,7 @@
         </p:nvSpPr>
         <p:spPr>
           <a:xfrm>
-            <a:off x="6205812" y="5170352"/>
+            <a:off x="6405507" y="5170352"/>
             <a:ext cx="1393373" cy="783770"/>
           </a:xfrm>
           <a:prstGeom prst="roundRect">
@@ -8246,7 +8252,7 @@
         </p:nvSpPr>
         <p:spPr>
           <a:xfrm>
-            <a:off x="4260592" y="3956060"/>
+            <a:off x="4460287" y="3956060"/>
             <a:ext cx="1393373" cy="783771"/>
           </a:xfrm>
           <a:prstGeom prst="roundRect">
@@ -8297,7 +8303,7 @@
         </p:nvSpPr>
         <p:spPr>
           <a:xfrm>
-            <a:off x="4260592" y="5165658"/>
+            <a:off x="4460287" y="5165658"/>
             <a:ext cx="1393373" cy="783770"/>
           </a:xfrm>
           <a:prstGeom prst="roundRect">
@@ -8356,7 +8362,7 @@
         </p:nvSpPr>
         <p:spPr>
           <a:xfrm>
-            <a:off x="2641594" y="3956060"/>
+            <a:off x="2841289" y="3956060"/>
             <a:ext cx="1393373" cy="783771"/>
           </a:xfrm>
           <a:prstGeom prst="roundRect">
@@ -8407,7 +8413,7 @@
         </p:nvSpPr>
         <p:spPr>
           <a:xfrm>
-            <a:off x="2641594" y="5165658"/>
+            <a:off x="2841289" y="5165658"/>
             <a:ext cx="1393373" cy="783770"/>
           </a:xfrm>
           <a:prstGeom prst="roundRect">
@@ -8465,7 +8471,7 @@
         </p:nvSpPr>
         <p:spPr>
           <a:xfrm>
-            <a:off x="1022596" y="3956060"/>
+            <a:off x="1222291" y="3956060"/>
             <a:ext cx="1393373" cy="783771"/>
           </a:xfrm>
           <a:prstGeom prst="roundRect">
@@ -8516,7 +8522,7 @@
         </p:nvSpPr>
         <p:spPr>
           <a:xfrm>
-            <a:off x="1022596" y="5165658"/>
+            <a:off x="1222291" y="5165658"/>
             <a:ext cx="1393373" cy="783770"/>
           </a:xfrm>
           <a:prstGeom prst="roundRect">
@@ -8575,7 +8581,7 @@
         </p:nvSpPr>
         <p:spPr>
           <a:xfrm>
-            <a:off x="7824809" y="3951365"/>
+            <a:off x="8024504" y="3951365"/>
             <a:ext cx="1393373" cy="783771"/>
           </a:xfrm>
           <a:prstGeom prst="roundRect">
@@ -8650,7 +8656,7 @@
         </p:nvSpPr>
         <p:spPr>
           <a:xfrm>
-            <a:off x="7824809" y="5170352"/>
+            <a:off x="8024504" y="5170352"/>
             <a:ext cx="1393373" cy="783770"/>
           </a:xfrm>
           <a:prstGeom prst="roundRect">
@@ -8735,7 +8741,7 @@
         </p:nvSpPr>
         <p:spPr>
           <a:xfrm>
-            <a:off x="9443807" y="3951366"/>
+            <a:off x="9643502" y="3951366"/>
             <a:ext cx="1528993" cy="783771"/>
           </a:xfrm>
           <a:prstGeom prst="roundRect">
@@ -8810,7 +8816,7 @@
         </p:nvSpPr>
         <p:spPr>
           <a:xfrm>
-            <a:off x="9443806" y="5165658"/>
+            <a:off x="9643501" y="5165658"/>
             <a:ext cx="1528994" cy="783770"/>
           </a:xfrm>
           <a:prstGeom prst="roundRect">
@@ -8883,6 +8889,59 @@
               </a:solidFill>
               <a:latin typeface="Segoe UI Black" panose="020B0A02040204020203" pitchFamily="34" charset="0"/>
               <a:ea typeface="Segoe UI Black" panose="020B0A02040204020203" pitchFamily="34" charset="0"/>
+            </a:endParaRPr>
+          </a:p>
+        </p:txBody>
+      </p:sp>
+      <p:sp>
+        <p:nvSpPr>
+          <p:cNvPr id="45" name="Titre 1"/>
+          <p:cNvSpPr txBox="1">
+            <a:spLocks/>
+          </p:cNvSpPr>
+          <p:nvPr/>
+        </p:nvSpPr>
+        <p:spPr>
+          <a:xfrm>
+            <a:off x="838200" y="337416"/>
+            <a:ext cx="10515600" cy="1325563"/>
+          </a:xfrm>
+          <a:prstGeom prst="rect">
+            <a:avLst/>
+          </a:prstGeom>
+        </p:spPr>
+        <p:txBody>
+          <a:bodyPr vert="horz" lIns="91440" tIns="45720" rIns="91440" bIns="45720" rtlCol="0" anchor="b">
+            <a:normAutofit/>
+          </a:bodyPr>
+          <a:lstStyle>
+            <a:lvl1pPr algn="ctr" defTabSz="914400" rtl="0" eaLnBrk="1" latinLnBrk="0" hangingPunct="1">
+              <a:lnSpc>
+                <a:spcPct val="90000"/>
+              </a:lnSpc>
+              <a:spcBef>
+                <a:spcPct val="0"/>
+              </a:spcBef>
+              <a:buNone/>
+              <a:defRPr sz="6000" kern="1200">
+                <a:solidFill>
+                  <a:schemeClr val="tx1"/>
+                </a:solidFill>
+                <a:latin typeface="+mj-lt"/>
+                <a:ea typeface="+mj-ea"/>
+                <a:cs typeface="+mj-cs"/>
+              </a:defRPr>
+            </a:lvl1pPr>
+          </a:lstStyle>
+          <a:p>
+            <a:r>
+              <a:rPr lang="en-US" b="1" u="sng" dirty="0" smtClean="0">
+                <a:latin typeface="Arial Black" panose="020B0A04020102020204" pitchFamily="34" charset="0"/>
+              </a:rPr>
+              <a:t>Menu design 2</a:t>
+            </a:r>
+            <a:endParaRPr lang="en-US" b="1" u="sng" dirty="0">
+              <a:latin typeface="Arial Black" panose="020B0A04020102020204" pitchFamily="34" charset="0"/>
             </a:endParaRPr>
           </a:p>
         </p:txBody>
@@ -9006,7 +9065,7 @@
         </p:nvCxnSpPr>
         <p:spPr>
           <a:xfrm>
-            <a:off x="7903373" y="5961884"/>
+            <a:off x="9636253" y="6235154"/>
             <a:ext cx="1067537" cy="1"/>
           </a:xfrm>
           <a:prstGeom prst="line">
@@ -9041,7 +9100,7 @@
         </p:nvSpPr>
         <p:spPr>
           <a:xfrm>
-            <a:off x="8440881" y="1528302"/>
+            <a:off x="2570173" y="3348230"/>
             <a:ext cx="2262909" cy="461818"/>
           </a:xfrm>
           <a:prstGeom prst="rect">
@@ -9574,10 +9633,14 @@
           <a:p>
             <a:pPr algn="ctr"/>
             <a:r>
-              <a:rPr lang="en-US" b="1" dirty="0" smtClean="0"/>
+              <a:rPr lang="en-US" b="1" u="sng" dirty="0" smtClean="0">
+                <a:latin typeface="Arial Black" panose="020B0A04020102020204" pitchFamily="34" charset="0"/>
+              </a:rPr>
               <a:t>Design drop down menu language.</a:t>
             </a:r>
-            <a:endParaRPr lang="en-US" b="1" dirty="0"/>
+            <a:endParaRPr lang="en-US" b="1" u="sng" dirty="0">
+              <a:latin typeface="Arial Black" panose="020B0A04020102020204" pitchFamily="34" charset="0"/>
+            </a:endParaRPr>
           </a:p>
         </p:txBody>
       </p:sp>
@@ -10021,7 +10084,7 @@
         </p:blipFill>
         <p:spPr>
           <a:xfrm>
-            <a:off x="4502816" y="4833913"/>
+            <a:off x="4036283" y="4708461"/>
             <a:ext cx="1069041" cy="1332814"/>
           </a:xfrm>
           <a:prstGeom prst="rect">
@@ -10860,7 +10923,7 @@
         </p:blipFill>
         <p:spPr bwMode="auto">
           <a:xfrm>
-            <a:off x="2954194" y="2604655"/>
+            <a:off x="1346113" y="3325785"/>
             <a:ext cx="1959552" cy="1145309"/>
           </a:xfrm>
           <a:prstGeom prst="rect">
@@ -10901,7 +10964,7 @@
         </p:blipFill>
         <p:spPr bwMode="auto">
           <a:xfrm>
-            <a:off x="5327939" y="4193310"/>
+            <a:off x="5159974" y="3325784"/>
             <a:ext cx="1959552" cy="1145309"/>
           </a:xfrm>
           <a:prstGeom prst="rect">
@@ -10942,7 +11005,7 @@
         </p:blipFill>
         <p:spPr bwMode="auto">
           <a:xfrm>
-            <a:off x="7637030" y="2604655"/>
+            <a:off x="8973835" y="3325784"/>
             <a:ext cx="1959552" cy="1145309"/>
           </a:xfrm>
           <a:prstGeom prst="rect">
@@ -10977,10 +11040,14 @@
           <a:p>
             <a:pPr algn="ctr"/>
             <a:r>
-              <a:rPr lang="en-US" b="1" dirty="0" smtClean="0"/>
+              <a:rPr lang="en-US" b="1" u="sng" dirty="0" smtClean="0">
+                <a:latin typeface="Arial Black" panose="020B0A04020102020204" pitchFamily="34" charset="0"/>
+              </a:rPr>
               <a:t>Flags</a:t>
             </a:r>
-            <a:endParaRPr lang="en-US" b="1" dirty="0"/>
+            <a:endParaRPr lang="en-US" b="1" u="sng" dirty="0">
+              <a:latin typeface="Arial Black" panose="020B0A04020102020204" pitchFamily="34" charset="0"/>
+            </a:endParaRPr>
           </a:p>
         </p:txBody>
       </p:sp>
@@ -11005,6 +11072,2337 @@
 </file>
 
 <file path=ppt/slides/slide6.xml><?xml version="1.0" encoding="utf-8"?>
+<p:sld xmlns:a="http://schemas.openxmlformats.org/drawingml/2006/main" xmlns:r="http://schemas.openxmlformats.org/officeDocument/2006/relationships" xmlns:p="http://schemas.openxmlformats.org/presentationml/2006/main">
+  <p:cSld>
+    <p:spTree>
+      <p:nvGrpSpPr>
+        <p:cNvPr id="1" name=""/>
+        <p:cNvGrpSpPr/>
+        <p:nvPr/>
+      </p:nvGrpSpPr>
+      <p:grpSpPr>
+        <a:xfrm>
+          <a:off x="0" y="0"/>
+          <a:ext cx="0" cy="0"/>
+          <a:chOff x="0" y="0"/>
+          <a:chExt cx="0" cy="0"/>
+        </a:xfrm>
+      </p:grpSpPr>
+      <p:sp>
+        <p:nvSpPr>
+          <p:cNvPr id="2" name="Rectangle à coins arrondis 1"/>
+          <p:cNvSpPr/>
+          <p:nvPr/>
+        </p:nvSpPr>
+        <p:spPr>
+          <a:xfrm>
+            <a:off x="848722" y="2039988"/>
+            <a:ext cx="1654334" cy="783771"/>
+          </a:xfrm>
+          <a:prstGeom prst="roundRect">
+            <a:avLst>
+              <a:gd name="adj" fmla="val 42851"/>
+            </a:avLst>
+          </a:prstGeom>
+          <a:gradFill>
+            <a:gsLst>
+              <a:gs pos="0">
+                <a:schemeClr val="accent1">
+                  <a:lumMod val="5000"/>
+                  <a:lumOff val="95000"/>
+                </a:schemeClr>
+              </a:gs>
+              <a:gs pos="10000">
+                <a:schemeClr val="bg2">
+                  <a:lumMod val="10000"/>
+                </a:schemeClr>
+              </a:gs>
+            </a:gsLst>
+            <a:lin ang="5400000" scaled="1"/>
+          </a:gradFill>
+          <a:ln>
+            <a:solidFill>
+              <a:schemeClr val="bg2">
+                <a:lumMod val="10000"/>
+              </a:schemeClr>
+            </a:solidFill>
+          </a:ln>
+        </p:spPr>
+        <p:style>
+          <a:lnRef idx="2">
+            <a:schemeClr val="accent1">
+              <a:shade val="50000"/>
+            </a:schemeClr>
+          </a:lnRef>
+          <a:fillRef idx="1">
+            <a:schemeClr val="accent1"/>
+          </a:fillRef>
+          <a:effectRef idx="0">
+            <a:schemeClr val="accent1"/>
+          </a:effectRef>
+          <a:fontRef idx="minor">
+            <a:schemeClr val="lt1"/>
+          </a:fontRef>
+        </p:style>
+        <p:txBody>
+          <a:bodyPr rtlCol="0" anchor="ctr"/>
+          <a:lstStyle/>
+          <a:p>
+            <a:pPr algn="ctr"/>
+            <a:r>
+              <a:rPr lang="fr-FR" dirty="0" smtClean="0">
+                <a:latin typeface="Segoe UI Black" panose="020B0A02040204020203" pitchFamily="34" charset="0"/>
+                <a:ea typeface="Segoe UI Black" panose="020B0A02040204020203" pitchFamily="34" charset="0"/>
+              </a:rPr>
+              <a:t>Back</a:t>
+            </a:r>
+            <a:endParaRPr lang="en-US" dirty="0">
+              <a:latin typeface="Segoe UI Black" panose="020B0A02040204020203" pitchFamily="34" charset="0"/>
+              <a:ea typeface="Segoe UI Black" panose="020B0A02040204020203" pitchFamily="34" charset="0"/>
+            </a:endParaRPr>
+          </a:p>
+        </p:txBody>
+      </p:sp>
+      <p:sp>
+        <p:nvSpPr>
+          <p:cNvPr id="3" name="Rectangle à coins arrondis 2"/>
+          <p:cNvSpPr/>
+          <p:nvPr/>
+        </p:nvSpPr>
+        <p:spPr>
+          <a:xfrm>
+            <a:off x="848721" y="5087988"/>
+            <a:ext cx="1654334" cy="783771"/>
+          </a:xfrm>
+          <a:prstGeom prst="roundRect">
+            <a:avLst>
+              <a:gd name="adj" fmla="val 42851"/>
+            </a:avLst>
+          </a:prstGeom>
+          <a:gradFill>
+            <a:gsLst>
+              <a:gs pos="0">
+                <a:schemeClr val="accent1">
+                  <a:lumMod val="5000"/>
+                  <a:lumOff val="95000"/>
+                </a:schemeClr>
+              </a:gs>
+              <a:gs pos="10000">
+                <a:schemeClr val="bg2">
+                  <a:lumMod val="10000"/>
+                </a:schemeClr>
+              </a:gs>
+            </a:gsLst>
+            <a:lin ang="5400000" scaled="1"/>
+          </a:gradFill>
+          <a:ln>
+            <a:solidFill>
+              <a:schemeClr val="bg2">
+                <a:lumMod val="10000"/>
+              </a:schemeClr>
+            </a:solidFill>
+          </a:ln>
+        </p:spPr>
+        <p:style>
+          <a:lnRef idx="2">
+            <a:schemeClr val="accent1">
+              <a:shade val="50000"/>
+            </a:schemeClr>
+          </a:lnRef>
+          <a:fillRef idx="1">
+            <a:schemeClr val="accent1"/>
+          </a:fillRef>
+          <a:effectRef idx="0">
+            <a:schemeClr val="accent1"/>
+          </a:effectRef>
+          <a:fontRef idx="minor">
+            <a:schemeClr val="lt1"/>
+          </a:fontRef>
+        </p:style>
+        <p:txBody>
+          <a:bodyPr rtlCol="0" anchor="ctr"/>
+          <a:lstStyle/>
+          <a:p>
+            <a:pPr algn="ctr"/>
+            <a:r>
+              <a:rPr lang="fr-FR" dirty="0" err="1" smtClean="0">
+                <a:latin typeface="Segoe UI Black" panose="020B0A02040204020203" pitchFamily="34" charset="0"/>
+                <a:ea typeface="Segoe UI Black" panose="020B0A02040204020203" pitchFamily="34" charset="0"/>
+              </a:rPr>
+              <a:t>Subiramwo</a:t>
+            </a:r>
+            <a:endParaRPr lang="en-US" dirty="0">
+              <a:latin typeface="Segoe UI Black" panose="020B0A02040204020203" pitchFamily="34" charset="0"/>
+              <a:ea typeface="Segoe UI Black" panose="020B0A02040204020203" pitchFamily="34" charset="0"/>
+            </a:endParaRPr>
+          </a:p>
+        </p:txBody>
+      </p:sp>
+      <p:sp>
+        <p:nvSpPr>
+          <p:cNvPr id="4" name="Rectangle à coins arrondis 3"/>
+          <p:cNvSpPr/>
+          <p:nvPr/>
+        </p:nvSpPr>
+        <p:spPr>
+          <a:xfrm>
+            <a:off x="848721" y="3563988"/>
+            <a:ext cx="1654334" cy="783771"/>
+          </a:xfrm>
+          <a:prstGeom prst="roundRect">
+            <a:avLst>
+              <a:gd name="adj" fmla="val 42851"/>
+            </a:avLst>
+          </a:prstGeom>
+          <a:gradFill>
+            <a:gsLst>
+              <a:gs pos="0">
+                <a:schemeClr val="accent1">
+                  <a:lumMod val="5000"/>
+                  <a:lumOff val="95000"/>
+                </a:schemeClr>
+              </a:gs>
+              <a:gs pos="10000">
+                <a:schemeClr val="bg2">
+                  <a:lumMod val="10000"/>
+                </a:schemeClr>
+              </a:gs>
+            </a:gsLst>
+            <a:lin ang="5400000" scaled="1"/>
+          </a:gradFill>
+          <a:ln>
+            <a:solidFill>
+              <a:schemeClr val="bg2">
+                <a:lumMod val="10000"/>
+              </a:schemeClr>
+            </a:solidFill>
+          </a:ln>
+        </p:spPr>
+        <p:style>
+          <a:lnRef idx="2">
+            <a:schemeClr val="accent1">
+              <a:shade val="50000"/>
+            </a:schemeClr>
+          </a:lnRef>
+          <a:fillRef idx="1">
+            <a:schemeClr val="accent1"/>
+          </a:fillRef>
+          <a:effectRef idx="0">
+            <a:schemeClr val="accent1"/>
+          </a:effectRef>
+          <a:fontRef idx="minor">
+            <a:schemeClr val="lt1"/>
+          </a:fontRef>
+        </p:style>
+        <p:txBody>
+          <a:bodyPr rtlCol="0" anchor="ctr"/>
+          <a:lstStyle/>
+          <a:p>
+            <a:pPr algn="ctr"/>
+            <a:r>
+              <a:rPr lang="fr-FR" dirty="0" smtClean="0">
+                <a:latin typeface="Segoe UI Black" panose="020B0A02040204020203" pitchFamily="34" charset="0"/>
+                <a:ea typeface="Segoe UI Black" panose="020B0A02040204020203" pitchFamily="34" charset="0"/>
+              </a:rPr>
+              <a:t>Retour</a:t>
+            </a:r>
+            <a:endParaRPr lang="en-US" dirty="0">
+              <a:latin typeface="Segoe UI Black" panose="020B0A02040204020203" pitchFamily="34" charset="0"/>
+              <a:ea typeface="Segoe UI Black" panose="020B0A02040204020203" pitchFamily="34" charset="0"/>
+            </a:endParaRPr>
+          </a:p>
+        </p:txBody>
+      </p:sp>
+      <p:sp>
+        <p:nvSpPr>
+          <p:cNvPr id="5" name="Rectangle à coins arrondis 4"/>
+          <p:cNvSpPr/>
+          <p:nvPr/>
+        </p:nvSpPr>
+        <p:spPr>
+          <a:xfrm>
+            <a:off x="3933667" y="2039988"/>
+            <a:ext cx="1654334" cy="783770"/>
+          </a:xfrm>
+          <a:prstGeom prst="roundRect">
+            <a:avLst>
+              <a:gd name="adj" fmla="val 42851"/>
+            </a:avLst>
+          </a:prstGeom>
+          <a:gradFill>
+            <a:gsLst>
+              <a:gs pos="0">
+                <a:schemeClr val="accent1">
+                  <a:lumMod val="5000"/>
+                  <a:lumOff val="95000"/>
+                </a:schemeClr>
+              </a:gs>
+              <a:gs pos="2000">
+                <a:schemeClr val="bg2">
+                  <a:lumMod val="10000"/>
+                </a:schemeClr>
+              </a:gs>
+            </a:gsLst>
+            <a:lin ang="5400000" scaled="1"/>
+          </a:gradFill>
+          <a:ln>
+            <a:solidFill>
+              <a:schemeClr val="bg2">
+                <a:lumMod val="10000"/>
+              </a:schemeClr>
+            </a:solidFill>
+          </a:ln>
+        </p:spPr>
+        <p:style>
+          <a:lnRef idx="2">
+            <a:schemeClr val="accent1">
+              <a:shade val="50000"/>
+            </a:schemeClr>
+          </a:lnRef>
+          <a:fillRef idx="1">
+            <a:schemeClr val="accent1"/>
+          </a:fillRef>
+          <a:effectRef idx="0">
+            <a:schemeClr val="accent1"/>
+          </a:effectRef>
+          <a:fontRef idx="minor">
+            <a:schemeClr val="lt1"/>
+          </a:fontRef>
+        </p:style>
+        <p:txBody>
+          <a:bodyPr rtlCol="0" anchor="ctr"/>
+          <a:lstStyle/>
+          <a:p>
+            <a:pPr algn="ctr"/>
+            <a:r>
+              <a:rPr lang="fr-FR" dirty="0" smtClean="0">
+                <a:solidFill>
+                  <a:schemeClr val="bg1">
+                    <a:lumMod val="50000"/>
+                  </a:schemeClr>
+                </a:solidFill>
+                <a:latin typeface="Segoe UI Black" panose="020B0A02040204020203" pitchFamily="34" charset="0"/>
+                <a:ea typeface="Segoe UI Black" panose="020B0A02040204020203" pitchFamily="34" charset="0"/>
+              </a:rPr>
+              <a:t>Back</a:t>
+            </a:r>
+            <a:endParaRPr lang="en-US" dirty="0">
+              <a:solidFill>
+                <a:schemeClr val="bg1">
+                  <a:lumMod val="50000"/>
+                </a:schemeClr>
+              </a:solidFill>
+              <a:latin typeface="Segoe UI Black" panose="020B0A02040204020203" pitchFamily="34" charset="0"/>
+              <a:ea typeface="Segoe UI Black" panose="020B0A02040204020203" pitchFamily="34" charset="0"/>
+            </a:endParaRPr>
+          </a:p>
+        </p:txBody>
+      </p:sp>
+      <p:sp>
+        <p:nvSpPr>
+          <p:cNvPr id="6" name="Rectangle à coins arrondis 5"/>
+          <p:cNvSpPr/>
+          <p:nvPr/>
+        </p:nvSpPr>
+        <p:spPr>
+          <a:xfrm>
+            <a:off x="3933667" y="3563988"/>
+            <a:ext cx="1654334" cy="783770"/>
+          </a:xfrm>
+          <a:prstGeom prst="roundRect">
+            <a:avLst>
+              <a:gd name="adj" fmla="val 42851"/>
+            </a:avLst>
+          </a:prstGeom>
+          <a:gradFill>
+            <a:gsLst>
+              <a:gs pos="0">
+                <a:schemeClr val="accent1">
+                  <a:lumMod val="5000"/>
+                  <a:lumOff val="95000"/>
+                </a:schemeClr>
+              </a:gs>
+              <a:gs pos="2000">
+                <a:schemeClr val="bg2">
+                  <a:lumMod val="10000"/>
+                </a:schemeClr>
+              </a:gs>
+            </a:gsLst>
+            <a:lin ang="5400000" scaled="1"/>
+          </a:gradFill>
+          <a:ln>
+            <a:solidFill>
+              <a:schemeClr val="bg2">
+                <a:lumMod val="10000"/>
+              </a:schemeClr>
+            </a:solidFill>
+          </a:ln>
+        </p:spPr>
+        <p:style>
+          <a:lnRef idx="2">
+            <a:schemeClr val="accent1">
+              <a:shade val="50000"/>
+            </a:schemeClr>
+          </a:lnRef>
+          <a:fillRef idx="1">
+            <a:schemeClr val="accent1"/>
+          </a:fillRef>
+          <a:effectRef idx="0">
+            <a:schemeClr val="accent1"/>
+          </a:effectRef>
+          <a:fontRef idx="minor">
+            <a:schemeClr val="lt1"/>
+          </a:fontRef>
+        </p:style>
+        <p:txBody>
+          <a:bodyPr rtlCol="0" anchor="ctr"/>
+          <a:lstStyle/>
+          <a:p>
+            <a:pPr algn="ctr"/>
+            <a:r>
+              <a:rPr lang="fr-FR" dirty="0" smtClean="0">
+                <a:solidFill>
+                  <a:schemeClr val="bg1">
+                    <a:lumMod val="50000"/>
+                  </a:schemeClr>
+                </a:solidFill>
+                <a:latin typeface="Segoe UI Black" panose="020B0A02040204020203" pitchFamily="34" charset="0"/>
+                <a:ea typeface="Segoe UI Black" panose="020B0A02040204020203" pitchFamily="34" charset="0"/>
+              </a:rPr>
+              <a:t>Retour</a:t>
+            </a:r>
+            <a:endParaRPr lang="en-US" dirty="0">
+              <a:solidFill>
+                <a:schemeClr val="bg1">
+                  <a:lumMod val="50000"/>
+                </a:schemeClr>
+              </a:solidFill>
+              <a:latin typeface="Segoe UI Black" panose="020B0A02040204020203" pitchFamily="34" charset="0"/>
+              <a:ea typeface="Segoe UI Black" panose="020B0A02040204020203" pitchFamily="34" charset="0"/>
+            </a:endParaRPr>
+          </a:p>
+        </p:txBody>
+      </p:sp>
+      <p:sp>
+        <p:nvSpPr>
+          <p:cNvPr id="7" name="Rectangle à coins arrondis 6"/>
+          <p:cNvSpPr/>
+          <p:nvPr/>
+        </p:nvSpPr>
+        <p:spPr>
+          <a:xfrm>
+            <a:off x="3933667" y="5087989"/>
+            <a:ext cx="1654334" cy="783770"/>
+          </a:xfrm>
+          <a:prstGeom prst="roundRect">
+            <a:avLst>
+              <a:gd name="adj" fmla="val 42851"/>
+            </a:avLst>
+          </a:prstGeom>
+          <a:gradFill>
+            <a:gsLst>
+              <a:gs pos="0">
+                <a:schemeClr val="accent1">
+                  <a:lumMod val="5000"/>
+                  <a:lumOff val="95000"/>
+                </a:schemeClr>
+              </a:gs>
+              <a:gs pos="2000">
+                <a:schemeClr val="bg2">
+                  <a:lumMod val="10000"/>
+                </a:schemeClr>
+              </a:gs>
+            </a:gsLst>
+            <a:lin ang="5400000" scaled="1"/>
+          </a:gradFill>
+          <a:ln>
+            <a:solidFill>
+              <a:schemeClr val="bg2">
+                <a:lumMod val="10000"/>
+              </a:schemeClr>
+            </a:solidFill>
+          </a:ln>
+        </p:spPr>
+        <p:style>
+          <a:lnRef idx="2">
+            <a:schemeClr val="accent1">
+              <a:shade val="50000"/>
+            </a:schemeClr>
+          </a:lnRef>
+          <a:fillRef idx="1">
+            <a:schemeClr val="accent1"/>
+          </a:fillRef>
+          <a:effectRef idx="0">
+            <a:schemeClr val="accent1"/>
+          </a:effectRef>
+          <a:fontRef idx="minor">
+            <a:schemeClr val="lt1"/>
+          </a:fontRef>
+        </p:style>
+        <p:txBody>
+          <a:bodyPr rtlCol="0" anchor="ctr"/>
+          <a:lstStyle/>
+          <a:p>
+            <a:pPr algn="ctr"/>
+            <a:r>
+              <a:rPr lang="fr-FR" dirty="0" err="1" smtClean="0">
+                <a:solidFill>
+                  <a:schemeClr val="bg1">
+                    <a:lumMod val="50000"/>
+                  </a:schemeClr>
+                </a:solidFill>
+                <a:latin typeface="Segoe UI Black" panose="020B0A02040204020203" pitchFamily="34" charset="0"/>
+                <a:ea typeface="Segoe UI Black" panose="020B0A02040204020203" pitchFamily="34" charset="0"/>
+              </a:rPr>
+              <a:t>Subiramwo</a:t>
+            </a:r>
+            <a:endParaRPr lang="en-US" dirty="0">
+              <a:solidFill>
+                <a:schemeClr val="bg1">
+                  <a:lumMod val="50000"/>
+                </a:schemeClr>
+              </a:solidFill>
+              <a:latin typeface="Segoe UI Black" panose="020B0A02040204020203" pitchFamily="34" charset="0"/>
+              <a:ea typeface="Segoe UI Black" panose="020B0A02040204020203" pitchFamily="34" charset="0"/>
+            </a:endParaRPr>
+          </a:p>
+        </p:txBody>
+      </p:sp>
+      <p:sp>
+        <p:nvSpPr>
+          <p:cNvPr id="12" name="Rectangle à coins arrondis 11"/>
+          <p:cNvSpPr/>
+          <p:nvPr/>
+        </p:nvSpPr>
+        <p:spPr>
+          <a:xfrm>
+            <a:off x="7539182" y="2267486"/>
+            <a:ext cx="3814618" cy="555757"/>
+          </a:xfrm>
+          <a:prstGeom prst="roundRect">
+            <a:avLst>
+              <a:gd name="adj" fmla="val 20323"/>
+            </a:avLst>
+          </a:prstGeom>
+          <a:solidFill>
+            <a:schemeClr val="bg1"/>
+          </a:solidFill>
+          <a:ln w="3175">
+            <a:solidFill>
+              <a:schemeClr val="tx1"/>
+            </a:solidFill>
+          </a:ln>
+          <a:effectLst>
+            <a:outerShdw blurRad="127000" dist="38100" dir="5400000" sx="101000" sy="101000" algn="t" rotWithShape="0">
+              <a:prstClr val="black">
+                <a:alpha val="40000"/>
+              </a:prstClr>
+            </a:outerShdw>
+          </a:effectLst>
+        </p:spPr>
+        <p:style>
+          <a:lnRef idx="2">
+            <a:schemeClr val="accent1">
+              <a:shade val="50000"/>
+            </a:schemeClr>
+          </a:lnRef>
+          <a:fillRef idx="1">
+            <a:schemeClr val="accent1"/>
+          </a:fillRef>
+          <a:effectRef idx="0">
+            <a:schemeClr val="accent1"/>
+          </a:effectRef>
+          <a:fontRef idx="minor">
+            <a:schemeClr val="lt1"/>
+          </a:fontRef>
+        </p:style>
+        <p:txBody>
+          <a:bodyPr rtlCol="0" anchor="ctr"/>
+          <a:lstStyle/>
+          <a:p>
+            <a:pPr algn="ctr"/>
+            <a:r>
+              <a:rPr lang="en-US" sz="2400" dirty="0">
+                <a:solidFill>
+                  <a:schemeClr val="tx1"/>
+                </a:solidFill>
+                <a:latin typeface="Segoe UI Black" panose="020B0A02040204020203" pitchFamily="34" charset="0"/>
+                <a:ea typeface="Segoe UI Black" panose="020B0A02040204020203" pitchFamily="34" charset="0"/>
+              </a:rPr>
+              <a:t>Player 1</a:t>
+            </a:r>
+          </a:p>
+        </p:txBody>
+      </p:sp>
+      <p:sp>
+        <p:nvSpPr>
+          <p:cNvPr id="13" name="Rectangle à coins arrondis 12"/>
+          <p:cNvSpPr/>
+          <p:nvPr/>
+        </p:nvSpPr>
+        <p:spPr>
+          <a:xfrm>
+            <a:off x="7539182" y="1549674"/>
+            <a:ext cx="3814618" cy="555757"/>
+          </a:xfrm>
+          <a:prstGeom prst="roundRect">
+            <a:avLst>
+              <a:gd name="adj" fmla="val 20323"/>
+            </a:avLst>
+          </a:prstGeom>
+          <a:solidFill>
+            <a:schemeClr val="bg1"/>
+          </a:solidFill>
+          <a:ln w="3175">
+            <a:solidFill>
+              <a:schemeClr val="tx1"/>
+            </a:solidFill>
+          </a:ln>
+          <a:effectLst>
+            <a:outerShdw blurRad="127000" dist="38100" dir="5400000" algn="t" rotWithShape="0">
+              <a:prstClr val="black">
+                <a:alpha val="40000"/>
+              </a:prstClr>
+            </a:outerShdw>
+          </a:effectLst>
+        </p:spPr>
+        <p:style>
+          <a:lnRef idx="2">
+            <a:schemeClr val="accent1">
+              <a:shade val="50000"/>
+            </a:schemeClr>
+          </a:lnRef>
+          <a:fillRef idx="1">
+            <a:schemeClr val="accent1"/>
+          </a:fillRef>
+          <a:effectRef idx="0">
+            <a:schemeClr val="accent1"/>
+          </a:effectRef>
+          <a:fontRef idx="minor">
+            <a:schemeClr val="lt1"/>
+          </a:fontRef>
+        </p:style>
+        <p:txBody>
+          <a:bodyPr rtlCol="0" anchor="ctr"/>
+          <a:lstStyle/>
+          <a:p>
+            <a:pPr algn="ctr"/>
+            <a:r>
+              <a:rPr lang="en-US" sz="2400" dirty="0" smtClean="0">
+                <a:solidFill>
+                  <a:schemeClr val="tx1"/>
+                </a:solidFill>
+                <a:latin typeface="Segoe UI Black" panose="020B0A02040204020203" pitchFamily="34" charset="0"/>
+                <a:ea typeface="Segoe UI Black" panose="020B0A02040204020203" pitchFamily="34" charset="0"/>
+              </a:rPr>
+              <a:t>Player 2</a:t>
+            </a:r>
+            <a:endParaRPr lang="en-US" sz="2400" dirty="0">
+              <a:solidFill>
+                <a:schemeClr val="tx1"/>
+              </a:solidFill>
+              <a:latin typeface="Segoe UI Black" panose="020B0A02040204020203" pitchFamily="34" charset="0"/>
+              <a:ea typeface="Segoe UI Black" panose="020B0A02040204020203" pitchFamily="34" charset="0"/>
+            </a:endParaRPr>
+          </a:p>
+        </p:txBody>
+      </p:sp>
+      <p:sp>
+        <p:nvSpPr>
+          <p:cNvPr id="16" name="Titre 15"/>
+          <p:cNvSpPr>
+            <a:spLocks noGrp="1"/>
+          </p:cNvSpPr>
+          <p:nvPr>
+            <p:ph type="title"/>
+          </p:nvPr>
+        </p:nvSpPr>
+        <p:spPr/>
+        <p:txBody>
+          <a:bodyPr/>
+          <a:lstStyle/>
+          <a:p>
+            <a:pPr algn="ctr"/>
+            <a:r>
+              <a:rPr lang="en-US" dirty="0" smtClean="0">
+                <a:latin typeface="Arial Black" panose="020B0A04020102020204" pitchFamily="34" charset="0"/>
+              </a:rPr>
+              <a:t>Play State </a:t>
+            </a:r>
+            <a:r>
+              <a:rPr lang="en-US" dirty="0">
+                <a:latin typeface="Arial Black" panose="020B0A04020102020204" pitchFamily="34" charset="0"/>
+              </a:rPr>
+              <a:t>S</a:t>
+            </a:r>
+            <a:r>
+              <a:rPr lang="en-US" dirty="0" smtClean="0">
+                <a:latin typeface="Arial Black" panose="020B0A04020102020204" pitchFamily="34" charset="0"/>
+              </a:rPr>
+              <a:t>tage </a:t>
+            </a:r>
+            <a:r>
+              <a:rPr lang="en-US" dirty="0">
+                <a:latin typeface="Arial Black" panose="020B0A04020102020204" pitchFamily="34" charset="0"/>
+              </a:rPr>
+              <a:t>B</a:t>
+            </a:r>
+            <a:r>
+              <a:rPr lang="en-US" dirty="0" smtClean="0">
+                <a:latin typeface="Arial Black" panose="020B0A04020102020204" pitchFamily="34" charset="0"/>
+              </a:rPr>
+              <a:t>uttons </a:t>
+            </a:r>
+            <a:r>
+              <a:rPr lang="en-US" dirty="0">
+                <a:latin typeface="Arial Black" panose="020B0A04020102020204" pitchFamily="34" charset="0"/>
+              </a:rPr>
+              <a:t>D</a:t>
+            </a:r>
+            <a:r>
+              <a:rPr lang="en-US" dirty="0" smtClean="0">
+                <a:latin typeface="Arial Black" panose="020B0A04020102020204" pitchFamily="34" charset="0"/>
+              </a:rPr>
+              <a:t>esign 1</a:t>
+            </a:r>
+            <a:endParaRPr lang="en-US" dirty="0">
+              <a:latin typeface="Arial Black" panose="020B0A04020102020204" pitchFamily="34" charset="0"/>
+            </a:endParaRPr>
+          </a:p>
+        </p:txBody>
+      </p:sp>
+      <p:sp>
+        <p:nvSpPr>
+          <p:cNvPr id="11" name="Rectangle à coins arrondis 10"/>
+          <p:cNvSpPr/>
+          <p:nvPr/>
+        </p:nvSpPr>
+        <p:spPr>
+          <a:xfrm>
+            <a:off x="7539182" y="3963405"/>
+            <a:ext cx="3814618" cy="555757"/>
+          </a:xfrm>
+          <a:prstGeom prst="roundRect">
+            <a:avLst>
+              <a:gd name="adj" fmla="val 20323"/>
+            </a:avLst>
+          </a:prstGeom>
+          <a:solidFill>
+            <a:schemeClr val="bg1"/>
+          </a:solidFill>
+          <a:ln w="3175">
+            <a:solidFill>
+              <a:schemeClr val="tx1"/>
+            </a:solidFill>
+          </a:ln>
+          <a:effectLst>
+            <a:outerShdw blurRad="127000" dist="38100" dir="5400000" sx="101000" sy="101000" algn="t" rotWithShape="0">
+              <a:prstClr val="black">
+                <a:alpha val="40000"/>
+              </a:prstClr>
+            </a:outerShdw>
+          </a:effectLst>
+        </p:spPr>
+        <p:style>
+          <a:lnRef idx="2">
+            <a:schemeClr val="accent1">
+              <a:shade val="50000"/>
+            </a:schemeClr>
+          </a:lnRef>
+          <a:fillRef idx="1">
+            <a:schemeClr val="accent1"/>
+          </a:fillRef>
+          <a:effectRef idx="0">
+            <a:schemeClr val="accent1"/>
+          </a:effectRef>
+          <a:fontRef idx="minor">
+            <a:schemeClr val="lt1"/>
+          </a:fontRef>
+        </p:style>
+        <p:txBody>
+          <a:bodyPr rtlCol="0" anchor="ctr"/>
+          <a:lstStyle/>
+          <a:p>
+            <a:pPr algn="ctr"/>
+            <a:r>
+              <a:rPr lang="en-US" sz="2400" dirty="0" err="1" smtClean="0">
+                <a:solidFill>
+                  <a:schemeClr val="tx1"/>
+                </a:solidFill>
+                <a:latin typeface="Segoe UI Black" panose="020B0A02040204020203" pitchFamily="34" charset="0"/>
+                <a:ea typeface="Segoe UI Black" panose="020B0A02040204020203" pitchFamily="34" charset="0"/>
+              </a:rPr>
+              <a:t>Joueur</a:t>
+            </a:r>
+            <a:r>
+              <a:rPr lang="en-US" sz="2400" dirty="0" smtClean="0">
+                <a:solidFill>
+                  <a:schemeClr val="tx1"/>
+                </a:solidFill>
+                <a:latin typeface="Segoe UI Black" panose="020B0A02040204020203" pitchFamily="34" charset="0"/>
+                <a:ea typeface="Segoe UI Black" panose="020B0A02040204020203" pitchFamily="34" charset="0"/>
+              </a:rPr>
+              <a:t> </a:t>
+            </a:r>
+            <a:r>
+              <a:rPr lang="en-US" sz="2400" dirty="0">
+                <a:solidFill>
+                  <a:schemeClr val="tx1"/>
+                </a:solidFill>
+                <a:latin typeface="Segoe UI Black" panose="020B0A02040204020203" pitchFamily="34" charset="0"/>
+                <a:ea typeface="Segoe UI Black" panose="020B0A02040204020203" pitchFamily="34" charset="0"/>
+              </a:rPr>
+              <a:t>1</a:t>
+            </a:r>
+          </a:p>
+        </p:txBody>
+      </p:sp>
+      <p:sp>
+        <p:nvSpPr>
+          <p:cNvPr id="14" name="Rectangle à coins arrondis 13"/>
+          <p:cNvSpPr/>
+          <p:nvPr/>
+        </p:nvSpPr>
+        <p:spPr>
+          <a:xfrm>
+            <a:off x="7539182" y="3245593"/>
+            <a:ext cx="3814618" cy="555757"/>
+          </a:xfrm>
+          <a:prstGeom prst="roundRect">
+            <a:avLst>
+              <a:gd name="adj" fmla="val 20323"/>
+            </a:avLst>
+          </a:prstGeom>
+          <a:solidFill>
+            <a:schemeClr val="bg1"/>
+          </a:solidFill>
+          <a:ln w="3175">
+            <a:solidFill>
+              <a:schemeClr val="tx1"/>
+            </a:solidFill>
+          </a:ln>
+          <a:effectLst>
+            <a:outerShdw blurRad="127000" dist="38100" dir="5400000" algn="t" rotWithShape="0">
+              <a:prstClr val="black">
+                <a:alpha val="40000"/>
+              </a:prstClr>
+            </a:outerShdw>
+          </a:effectLst>
+        </p:spPr>
+        <p:style>
+          <a:lnRef idx="2">
+            <a:schemeClr val="accent1">
+              <a:shade val="50000"/>
+            </a:schemeClr>
+          </a:lnRef>
+          <a:fillRef idx="1">
+            <a:schemeClr val="accent1"/>
+          </a:fillRef>
+          <a:effectRef idx="0">
+            <a:schemeClr val="accent1"/>
+          </a:effectRef>
+          <a:fontRef idx="minor">
+            <a:schemeClr val="lt1"/>
+          </a:fontRef>
+        </p:style>
+        <p:txBody>
+          <a:bodyPr rtlCol="0" anchor="ctr"/>
+          <a:lstStyle/>
+          <a:p>
+            <a:pPr algn="ctr"/>
+            <a:r>
+              <a:rPr lang="en-US" sz="2400" dirty="0" err="1" smtClean="0">
+                <a:solidFill>
+                  <a:schemeClr val="tx1"/>
+                </a:solidFill>
+                <a:latin typeface="Segoe UI Black" panose="020B0A02040204020203" pitchFamily="34" charset="0"/>
+                <a:ea typeface="Segoe UI Black" panose="020B0A02040204020203" pitchFamily="34" charset="0"/>
+              </a:rPr>
+              <a:t>Joueur</a:t>
+            </a:r>
+            <a:r>
+              <a:rPr lang="en-US" sz="2400" dirty="0" smtClean="0">
+                <a:solidFill>
+                  <a:schemeClr val="tx1"/>
+                </a:solidFill>
+                <a:latin typeface="Segoe UI Black" panose="020B0A02040204020203" pitchFamily="34" charset="0"/>
+                <a:ea typeface="Segoe UI Black" panose="020B0A02040204020203" pitchFamily="34" charset="0"/>
+              </a:rPr>
+              <a:t> </a:t>
+            </a:r>
+            <a:r>
+              <a:rPr lang="en-US" sz="2400" dirty="0" smtClean="0">
+                <a:solidFill>
+                  <a:schemeClr val="tx1"/>
+                </a:solidFill>
+                <a:latin typeface="Segoe UI Black" panose="020B0A02040204020203" pitchFamily="34" charset="0"/>
+                <a:ea typeface="Segoe UI Black" panose="020B0A02040204020203" pitchFamily="34" charset="0"/>
+              </a:rPr>
+              <a:t>2</a:t>
+            </a:r>
+            <a:endParaRPr lang="en-US" sz="2400" dirty="0">
+              <a:solidFill>
+                <a:schemeClr val="tx1"/>
+              </a:solidFill>
+              <a:latin typeface="Segoe UI Black" panose="020B0A02040204020203" pitchFamily="34" charset="0"/>
+              <a:ea typeface="Segoe UI Black" panose="020B0A02040204020203" pitchFamily="34" charset="0"/>
+            </a:endParaRPr>
+          </a:p>
+        </p:txBody>
+      </p:sp>
+      <p:sp>
+        <p:nvSpPr>
+          <p:cNvPr id="15" name="Rectangle à coins arrondis 14"/>
+          <p:cNvSpPr/>
+          <p:nvPr/>
+        </p:nvSpPr>
+        <p:spPr>
+          <a:xfrm>
+            <a:off x="7539182" y="5659324"/>
+            <a:ext cx="3814618" cy="555757"/>
+          </a:xfrm>
+          <a:prstGeom prst="roundRect">
+            <a:avLst>
+              <a:gd name="adj" fmla="val 20323"/>
+            </a:avLst>
+          </a:prstGeom>
+          <a:solidFill>
+            <a:schemeClr val="bg1"/>
+          </a:solidFill>
+          <a:ln w="3175">
+            <a:solidFill>
+              <a:schemeClr val="tx1"/>
+            </a:solidFill>
+          </a:ln>
+          <a:effectLst>
+            <a:outerShdw blurRad="127000" dist="38100" dir="5400000" sx="101000" sy="101000" algn="t" rotWithShape="0">
+              <a:prstClr val="black">
+                <a:alpha val="40000"/>
+              </a:prstClr>
+            </a:outerShdw>
+          </a:effectLst>
+        </p:spPr>
+        <p:style>
+          <a:lnRef idx="2">
+            <a:schemeClr val="accent1">
+              <a:shade val="50000"/>
+            </a:schemeClr>
+          </a:lnRef>
+          <a:fillRef idx="1">
+            <a:schemeClr val="accent1"/>
+          </a:fillRef>
+          <a:effectRef idx="0">
+            <a:schemeClr val="accent1"/>
+          </a:effectRef>
+          <a:fontRef idx="minor">
+            <a:schemeClr val="lt1"/>
+          </a:fontRef>
+        </p:style>
+        <p:txBody>
+          <a:bodyPr rtlCol="0" anchor="ctr"/>
+          <a:lstStyle/>
+          <a:p>
+            <a:pPr algn="ctr"/>
+            <a:r>
+              <a:rPr lang="en-US" sz="2400" dirty="0" err="1" smtClean="0">
+                <a:solidFill>
+                  <a:schemeClr val="tx1"/>
+                </a:solidFill>
+                <a:latin typeface="Segoe UI Black" panose="020B0A02040204020203" pitchFamily="34" charset="0"/>
+                <a:ea typeface="Segoe UI Black" panose="020B0A02040204020203" pitchFamily="34" charset="0"/>
+              </a:rPr>
+              <a:t>Umukinyi</a:t>
+            </a:r>
+            <a:r>
+              <a:rPr lang="en-US" sz="2400" dirty="0" smtClean="0">
+                <a:solidFill>
+                  <a:schemeClr val="tx1"/>
+                </a:solidFill>
+                <a:latin typeface="Segoe UI Black" panose="020B0A02040204020203" pitchFamily="34" charset="0"/>
+                <a:ea typeface="Segoe UI Black" panose="020B0A02040204020203" pitchFamily="34" charset="0"/>
+              </a:rPr>
+              <a:t> </a:t>
+            </a:r>
+            <a:r>
+              <a:rPr lang="en-US" sz="2400" dirty="0" err="1" smtClean="0">
+                <a:solidFill>
+                  <a:schemeClr val="tx1"/>
+                </a:solidFill>
+                <a:latin typeface="Segoe UI Black" panose="020B0A02040204020203" pitchFamily="34" charset="0"/>
+                <a:ea typeface="Segoe UI Black" panose="020B0A02040204020203" pitchFamily="34" charset="0"/>
+              </a:rPr>
+              <a:t>wa</a:t>
+            </a:r>
+            <a:r>
+              <a:rPr lang="en-US" sz="2400" dirty="0" smtClean="0">
+                <a:solidFill>
+                  <a:schemeClr val="tx1"/>
+                </a:solidFill>
+                <a:latin typeface="Segoe UI Black" panose="020B0A02040204020203" pitchFamily="34" charset="0"/>
+                <a:ea typeface="Segoe UI Black" panose="020B0A02040204020203" pitchFamily="34" charset="0"/>
+              </a:rPr>
+              <a:t> </a:t>
+            </a:r>
+            <a:r>
+              <a:rPr lang="en-US" sz="2400" dirty="0">
+                <a:solidFill>
+                  <a:schemeClr val="tx1"/>
+                </a:solidFill>
+                <a:latin typeface="Segoe UI Black" panose="020B0A02040204020203" pitchFamily="34" charset="0"/>
+                <a:ea typeface="Segoe UI Black" panose="020B0A02040204020203" pitchFamily="34" charset="0"/>
+              </a:rPr>
+              <a:t>1</a:t>
+            </a:r>
+          </a:p>
+        </p:txBody>
+      </p:sp>
+      <p:sp>
+        <p:nvSpPr>
+          <p:cNvPr id="17" name="Rectangle à coins arrondis 16"/>
+          <p:cNvSpPr/>
+          <p:nvPr/>
+        </p:nvSpPr>
+        <p:spPr>
+          <a:xfrm>
+            <a:off x="7539182" y="4941512"/>
+            <a:ext cx="3814618" cy="555757"/>
+          </a:xfrm>
+          <a:prstGeom prst="roundRect">
+            <a:avLst>
+              <a:gd name="adj" fmla="val 20323"/>
+            </a:avLst>
+          </a:prstGeom>
+          <a:solidFill>
+            <a:schemeClr val="bg1"/>
+          </a:solidFill>
+          <a:ln w="3175">
+            <a:solidFill>
+              <a:schemeClr val="tx1"/>
+            </a:solidFill>
+          </a:ln>
+          <a:effectLst>
+            <a:outerShdw blurRad="127000" dist="38100" dir="5400000" algn="t" rotWithShape="0">
+              <a:prstClr val="black">
+                <a:alpha val="40000"/>
+              </a:prstClr>
+            </a:outerShdw>
+          </a:effectLst>
+        </p:spPr>
+        <p:style>
+          <a:lnRef idx="2">
+            <a:schemeClr val="accent1">
+              <a:shade val="50000"/>
+            </a:schemeClr>
+          </a:lnRef>
+          <a:fillRef idx="1">
+            <a:schemeClr val="accent1"/>
+          </a:fillRef>
+          <a:effectRef idx="0">
+            <a:schemeClr val="accent1"/>
+          </a:effectRef>
+          <a:fontRef idx="minor">
+            <a:schemeClr val="lt1"/>
+          </a:fontRef>
+        </p:style>
+        <p:txBody>
+          <a:bodyPr rtlCol="0" anchor="ctr"/>
+          <a:lstStyle/>
+          <a:p>
+            <a:pPr algn="ctr"/>
+            <a:r>
+              <a:rPr lang="en-US" sz="2400" dirty="0" err="1" smtClean="0">
+                <a:solidFill>
+                  <a:schemeClr val="tx1"/>
+                </a:solidFill>
+                <a:latin typeface="Segoe UI Black" panose="020B0A02040204020203" pitchFamily="34" charset="0"/>
+                <a:ea typeface="Segoe UI Black" panose="020B0A02040204020203" pitchFamily="34" charset="0"/>
+              </a:rPr>
+              <a:t>Umukinyi</a:t>
+            </a:r>
+            <a:r>
+              <a:rPr lang="en-US" sz="2400" dirty="0" smtClean="0">
+                <a:solidFill>
+                  <a:schemeClr val="tx1"/>
+                </a:solidFill>
+                <a:latin typeface="Segoe UI Black" panose="020B0A02040204020203" pitchFamily="34" charset="0"/>
+                <a:ea typeface="Segoe UI Black" panose="020B0A02040204020203" pitchFamily="34" charset="0"/>
+              </a:rPr>
+              <a:t> </a:t>
+            </a:r>
+            <a:r>
+              <a:rPr lang="en-US" sz="2400" dirty="0" err="1" smtClean="0">
+                <a:solidFill>
+                  <a:schemeClr val="tx1"/>
+                </a:solidFill>
+                <a:latin typeface="Segoe UI Black" panose="020B0A02040204020203" pitchFamily="34" charset="0"/>
+                <a:ea typeface="Segoe UI Black" panose="020B0A02040204020203" pitchFamily="34" charset="0"/>
+              </a:rPr>
+              <a:t>wa</a:t>
+            </a:r>
+            <a:r>
+              <a:rPr lang="en-US" sz="2400" dirty="0" smtClean="0">
+                <a:solidFill>
+                  <a:schemeClr val="tx1"/>
+                </a:solidFill>
+                <a:latin typeface="Segoe UI Black" panose="020B0A02040204020203" pitchFamily="34" charset="0"/>
+                <a:ea typeface="Segoe UI Black" panose="020B0A02040204020203" pitchFamily="34" charset="0"/>
+              </a:rPr>
+              <a:t> </a:t>
+            </a:r>
+            <a:r>
+              <a:rPr lang="en-US" sz="2400" dirty="0" smtClean="0">
+                <a:solidFill>
+                  <a:schemeClr val="tx1"/>
+                </a:solidFill>
+                <a:latin typeface="Segoe UI Black" panose="020B0A02040204020203" pitchFamily="34" charset="0"/>
+                <a:ea typeface="Segoe UI Black" panose="020B0A02040204020203" pitchFamily="34" charset="0"/>
+              </a:rPr>
+              <a:t>2</a:t>
+            </a:r>
+            <a:endParaRPr lang="en-US" sz="2400" dirty="0">
+              <a:solidFill>
+                <a:schemeClr val="tx1"/>
+              </a:solidFill>
+              <a:latin typeface="Segoe UI Black" panose="020B0A02040204020203" pitchFamily="34" charset="0"/>
+              <a:ea typeface="Segoe UI Black" panose="020B0A02040204020203" pitchFamily="34" charset="0"/>
+            </a:endParaRPr>
+          </a:p>
+        </p:txBody>
+      </p:sp>
+    </p:spTree>
+    <p:extLst>
+      <p:ext uri="{BB962C8B-B14F-4D97-AF65-F5344CB8AC3E}">
+        <p14:creationId xmlns:p14="http://schemas.microsoft.com/office/powerpoint/2010/main" val="1022212001"/>
+      </p:ext>
+    </p:extLst>
+  </p:cSld>
+  <p:clrMapOvr>
+    <a:masterClrMapping/>
+  </p:clrMapOvr>
+  <p:timing>
+    <p:tnLst>
+      <p:par>
+        <p:cTn id="1" dur="indefinite" restart="never" nodeType="tmRoot"/>
+      </p:par>
+    </p:tnLst>
+  </p:timing>
+</p:sld>
+</file>
+
+<file path=ppt/slides/slide7.xml><?xml version="1.0" encoding="utf-8"?>
+<p:sld xmlns:a="http://schemas.openxmlformats.org/drawingml/2006/main" xmlns:r="http://schemas.openxmlformats.org/officeDocument/2006/relationships" xmlns:p="http://schemas.openxmlformats.org/presentationml/2006/main">
+  <p:cSld>
+    <p:spTree>
+      <p:nvGrpSpPr>
+        <p:cNvPr id="1" name=""/>
+        <p:cNvGrpSpPr/>
+        <p:nvPr/>
+      </p:nvGrpSpPr>
+      <p:grpSpPr>
+        <a:xfrm>
+          <a:off x="0" y="0"/>
+          <a:ext cx="0" cy="0"/>
+          <a:chOff x="0" y="0"/>
+          <a:chExt cx="0" cy="0"/>
+        </a:xfrm>
+      </p:grpSpPr>
+      <p:sp>
+        <p:nvSpPr>
+          <p:cNvPr id="2" name="Rectangle à coins arrondis 1"/>
+          <p:cNvSpPr/>
+          <p:nvPr/>
+        </p:nvSpPr>
+        <p:spPr>
+          <a:xfrm>
+            <a:off x="775149" y="1743470"/>
+            <a:ext cx="1654334" cy="783771"/>
+          </a:xfrm>
+          <a:prstGeom prst="roundRect">
+            <a:avLst>
+              <a:gd name="adj" fmla="val 0"/>
+            </a:avLst>
+          </a:prstGeom>
+          <a:ln/>
+        </p:spPr>
+        <p:style>
+          <a:lnRef idx="2">
+            <a:schemeClr val="dk1"/>
+          </a:lnRef>
+          <a:fillRef idx="1">
+            <a:schemeClr val="lt1"/>
+          </a:fillRef>
+          <a:effectRef idx="0">
+            <a:schemeClr val="dk1"/>
+          </a:effectRef>
+          <a:fontRef idx="minor">
+            <a:schemeClr val="dk1"/>
+          </a:fontRef>
+        </p:style>
+        <p:txBody>
+          <a:bodyPr rtlCol="0" anchor="ctr"/>
+          <a:lstStyle/>
+          <a:p>
+            <a:pPr algn="ctr"/>
+            <a:r>
+              <a:rPr lang="fr-FR" dirty="0" smtClean="0">
+                <a:latin typeface="Segoe UI Black" panose="020B0A02040204020203" pitchFamily="34" charset="0"/>
+                <a:ea typeface="Segoe UI Black" panose="020B0A02040204020203" pitchFamily="34" charset="0"/>
+              </a:rPr>
+              <a:t>Back</a:t>
+            </a:r>
+            <a:endParaRPr lang="en-US" dirty="0">
+              <a:latin typeface="Segoe UI Black" panose="020B0A02040204020203" pitchFamily="34" charset="0"/>
+              <a:ea typeface="Segoe UI Black" panose="020B0A02040204020203" pitchFamily="34" charset="0"/>
+            </a:endParaRPr>
+          </a:p>
+        </p:txBody>
+      </p:sp>
+      <p:sp>
+        <p:nvSpPr>
+          <p:cNvPr id="3" name="Rectangle à coins arrondis 2"/>
+          <p:cNvSpPr/>
+          <p:nvPr/>
+        </p:nvSpPr>
+        <p:spPr>
+          <a:xfrm>
+            <a:off x="775149" y="3535484"/>
+            <a:ext cx="1654334" cy="783771"/>
+          </a:xfrm>
+          <a:prstGeom prst="roundRect">
+            <a:avLst>
+              <a:gd name="adj" fmla="val 0"/>
+            </a:avLst>
+          </a:prstGeom>
+          <a:ln/>
+        </p:spPr>
+        <p:style>
+          <a:lnRef idx="2">
+            <a:schemeClr val="dk1"/>
+          </a:lnRef>
+          <a:fillRef idx="1">
+            <a:schemeClr val="lt1"/>
+          </a:fillRef>
+          <a:effectRef idx="0">
+            <a:schemeClr val="dk1"/>
+          </a:effectRef>
+          <a:fontRef idx="minor">
+            <a:schemeClr val="dk1"/>
+          </a:fontRef>
+        </p:style>
+        <p:txBody>
+          <a:bodyPr rtlCol="0" anchor="ctr"/>
+          <a:lstStyle/>
+          <a:p>
+            <a:pPr algn="ctr"/>
+            <a:r>
+              <a:rPr lang="fr-FR" dirty="0" smtClean="0">
+                <a:latin typeface="Segoe UI Black" panose="020B0A02040204020203" pitchFamily="34" charset="0"/>
+                <a:ea typeface="Segoe UI Black" panose="020B0A02040204020203" pitchFamily="34" charset="0"/>
+              </a:rPr>
+              <a:t>Retour</a:t>
+            </a:r>
+            <a:endParaRPr lang="en-US" dirty="0">
+              <a:latin typeface="Segoe UI Black" panose="020B0A02040204020203" pitchFamily="34" charset="0"/>
+              <a:ea typeface="Segoe UI Black" panose="020B0A02040204020203" pitchFamily="34" charset="0"/>
+            </a:endParaRPr>
+          </a:p>
+        </p:txBody>
+      </p:sp>
+      <p:sp>
+        <p:nvSpPr>
+          <p:cNvPr id="4" name="Rectangle à coins arrondis 3"/>
+          <p:cNvSpPr/>
+          <p:nvPr/>
+        </p:nvSpPr>
+        <p:spPr>
+          <a:xfrm>
+            <a:off x="775149" y="5327498"/>
+            <a:ext cx="1654334" cy="783771"/>
+          </a:xfrm>
+          <a:prstGeom prst="roundRect">
+            <a:avLst>
+              <a:gd name="adj" fmla="val 0"/>
+            </a:avLst>
+          </a:prstGeom>
+          <a:ln/>
+        </p:spPr>
+        <p:style>
+          <a:lnRef idx="2">
+            <a:schemeClr val="dk1"/>
+          </a:lnRef>
+          <a:fillRef idx="1">
+            <a:schemeClr val="lt1"/>
+          </a:fillRef>
+          <a:effectRef idx="0">
+            <a:schemeClr val="dk1"/>
+          </a:effectRef>
+          <a:fontRef idx="minor">
+            <a:schemeClr val="dk1"/>
+          </a:fontRef>
+        </p:style>
+        <p:txBody>
+          <a:bodyPr rtlCol="0" anchor="ctr"/>
+          <a:lstStyle/>
+          <a:p>
+            <a:pPr algn="ctr"/>
+            <a:r>
+              <a:rPr lang="fr-FR" dirty="0" err="1" smtClean="0">
+                <a:latin typeface="Segoe UI Black" panose="020B0A02040204020203" pitchFamily="34" charset="0"/>
+                <a:ea typeface="Segoe UI Black" panose="020B0A02040204020203" pitchFamily="34" charset="0"/>
+              </a:rPr>
+              <a:t>Subiramwo</a:t>
+            </a:r>
+            <a:endParaRPr lang="en-US" dirty="0">
+              <a:latin typeface="Segoe UI Black" panose="020B0A02040204020203" pitchFamily="34" charset="0"/>
+              <a:ea typeface="Segoe UI Black" panose="020B0A02040204020203" pitchFamily="34" charset="0"/>
+            </a:endParaRPr>
+          </a:p>
+        </p:txBody>
+      </p:sp>
+      <p:sp>
+        <p:nvSpPr>
+          <p:cNvPr id="5" name="Rectangle à coins arrondis 4"/>
+          <p:cNvSpPr/>
+          <p:nvPr/>
+        </p:nvSpPr>
+        <p:spPr>
+          <a:xfrm>
+            <a:off x="3760087" y="1743470"/>
+            <a:ext cx="1654334" cy="783770"/>
+          </a:xfrm>
+          <a:prstGeom prst="roundRect">
+            <a:avLst>
+              <a:gd name="adj" fmla="val 0"/>
+            </a:avLst>
+          </a:prstGeom>
+          <a:ln/>
+        </p:spPr>
+        <p:style>
+          <a:lnRef idx="2">
+            <a:schemeClr val="dk1">
+              <a:shade val="50000"/>
+            </a:schemeClr>
+          </a:lnRef>
+          <a:fillRef idx="1">
+            <a:schemeClr val="dk1"/>
+          </a:fillRef>
+          <a:effectRef idx="0">
+            <a:schemeClr val="dk1"/>
+          </a:effectRef>
+          <a:fontRef idx="minor">
+            <a:schemeClr val="lt1"/>
+          </a:fontRef>
+        </p:style>
+        <p:txBody>
+          <a:bodyPr rtlCol="0" anchor="ctr"/>
+          <a:lstStyle/>
+          <a:p>
+            <a:pPr algn="ctr"/>
+            <a:r>
+              <a:rPr lang="fr-FR" dirty="0" smtClean="0">
+                <a:solidFill>
+                  <a:schemeClr val="bg1"/>
+                </a:solidFill>
+                <a:latin typeface="Segoe UI Black" panose="020B0A02040204020203" pitchFamily="34" charset="0"/>
+                <a:ea typeface="Segoe UI Black" panose="020B0A02040204020203" pitchFamily="34" charset="0"/>
+              </a:rPr>
+              <a:t>Back</a:t>
+            </a:r>
+            <a:endParaRPr lang="en-US" dirty="0">
+              <a:solidFill>
+                <a:schemeClr val="bg1"/>
+              </a:solidFill>
+              <a:latin typeface="Segoe UI Black" panose="020B0A02040204020203" pitchFamily="34" charset="0"/>
+              <a:ea typeface="Segoe UI Black" panose="020B0A02040204020203" pitchFamily="34" charset="0"/>
+            </a:endParaRPr>
+          </a:p>
+        </p:txBody>
+      </p:sp>
+      <p:sp>
+        <p:nvSpPr>
+          <p:cNvPr id="6" name="Rectangle à coins arrondis 5"/>
+          <p:cNvSpPr/>
+          <p:nvPr/>
+        </p:nvSpPr>
+        <p:spPr>
+          <a:xfrm>
+            <a:off x="3760087" y="3535484"/>
+            <a:ext cx="1654334" cy="783770"/>
+          </a:xfrm>
+          <a:prstGeom prst="roundRect">
+            <a:avLst>
+              <a:gd name="adj" fmla="val 0"/>
+            </a:avLst>
+          </a:prstGeom>
+          <a:ln/>
+        </p:spPr>
+        <p:style>
+          <a:lnRef idx="2">
+            <a:schemeClr val="dk1">
+              <a:shade val="50000"/>
+            </a:schemeClr>
+          </a:lnRef>
+          <a:fillRef idx="1">
+            <a:schemeClr val="dk1"/>
+          </a:fillRef>
+          <a:effectRef idx="0">
+            <a:schemeClr val="dk1"/>
+          </a:effectRef>
+          <a:fontRef idx="minor">
+            <a:schemeClr val="lt1"/>
+          </a:fontRef>
+        </p:style>
+        <p:txBody>
+          <a:bodyPr rtlCol="0" anchor="ctr"/>
+          <a:lstStyle/>
+          <a:p>
+            <a:pPr algn="ctr"/>
+            <a:r>
+              <a:rPr lang="fr-FR" dirty="0" smtClean="0">
+                <a:solidFill>
+                  <a:schemeClr val="bg1"/>
+                </a:solidFill>
+                <a:latin typeface="Segoe UI Black" panose="020B0A02040204020203" pitchFamily="34" charset="0"/>
+                <a:ea typeface="Segoe UI Black" panose="020B0A02040204020203" pitchFamily="34" charset="0"/>
+              </a:rPr>
+              <a:t>Retour</a:t>
+            </a:r>
+            <a:endParaRPr lang="en-US" dirty="0">
+              <a:solidFill>
+                <a:schemeClr val="bg1"/>
+              </a:solidFill>
+              <a:latin typeface="Segoe UI Black" panose="020B0A02040204020203" pitchFamily="34" charset="0"/>
+              <a:ea typeface="Segoe UI Black" panose="020B0A02040204020203" pitchFamily="34" charset="0"/>
+            </a:endParaRPr>
+          </a:p>
+        </p:txBody>
+      </p:sp>
+      <p:sp>
+        <p:nvSpPr>
+          <p:cNvPr id="7" name="Rectangle à coins arrondis 6"/>
+          <p:cNvSpPr/>
+          <p:nvPr/>
+        </p:nvSpPr>
+        <p:spPr>
+          <a:xfrm>
+            <a:off x="3760087" y="5327499"/>
+            <a:ext cx="1654334" cy="783770"/>
+          </a:xfrm>
+          <a:prstGeom prst="roundRect">
+            <a:avLst>
+              <a:gd name="adj" fmla="val 0"/>
+            </a:avLst>
+          </a:prstGeom>
+          <a:ln/>
+        </p:spPr>
+        <p:style>
+          <a:lnRef idx="2">
+            <a:schemeClr val="dk1">
+              <a:shade val="50000"/>
+            </a:schemeClr>
+          </a:lnRef>
+          <a:fillRef idx="1">
+            <a:schemeClr val="dk1"/>
+          </a:fillRef>
+          <a:effectRef idx="0">
+            <a:schemeClr val="dk1"/>
+          </a:effectRef>
+          <a:fontRef idx="minor">
+            <a:schemeClr val="lt1"/>
+          </a:fontRef>
+        </p:style>
+        <p:txBody>
+          <a:bodyPr rtlCol="0" anchor="ctr"/>
+          <a:lstStyle/>
+          <a:p>
+            <a:pPr algn="ctr"/>
+            <a:r>
+              <a:rPr lang="fr-FR" dirty="0" err="1" smtClean="0">
+                <a:solidFill>
+                  <a:schemeClr val="bg1"/>
+                </a:solidFill>
+                <a:latin typeface="Segoe UI Black" panose="020B0A02040204020203" pitchFamily="34" charset="0"/>
+                <a:ea typeface="Segoe UI Black" panose="020B0A02040204020203" pitchFamily="34" charset="0"/>
+              </a:rPr>
+              <a:t>Subiramwo</a:t>
+            </a:r>
+            <a:endParaRPr lang="en-US" dirty="0">
+              <a:solidFill>
+                <a:schemeClr val="bg1"/>
+              </a:solidFill>
+              <a:latin typeface="Segoe UI Black" panose="020B0A02040204020203" pitchFamily="34" charset="0"/>
+              <a:ea typeface="Segoe UI Black" panose="020B0A02040204020203" pitchFamily="34" charset="0"/>
+            </a:endParaRPr>
+          </a:p>
+        </p:txBody>
+      </p:sp>
+      <p:grpSp>
+        <p:nvGrpSpPr>
+          <p:cNvPr id="17" name="Groupe 16"/>
+          <p:cNvGrpSpPr/>
+          <p:nvPr/>
+        </p:nvGrpSpPr>
+        <p:grpSpPr>
+          <a:xfrm>
+            <a:off x="7184491" y="2046477"/>
+            <a:ext cx="3814618" cy="783770"/>
+            <a:chOff x="7332272" y="2942747"/>
+            <a:chExt cx="3814618" cy="783770"/>
+          </a:xfrm>
+        </p:grpSpPr>
+        <p:sp>
+          <p:nvSpPr>
+            <p:cNvPr id="10" name="Rectangle à coins arrondis 9"/>
+            <p:cNvSpPr/>
+            <p:nvPr/>
+          </p:nvSpPr>
+          <p:spPr>
+            <a:xfrm>
+              <a:off x="7332272" y="3050403"/>
+              <a:ext cx="3814618" cy="555757"/>
+            </a:xfrm>
+            <a:prstGeom prst="roundRect">
+              <a:avLst>
+                <a:gd name="adj" fmla="val 0"/>
+              </a:avLst>
+            </a:prstGeom>
+            <a:solidFill>
+              <a:schemeClr val="tx1"/>
+            </a:solidFill>
+            <a:ln>
+              <a:solidFill>
+                <a:schemeClr val="tx1">
+                  <a:lumMod val="95000"/>
+                  <a:lumOff val="5000"/>
+                </a:schemeClr>
+              </a:solidFill>
+            </a:ln>
+            <a:effectLst>
+              <a:outerShdw blurRad="127000" dist="38100" dir="5400000" algn="t" rotWithShape="0">
+                <a:prstClr val="black">
+                  <a:alpha val="48000"/>
+                </a:prstClr>
+              </a:outerShdw>
+            </a:effectLst>
+          </p:spPr>
+          <p:style>
+            <a:lnRef idx="2">
+              <a:schemeClr val="dk1">
+                <a:shade val="50000"/>
+              </a:schemeClr>
+            </a:lnRef>
+            <a:fillRef idx="1">
+              <a:schemeClr val="dk1"/>
+            </a:fillRef>
+            <a:effectRef idx="0">
+              <a:schemeClr val="dk1"/>
+            </a:effectRef>
+            <a:fontRef idx="minor">
+              <a:schemeClr val="lt1"/>
+            </a:fontRef>
+          </p:style>
+          <p:txBody>
+            <a:bodyPr rtlCol="0" anchor="ctr"/>
+            <a:lstStyle/>
+            <a:p>
+              <a:pPr algn="ctr"/>
+              <a:r>
+                <a:rPr lang="en-US" dirty="0">
+                  <a:latin typeface="Segoe UI Black" panose="020B0A02040204020203" pitchFamily="34" charset="0"/>
+                  <a:ea typeface="Segoe UI Black" panose="020B0A02040204020203" pitchFamily="34" charset="0"/>
+                </a:rPr>
+                <a:t>Player </a:t>
+              </a:r>
+              <a:r>
+                <a:rPr lang="en-US" dirty="0" smtClean="0">
+                  <a:latin typeface="Segoe UI Black" panose="020B0A02040204020203" pitchFamily="34" charset="0"/>
+                  <a:ea typeface="Segoe UI Black" panose="020B0A02040204020203" pitchFamily="34" charset="0"/>
+                </a:rPr>
+                <a:t>1</a:t>
+              </a:r>
+              <a:endParaRPr lang="en-US" dirty="0">
+                <a:latin typeface="Segoe UI Black" panose="020B0A02040204020203" pitchFamily="34" charset="0"/>
+                <a:ea typeface="Segoe UI Black" panose="020B0A02040204020203" pitchFamily="34" charset="0"/>
+              </a:endParaRPr>
+            </a:p>
+          </p:txBody>
+        </p:sp>
+        <p:cxnSp>
+          <p:nvCxnSpPr>
+            <p:cNvPr id="12" name="Connecteur droit 11"/>
+            <p:cNvCxnSpPr/>
+            <p:nvPr/>
+          </p:nvCxnSpPr>
+          <p:spPr>
+            <a:xfrm>
+              <a:off x="11116410" y="2942747"/>
+              <a:ext cx="0" cy="783770"/>
+            </a:xfrm>
+            <a:prstGeom prst="line">
+              <a:avLst/>
+            </a:prstGeom>
+            <a:ln w="76200">
+              <a:solidFill>
+                <a:schemeClr val="tx1"/>
+              </a:solidFill>
+            </a:ln>
+          </p:spPr>
+          <p:style>
+            <a:lnRef idx="1">
+              <a:schemeClr val="accent1"/>
+            </a:lnRef>
+            <a:fillRef idx="0">
+              <a:schemeClr val="accent1"/>
+            </a:fillRef>
+            <a:effectRef idx="0">
+              <a:schemeClr val="accent1"/>
+            </a:effectRef>
+            <a:fontRef idx="minor">
+              <a:schemeClr val="tx1"/>
+            </a:fontRef>
+          </p:style>
+        </p:cxnSp>
+      </p:grpSp>
+      <p:grpSp>
+        <p:nvGrpSpPr>
+          <p:cNvPr id="18" name="Groupe 17"/>
+          <p:cNvGrpSpPr/>
+          <p:nvPr/>
+        </p:nvGrpSpPr>
+        <p:grpSpPr>
+          <a:xfrm>
+            <a:off x="7184491" y="1384629"/>
+            <a:ext cx="3814618" cy="783770"/>
+            <a:chOff x="7332272" y="1430177"/>
+            <a:chExt cx="3814618" cy="783770"/>
+          </a:xfrm>
+        </p:grpSpPr>
+        <p:sp>
+          <p:nvSpPr>
+            <p:cNvPr id="9" name="Rectangle à coins arrondis 8"/>
+            <p:cNvSpPr/>
+            <p:nvPr/>
+          </p:nvSpPr>
+          <p:spPr>
+            <a:xfrm>
+              <a:off x="7332272" y="1536268"/>
+              <a:ext cx="3814618" cy="555757"/>
+            </a:xfrm>
+            <a:prstGeom prst="roundRect">
+              <a:avLst>
+                <a:gd name="adj" fmla="val 0"/>
+              </a:avLst>
+            </a:prstGeom>
+            <a:solidFill>
+              <a:schemeClr val="tx1"/>
+            </a:solidFill>
+            <a:ln>
+              <a:solidFill>
+                <a:schemeClr val="tx1">
+                  <a:lumMod val="95000"/>
+                  <a:lumOff val="5000"/>
+                </a:schemeClr>
+              </a:solidFill>
+            </a:ln>
+            <a:effectLst>
+              <a:outerShdw blurRad="127000" dist="38100" dir="5400000" algn="t" rotWithShape="0">
+                <a:prstClr val="black">
+                  <a:alpha val="48000"/>
+                </a:prstClr>
+              </a:outerShdw>
+            </a:effectLst>
+          </p:spPr>
+          <p:style>
+            <a:lnRef idx="2">
+              <a:schemeClr val="dk1">
+                <a:shade val="50000"/>
+              </a:schemeClr>
+            </a:lnRef>
+            <a:fillRef idx="1">
+              <a:schemeClr val="dk1"/>
+            </a:fillRef>
+            <a:effectRef idx="0">
+              <a:schemeClr val="dk1"/>
+            </a:effectRef>
+            <a:fontRef idx="minor">
+              <a:schemeClr val="lt1"/>
+            </a:fontRef>
+          </p:style>
+          <p:txBody>
+            <a:bodyPr rtlCol="0" anchor="ctr"/>
+            <a:lstStyle/>
+            <a:p>
+              <a:pPr algn="ctr"/>
+              <a:r>
+                <a:rPr lang="en-US" dirty="0">
+                  <a:latin typeface="Segoe UI Black" panose="020B0A02040204020203" pitchFamily="34" charset="0"/>
+                  <a:ea typeface="Segoe UI Black" panose="020B0A02040204020203" pitchFamily="34" charset="0"/>
+                </a:rPr>
+                <a:t>Player </a:t>
+              </a:r>
+              <a:r>
+                <a:rPr lang="en-US" dirty="0" smtClean="0">
+                  <a:latin typeface="Segoe UI Black" panose="020B0A02040204020203" pitchFamily="34" charset="0"/>
+                  <a:ea typeface="Segoe UI Black" panose="020B0A02040204020203" pitchFamily="34" charset="0"/>
+                </a:rPr>
+                <a:t>2</a:t>
+              </a:r>
+              <a:endParaRPr lang="en-US" dirty="0">
+                <a:latin typeface="Segoe UI Black" panose="020B0A02040204020203" pitchFamily="34" charset="0"/>
+                <a:ea typeface="Segoe UI Black" panose="020B0A02040204020203" pitchFamily="34" charset="0"/>
+              </a:endParaRPr>
+            </a:p>
+          </p:txBody>
+        </p:sp>
+        <p:cxnSp>
+          <p:nvCxnSpPr>
+            <p:cNvPr id="16" name="Connecteur droit 15"/>
+            <p:cNvCxnSpPr/>
+            <p:nvPr/>
+          </p:nvCxnSpPr>
+          <p:spPr>
+            <a:xfrm>
+              <a:off x="7365465" y="1430177"/>
+              <a:ext cx="0" cy="783770"/>
+            </a:xfrm>
+            <a:prstGeom prst="line">
+              <a:avLst/>
+            </a:prstGeom>
+            <a:ln w="76200">
+              <a:solidFill>
+                <a:schemeClr val="tx1"/>
+              </a:solidFill>
+            </a:ln>
+          </p:spPr>
+          <p:style>
+            <a:lnRef idx="1">
+              <a:schemeClr val="accent1"/>
+            </a:lnRef>
+            <a:fillRef idx="0">
+              <a:schemeClr val="accent1"/>
+            </a:fillRef>
+            <a:effectRef idx="0">
+              <a:schemeClr val="accent1"/>
+            </a:effectRef>
+            <a:fontRef idx="minor">
+              <a:schemeClr val="tx1"/>
+            </a:fontRef>
+          </p:style>
+        </p:cxnSp>
+      </p:grpSp>
+      <p:sp>
+        <p:nvSpPr>
+          <p:cNvPr id="19" name="Titre 18"/>
+          <p:cNvSpPr>
+            <a:spLocks noGrp="1"/>
+          </p:cNvSpPr>
+          <p:nvPr>
+            <p:ph type="title"/>
+          </p:nvPr>
+        </p:nvSpPr>
+        <p:spPr/>
+        <p:txBody>
+          <a:bodyPr/>
+          <a:lstStyle/>
+          <a:p>
+            <a:pPr algn="ctr"/>
+            <a:r>
+              <a:rPr lang="en-US" dirty="0" smtClean="0">
+                <a:latin typeface="Arial Black" panose="020B0A04020102020204" pitchFamily="34" charset="0"/>
+              </a:rPr>
+              <a:t>Play State Stage Buttons Design 2  </a:t>
+            </a:r>
+            <a:endParaRPr lang="en-US" dirty="0">
+              <a:latin typeface="Arial Black" panose="020B0A04020102020204" pitchFamily="34" charset="0"/>
+            </a:endParaRPr>
+          </a:p>
+        </p:txBody>
+      </p:sp>
+      <p:grpSp>
+        <p:nvGrpSpPr>
+          <p:cNvPr id="15" name="Groupe 14"/>
+          <p:cNvGrpSpPr/>
+          <p:nvPr/>
+        </p:nvGrpSpPr>
+        <p:grpSpPr>
+          <a:xfrm>
+            <a:off x="7184491" y="3898542"/>
+            <a:ext cx="3814618" cy="783770"/>
+            <a:chOff x="7332272" y="2942747"/>
+            <a:chExt cx="3814618" cy="783770"/>
+          </a:xfrm>
+        </p:grpSpPr>
+        <p:sp>
+          <p:nvSpPr>
+            <p:cNvPr id="20" name="Rectangle à coins arrondis 19"/>
+            <p:cNvSpPr/>
+            <p:nvPr/>
+          </p:nvSpPr>
+          <p:spPr>
+            <a:xfrm>
+              <a:off x="7332272" y="3050403"/>
+              <a:ext cx="3814618" cy="555757"/>
+            </a:xfrm>
+            <a:prstGeom prst="roundRect">
+              <a:avLst>
+                <a:gd name="adj" fmla="val 0"/>
+              </a:avLst>
+            </a:prstGeom>
+            <a:solidFill>
+              <a:schemeClr val="tx1"/>
+            </a:solidFill>
+            <a:ln>
+              <a:solidFill>
+                <a:schemeClr val="tx1">
+                  <a:lumMod val="95000"/>
+                  <a:lumOff val="5000"/>
+                </a:schemeClr>
+              </a:solidFill>
+            </a:ln>
+            <a:effectLst>
+              <a:outerShdw blurRad="127000" dist="38100" dir="5400000" algn="t" rotWithShape="0">
+                <a:prstClr val="black">
+                  <a:alpha val="48000"/>
+                </a:prstClr>
+              </a:outerShdw>
+            </a:effectLst>
+          </p:spPr>
+          <p:style>
+            <a:lnRef idx="2">
+              <a:schemeClr val="dk1">
+                <a:shade val="50000"/>
+              </a:schemeClr>
+            </a:lnRef>
+            <a:fillRef idx="1">
+              <a:schemeClr val="dk1"/>
+            </a:fillRef>
+            <a:effectRef idx="0">
+              <a:schemeClr val="dk1"/>
+            </a:effectRef>
+            <a:fontRef idx="minor">
+              <a:schemeClr val="lt1"/>
+            </a:fontRef>
+          </p:style>
+          <p:txBody>
+            <a:bodyPr rtlCol="0" anchor="ctr"/>
+            <a:lstStyle/>
+            <a:p>
+              <a:pPr algn="ctr"/>
+              <a:r>
+                <a:rPr lang="en-US" dirty="0" err="1" smtClean="0">
+                  <a:latin typeface="Segoe UI Black" panose="020B0A02040204020203" pitchFamily="34" charset="0"/>
+                  <a:ea typeface="Segoe UI Black" panose="020B0A02040204020203" pitchFamily="34" charset="0"/>
+                </a:rPr>
+                <a:t>Joueu</a:t>
+              </a:r>
+              <a:r>
+                <a:rPr lang="en-US" dirty="0" err="1" smtClean="0">
+                  <a:latin typeface="Segoe UI Black" panose="020B0A02040204020203" pitchFamily="34" charset="0"/>
+                  <a:ea typeface="Segoe UI Black" panose="020B0A02040204020203" pitchFamily="34" charset="0"/>
+                </a:rPr>
+                <a:t>r</a:t>
+              </a:r>
+              <a:r>
+                <a:rPr lang="en-US" dirty="0" smtClean="0">
+                  <a:latin typeface="Segoe UI Black" panose="020B0A02040204020203" pitchFamily="34" charset="0"/>
+                  <a:ea typeface="Segoe UI Black" panose="020B0A02040204020203" pitchFamily="34" charset="0"/>
+                </a:rPr>
+                <a:t> </a:t>
+              </a:r>
+              <a:r>
+                <a:rPr lang="en-US" dirty="0" smtClean="0">
+                  <a:latin typeface="Segoe UI Black" panose="020B0A02040204020203" pitchFamily="34" charset="0"/>
+                  <a:ea typeface="Segoe UI Black" panose="020B0A02040204020203" pitchFamily="34" charset="0"/>
+                </a:rPr>
+                <a:t>1</a:t>
+              </a:r>
+              <a:endParaRPr lang="en-US" dirty="0">
+                <a:latin typeface="Segoe UI Black" panose="020B0A02040204020203" pitchFamily="34" charset="0"/>
+                <a:ea typeface="Segoe UI Black" panose="020B0A02040204020203" pitchFamily="34" charset="0"/>
+              </a:endParaRPr>
+            </a:p>
+          </p:txBody>
+        </p:sp>
+        <p:cxnSp>
+          <p:nvCxnSpPr>
+            <p:cNvPr id="21" name="Connecteur droit 20"/>
+            <p:cNvCxnSpPr/>
+            <p:nvPr/>
+          </p:nvCxnSpPr>
+          <p:spPr>
+            <a:xfrm>
+              <a:off x="11116410" y="2942747"/>
+              <a:ext cx="0" cy="783770"/>
+            </a:xfrm>
+            <a:prstGeom prst="line">
+              <a:avLst/>
+            </a:prstGeom>
+            <a:ln w="76200">
+              <a:solidFill>
+                <a:schemeClr val="tx1"/>
+              </a:solidFill>
+            </a:ln>
+          </p:spPr>
+          <p:style>
+            <a:lnRef idx="1">
+              <a:schemeClr val="accent1"/>
+            </a:lnRef>
+            <a:fillRef idx="0">
+              <a:schemeClr val="accent1"/>
+            </a:fillRef>
+            <a:effectRef idx="0">
+              <a:schemeClr val="accent1"/>
+            </a:effectRef>
+            <a:fontRef idx="minor">
+              <a:schemeClr val="tx1"/>
+            </a:fontRef>
+          </p:style>
+        </p:cxnSp>
+      </p:grpSp>
+      <p:grpSp>
+        <p:nvGrpSpPr>
+          <p:cNvPr id="22" name="Groupe 21"/>
+          <p:cNvGrpSpPr/>
+          <p:nvPr/>
+        </p:nvGrpSpPr>
+        <p:grpSpPr>
+          <a:xfrm>
+            <a:off x="7184491" y="3236694"/>
+            <a:ext cx="3814618" cy="783770"/>
+            <a:chOff x="7332272" y="1430177"/>
+            <a:chExt cx="3814618" cy="783770"/>
+          </a:xfrm>
+        </p:grpSpPr>
+        <p:sp>
+          <p:nvSpPr>
+            <p:cNvPr id="23" name="Rectangle à coins arrondis 22"/>
+            <p:cNvSpPr/>
+            <p:nvPr/>
+          </p:nvSpPr>
+          <p:spPr>
+            <a:xfrm>
+              <a:off x="7332272" y="1536268"/>
+              <a:ext cx="3814618" cy="555757"/>
+            </a:xfrm>
+            <a:prstGeom prst="roundRect">
+              <a:avLst>
+                <a:gd name="adj" fmla="val 0"/>
+              </a:avLst>
+            </a:prstGeom>
+            <a:solidFill>
+              <a:schemeClr val="tx1"/>
+            </a:solidFill>
+            <a:ln>
+              <a:solidFill>
+                <a:schemeClr val="tx1">
+                  <a:lumMod val="95000"/>
+                  <a:lumOff val="5000"/>
+                </a:schemeClr>
+              </a:solidFill>
+            </a:ln>
+            <a:effectLst>
+              <a:outerShdw blurRad="127000" dist="38100" dir="5400000" algn="t" rotWithShape="0">
+                <a:prstClr val="black">
+                  <a:alpha val="48000"/>
+                </a:prstClr>
+              </a:outerShdw>
+            </a:effectLst>
+          </p:spPr>
+          <p:style>
+            <a:lnRef idx="2">
+              <a:schemeClr val="dk1">
+                <a:shade val="50000"/>
+              </a:schemeClr>
+            </a:lnRef>
+            <a:fillRef idx="1">
+              <a:schemeClr val="dk1"/>
+            </a:fillRef>
+            <a:effectRef idx="0">
+              <a:schemeClr val="dk1"/>
+            </a:effectRef>
+            <a:fontRef idx="minor">
+              <a:schemeClr val="lt1"/>
+            </a:fontRef>
+          </p:style>
+          <p:txBody>
+            <a:bodyPr rtlCol="0" anchor="ctr"/>
+            <a:lstStyle/>
+            <a:p>
+              <a:pPr algn="ctr"/>
+              <a:r>
+                <a:rPr lang="en-US" dirty="0" err="1" smtClean="0">
+                  <a:latin typeface="Segoe UI Black" panose="020B0A02040204020203" pitchFamily="34" charset="0"/>
+                  <a:ea typeface="Segoe UI Black" panose="020B0A02040204020203" pitchFamily="34" charset="0"/>
+                </a:rPr>
+                <a:t>Joueu</a:t>
+              </a:r>
+              <a:r>
+                <a:rPr lang="en-US" dirty="0" err="1" smtClean="0">
+                  <a:latin typeface="Segoe UI Black" panose="020B0A02040204020203" pitchFamily="34" charset="0"/>
+                  <a:ea typeface="Segoe UI Black" panose="020B0A02040204020203" pitchFamily="34" charset="0"/>
+                </a:rPr>
+                <a:t>r</a:t>
+              </a:r>
+              <a:r>
+                <a:rPr lang="en-US" dirty="0" smtClean="0">
+                  <a:latin typeface="Segoe UI Black" panose="020B0A02040204020203" pitchFamily="34" charset="0"/>
+                  <a:ea typeface="Segoe UI Black" panose="020B0A02040204020203" pitchFamily="34" charset="0"/>
+                </a:rPr>
+                <a:t> </a:t>
+              </a:r>
+              <a:r>
+                <a:rPr lang="en-US" dirty="0" smtClean="0">
+                  <a:latin typeface="Segoe UI Black" panose="020B0A02040204020203" pitchFamily="34" charset="0"/>
+                  <a:ea typeface="Segoe UI Black" panose="020B0A02040204020203" pitchFamily="34" charset="0"/>
+                </a:rPr>
+                <a:t>2</a:t>
+              </a:r>
+              <a:endParaRPr lang="en-US" dirty="0">
+                <a:latin typeface="Segoe UI Black" panose="020B0A02040204020203" pitchFamily="34" charset="0"/>
+                <a:ea typeface="Segoe UI Black" panose="020B0A02040204020203" pitchFamily="34" charset="0"/>
+              </a:endParaRPr>
+            </a:p>
+          </p:txBody>
+        </p:sp>
+        <p:cxnSp>
+          <p:nvCxnSpPr>
+            <p:cNvPr id="24" name="Connecteur droit 23"/>
+            <p:cNvCxnSpPr/>
+            <p:nvPr/>
+          </p:nvCxnSpPr>
+          <p:spPr>
+            <a:xfrm>
+              <a:off x="7365465" y="1430177"/>
+              <a:ext cx="0" cy="783770"/>
+            </a:xfrm>
+            <a:prstGeom prst="line">
+              <a:avLst/>
+            </a:prstGeom>
+            <a:ln w="76200">
+              <a:solidFill>
+                <a:schemeClr val="tx1"/>
+              </a:solidFill>
+            </a:ln>
+          </p:spPr>
+          <p:style>
+            <a:lnRef idx="1">
+              <a:schemeClr val="accent1"/>
+            </a:lnRef>
+            <a:fillRef idx="0">
+              <a:schemeClr val="accent1"/>
+            </a:fillRef>
+            <a:effectRef idx="0">
+              <a:schemeClr val="accent1"/>
+            </a:effectRef>
+            <a:fontRef idx="minor">
+              <a:schemeClr val="tx1"/>
+            </a:fontRef>
+          </p:style>
+        </p:cxnSp>
+      </p:grpSp>
+      <p:grpSp>
+        <p:nvGrpSpPr>
+          <p:cNvPr id="25" name="Groupe 24"/>
+          <p:cNvGrpSpPr/>
+          <p:nvPr/>
+        </p:nvGrpSpPr>
+        <p:grpSpPr>
+          <a:xfrm>
+            <a:off x="7184491" y="5764873"/>
+            <a:ext cx="3814618" cy="783770"/>
+            <a:chOff x="7332272" y="2942747"/>
+            <a:chExt cx="3814618" cy="783770"/>
+          </a:xfrm>
+        </p:grpSpPr>
+        <p:sp>
+          <p:nvSpPr>
+            <p:cNvPr id="26" name="Rectangle à coins arrondis 25"/>
+            <p:cNvSpPr/>
+            <p:nvPr/>
+          </p:nvSpPr>
+          <p:spPr>
+            <a:xfrm>
+              <a:off x="7332272" y="3050403"/>
+              <a:ext cx="3814618" cy="555757"/>
+            </a:xfrm>
+            <a:prstGeom prst="roundRect">
+              <a:avLst>
+                <a:gd name="adj" fmla="val 0"/>
+              </a:avLst>
+            </a:prstGeom>
+            <a:solidFill>
+              <a:schemeClr val="tx1"/>
+            </a:solidFill>
+            <a:ln>
+              <a:solidFill>
+                <a:schemeClr val="tx1">
+                  <a:lumMod val="95000"/>
+                  <a:lumOff val="5000"/>
+                </a:schemeClr>
+              </a:solidFill>
+            </a:ln>
+            <a:effectLst>
+              <a:outerShdw blurRad="127000" dist="38100" dir="5400000" algn="t" rotWithShape="0">
+                <a:prstClr val="black">
+                  <a:alpha val="48000"/>
+                </a:prstClr>
+              </a:outerShdw>
+            </a:effectLst>
+          </p:spPr>
+          <p:style>
+            <a:lnRef idx="2">
+              <a:schemeClr val="dk1">
+                <a:shade val="50000"/>
+              </a:schemeClr>
+            </a:lnRef>
+            <a:fillRef idx="1">
+              <a:schemeClr val="dk1"/>
+            </a:fillRef>
+            <a:effectRef idx="0">
+              <a:schemeClr val="dk1"/>
+            </a:effectRef>
+            <a:fontRef idx="minor">
+              <a:schemeClr val="lt1"/>
+            </a:fontRef>
+          </p:style>
+          <p:txBody>
+            <a:bodyPr rtlCol="0" anchor="ctr"/>
+            <a:lstStyle/>
+            <a:p>
+              <a:pPr algn="ctr"/>
+              <a:r>
+                <a:rPr lang="en-US" dirty="0" err="1" smtClean="0">
+                  <a:latin typeface="Segoe UI Black" panose="020B0A02040204020203" pitchFamily="34" charset="0"/>
+                  <a:ea typeface="Segoe UI Black" panose="020B0A02040204020203" pitchFamily="34" charset="0"/>
+                </a:rPr>
+                <a:t>Umukinyi</a:t>
+              </a:r>
+              <a:r>
+                <a:rPr lang="en-US" dirty="0" smtClean="0">
+                  <a:latin typeface="Segoe UI Black" panose="020B0A02040204020203" pitchFamily="34" charset="0"/>
+                  <a:ea typeface="Segoe UI Black" panose="020B0A02040204020203" pitchFamily="34" charset="0"/>
+                </a:rPr>
+                <a:t> </a:t>
+              </a:r>
+              <a:r>
+                <a:rPr lang="en-US" dirty="0" err="1" smtClean="0">
+                  <a:latin typeface="Segoe UI Black" panose="020B0A02040204020203" pitchFamily="34" charset="0"/>
+                  <a:ea typeface="Segoe UI Black" panose="020B0A02040204020203" pitchFamily="34" charset="0"/>
+                </a:rPr>
+                <a:t>wa</a:t>
+              </a:r>
+              <a:r>
+                <a:rPr lang="en-US" dirty="0" smtClean="0">
+                  <a:latin typeface="Segoe UI Black" panose="020B0A02040204020203" pitchFamily="34" charset="0"/>
+                  <a:ea typeface="Segoe UI Black" panose="020B0A02040204020203" pitchFamily="34" charset="0"/>
+                </a:rPr>
+                <a:t> 1</a:t>
+              </a:r>
+              <a:endParaRPr lang="en-US" dirty="0">
+                <a:latin typeface="Segoe UI Black" panose="020B0A02040204020203" pitchFamily="34" charset="0"/>
+                <a:ea typeface="Segoe UI Black" panose="020B0A02040204020203" pitchFamily="34" charset="0"/>
+              </a:endParaRPr>
+            </a:p>
+          </p:txBody>
+        </p:sp>
+        <p:cxnSp>
+          <p:nvCxnSpPr>
+            <p:cNvPr id="27" name="Connecteur droit 26"/>
+            <p:cNvCxnSpPr/>
+            <p:nvPr/>
+          </p:nvCxnSpPr>
+          <p:spPr>
+            <a:xfrm>
+              <a:off x="11116410" y="2942747"/>
+              <a:ext cx="0" cy="783770"/>
+            </a:xfrm>
+            <a:prstGeom prst="line">
+              <a:avLst/>
+            </a:prstGeom>
+            <a:ln w="76200">
+              <a:solidFill>
+                <a:schemeClr val="tx1"/>
+              </a:solidFill>
+            </a:ln>
+          </p:spPr>
+          <p:style>
+            <a:lnRef idx="1">
+              <a:schemeClr val="accent1"/>
+            </a:lnRef>
+            <a:fillRef idx="0">
+              <a:schemeClr val="accent1"/>
+            </a:fillRef>
+            <a:effectRef idx="0">
+              <a:schemeClr val="accent1"/>
+            </a:effectRef>
+            <a:fontRef idx="minor">
+              <a:schemeClr val="tx1"/>
+            </a:fontRef>
+          </p:style>
+        </p:cxnSp>
+      </p:grpSp>
+      <p:grpSp>
+        <p:nvGrpSpPr>
+          <p:cNvPr id="28" name="Groupe 27"/>
+          <p:cNvGrpSpPr/>
+          <p:nvPr/>
+        </p:nvGrpSpPr>
+        <p:grpSpPr>
+          <a:xfrm>
+            <a:off x="7184491" y="5103025"/>
+            <a:ext cx="3814618" cy="783770"/>
+            <a:chOff x="7332272" y="1430177"/>
+            <a:chExt cx="3814618" cy="783770"/>
+          </a:xfrm>
+        </p:grpSpPr>
+        <p:sp>
+          <p:nvSpPr>
+            <p:cNvPr id="29" name="Rectangle à coins arrondis 28"/>
+            <p:cNvSpPr/>
+            <p:nvPr/>
+          </p:nvSpPr>
+          <p:spPr>
+            <a:xfrm>
+              <a:off x="7332272" y="1536268"/>
+              <a:ext cx="3814618" cy="555757"/>
+            </a:xfrm>
+            <a:prstGeom prst="roundRect">
+              <a:avLst>
+                <a:gd name="adj" fmla="val 0"/>
+              </a:avLst>
+            </a:prstGeom>
+            <a:solidFill>
+              <a:schemeClr val="tx1"/>
+            </a:solidFill>
+            <a:ln>
+              <a:solidFill>
+                <a:schemeClr val="tx1">
+                  <a:lumMod val="95000"/>
+                  <a:lumOff val="5000"/>
+                </a:schemeClr>
+              </a:solidFill>
+            </a:ln>
+            <a:effectLst>
+              <a:outerShdw blurRad="127000" dist="38100" dir="5400000" algn="t" rotWithShape="0">
+                <a:prstClr val="black">
+                  <a:alpha val="48000"/>
+                </a:prstClr>
+              </a:outerShdw>
+            </a:effectLst>
+          </p:spPr>
+          <p:style>
+            <a:lnRef idx="2">
+              <a:schemeClr val="dk1">
+                <a:shade val="50000"/>
+              </a:schemeClr>
+            </a:lnRef>
+            <a:fillRef idx="1">
+              <a:schemeClr val="dk1"/>
+            </a:fillRef>
+            <a:effectRef idx="0">
+              <a:schemeClr val="dk1"/>
+            </a:effectRef>
+            <a:fontRef idx="minor">
+              <a:schemeClr val="lt1"/>
+            </a:fontRef>
+          </p:style>
+          <p:txBody>
+            <a:bodyPr rtlCol="0" anchor="ctr"/>
+            <a:lstStyle/>
+            <a:p>
+              <a:pPr algn="ctr"/>
+              <a:r>
+                <a:rPr lang="en-US" dirty="0" err="1" smtClean="0">
+                  <a:latin typeface="Segoe UI Black" panose="020B0A02040204020203" pitchFamily="34" charset="0"/>
+                  <a:ea typeface="Segoe UI Black" panose="020B0A02040204020203" pitchFamily="34" charset="0"/>
+                </a:rPr>
+                <a:t>Umukinyi</a:t>
+              </a:r>
+              <a:r>
+                <a:rPr lang="en-US" dirty="0" smtClean="0">
+                  <a:latin typeface="Segoe UI Black" panose="020B0A02040204020203" pitchFamily="34" charset="0"/>
+                  <a:ea typeface="Segoe UI Black" panose="020B0A02040204020203" pitchFamily="34" charset="0"/>
+                </a:rPr>
+                <a:t> </a:t>
+              </a:r>
+              <a:r>
+                <a:rPr lang="en-US" dirty="0" err="1" smtClean="0">
+                  <a:latin typeface="Segoe UI Black" panose="020B0A02040204020203" pitchFamily="34" charset="0"/>
+                  <a:ea typeface="Segoe UI Black" panose="020B0A02040204020203" pitchFamily="34" charset="0"/>
+                </a:rPr>
+                <a:t>wa</a:t>
+              </a:r>
+              <a:r>
+                <a:rPr lang="en-US" dirty="0" smtClean="0">
+                  <a:latin typeface="Segoe UI Black" panose="020B0A02040204020203" pitchFamily="34" charset="0"/>
+                  <a:ea typeface="Segoe UI Black" panose="020B0A02040204020203" pitchFamily="34" charset="0"/>
+                </a:rPr>
+                <a:t> </a:t>
+              </a:r>
+              <a:r>
+                <a:rPr lang="en-US" dirty="0" smtClean="0">
+                  <a:latin typeface="Segoe UI Black" panose="020B0A02040204020203" pitchFamily="34" charset="0"/>
+                  <a:ea typeface="Segoe UI Black" panose="020B0A02040204020203" pitchFamily="34" charset="0"/>
+                </a:rPr>
+                <a:t>2</a:t>
+              </a:r>
+              <a:endParaRPr lang="en-US" dirty="0">
+                <a:latin typeface="Segoe UI Black" panose="020B0A02040204020203" pitchFamily="34" charset="0"/>
+                <a:ea typeface="Segoe UI Black" panose="020B0A02040204020203" pitchFamily="34" charset="0"/>
+              </a:endParaRPr>
+            </a:p>
+          </p:txBody>
+        </p:sp>
+        <p:cxnSp>
+          <p:nvCxnSpPr>
+            <p:cNvPr id="30" name="Connecteur droit 29"/>
+            <p:cNvCxnSpPr/>
+            <p:nvPr/>
+          </p:nvCxnSpPr>
+          <p:spPr>
+            <a:xfrm>
+              <a:off x="7365465" y="1430177"/>
+              <a:ext cx="0" cy="783770"/>
+            </a:xfrm>
+            <a:prstGeom prst="line">
+              <a:avLst/>
+            </a:prstGeom>
+            <a:ln w="76200">
+              <a:solidFill>
+                <a:schemeClr val="tx1"/>
+              </a:solidFill>
+            </a:ln>
+          </p:spPr>
+          <p:style>
+            <a:lnRef idx="1">
+              <a:schemeClr val="accent1"/>
+            </a:lnRef>
+            <a:fillRef idx="0">
+              <a:schemeClr val="accent1"/>
+            </a:fillRef>
+            <a:effectRef idx="0">
+              <a:schemeClr val="accent1"/>
+            </a:effectRef>
+            <a:fontRef idx="minor">
+              <a:schemeClr val="tx1"/>
+            </a:fontRef>
+          </p:style>
+        </p:cxnSp>
+      </p:grpSp>
+    </p:spTree>
+    <p:extLst>
+      <p:ext uri="{BB962C8B-B14F-4D97-AF65-F5344CB8AC3E}">
+        <p14:creationId xmlns:p14="http://schemas.microsoft.com/office/powerpoint/2010/main" val="523485795"/>
+      </p:ext>
+    </p:extLst>
+  </p:cSld>
+  <p:clrMapOvr>
+    <a:masterClrMapping/>
+  </p:clrMapOvr>
+</p:sld>
+</file>
+
+<file path=ppt/slides/slide8.xml><?xml version="1.0" encoding="utf-8"?>
 <p:sld xmlns:a="http://schemas.openxmlformats.org/drawingml/2006/main" xmlns:r="http://schemas.openxmlformats.org/officeDocument/2006/relationships" xmlns:p="http://schemas.openxmlformats.org/presentationml/2006/main">
   <p:cSld>
     <p:spTree>
@@ -11184,73 +13582,6 @@
     <p:extLst>
       <p:ext uri="{BB962C8B-B14F-4D97-AF65-F5344CB8AC3E}">
         <p14:creationId xmlns:p14="http://schemas.microsoft.com/office/powerpoint/2010/main" val="4159037437"/>
-      </p:ext>
-    </p:extLst>
-  </p:cSld>
-  <p:clrMapOvr>
-    <a:masterClrMapping/>
-  </p:clrMapOvr>
-</p:sld>
-</file>
-
-<file path=ppt/slides/slide7.xml><?xml version="1.0" encoding="utf-8"?>
-<p:sld xmlns:a="http://schemas.openxmlformats.org/drawingml/2006/main" xmlns:r="http://schemas.openxmlformats.org/officeDocument/2006/relationships" xmlns:p="http://schemas.openxmlformats.org/presentationml/2006/main">
-  <p:cSld>
-    <p:spTree>
-      <p:nvGrpSpPr>
-        <p:cNvPr id="1" name=""/>
-        <p:cNvGrpSpPr/>
-        <p:nvPr/>
-      </p:nvGrpSpPr>
-      <p:grpSpPr>
-        <a:xfrm>
-          <a:off x="0" y="0"/>
-          <a:ext cx="0" cy="0"/>
-          <a:chOff x="0" y="0"/>
-          <a:chExt cx="0" cy="0"/>
-        </a:xfrm>
-      </p:grpSpPr>
-    </p:spTree>
-    <p:extLst>
-      <p:ext uri="{BB962C8B-B14F-4D97-AF65-F5344CB8AC3E}">
-        <p14:creationId xmlns:p14="http://schemas.microsoft.com/office/powerpoint/2010/main" val="1022212001"/>
-      </p:ext>
-    </p:extLst>
-  </p:cSld>
-  <p:clrMapOvr>
-    <a:masterClrMapping/>
-  </p:clrMapOvr>
-  <p:timing>
-    <p:tnLst>
-      <p:par>
-        <p:cTn id="1" dur="indefinite" restart="never" nodeType="tmRoot"/>
-      </p:par>
-    </p:tnLst>
-  </p:timing>
-</p:sld>
-</file>
-
-<file path=ppt/slides/slide8.xml><?xml version="1.0" encoding="utf-8"?>
-<p:sld xmlns:a="http://schemas.openxmlformats.org/drawingml/2006/main" xmlns:r="http://schemas.openxmlformats.org/officeDocument/2006/relationships" xmlns:p="http://schemas.openxmlformats.org/presentationml/2006/main">
-  <p:cSld>
-    <p:spTree>
-      <p:nvGrpSpPr>
-        <p:cNvPr id="1" name=""/>
-        <p:cNvGrpSpPr/>
-        <p:nvPr/>
-      </p:nvGrpSpPr>
-      <p:grpSpPr>
-        <a:xfrm>
-          <a:off x="0" y="0"/>
-          <a:ext cx="0" cy="0"/>
-          <a:chOff x="0" y="0"/>
-          <a:chExt cx="0" cy="0"/>
-        </a:xfrm>
-      </p:grpSpPr>
-    </p:spTree>
-    <p:extLst>
-      <p:ext uri="{BB962C8B-B14F-4D97-AF65-F5344CB8AC3E}">
-        <p14:creationId xmlns:p14="http://schemas.microsoft.com/office/powerpoint/2010/main" val="523485795"/>
       </p:ext>
     </p:extLst>
   </p:cSld>

</xml_diff>

<commit_message>
Started the code for online gaming
</commit_message>
<xml_diff>
--- a/assets/buttons.pptx
+++ b/assets/buttons.pptx
@@ -12,8 +12,8 @@
     <p:sldId id="259" r:id="rId6"/>
     <p:sldId id="256" r:id="rId7"/>
     <p:sldId id="262" r:id="rId8"/>
-    <p:sldId id="258" r:id="rId9"/>
-    <p:sldId id="263" r:id="rId10"/>
+    <p:sldId id="263" r:id="rId9"/>
+    <p:sldId id="258" r:id="rId10"/>
   </p:sldIdLst>
   <p:sldSz cx="12192000" cy="6858000"/>
   <p:notesSz cx="6858000" cy="9144000"/>
@@ -251,7 +251,7 @@
           <a:p>
             <a:fld id="{2E40D743-7CB8-4D0B-882D-D502BAAD38FE}" type="datetimeFigureOut">
               <a:rPr lang="en-US" smtClean="0"/>
-              <a:t>4/12/2021</a:t>
+              <a:t>4/15/2021</a:t>
             </a:fld>
             <a:endParaRPr lang="en-US"/>
           </a:p>
@@ -421,7 +421,7 @@
           <a:p>
             <a:fld id="{2E40D743-7CB8-4D0B-882D-D502BAAD38FE}" type="datetimeFigureOut">
               <a:rPr lang="en-US" smtClean="0"/>
-              <a:t>4/12/2021</a:t>
+              <a:t>4/15/2021</a:t>
             </a:fld>
             <a:endParaRPr lang="en-US"/>
           </a:p>
@@ -601,7 +601,7 @@
           <a:p>
             <a:fld id="{2E40D743-7CB8-4D0B-882D-D502BAAD38FE}" type="datetimeFigureOut">
               <a:rPr lang="en-US" smtClean="0"/>
-              <a:t>4/12/2021</a:t>
+              <a:t>4/15/2021</a:t>
             </a:fld>
             <a:endParaRPr lang="en-US"/>
           </a:p>
@@ -771,7 +771,7 @@
           <a:p>
             <a:fld id="{2E40D743-7CB8-4D0B-882D-D502BAAD38FE}" type="datetimeFigureOut">
               <a:rPr lang="en-US" smtClean="0"/>
-              <a:t>4/12/2021</a:t>
+              <a:t>4/15/2021</a:t>
             </a:fld>
             <a:endParaRPr lang="en-US"/>
           </a:p>
@@ -1017,7 +1017,7 @@
           <a:p>
             <a:fld id="{2E40D743-7CB8-4D0B-882D-D502BAAD38FE}" type="datetimeFigureOut">
               <a:rPr lang="en-US" smtClean="0"/>
-              <a:t>4/12/2021</a:t>
+              <a:t>4/15/2021</a:t>
             </a:fld>
             <a:endParaRPr lang="en-US"/>
           </a:p>
@@ -1249,7 +1249,7 @@
           <a:p>
             <a:fld id="{2E40D743-7CB8-4D0B-882D-D502BAAD38FE}" type="datetimeFigureOut">
               <a:rPr lang="en-US" smtClean="0"/>
-              <a:t>4/12/2021</a:t>
+              <a:t>4/15/2021</a:t>
             </a:fld>
             <a:endParaRPr lang="en-US"/>
           </a:p>
@@ -1616,7 +1616,7 @@
           <a:p>
             <a:fld id="{2E40D743-7CB8-4D0B-882D-D502BAAD38FE}" type="datetimeFigureOut">
               <a:rPr lang="en-US" smtClean="0"/>
-              <a:t>4/12/2021</a:t>
+              <a:t>4/15/2021</a:t>
             </a:fld>
             <a:endParaRPr lang="en-US"/>
           </a:p>
@@ -1734,7 +1734,7 @@
           <a:p>
             <a:fld id="{2E40D743-7CB8-4D0B-882D-D502BAAD38FE}" type="datetimeFigureOut">
               <a:rPr lang="en-US" smtClean="0"/>
-              <a:t>4/12/2021</a:t>
+              <a:t>4/15/2021</a:t>
             </a:fld>
             <a:endParaRPr lang="en-US"/>
           </a:p>
@@ -1829,7 +1829,7 @@
           <a:p>
             <a:fld id="{2E40D743-7CB8-4D0B-882D-D502BAAD38FE}" type="datetimeFigureOut">
               <a:rPr lang="en-US" smtClean="0"/>
-              <a:t>4/12/2021</a:t>
+              <a:t>4/15/2021</a:t>
             </a:fld>
             <a:endParaRPr lang="en-US"/>
           </a:p>
@@ -2106,7 +2106,7 @@
           <a:p>
             <a:fld id="{2E40D743-7CB8-4D0B-882D-D502BAAD38FE}" type="datetimeFigureOut">
               <a:rPr lang="en-US" smtClean="0"/>
-              <a:t>4/12/2021</a:t>
+              <a:t>4/15/2021</a:t>
             </a:fld>
             <a:endParaRPr lang="en-US"/>
           </a:p>
@@ -2359,7 +2359,7 @@
           <a:p>
             <a:fld id="{2E40D743-7CB8-4D0B-882D-D502BAAD38FE}" type="datetimeFigureOut">
               <a:rPr lang="en-US" smtClean="0"/>
-              <a:t>4/12/2021</a:t>
+              <a:t>4/15/2021</a:t>
             </a:fld>
             <a:endParaRPr lang="en-US"/>
           </a:p>
@@ -2572,7 +2572,7 @@
           <a:p>
             <a:fld id="{2E40D743-7CB8-4D0B-882D-D502BAAD38FE}" type="datetimeFigureOut">
               <a:rPr lang="en-US" smtClean="0"/>
-              <a:t>4/12/2021</a:t>
+              <a:t>4/15/2021</a:t>
             </a:fld>
             <a:endParaRPr lang="en-US"/>
           </a:p>
@@ -11096,7 +11096,7 @@
         </p:nvSpPr>
         <p:spPr>
           <a:xfrm>
-            <a:off x="848722" y="2039988"/>
+            <a:off x="571631" y="1690688"/>
             <a:ext cx="1654334" cy="783771"/>
           </a:xfrm>
           <a:prstGeom prst="roundRect">
@@ -11171,7 +11171,7 @@
         </p:nvSpPr>
         <p:spPr>
           <a:xfrm>
-            <a:off x="848721" y="5087988"/>
+            <a:off x="571630" y="4341814"/>
             <a:ext cx="1654334" cy="783771"/>
           </a:xfrm>
           <a:prstGeom prst="roundRect">
@@ -11246,7 +11246,7 @@
         </p:nvSpPr>
         <p:spPr>
           <a:xfrm>
-            <a:off x="848721" y="3563988"/>
+            <a:off x="571630" y="3016251"/>
             <a:ext cx="1654334" cy="783771"/>
           </a:xfrm>
           <a:prstGeom prst="roundRect">
@@ -11321,7 +11321,7 @@
         </p:nvSpPr>
         <p:spPr>
           <a:xfrm>
-            <a:off x="3933667" y="2039988"/>
+            <a:off x="3656576" y="1690688"/>
             <a:ext cx="1654334" cy="783770"/>
           </a:xfrm>
           <a:prstGeom prst="roundRect">
@@ -11406,7 +11406,7 @@
         </p:nvSpPr>
         <p:spPr>
           <a:xfrm>
-            <a:off x="3933667" y="3563988"/>
+            <a:off x="3656576" y="3016251"/>
             <a:ext cx="1654334" cy="783770"/>
           </a:xfrm>
           <a:prstGeom prst="roundRect">
@@ -11491,7 +11491,7 @@
         </p:nvSpPr>
         <p:spPr>
           <a:xfrm>
-            <a:off x="3933667" y="5087989"/>
+            <a:off x="3656576" y="4341815"/>
             <a:ext cx="1654334" cy="783770"/>
           </a:xfrm>
           <a:prstGeom prst="roundRect">
@@ -11928,17 +11928,7 @@
                 <a:latin typeface="Segoe UI Black" panose="020B0A02040204020203" pitchFamily="34" charset="0"/>
                 <a:ea typeface="Segoe UI Black" panose="020B0A02040204020203" pitchFamily="34" charset="0"/>
               </a:rPr>
-              <a:t> </a:t>
-            </a:r>
-            <a:r>
-              <a:rPr lang="en-US" sz="2400" dirty="0" smtClean="0">
-                <a:solidFill>
-                  <a:schemeClr val="tx1"/>
-                </a:solidFill>
-                <a:latin typeface="Segoe UI Black" panose="020B0A02040204020203" pitchFamily="34" charset="0"/>
-                <a:ea typeface="Segoe UI Black" panose="020B0A02040204020203" pitchFamily="34" charset="0"/>
-              </a:rPr>
-              <a:t>2</a:t>
+              <a:t> 2</a:t>
             </a:r>
             <a:endParaRPr lang="en-US" sz="2400" dirty="0">
               <a:solidFill>
@@ -12147,17 +12137,7 @@
                 <a:latin typeface="Segoe UI Black" panose="020B0A02040204020203" pitchFamily="34" charset="0"/>
                 <a:ea typeface="Segoe UI Black" panose="020B0A02040204020203" pitchFamily="34" charset="0"/>
               </a:rPr>
-              <a:t> </a:t>
-            </a:r>
-            <a:r>
-              <a:rPr lang="en-US" sz="2400" dirty="0" smtClean="0">
-                <a:solidFill>
-                  <a:schemeClr val="tx1"/>
-                </a:solidFill>
-                <a:latin typeface="Segoe UI Black" panose="020B0A02040204020203" pitchFamily="34" charset="0"/>
-                <a:ea typeface="Segoe UI Black" panose="020B0A02040204020203" pitchFamily="34" charset="0"/>
-              </a:rPr>
-              <a:t>2</a:t>
+              <a:t> 2</a:t>
             </a:r>
             <a:endParaRPr lang="en-US" sz="2400" dirty="0">
               <a:solidFill>
@@ -12169,6 +12149,446 @@
           </a:p>
         </p:txBody>
       </p:sp>
+      <p:sp>
+        <p:nvSpPr>
+          <p:cNvPr id="22" name="Rectangle à coins arrondis 21"/>
+          <p:cNvSpPr/>
+          <p:nvPr/>
+        </p:nvSpPr>
+        <p:spPr>
+          <a:xfrm>
+            <a:off x="571630" y="5667376"/>
+            <a:ext cx="720000" cy="720000"/>
+          </a:xfrm>
+          <a:prstGeom prst="roundRect">
+            <a:avLst>
+              <a:gd name="adj" fmla="val 42851"/>
+            </a:avLst>
+          </a:prstGeom>
+          <a:gradFill>
+            <a:gsLst>
+              <a:gs pos="0">
+                <a:schemeClr val="accent1">
+                  <a:lumMod val="5000"/>
+                  <a:lumOff val="95000"/>
+                </a:schemeClr>
+              </a:gs>
+              <a:gs pos="10000">
+                <a:schemeClr val="bg2">
+                  <a:lumMod val="10000"/>
+                </a:schemeClr>
+              </a:gs>
+            </a:gsLst>
+            <a:lin ang="5400000" scaled="1"/>
+          </a:gradFill>
+          <a:ln>
+            <a:solidFill>
+              <a:schemeClr val="bg2">
+                <a:lumMod val="10000"/>
+              </a:schemeClr>
+            </a:solidFill>
+          </a:ln>
+        </p:spPr>
+        <p:style>
+          <a:lnRef idx="2">
+            <a:schemeClr val="accent1">
+              <a:shade val="50000"/>
+            </a:schemeClr>
+          </a:lnRef>
+          <a:fillRef idx="1">
+            <a:schemeClr val="accent1"/>
+          </a:fillRef>
+          <a:effectRef idx="0">
+            <a:schemeClr val="accent1"/>
+          </a:effectRef>
+          <a:fontRef idx="minor">
+            <a:schemeClr val="lt1"/>
+          </a:fontRef>
+        </p:style>
+        <p:txBody>
+          <a:bodyPr rtlCol="0" anchor="ctr"/>
+          <a:lstStyle/>
+          <a:p>
+            <a:pPr algn="ctr"/>
+            <a:endParaRPr lang="en-US" dirty="0">
+              <a:latin typeface="Segoe UI Black" panose="020B0A02040204020203" pitchFamily="34" charset="0"/>
+              <a:ea typeface="Segoe UI Black" panose="020B0A02040204020203" pitchFamily="34" charset="0"/>
+            </a:endParaRPr>
+          </a:p>
+        </p:txBody>
+      </p:sp>
+      <p:sp>
+        <p:nvSpPr>
+          <p:cNvPr id="23" name="Rectangle à coins arrondis 22"/>
+          <p:cNvSpPr/>
+          <p:nvPr/>
+        </p:nvSpPr>
+        <p:spPr>
+          <a:xfrm>
+            <a:off x="3656576" y="5667377"/>
+            <a:ext cx="720000" cy="720000"/>
+          </a:xfrm>
+          <a:prstGeom prst="roundRect">
+            <a:avLst>
+              <a:gd name="adj" fmla="val 42851"/>
+            </a:avLst>
+          </a:prstGeom>
+          <a:gradFill>
+            <a:gsLst>
+              <a:gs pos="0">
+                <a:schemeClr val="accent1">
+                  <a:lumMod val="5000"/>
+                  <a:lumOff val="95000"/>
+                </a:schemeClr>
+              </a:gs>
+              <a:gs pos="2000">
+                <a:schemeClr val="bg2">
+                  <a:lumMod val="10000"/>
+                </a:schemeClr>
+              </a:gs>
+            </a:gsLst>
+            <a:lin ang="5400000" scaled="1"/>
+          </a:gradFill>
+          <a:ln>
+            <a:solidFill>
+              <a:schemeClr val="bg2">
+                <a:lumMod val="10000"/>
+              </a:schemeClr>
+            </a:solidFill>
+          </a:ln>
+        </p:spPr>
+        <p:style>
+          <a:lnRef idx="2">
+            <a:schemeClr val="accent1">
+              <a:shade val="50000"/>
+            </a:schemeClr>
+          </a:lnRef>
+          <a:fillRef idx="1">
+            <a:schemeClr val="accent1"/>
+          </a:fillRef>
+          <a:effectRef idx="0">
+            <a:schemeClr val="accent1"/>
+          </a:effectRef>
+          <a:fontRef idx="minor">
+            <a:schemeClr val="lt1"/>
+          </a:fontRef>
+        </p:style>
+        <p:txBody>
+          <a:bodyPr rtlCol="0" anchor="ctr"/>
+          <a:lstStyle/>
+          <a:p>
+            <a:pPr algn="ctr"/>
+            <a:endParaRPr lang="en-US" dirty="0">
+              <a:solidFill>
+                <a:schemeClr val="bg1">
+                  <a:lumMod val="50000"/>
+                </a:schemeClr>
+              </a:solidFill>
+              <a:latin typeface="Segoe UI Black" panose="020B0A02040204020203" pitchFamily="34" charset="0"/>
+              <a:ea typeface="Segoe UI Black" panose="020B0A02040204020203" pitchFamily="34" charset="0"/>
+            </a:endParaRPr>
+          </a:p>
+        </p:txBody>
+      </p:sp>
+      <p:cxnSp>
+        <p:nvCxnSpPr>
+          <p:cNvPr id="24" name="Connecteur droit avec flèche 23"/>
+          <p:cNvCxnSpPr/>
+          <p:nvPr/>
+        </p:nvCxnSpPr>
+        <p:spPr>
+          <a:xfrm>
+            <a:off x="743670" y="6027376"/>
+            <a:ext cx="375920" cy="5080"/>
+          </a:xfrm>
+          <a:prstGeom prst="straightConnector1">
+            <a:avLst/>
+          </a:prstGeom>
+          <a:ln w="57150">
+            <a:solidFill>
+              <a:schemeClr val="bg1"/>
+            </a:solidFill>
+            <a:headEnd type="arrow" w="med" len="med"/>
+            <a:tailEnd type="none" w="med" len="med"/>
+          </a:ln>
+        </p:spPr>
+        <p:style>
+          <a:lnRef idx="1">
+            <a:schemeClr val="accent1"/>
+          </a:lnRef>
+          <a:fillRef idx="0">
+            <a:schemeClr val="accent1"/>
+          </a:fillRef>
+          <a:effectRef idx="0">
+            <a:schemeClr val="accent1"/>
+          </a:effectRef>
+          <a:fontRef idx="minor">
+            <a:schemeClr val="tx1"/>
+          </a:fontRef>
+        </p:style>
+      </p:cxnSp>
+      <p:cxnSp>
+        <p:nvCxnSpPr>
+          <p:cNvPr id="25" name="Connecteur droit avec flèche 24"/>
+          <p:cNvCxnSpPr/>
+          <p:nvPr/>
+        </p:nvCxnSpPr>
+        <p:spPr>
+          <a:xfrm>
+            <a:off x="3828616" y="6022296"/>
+            <a:ext cx="375920" cy="5080"/>
+          </a:xfrm>
+          <a:prstGeom prst="straightConnector1">
+            <a:avLst/>
+          </a:prstGeom>
+          <a:ln w="57150">
+            <a:solidFill>
+              <a:srgbClr val="7F7F7F"/>
+            </a:solidFill>
+            <a:headEnd type="arrow" w="med" len="med"/>
+            <a:tailEnd type="none" w="med" len="med"/>
+          </a:ln>
+        </p:spPr>
+        <p:style>
+          <a:lnRef idx="1">
+            <a:schemeClr val="accent1"/>
+          </a:lnRef>
+          <a:fillRef idx="0">
+            <a:schemeClr val="accent1"/>
+          </a:fillRef>
+          <a:effectRef idx="0">
+            <a:schemeClr val="accent1"/>
+          </a:effectRef>
+          <a:fontRef idx="minor">
+            <a:schemeClr val="tx1"/>
+          </a:fontRef>
+        </p:style>
+      </p:cxnSp>
+      <p:sp>
+        <p:nvSpPr>
+          <p:cNvPr id="26" name="Rectangle à coins arrondis 25"/>
+          <p:cNvSpPr/>
+          <p:nvPr/>
+        </p:nvSpPr>
+        <p:spPr>
+          <a:xfrm>
+            <a:off x="1505964" y="5667376"/>
+            <a:ext cx="720000" cy="720000"/>
+          </a:xfrm>
+          <a:prstGeom prst="roundRect">
+            <a:avLst>
+              <a:gd name="adj" fmla="val 42851"/>
+            </a:avLst>
+          </a:prstGeom>
+          <a:gradFill>
+            <a:gsLst>
+              <a:gs pos="0">
+                <a:schemeClr val="accent1">
+                  <a:lumMod val="5000"/>
+                  <a:lumOff val="95000"/>
+                </a:schemeClr>
+              </a:gs>
+              <a:gs pos="10000">
+                <a:schemeClr val="bg2">
+                  <a:lumMod val="10000"/>
+                </a:schemeClr>
+              </a:gs>
+            </a:gsLst>
+            <a:lin ang="5400000" scaled="1"/>
+          </a:gradFill>
+          <a:ln>
+            <a:solidFill>
+              <a:schemeClr val="bg2">
+                <a:lumMod val="10000"/>
+              </a:schemeClr>
+            </a:solidFill>
+          </a:ln>
+        </p:spPr>
+        <p:style>
+          <a:lnRef idx="2">
+            <a:schemeClr val="accent1">
+              <a:shade val="50000"/>
+            </a:schemeClr>
+          </a:lnRef>
+          <a:fillRef idx="1">
+            <a:schemeClr val="accent1"/>
+          </a:fillRef>
+          <a:effectRef idx="0">
+            <a:schemeClr val="accent1"/>
+          </a:effectRef>
+          <a:fontRef idx="minor">
+            <a:schemeClr val="lt1"/>
+          </a:fontRef>
+        </p:style>
+        <p:txBody>
+          <a:bodyPr rtlCol="0" anchor="ctr"/>
+          <a:lstStyle/>
+          <a:p>
+            <a:pPr algn="ctr"/>
+            <a:endParaRPr lang="en-US" dirty="0">
+              <a:latin typeface="Segoe UI Black" panose="020B0A02040204020203" pitchFamily="34" charset="0"/>
+              <a:ea typeface="Segoe UI Black" panose="020B0A02040204020203" pitchFamily="34" charset="0"/>
+            </a:endParaRPr>
+          </a:p>
+        </p:txBody>
+      </p:sp>
+      <p:sp>
+        <p:nvSpPr>
+          <p:cNvPr id="27" name="Rectangle à coins arrondis 26"/>
+          <p:cNvSpPr/>
+          <p:nvPr/>
+        </p:nvSpPr>
+        <p:spPr>
+          <a:xfrm>
+            <a:off x="4587455" y="5667376"/>
+            <a:ext cx="720000" cy="720000"/>
+          </a:xfrm>
+          <a:prstGeom prst="roundRect">
+            <a:avLst>
+              <a:gd name="adj" fmla="val 42851"/>
+            </a:avLst>
+          </a:prstGeom>
+          <a:gradFill>
+            <a:gsLst>
+              <a:gs pos="0">
+                <a:schemeClr val="accent1">
+                  <a:lumMod val="5000"/>
+                  <a:lumOff val="95000"/>
+                </a:schemeClr>
+              </a:gs>
+              <a:gs pos="2000">
+                <a:schemeClr val="bg2">
+                  <a:lumMod val="10000"/>
+                </a:schemeClr>
+              </a:gs>
+            </a:gsLst>
+            <a:lin ang="5400000" scaled="1"/>
+          </a:gradFill>
+          <a:ln>
+            <a:solidFill>
+              <a:schemeClr val="bg2">
+                <a:lumMod val="10000"/>
+              </a:schemeClr>
+            </a:solidFill>
+          </a:ln>
+        </p:spPr>
+        <p:style>
+          <a:lnRef idx="2">
+            <a:schemeClr val="accent1">
+              <a:shade val="50000"/>
+            </a:schemeClr>
+          </a:lnRef>
+          <a:fillRef idx="1">
+            <a:schemeClr val="accent1"/>
+          </a:fillRef>
+          <a:effectRef idx="0">
+            <a:schemeClr val="accent1"/>
+          </a:effectRef>
+          <a:fontRef idx="minor">
+            <a:schemeClr val="lt1"/>
+          </a:fontRef>
+        </p:style>
+        <p:txBody>
+          <a:bodyPr rtlCol="0" anchor="ctr"/>
+          <a:lstStyle/>
+          <a:p>
+            <a:pPr algn="ctr"/>
+            <a:endParaRPr lang="en-US" dirty="0">
+              <a:solidFill>
+                <a:schemeClr val="bg1">
+                  <a:lumMod val="50000"/>
+                </a:schemeClr>
+              </a:solidFill>
+              <a:latin typeface="Segoe UI Black" panose="020B0A02040204020203" pitchFamily="34" charset="0"/>
+              <a:ea typeface="Segoe UI Black" panose="020B0A02040204020203" pitchFamily="34" charset="0"/>
+            </a:endParaRPr>
+          </a:p>
+        </p:txBody>
+      </p:sp>
+      <p:pic>
+        <p:nvPicPr>
+          <p:cNvPr id="28" name="Image 27"/>
+          <p:cNvPicPr>
+            <a:picLocks noChangeAspect="1"/>
+          </p:cNvPicPr>
+          <p:nvPr/>
+        </p:nvPicPr>
+        <p:blipFill rotWithShape="1">
+          <a:blip r:embed="rId2" cstate="print">
+            <a:biLevel thresh="25000"/>
+            <a:extLst>
+              <a:ext uri="{BEBA8EAE-BF5A-486C-A8C5-ECC9F3942E4B}">
+                <a14:imgProps xmlns:a14="http://schemas.microsoft.com/office/drawing/2010/main">
+                  <a14:imgLayer r:embed="rId3">
+                    <a14:imgEffect>
+                      <a14:sharpenSoften amount="100000"/>
+                    </a14:imgEffect>
+                    <a14:imgEffect>
+                      <a14:brightnessContrast bright="100000" contrast="-100000"/>
+                    </a14:imgEffect>
+                  </a14:imgLayer>
+                </a14:imgProps>
+              </a:ext>
+              <a:ext uri="{28A0092B-C50C-407E-A947-70E740481C1C}">
+                <a14:useLocalDpi xmlns:a14="http://schemas.microsoft.com/office/drawing/2010/main" val="0"/>
+              </a:ext>
+            </a:extLst>
+          </a:blip>
+          <a:srcRect t="4275" b="4275"/>
+          <a:stretch/>
+        </p:blipFill>
+        <p:spPr>
+          <a:xfrm>
+            <a:off x="1680897" y="5858134"/>
+            <a:ext cx="370133" cy="338483"/>
+          </a:xfrm>
+          <a:prstGeom prst="rect">
+            <a:avLst/>
+          </a:prstGeom>
+        </p:spPr>
+      </p:pic>
+      <p:pic>
+        <p:nvPicPr>
+          <p:cNvPr id="29" name="Image 28"/>
+          <p:cNvPicPr>
+            <a:picLocks noChangeAspect="1"/>
+          </p:cNvPicPr>
+          <p:nvPr/>
+        </p:nvPicPr>
+        <p:blipFill rotWithShape="1">
+          <a:blip r:embed="rId2" cstate="print">
+            <a:grayscl/>
+            <a:extLst>
+              <a:ext uri="{BEBA8EAE-BF5A-486C-A8C5-ECC9F3942E4B}">
+                <a14:imgProps xmlns:a14="http://schemas.microsoft.com/office/drawing/2010/main">
+                  <a14:imgLayer r:embed="rId3">
+                    <a14:imgEffect>
+                      <a14:sharpenSoften amount="100000"/>
+                    </a14:imgEffect>
+                    <a14:imgEffect>
+                      <a14:brightnessContrast bright="100000" contrast="-100000"/>
+                    </a14:imgEffect>
+                  </a14:imgLayer>
+                </a14:imgProps>
+              </a:ext>
+              <a:ext uri="{28A0092B-C50C-407E-A947-70E740481C1C}">
+                <a14:useLocalDpi xmlns:a14="http://schemas.microsoft.com/office/drawing/2010/main" val="0"/>
+              </a:ext>
+            </a:extLst>
+          </a:blip>
+          <a:srcRect t="4275" b="4275"/>
+          <a:stretch/>
+        </p:blipFill>
+        <p:spPr>
+          <a:xfrm>
+            <a:off x="4765843" y="5850082"/>
+            <a:ext cx="370133" cy="338483"/>
+          </a:xfrm>
+          <a:prstGeom prst="rect">
+            <a:avLst/>
+          </a:prstGeom>
+        </p:spPr>
+      </p:pic>
     </p:spTree>
     <p:extLst>
       <p:ext uri="{BB962C8B-B14F-4D97-AF65-F5344CB8AC3E}">
@@ -12265,7 +12685,7 @@
         </p:nvSpPr>
         <p:spPr>
           <a:xfrm>
-            <a:off x="775149" y="3535484"/>
+            <a:off x="775149" y="2830247"/>
             <a:ext cx="1654334" cy="783771"/>
           </a:xfrm>
           <a:prstGeom prst="roundRect">
@@ -12316,7 +12736,7 @@
         </p:nvSpPr>
         <p:spPr>
           <a:xfrm>
-            <a:off x="775149" y="5327498"/>
+            <a:off x="775149" y="3917024"/>
             <a:ext cx="1654334" cy="783771"/>
           </a:xfrm>
           <a:prstGeom prst="roundRect">
@@ -12426,7 +12846,7 @@
         </p:nvSpPr>
         <p:spPr>
           <a:xfrm>
-            <a:off x="3760087" y="3535484"/>
+            <a:off x="3760087" y="2830247"/>
             <a:ext cx="1654334" cy="783770"/>
           </a:xfrm>
           <a:prstGeom prst="roundRect">
@@ -12485,7 +12905,7 @@
         </p:nvSpPr>
         <p:spPr>
           <a:xfrm>
-            <a:off x="3760087" y="5327499"/>
+            <a:off x="3760087" y="3917025"/>
             <a:ext cx="1654334" cy="783770"/>
           </a:xfrm>
           <a:prstGeom prst="roundRect">
@@ -12893,28 +13313,14 @@
                   <a:latin typeface="Segoe UI Black" panose="020B0A02040204020203" pitchFamily="34" charset="0"/>
                   <a:ea typeface="Segoe UI Black" panose="020B0A02040204020203" pitchFamily="34" charset="0"/>
                 </a:rPr>
-                <a:t>Joueu</a:t>
-              </a:r>
-              <a:r>
-                <a:rPr lang="en-US" dirty="0" err="1" smtClean="0">
-                  <a:latin typeface="Segoe UI Black" panose="020B0A02040204020203" pitchFamily="34" charset="0"/>
-                  <a:ea typeface="Segoe UI Black" panose="020B0A02040204020203" pitchFamily="34" charset="0"/>
-                </a:rPr>
-                <a:t>r</a:t>
+                <a:t>Joueur</a:t>
               </a:r>
               <a:r>
                 <a:rPr lang="en-US" dirty="0" smtClean="0">
                   <a:latin typeface="Segoe UI Black" panose="020B0A02040204020203" pitchFamily="34" charset="0"/>
                   <a:ea typeface="Segoe UI Black" panose="020B0A02040204020203" pitchFamily="34" charset="0"/>
                 </a:rPr>
-                <a:t> </a:t>
-              </a:r>
-              <a:r>
-                <a:rPr lang="en-US" dirty="0" smtClean="0">
-                  <a:latin typeface="Segoe UI Black" panose="020B0A02040204020203" pitchFamily="34" charset="0"/>
-                  <a:ea typeface="Segoe UI Black" panose="020B0A02040204020203" pitchFamily="34" charset="0"/>
-                </a:rPr>
-                <a:t>1</a:t>
+                <a:t> 1</a:t>
               </a:r>
               <a:endParaRPr lang="en-US" dirty="0">
                 <a:latin typeface="Segoe UI Black" panose="020B0A02040204020203" pitchFamily="34" charset="0"/>
@@ -13034,28 +13440,14 @@
                   <a:latin typeface="Segoe UI Black" panose="020B0A02040204020203" pitchFamily="34" charset="0"/>
                   <a:ea typeface="Segoe UI Black" panose="020B0A02040204020203" pitchFamily="34" charset="0"/>
                 </a:rPr>
-                <a:t>Joueu</a:t>
-              </a:r>
-              <a:r>
-                <a:rPr lang="en-US" dirty="0" err="1" smtClean="0">
-                  <a:latin typeface="Segoe UI Black" panose="020B0A02040204020203" pitchFamily="34" charset="0"/>
-                  <a:ea typeface="Segoe UI Black" panose="020B0A02040204020203" pitchFamily="34" charset="0"/>
-                </a:rPr>
-                <a:t>r</a:t>
+                <a:t>Joueur</a:t>
               </a:r>
               <a:r>
                 <a:rPr lang="en-US" dirty="0" smtClean="0">
                   <a:latin typeface="Segoe UI Black" panose="020B0A02040204020203" pitchFamily="34" charset="0"/>
                   <a:ea typeface="Segoe UI Black" panose="020B0A02040204020203" pitchFamily="34" charset="0"/>
                 </a:rPr>
-                <a:t> </a:t>
-              </a:r>
-              <a:r>
-                <a:rPr lang="en-US" dirty="0" smtClean="0">
-                  <a:latin typeface="Segoe UI Black" panose="020B0A02040204020203" pitchFamily="34" charset="0"/>
-                  <a:ea typeface="Segoe UI Black" panose="020B0A02040204020203" pitchFamily="34" charset="0"/>
-                </a:rPr>
-                <a:t>2</a:t>
+                <a:t> 2</a:t>
               </a:r>
               <a:endParaRPr lang="en-US" dirty="0">
                 <a:latin typeface="Segoe UI Black" panose="020B0A02040204020203" pitchFamily="34" charset="0"/>
@@ -13337,14 +13729,7 @@
                   <a:latin typeface="Segoe UI Black" panose="020B0A02040204020203" pitchFamily="34" charset="0"/>
                   <a:ea typeface="Segoe UI Black" panose="020B0A02040204020203" pitchFamily="34" charset="0"/>
                 </a:rPr>
-                <a:t> </a:t>
-              </a:r>
-              <a:r>
-                <a:rPr lang="en-US" dirty="0" smtClean="0">
-                  <a:latin typeface="Segoe UI Black" panose="020B0A02040204020203" pitchFamily="34" charset="0"/>
-                  <a:ea typeface="Segoe UI Black" panose="020B0A02040204020203" pitchFamily="34" charset="0"/>
-                </a:rPr>
-                <a:t>2</a:t>
+                <a:t> 2</a:t>
               </a:r>
               <a:endParaRPr lang="en-US" dirty="0">
                 <a:latin typeface="Segoe UI Black" panose="020B0A02040204020203" pitchFamily="34" charset="0"/>
@@ -13389,6 +13774,337 @@
           </p:style>
         </p:cxnSp>
       </p:grpSp>
+      <p:sp>
+        <p:nvSpPr>
+          <p:cNvPr id="31" name="Rectangle à coins arrondis 30"/>
+          <p:cNvSpPr/>
+          <p:nvPr/>
+        </p:nvSpPr>
+        <p:spPr>
+          <a:xfrm>
+            <a:off x="774737" y="5003802"/>
+            <a:ext cx="720000" cy="720000"/>
+          </a:xfrm>
+          <a:prstGeom prst="roundRect">
+            <a:avLst>
+              <a:gd name="adj" fmla="val 0"/>
+            </a:avLst>
+          </a:prstGeom>
+          <a:ln/>
+        </p:spPr>
+        <p:style>
+          <a:lnRef idx="2">
+            <a:schemeClr val="dk1"/>
+          </a:lnRef>
+          <a:fillRef idx="1">
+            <a:schemeClr val="lt1"/>
+          </a:fillRef>
+          <a:effectRef idx="0">
+            <a:schemeClr val="dk1"/>
+          </a:effectRef>
+          <a:fontRef idx="minor">
+            <a:schemeClr val="dk1"/>
+          </a:fontRef>
+        </p:style>
+        <p:txBody>
+          <a:bodyPr rtlCol="0" anchor="ctr"/>
+          <a:lstStyle/>
+          <a:p>
+            <a:pPr algn="ctr"/>
+            <a:endParaRPr lang="en-US" dirty="0">
+              <a:latin typeface="Segoe UI Black" panose="020B0A02040204020203" pitchFamily="34" charset="0"/>
+              <a:ea typeface="Segoe UI Black" panose="020B0A02040204020203" pitchFamily="34" charset="0"/>
+            </a:endParaRPr>
+          </a:p>
+        </p:txBody>
+      </p:sp>
+      <p:sp>
+        <p:nvSpPr>
+          <p:cNvPr id="32" name="Rectangle à coins arrondis 31"/>
+          <p:cNvSpPr/>
+          <p:nvPr/>
+        </p:nvSpPr>
+        <p:spPr>
+          <a:xfrm>
+            <a:off x="3760086" y="5003802"/>
+            <a:ext cx="720000" cy="720000"/>
+          </a:xfrm>
+          <a:prstGeom prst="roundRect">
+            <a:avLst>
+              <a:gd name="adj" fmla="val 0"/>
+            </a:avLst>
+          </a:prstGeom>
+          <a:ln/>
+        </p:spPr>
+        <p:style>
+          <a:lnRef idx="2">
+            <a:schemeClr val="dk1">
+              <a:shade val="50000"/>
+            </a:schemeClr>
+          </a:lnRef>
+          <a:fillRef idx="1">
+            <a:schemeClr val="dk1"/>
+          </a:fillRef>
+          <a:effectRef idx="0">
+            <a:schemeClr val="dk1"/>
+          </a:effectRef>
+          <a:fontRef idx="minor">
+            <a:schemeClr val="lt1"/>
+          </a:fontRef>
+        </p:style>
+        <p:txBody>
+          <a:bodyPr rtlCol="0" anchor="ctr"/>
+          <a:lstStyle/>
+          <a:p>
+            <a:pPr algn="ctr"/>
+            <a:endParaRPr lang="en-US" dirty="0">
+              <a:solidFill>
+                <a:schemeClr val="bg1"/>
+              </a:solidFill>
+              <a:latin typeface="Segoe UI Black" panose="020B0A02040204020203" pitchFamily="34" charset="0"/>
+              <a:ea typeface="Segoe UI Black" panose="020B0A02040204020203" pitchFamily="34" charset="0"/>
+            </a:endParaRPr>
+          </a:p>
+        </p:txBody>
+      </p:sp>
+      <p:cxnSp>
+        <p:nvCxnSpPr>
+          <p:cNvPr id="11" name="Connecteur droit avec flèche 10"/>
+          <p:cNvCxnSpPr/>
+          <p:nvPr/>
+        </p:nvCxnSpPr>
+        <p:spPr>
+          <a:xfrm>
+            <a:off x="946777" y="5363802"/>
+            <a:ext cx="375920" cy="5080"/>
+          </a:xfrm>
+          <a:prstGeom prst="straightConnector1">
+            <a:avLst/>
+          </a:prstGeom>
+          <a:ln w="57150">
+            <a:solidFill>
+              <a:schemeClr val="tx1"/>
+            </a:solidFill>
+            <a:headEnd type="arrow" w="med" len="med"/>
+            <a:tailEnd type="none" w="med" len="med"/>
+          </a:ln>
+        </p:spPr>
+        <p:style>
+          <a:lnRef idx="1">
+            <a:schemeClr val="accent1"/>
+          </a:lnRef>
+          <a:fillRef idx="0">
+            <a:schemeClr val="accent1"/>
+          </a:fillRef>
+          <a:effectRef idx="0">
+            <a:schemeClr val="accent1"/>
+          </a:effectRef>
+          <a:fontRef idx="minor">
+            <a:schemeClr val="tx1"/>
+          </a:fontRef>
+        </p:style>
+      </p:cxnSp>
+      <p:cxnSp>
+        <p:nvCxnSpPr>
+          <p:cNvPr id="33" name="Connecteur droit avec flèche 32"/>
+          <p:cNvCxnSpPr/>
+          <p:nvPr/>
+        </p:nvCxnSpPr>
+        <p:spPr>
+          <a:xfrm>
+            <a:off x="3932126" y="5363802"/>
+            <a:ext cx="375920" cy="5080"/>
+          </a:xfrm>
+          <a:prstGeom prst="straightConnector1">
+            <a:avLst/>
+          </a:prstGeom>
+          <a:ln w="57150">
+            <a:solidFill>
+              <a:schemeClr val="bg1"/>
+            </a:solidFill>
+            <a:headEnd type="arrow" w="med" len="med"/>
+            <a:tailEnd type="none" w="med" len="med"/>
+          </a:ln>
+        </p:spPr>
+        <p:style>
+          <a:lnRef idx="1">
+            <a:schemeClr val="accent1"/>
+          </a:lnRef>
+          <a:fillRef idx="0">
+            <a:schemeClr val="accent1"/>
+          </a:fillRef>
+          <a:effectRef idx="0">
+            <a:schemeClr val="accent1"/>
+          </a:effectRef>
+          <a:fontRef idx="minor">
+            <a:schemeClr val="tx1"/>
+          </a:fontRef>
+        </p:style>
+      </p:cxnSp>
+      <p:sp>
+        <p:nvSpPr>
+          <p:cNvPr id="34" name="Rectangle à coins arrondis 33"/>
+          <p:cNvSpPr/>
+          <p:nvPr/>
+        </p:nvSpPr>
+        <p:spPr>
+          <a:xfrm>
+            <a:off x="1709072" y="5003801"/>
+            <a:ext cx="720000" cy="720000"/>
+          </a:xfrm>
+          <a:prstGeom prst="roundRect">
+            <a:avLst>
+              <a:gd name="adj" fmla="val 0"/>
+            </a:avLst>
+          </a:prstGeom>
+          <a:ln/>
+        </p:spPr>
+        <p:style>
+          <a:lnRef idx="2">
+            <a:schemeClr val="dk1"/>
+          </a:lnRef>
+          <a:fillRef idx="1">
+            <a:schemeClr val="lt1"/>
+          </a:fillRef>
+          <a:effectRef idx="0">
+            <a:schemeClr val="dk1"/>
+          </a:effectRef>
+          <a:fontRef idx="minor">
+            <a:schemeClr val="dk1"/>
+          </a:fontRef>
+        </p:style>
+        <p:txBody>
+          <a:bodyPr rtlCol="0" anchor="ctr"/>
+          <a:lstStyle/>
+          <a:p>
+            <a:pPr algn="ctr"/>
+            <a:endParaRPr lang="en-US" dirty="0">
+              <a:latin typeface="Segoe UI Black" panose="020B0A02040204020203" pitchFamily="34" charset="0"/>
+              <a:ea typeface="Segoe UI Black" panose="020B0A02040204020203" pitchFamily="34" charset="0"/>
+            </a:endParaRPr>
+          </a:p>
+        </p:txBody>
+      </p:sp>
+      <p:sp>
+        <p:nvSpPr>
+          <p:cNvPr id="35" name="Rectangle à coins arrondis 34"/>
+          <p:cNvSpPr/>
+          <p:nvPr/>
+        </p:nvSpPr>
+        <p:spPr>
+          <a:xfrm>
+            <a:off x="4694421" y="5003801"/>
+            <a:ext cx="720000" cy="720000"/>
+          </a:xfrm>
+          <a:prstGeom prst="roundRect">
+            <a:avLst>
+              <a:gd name="adj" fmla="val 0"/>
+            </a:avLst>
+          </a:prstGeom>
+          <a:ln/>
+        </p:spPr>
+        <p:style>
+          <a:lnRef idx="2">
+            <a:schemeClr val="dk1">
+              <a:shade val="50000"/>
+            </a:schemeClr>
+          </a:lnRef>
+          <a:fillRef idx="1">
+            <a:schemeClr val="dk1"/>
+          </a:fillRef>
+          <a:effectRef idx="0">
+            <a:schemeClr val="dk1"/>
+          </a:effectRef>
+          <a:fontRef idx="minor">
+            <a:schemeClr val="lt1"/>
+          </a:fontRef>
+        </p:style>
+        <p:txBody>
+          <a:bodyPr rtlCol="0" anchor="ctr"/>
+          <a:lstStyle/>
+          <a:p>
+            <a:pPr algn="ctr"/>
+            <a:endParaRPr lang="en-US" dirty="0">
+              <a:solidFill>
+                <a:schemeClr val="bg1"/>
+              </a:solidFill>
+              <a:latin typeface="Segoe UI Black" panose="020B0A02040204020203" pitchFamily="34" charset="0"/>
+              <a:ea typeface="Segoe UI Black" panose="020B0A02040204020203" pitchFamily="34" charset="0"/>
+            </a:endParaRPr>
+          </a:p>
+        </p:txBody>
+      </p:sp>
+      <p:pic>
+        <p:nvPicPr>
+          <p:cNvPr id="36" name="Image 35"/>
+          <p:cNvPicPr>
+            <a:picLocks noChangeAspect="1"/>
+          </p:cNvPicPr>
+          <p:nvPr/>
+        </p:nvPicPr>
+        <p:blipFill rotWithShape="1">
+          <a:blip r:embed="rId2" cstate="print">
+            <a:extLst>
+              <a:ext uri="{28A0092B-C50C-407E-A947-70E740481C1C}">
+                <a14:useLocalDpi xmlns:a14="http://schemas.microsoft.com/office/drawing/2010/main" val="0"/>
+              </a:ext>
+            </a:extLst>
+          </a:blip>
+          <a:srcRect t="4275" b="4275"/>
+          <a:stretch/>
+        </p:blipFill>
+        <p:spPr>
+          <a:xfrm>
+            <a:off x="1884005" y="5194559"/>
+            <a:ext cx="370133" cy="338483"/>
+          </a:xfrm>
+          <a:prstGeom prst="rect">
+            <a:avLst/>
+          </a:prstGeom>
+        </p:spPr>
+      </p:pic>
+      <p:pic>
+        <p:nvPicPr>
+          <p:cNvPr id="37" name="Image 36"/>
+          <p:cNvPicPr>
+            <a:picLocks noChangeAspect="1"/>
+          </p:cNvPicPr>
+          <p:nvPr/>
+        </p:nvPicPr>
+        <p:blipFill rotWithShape="1">
+          <a:blip r:embed="rId3" cstate="print">
+            <a:biLevel thresh="25000"/>
+            <a:extLst>
+              <a:ext uri="{BEBA8EAE-BF5A-486C-A8C5-ECC9F3942E4B}">
+                <a14:imgProps xmlns:a14="http://schemas.microsoft.com/office/drawing/2010/main">
+                  <a14:imgLayer r:embed="rId4">
+                    <a14:imgEffect>
+                      <a14:sharpenSoften amount="100000"/>
+                    </a14:imgEffect>
+                    <a14:imgEffect>
+                      <a14:brightnessContrast bright="100000" contrast="-100000"/>
+                    </a14:imgEffect>
+                  </a14:imgLayer>
+                </a14:imgProps>
+              </a:ext>
+              <a:ext uri="{28A0092B-C50C-407E-A947-70E740481C1C}">
+                <a14:useLocalDpi xmlns:a14="http://schemas.microsoft.com/office/drawing/2010/main" val="0"/>
+              </a:ext>
+            </a:extLst>
+          </a:blip>
+          <a:srcRect t="4275" b="4275"/>
+          <a:stretch/>
+        </p:blipFill>
+        <p:spPr>
+          <a:xfrm>
+            <a:off x="4869354" y="5202340"/>
+            <a:ext cx="370133" cy="338483"/>
+          </a:xfrm>
+          <a:prstGeom prst="rect">
+            <a:avLst/>
+          </a:prstGeom>
+        </p:spPr>
+      </p:pic>
     </p:spTree>
     <p:extLst>
       <p:ext uri="{BB962C8B-B14F-4D97-AF65-F5344CB8AC3E}">
@@ -13403,6 +14119,36 @@
 </file>
 
 <file path=ppt/slides/slide8.xml><?xml version="1.0" encoding="utf-8"?>
+<p:sld xmlns:a="http://schemas.openxmlformats.org/drawingml/2006/main" xmlns:r="http://schemas.openxmlformats.org/officeDocument/2006/relationships" xmlns:p="http://schemas.openxmlformats.org/presentationml/2006/main">
+  <p:cSld>
+    <p:spTree>
+      <p:nvGrpSpPr>
+        <p:cNvPr id="1" name=""/>
+        <p:cNvGrpSpPr/>
+        <p:nvPr/>
+      </p:nvGrpSpPr>
+      <p:grpSpPr>
+        <a:xfrm>
+          <a:off x="0" y="0"/>
+          <a:ext cx="0" cy="0"/>
+          <a:chOff x="0" y="0"/>
+          <a:chExt cx="0" cy="0"/>
+        </a:xfrm>
+      </p:grpSpPr>
+    </p:spTree>
+    <p:extLst>
+      <p:ext uri="{BB962C8B-B14F-4D97-AF65-F5344CB8AC3E}">
+        <p14:creationId xmlns:p14="http://schemas.microsoft.com/office/powerpoint/2010/main" val="312559596"/>
+      </p:ext>
+    </p:extLst>
+  </p:cSld>
+  <p:clrMapOvr>
+    <a:masterClrMapping/>
+  </p:clrMapOvr>
+</p:sld>
+</file>
+
+<file path=ppt/slides/slide9.xml><?xml version="1.0" encoding="utf-8"?>
 <p:sld xmlns:a="http://schemas.openxmlformats.org/drawingml/2006/main" xmlns:r="http://schemas.openxmlformats.org/officeDocument/2006/relationships" xmlns:p="http://schemas.openxmlformats.org/presentationml/2006/main">
   <p:cSld>
     <p:spTree>
@@ -13582,36 +14328,6 @@
     <p:extLst>
       <p:ext uri="{BB962C8B-B14F-4D97-AF65-F5344CB8AC3E}">
         <p14:creationId xmlns:p14="http://schemas.microsoft.com/office/powerpoint/2010/main" val="4159037437"/>
-      </p:ext>
-    </p:extLst>
-  </p:cSld>
-  <p:clrMapOvr>
-    <a:masterClrMapping/>
-  </p:clrMapOvr>
-</p:sld>
-</file>
-
-<file path=ppt/slides/slide9.xml><?xml version="1.0" encoding="utf-8"?>
-<p:sld xmlns:a="http://schemas.openxmlformats.org/drawingml/2006/main" xmlns:r="http://schemas.openxmlformats.org/officeDocument/2006/relationships" xmlns:p="http://schemas.openxmlformats.org/presentationml/2006/main">
-  <p:cSld>
-    <p:spTree>
-      <p:nvGrpSpPr>
-        <p:cNvPr id="1" name=""/>
-        <p:cNvGrpSpPr/>
-        <p:nvPr/>
-      </p:nvGrpSpPr>
-      <p:grpSpPr>
-        <a:xfrm>
-          <a:off x="0" y="0"/>
-          <a:ext cx="0" cy="0"/>
-          <a:chOff x="0" y="0"/>
-          <a:chExt cx="0" cy="0"/>
-        </a:xfrm>
-      </p:grpSpPr>
-    </p:spTree>
-    <p:extLst>
-      <p:ext uri="{BB962C8B-B14F-4D97-AF65-F5344CB8AC3E}">
-        <p14:creationId xmlns:p14="http://schemas.microsoft.com/office/powerpoint/2010/main" val="312559596"/>
       </p:ext>
     </p:extLst>
   </p:cSld>

</xml_diff>

<commit_message>
updated : online event handler,waiting for Px screen added : virtual env
</commit_message>
<xml_diff>
--- a/assets/buttons.pptx
+++ b/assets/buttons.pptx
@@ -251,7 +251,7 @@
           <a:p>
             <a:fld id="{2E40D743-7CB8-4D0B-882D-D502BAAD38FE}" type="datetimeFigureOut">
               <a:rPr lang="en-US" smtClean="0"/>
-              <a:t>4/15/2021</a:t>
+              <a:t>4/18/2021</a:t>
             </a:fld>
             <a:endParaRPr lang="en-US"/>
           </a:p>
@@ -421,7 +421,7 @@
           <a:p>
             <a:fld id="{2E40D743-7CB8-4D0B-882D-D502BAAD38FE}" type="datetimeFigureOut">
               <a:rPr lang="en-US" smtClean="0"/>
-              <a:t>4/15/2021</a:t>
+              <a:t>4/18/2021</a:t>
             </a:fld>
             <a:endParaRPr lang="en-US"/>
           </a:p>
@@ -601,7 +601,7 @@
           <a:p>
             <a:fld id="{2E40D743-7CB8-4D0B-882D-D502BAAD38FE}" type="datetimeFigureOut">
               <a:rPr lang="en-US" smtClean="0"/>
-              <a:t>4/15/2021</a:t>
+              <a:t>4/18/2021</a:t>
             </a:fld>
             <a:endParaRPr lang="en-US"/>
           </a:p>
@@ -771,7 +771,7 @@
           <a:p>
             <a:fld id="{2E40D743-7CB8-4D0B-882D-D502BAAD38FE}" type="datetimeFigureOut">
               <a:rPr lang="en-US" smtClean="0"/>
-              <a:t>4/15/2021</a:t>
+              <a:t>4/18/2021</a:t>
             </a:fld>
             <a:endParaRPr lang="en-US"/>
           </a:p>
@@ -1017,7 +1017,7 @@
           <a:p>
             <a:fld id="{2E40D743-7CB8-4D0B-882D-D502BAAD38FE}" type="datetimeFigureOut">
               <a:rPr lang="en-US" smtClean="0"/>
-              <a:t>4/15/2021</a:t>
+              <a:t>4/18/2021</a:t>
             </a:fld>
             <a:endParaRPr lang="en-US"/>
           </a:p>
@@ -1249,7 +1249,7 @@
           <a:p>
             <a:fld id="{2E40D743-7CB8-4D0B-882D-D502BAAD38FE}" type="datetimeFigureOut">
               <a:rPr lang="en-US" smtClean="0"/>
-              <a:t>4/15/2021</a:t>
+              <a:t>4/18/2021</a:t>
             </a:fld>
             <a:endParaRPr lang="en-US"/>
           </a:p>
@@ -1616,7 +1616,7 @@
           <a:p>
             <a:fld id="{2E40D743-7CB8-4D0B-882D-D502BAAD38FE}" type="datetimeFigureOut">
               <a:rPr lang="en-US" smtClean="0"/>
-              <a:t>4/15/2021</a:t>
+              <a:t>4/18/2021</a:t>
             </a:fld>
             <a:endParaRPr lang="en-US"/>
           </a:p>
@@ -1734,7 +1734,7 @@
           <a:p>
             <a:fld id="{2E40D743-7CB8-4D0B-882D-D502BAAD38FE}" type="datetimeFigureOut">
               <a:rPr lang="en-US" smtClean="0"/>
-              <a:t>4/15/2021</a:t>
+              <a:t>4/18/2021</a:t>
             </a:fld>
             <a:endParaRPr lang="en-US"/>
           </a:p>
@@ -1829,7 +1829,7 @@
           <a:p>
             <a:fld id="{2E40D743-7CB8-4D0B-882D-D502BAAD38FE}" type="datetimeFigureOut">
               <a:rPr lang="en-US" smtClean="0"/>
-              <a:t>4/15/2021</a:t>
+              <a:t>4/18/2021</a:t>
             </a:fld>
             <a:endParaRPr lang="en-US"/>
           </a:p>
@@ -2106,7 +2106,7 @@
           <a:p>
             <a:fld id="{2E40D743-7CB8-4D0B-882D-D502BAAD38FE}" type="datetimeFigureOut">
               <a:rPr lang="en-US" smtClean="0"/>
-              <a:t>4/15/2021</a:t>
+              <a:t>4/18/2021</a:t>
             </a:fld>
             <a:endParaRPr lang="en-US"/>
           </a:p>
@@ -2359,7 +2359,7 @@
           <a:p>
             <a:fld id="{2E40D743-7CB8-4D0B-882D-D502BAAD38FE}" type="datetimeFigureOut">
               <a:rPr lang="en-US" smtClean="0"/>
-              <a:t>4/15/2021</a:t>
+              <a:t>4/18/2021</a:t>
             </a:fld>
             <a:endParaRPr lang="en-US"/>
           </a:p>
@@ -2572,7 +2572,7 @@
           <a:p>
             <a:fld id="{2E40D743-7CB8-4D0B-882D-D502BAAD38FE}" type="datetimeFigureOut">
               <a:rPr lang="en-US" smtClean="0"/>
-              <a:t>4/15/2021</a:t>
+              <a:t>4/18/2021</a:t>
             </a:fld>
             <a:endParaRPr lang="en-US"/>
           </a:p>
@@ -14135,6 +14135,1204 @@
           <a:chExt cx="0" cy="0"/>
         </a:xfrm>
       </p:grpSpPr>
+      <p:grpSp>
+        <p:nvGrpSpPr>
+          <p:cNvPr id="6" name="Groupe 5"/>
+          <p:cNvGrpSpPr/>
+          <p:nvPr/>
+        </p:nvGrpSpPr>
+        <p:grpSpPr>
+          <a:xfrm>
+            <a:off x="655675" y="493926"/>
+            <a:ext cx="3814618" cy="786818"/>
+            <a:chOff x="7184491" y="3895494"/>
+            <a:chExt cx="3814618" cy="786818"/>
+          </a:xfrm>
+        </p:grpSpPr>
+        <p:grpSp>
+          <p:nvGrpSpPr>
+            <p:cNvPr id="2" name="Groupe 1"/>
+            <p:cNvGrpSpPr/>
+            <p:nvPr/>
+          </p:nvGrpSpPr>
+          <p:grpSpPr>
+            <a:xfrm>
+              <a:off x="7184491" y="3898542"/>
+              <a:ext cx="3814618" cy="783770"/>
+              <a:chOff x="7332272" y="2942747"/>
+              <a:chExt cx="3814618" cy="783770"/>
+            </a:xfrm>
+          </p:grpSpPr>
+          <p:sp>
+            <p:nvSpPr>
+              <p:cNvPr id="3" name="Rectangle à coins arrondis 2"/>
+              <p:cNvSpPr/>
+              <p:nvPr/>
+            </p:nvSpPr>
+            <p:spPr>
+              <a:xfrm>
+                <a:off x="7332272" y="3050403"/>
+                <a:ext cx="3814618" cy="555757"/>
+              </a:xfrm>
+              <a:prstGeom prst="roundRect">
+                <a:avLst>
+                  <a:gd name="adj" fmla="val 0"/>
+                </a:avLst>
+              </a:prstGeom>
+              <a:noFill/>
+              <a:ln>
+                <a:solidFill>
+                  <a:schemeClr val="tx1">
+                    <a:lumMod val="95000"/>
+                    <a:lumOff val="5000"/>
+                  </a:schemeClr>
+                </a:solidFill>
+              </a:ln>
+              <a:effectLst>
+                <a:outerShdw blurRad="127000" dist="38100" dir="5400000" algn="t" rotWithShape="0">
+                  <a:prstClr val="black">
+                    <a:alpha val="48000"/>
+                  </a:prstClr>
+                </a:outerShdw>
+              </a:effectLst>
+            </p:spPr>
+            <p:style>
+              <a:lnRef idx="2">
+                <a:schemeClr val="dk1">
+                  <a:shade val="50000"/>
+                </a:schemeClr>
+              </a:lnRef>
+              <a:fillRef idx="1">
+                <a:schemeClr val="dk1"/>
+              </a:fillRef>
+              <a:effectRef idx="0">
+                <a:schemeClr val="dk1"/>
+              </a:effectRef>
+              <a:fontRef idx="minor">
+                <a:schemeClr val="lt1"/>
+              </a:fontRef>
+            </p:style>
+            <p:txBody>
+              <a:bodyPr rtlCol="0" anchor="ctr"/>
+              <a:lstStyle/>
+              <a:p>
+                <a:pPr algn="ctr"/>
+                <a:r>
+                  <a:rPr lang="en-US" dirty="0" smtClean="0">
+                    <a:solidFill>
+                      <a:schemeClr val="tx1"/>
+                    </a:solidFill>
+                    <a:latin typeface="Segoe UI Black" panose="020B0A02040204020203" pitchFamily="34" charset="0"/>
+                    <a:ea typeface="Segoe UI Black" panose="020B0A02040204020203" pitchFamily="34" charset="0"/>
+                  </a:rPr>
+                  <a:t>Waiting for P1</a:t>
+                </a:r>
+                <a:endParaRPr lang="en-US" dirty="0">
+                  <a:solidFill>
+                    <a:schemeClr val="tx1"/>
+                  </a:solidFill>
+                  <a:latin typeface="Segoe UI Black" panose="020B0A02040204020203" pitchFamily="34" charset="0"/>
+                  <a:ea typeface="Segoe UI Black" panose="020B0A02040204020203" pitchFamily="34" charset="0"/>
+                </a:endParaRPr>
+              </a:p>
+            </p:txBody>
+          </p:sp>
+          <p:cxnSp>
+            <p:nvCxnSpPr>
+              <p:cNvPr id="4" name="Connecteur droit 3"/>
+              <p:cNvCxnSpPr/>
+              <p:nvPr/>
+            </p:nvCxnSpPr>
+            <p:spPr>
+              <a:xfrm>
+                <a:off x="11116410" y="2942747"/>
+                <a:ext cx="0" cy="783770"/>
+              </a:xfrm>
+              <a:prstGeom prst="line">
+                <a:avLst/>
+              </a:prstGeom>
+              <a:ln w="76200">
+                <a:solidFill>
+                  <a:schemeClr val="tx1"/>
+                </a:solidFill>
+              </a:ln>
+            </p:spPr>
+            <p:style>
+              <a:lnRef idx="1">
+                <a:schemeClr val="accent1"/>
+              </a:lnRef>
+              <a:fillRef idx="0">
+                <a:schemeClr val="accent1"/>
+              </a:fillRef>
+              <a:effectRef idx="0">
+                <a:schemeClr val="accent1"/>
+              </a:effectRef>
+              <a:fontRef idx="minor">
+                <a:schemeClr val="tx1"/>
+              </a:fontRef>
+            </p:style>
+          </p:cxnSp>
+        </p:grpSp>
+        <p:cxnSp>
+          <p:nvCxnSpPr>
+            <p:cNvPr id="5" name="Connecteur droit 4"/>
+            <p:cNvCxnSpPr/>
+            <p:nvPr/>
+          </p:nvCxnSpPr>
+          <p:spPr>
+            <a:xfrm>
+              <a:off x="7225685" y="3895494"/>
+              <a:ext cx="0" cy="783770"/>
+            </a:xfrm>
+            <a:prstGeom prst="line">
+              <a:avLst/>
+            </a:prstGeom>
+            <a:ln w="76200">
+              <a:solidFill>
+                <a:schemeClr val="tx1"/>
+              </a:solidFill>
+            </a:ln>
+          </p:spPr>
+          <p:style>
+            <a:lnRef idx="1">
+              <a:schemeClr val="accent1"/>
+            </a:lnRef>
+            <a:fillRef idx="0">
+              <a:schemeClr val="accent1"/>
+            </a:fillRef>
+            <a:effectRef idx="0">
+              <a:schemeClr val="accent1"/>
+            </a:effectRef>
+            <a:fontRef idx="minor">
+              <a:schemeClr val="tx1"/>
+            </a:fontRef>
+          </p:style>
+        </p:cxnSp>
+      </p:grpSp>
+      <p:grpSp>
+        <p:nvGrpSpPr>
+          <p:cNvPr id="7" name="Groupe 6"/>
+          <p:cNvGrpSpPr/>
+          <p:nvPr/>
+        </p:nvGrpSpPr>
+        <p:grpSpPr>
+          <a:xfrm>
+            <a:off x="655675" y="2721759"/>
+            <a:ext cx="3814618" cy="786818"/>
+            <a:chOff x="7184491" y="3895494"/>
+            <a:chExt cx="3814618" cy="786818"/>
+          </a:xfrm>
+        </p:grpSpPr>
+        <p:grpSp>
+          <p:nvGrpSpPr>
+            <p:cNvPr id="8" name="Groupe 7"/>
+            <p:cNvGrpSpPr/>
+            <p:nvPr/>
+          </p:nvGrpSpPr>
+          <p:grpSpPr>
+            <a:xfrm>
+              <a:off x="7184491" y="3898542"/>
+              <a:ext cx="3814618" cy="783770"/>
+              <a:chOff x="7332272" y="2942747"/>
+              <a:chExt cx="3814618" cy="783770"/>
+            </a:xfrm>
+          </p:grpSpPr>
+          <p:sp>
+            <p:nvSpPr>
+              <p:cNvPr id="10" name="Rectangle à coins arrondis 9"/>
+              <p:cNvSpPr/>
+              <p:nvPr/>
+            </p:nvSpPr>
+            <p:spPr>
+              <a:xfrm>
+                <a:off x="7332272" y="3050403"/>
+                <a:ext cx="3814618" cy="555757"/>
+              </a:xfrm>
+              <a:prstGeom prst="roundRect">
+                <a:avLst>
+                  <a:gd name="adj" fmla="val 0"/>
+                </a:avLst>
+              </a:prstGeom>
+              <a:noFill/>
+              <a:ln>
+                <a:solidFill>
+                  <a:schemeClr val="tx1"/>
+                </a:solidFill>
+              </a:ln>
+              <a:effectLst>
+                <a:outerShdw blurRad="127000" dist="38100" dir="5400000" algn="t" rotWithShape="0">
+                  <a:prstClr val="black">
+                    <a:alpha val="48000"/>
+                  </a:prstClr>
+                </a:outerShdw>
+              </a:effectLst>
+            </p:spPr>
+            <p:style>
+              <a:lnRef idx="2">
+                <a:schemeClr val="dk1">
+                  <a:shade val="50000"/>
+                </a:schemeClr>
+              </a:lnRef>
+              <a:fillRef idx="1">
+                <a:schemeClr val="dk1"/>
+              </a:fillRef>
+              <a:effectRef idx="0">
+                <a:schemeClr val="dk1"/>
+              </a:effectRef>
+              <a:fontRef idx="minor">
+                <a:schemeClr val="lt1"/>
+              </a:fontRef>
+            </p:style>
+            <p:txBody>
+              <a:bodyPr rtlCol="0" anchor="ctr"/>
+              <a:lstStyle/>
+              <a:p>
+                <a:pPr algn="ctr"/>
+                <a:r>
+                  <a:rPr lang="en-US" dirty="0" err="1" smtClean="0">
+                    <a:solidFill>
+                      <a:schemeClr val="tx1"/>
+                    </a:solidFill>
+                    <a:latin typeface="Segoe UI Black" panose="020B0A02040204020203" pitchFamily="34" charset="0"/>
+                    <a:ea typeface="Segoe UI Black" panose="020B0A02040204020203" pitchFamily="34" charset="0"/>
+                  </a:rPr>
+                  <a:t>En</a:t>
+                </a:r>
+                <a:r>
+                  <a:rPr lang="en-US" dirty="0" smtClean="0">
+                    <a:solidFill>
+                      <a:schemeClr val="tx1"/>
+                    </a:solidFill>
+                    <a:latin typeface="Segoe UI Black" panose="020B0A02040204020203" pitchFamily="34" charset="0"/>
+                    <a:ea typeface="Segoe UI Black" panose="020B0A02040204020203" pitchFamily="34" charset="0"/>
+                  </a:rPr>
+                  <a:t> </a:t>
+                </a:r>
+                <a:r>
+                  <a:rPr lang="en-US" dirty="0" err="1" smtClean="0">
+                    <a:solidFill>
+                      <a:schemeClr val="tx1"/>
+                    </a:solidFill>
+                    <a:latin typeface="Segoe UI Black" panose="020B0A02040204020203" pitchFamily="34" charset="0"/>
+                    <a:ea typeface="Segoe UI Black" panose="020B0A02040204020203" pitchFamily="34" charset="0"/>
+                  </a:rPr>
+                  <a:t>attente</a:t>
+                </a:r>
+                <a:r>
+                  <a:rPr lang="en-US" dirty="0" smtClean="0">
+                    <a:solidFill>
+                      <a:schemeClr val="tx1"/>
+                    </a:solidFill>
+                    <a:latin typeface="Segoe UI Black" panose="020B0A02040204020203" pitchFamily="34" charset="0"/>
+                    <a:ea typeface="Segoe UI Black" panose="020B0A02040204020203" pitchFamily="34" charset="0"/>
+                  </a:rPr>
+                  <a:t> de P1</a:t>
+                </a:r>
+                <a:endParaRPr lang="en-US" dirty="0">
+                  <a:solidFill>
+                    <a:schemeClr val="tx1"/>
+                  </a:solidFill>
+                  <a:latin typeface="Segoe UI Black" panose="020B0A02040204020203" pitchFamily="34" charset="0"/>
+                  <a:ea typeface="Segoe UI Black" panose="020B0A02040204020203" pitchFamily="34" charset="0"/>
+                </a:endParaRPr>
+              </a:p>
+            </p:txBody>
+          </p:sp>
+          <p:cxnSp>
+            <p:nvCxnSpPr>
+              <p:cNvPr id="11" name="Connecteur droit 10"/>
+              <p:cNvCxnSpPr/>
+              <p:nvPr/>
+            </p:nvCxnSpPr>
+            <p:spPr>
+              <a:xfrm>
+                <a:off x="11116410" y="2942747"/>
+                <a:ext cx="0" cy="783770"/>
+              </a:xfrm>
+              <a:prstGeom prst="line">
+                <a:avLst/>
+              </a:prstGeom>
+              <a:ln w="76200">
+                <a:solidFill>
+                  <a:schemeClr val="tx1"/>
+                </a:solidFill>
+              </a:ln>
+            </p:spPr>
+            <p:style>
+              <a:lnRef idx="1">
+                <a:schemeClr val="accent1"/>
+              </a:lnRef>
+              <a:fillRef idx="0">
+                <a:schemeClr val="accent1"/>
+              </a:fillRef>
+              <a:effectRef idx="0">
+                <a:schemeClr val="accent1"/>
+              </a:effectRef>
+              <a:fontRef idx="minor">
+                <a:schemeClr val="tx1"/>
+              </a:fontRef>
+            </p:style>
+          </p:cxnSp>
+        </p:grpSp>
+        <p:cxnSp>
+          <p:nvCxnSpPr>
+            <p:cNvPr id="9" name="Connecteur droit 8"/>
+            <p:cNvCxnSpPr/>
+            <p:nvPr/>
+          </p:nvCxnSpPr>
+          <p:spPr>
+            <a:xfrm>
+              <a:off x="7225685" y="3895494"/>
+              <a:ext cx="0" cy="783770"/>
+            </a:xfrm>
+            <a:prstGeom prst="line">
+              <a:avLst/>
+            </a:prstGeom>
+            <a:ln w="76200">
+              <a:solidFill>
+                <a:schemeClr val="tx1"/>
+              </a:solidFill>
+            </a:ln>
+          </p:spPr>
+          <p:style>
+            <a:lnRef idx="1">
+              <a:schemeClr val="accent1"/>
+            </a:lnRef>
+            <a:fillRef idx="0">
+              <a:schemeClr val="accent1"/>
+            </a:fillRef>
+            <a:effectRef idx="0">
+              <a:schemeClr val="accent1"/>
+            </a:effectRef>
+            <a:fontRef idx="minor">
+              <a:schemeClr val="tx1"/>
+            </a:fontRef>
+          </p:style>
+        </p:cxnSp>
+      </p:grpSp>
+      <p:grpSp>
+        <p:nvGrpSpPr>
+          <p:cNvPr id="17" name="Groupe 16"/>
+          <p:cNvGrpSpPr/>
+          <p:nvPr/>
+        </p:nvGrpSpPr>
+        <p:grpSpPr>
+          <a:xfrm>
+            <a:off x="655675" y="4959246"/>
+            <a:ext cx="3814618" cy="786818"/>
+            <a:chOff x="7184491" y="3895494"/>
+            <a:chExt cx="3814618" cy="786818"/>
+          </a:xfrm>
+        </p:grpSpPr>
+        <p:grpSp>
+          <p:nvGrpSpPr>
+            <p:cNvPr id="18" name="Groupe 17"/>
+            <p:cNvGrpSpPr/>
+            <p:nvPr/>
+          </p:nvGrpSpPr>
+          <p:grpSpPr>
+            <a:xfrm>
+              <a:off x="7184491" y="3898542"/>
+              <a:ext cx="3814618" cy="783770"/>
+              <a:chOff x="7332272" y="2942747"/>
+              <a:chExt cx="3814618" cy="783770"/>
+            </a:xfrm>
+          </p:grpSpPr>
+          <p:sp>
+            <p:nvSpPr>
+              <p:cNvPr id="20" name="Rectangle à coins arrondis 19"/>
+              <p:cNvSpPr/>
+              <p:nvPr/>
+            </p:nvSpPr>
+            <p:spPr>
+              <a:xfrm>
+                <a:off x="7332272" y="3050403"/>
+                <a:ext cx="3814618" cy="555757"/>
+              </a:xfrm>
+              <a:prstGeom prst="roundRect">
+                <a:avLst>
+                  <a:gd name="adj" fmla="val 0"/>
+                </a:avLst>
+              </a:prstGeom>
+              <a:noFill/>
+              <a:ln>
+                <a:solidFill>
+                  <a:schemeClr val="tx1">
+                    <a:lumMod val="95000"/>
+                    <a:lumOff val="5000"/>
+                  </a:schemeClr>
+                </a:solidFill>
+              </a:ln>
+              <a:effectLst>
+                <a:outerShdw blurRad="127000" dist="38100" dir="5400000" algn="t" rotWithShape="0">
+                  <a:prstClr val="black">
+                    <a:alpha val="48000"/>
+                  </a:prstClr>
+                </a:outerShdw>
+              </a:effectLst>
+            </p:spPr>
+            <p:style>
+              <a:lnRef idx="2">
+                <a:schemeClr val="dk1">
+                  <a:shade val="50000"/>
+                </a:schemeClr>
+              </a:lnRef>
+              <a:fillRef idx="1">
+                <a:schemeClr val="dk1"/>
+              </a:fillRef>
+              <a:effectRef idx="0">
+                <a:schemeClr val="dk1"/>
+              </a:effectRef>
+              <a:fontRef idx="minor">
+                <a:schemeClr val="lt1"/>
+              </a:fontRef>
+            </p:style>
+            <p:txBody>
+              <a:bodyPr rtlCol="0" anchor="ctr"/>
+              <a:lstStyle/>
+              <a:p>
+                <a:pPr algn="ctr"/>
+                <a:r>
+                  <a:rPr lang="en-US" dirty="0" err="1" smtClean="0">
+                    <a:solidFill>
+                      <a:schemeClr val="tx1"/>
+                    </a:solidFill>
+                    <a:latin typeface="Segoe UI Black" panose="020B0A02040204020203" pitchFamily="34" charset="0"/>
+                    <a:ea typeface="Segoe UI Black" panose="020B0A02040204020203" pitchFamily="34" charset="0"/>
+                  </a:rPr>
+                  <a:t>Turindiriye</a:t>
+                </a:r>
+                <a:r>
+                  <a:rPr lang="en-US" dirty="0" smtClean="0">
+                    <a:solidFill>
+                      <a:schemeClr val="tx1"/>
+                    </a:solidFill>
+                    <a:latin typeface="Segoe UI Black" panose="020B0A02040204020203" pitchFamily="34" charset="0"/>
+                    <a:ea typeface="Segoe UI Black" panose="020B0A02040204020203" pitchFamily="34" charset="0"/>
+                  </a:rPr>
+                  <a:t> </a:t>
+                </a:r>
+                <a:r>
+                  <a:rPr lang="en-US" dirty="0" err="1" smtClean="0">
+                    <a:solidFill>
+                      <a:schemeClr val="tx1"/>
+                    </a:solidFill>
+                    <a:latin typeface="Segoe UI Black" panose="020B0A02040204020203" pitchFamily="34" charset="0"/>
+                    <a:ea typeface="Segoe UI Black" panose="020B0A02040204020203" pitchFamily="34" charset="0"/>
+                  </a:rPr>
+                  <a:t>umukinyi</a:t>
+                </a:r>
+                <a:r>
+                  <a:rPr lang="en-US" dirty="0" smtClean="0">
+                    <a:solidFill>
+                      <a:schemeClr val="tx1"/>
+                    </a:solidFill>
+                    <a:latin typeface="Segoe UI Black" panose="020B0A02040204020203" pitchFamily="34" charset="0"/>
+                    <a:ea typeface="Segoe UI Black" panose="020B0A02040204020203" pitchFamily="34" charset="0"/>
+                  </a:rPr>
+                  <a:t> </a:t>
+                </a:r>
+                <a:r>
+                  <a:rPr lang="en-US" dirty="0" err="1" smtClean="0">
+                    <a:solidFill>
+                      <a:schemeClr val="tx1"/>
+                    </a:solidFill>
+                    <a:latin typeface="Segoe UI Black" panose="020B0A02040204020203" pitchFamily="34" charset="0"/>
+                    <a:ea typeface="Segoe UI Black" panose="020B0A02040204020203" pitchFamily="34" charset="0"/>
+                  </a:rPr>
+                  <a:t>wa</a:t>
+                </a:r>
+                <a:r>
+                  <a:rPr lang="en-US" dirty="0" smtClean="0">
+                    <a:solidFill>
+                      <a:schemeClr val="tx1"/>
+                    </a:solidFill>
+                    <a:latin typeface="Segoe UI Black" panose="020B0A02040204020203" pitchFamily="34" charset="0"/>
+                    <a:ea typeface="Segoe UI Black" panose="020B0A02040204020203" pitchFamily="34" charset="0"/>
+                  </a:rPr>
+                  <a:t> 1</a:t>
+                </a:r>
+                <a:endParaRPr lang="en-US" dirty="0">
+                  <a:solidFill>
+                    <a:schemeClr val="tx1"/>
+                  </a:solidFill>
+                  <a:latin typeface="Segoe UI Black" panose="020B0A02040204020203" pitchFamily="34" charset="0"/>
+                  <a:ea typeface="Segoe UI Black" panose="020B0A02040204020203" pitchFamily="34" charset="0"/>
+                </a:endParaRPr>
+              </a:p>
+            </p:txBody>
+          </p:sp>
+          <p:cxnSp>
+            <p:nvCxnSpPr>
+              <p:cNvPr id="21" name="Connecteur droit 20"/>
+              <p:cNvCxnSpPr/>
+              <p:nvPr/>
+            </p:nvCxnSpPr>
+            <p:spPr>
+              <a:xfrm>
+                <a:off x="11125554" y="2942747"/>
+                <a:ext cx="0" cy="783770"/>
+              </a:xfrm>
+              <a:prstGeom prst="line">
+                <a:avLst/>
+              </a:prstGeom>
+              <a:ln w="76200">
+                <a:solidFill>
+                  <a:schemeClr val="tx1"/>
+                </a:solidFill>
+              </a:ln>
+            </p:spPr>
+            <p:style>
+              <a:lnRef idx="1">
+                <a:schemeClr val="accent1"/>
+              </a:lnRef>
+              <a:fillRef idx="0">
+                <a:schemeClr val="accent1"/>
+              </a:fillRef>
+              <a:effectRef idx="0">
+                <a:schemeClr val="accent1"/>
+              </a:effectRef>
+              <a:fontRef idx="minor">
+                <a:schemeClr val="tx1"/>
+              </a:fontRef>
+            </p:style>
+          </p:cxnSp>
+        </p:grpSp>
+        <p:cxnSp>
+          <p:nvCxnSpPr>
+            <p:cNvPr id="19" name="Connecteur droit 18"/>
+            <p:cNvCxnSpPr/>
+            <p:nvPr/>
+          </p:nvCxnSpPr>
+          <p:spPr>
+            <a:xfrm>
+              <a:off x="7216541" y="3895494"/>
+              <a:ext cx="0" cy="783770"/>
+            </a:xfrm>
+            <a:prstGeom prst="line">
+              <a:avLst/>
+            </a:prstGeom>
+            <a:ln w="76200">
+              <a:solidFill>
+                <a:schemeClr val="tx1"/>
+              </a:solidFill>
+            </a:ln>
+          </p:spPr>
+          <p:style>
+            <a:lnRef idx="1">
+              <a:schemeClr val="accent1"/>
+            </a:lnRef>
+            <a:fillRef idx="0">
+              <a:schemeClr val="accent1"/>
+            </a:fillRef>
+            <a:effectRef idx="0">
+              <a:schemeClr val="accent1"/>
+            </a:effectRef>
+            <a:fontRef idx="minor">
+              <a:schemeClr val="tx1"/>
+            </a:fontRef>
+          </p:style>
+        </p:cxnSp>
+      </p:grpSp>
+      <p:grpSp>
+        <p:nvGrpSpPr>
+          <p:cNvPr id="22" name="Groupe 21"/>
+          <p:cNvGrpSpPr/>
+          <p:nvPr/>
+        </p:nvGrpSpPr>
+        <p:grpSpPr>
+          <a:xfrm>
+            <a:off x="6614515" y="373569"/>
+            <a:ext cx="3814618" cy="786818"/>
+            <a:chOff x="7184491" y="3895494"/>
+            <a:chExt cx="3814618" cy="786818"/>
+          </a:xfrm>
+        </p:grpSpPr>
+        <p:grpSp>
+          <p:nvGrpSpPr>
+            <p:cNvPr id="23" name="Groupe 22"/>
+            <p:cNvGrpSpPr/>
+            <p:nvPr/>
+          </p:nvGrpSpPr>
+          <p:grpSpPr>
+            <a:xfrm>
+              <a:off x="7184491" y="3898542"/>
+              <a:ext cx="3814618" cy="783770"/>
+              <a:chOff x="7332272" y="2942747"/>
+              <a:chExt cx="3814618" cy="783770"/>
+            </a:xfrm>
+          </p:grpSpPr>
+          <p:sp>
+            <p:nvSpPr>
+              <p:cNvPr id="25" name="Rectangle à coins arrondis 24"/>
+              <p:cNvSpPr/>
+              <p:nvPr/>
+            </p:nvSpPr>
+            <p:spPr>
+              <a:xfrm>
+                <a:off x="7332272" y="3050403"/>
+                <a:ext cx="3814618" cy="555757"/>
+              </a:xfrm>
+              <a:prstGeom prst="roundRect">
+                <a:avLst>
+                  <a:gd name="adj" fmla="val 0"/>
+                </a:avLst>
+              </a:prstGeom>
+              <a:noFill/>
+              <a:ln>
+                <a:solidFill>
+                  <a:schemeClr val="tx1">
+                    <a:lumMod val="95000"/>
+                    <a:lumOff val="5000"/>
+                  </a:schemeClr>
+                </a:solidFill>
+              </a:ln>
+              <a:effectLst>
+                <a:outerShdw blurRad="127000" dist="38100" dir="5400000" algn="t" rotWithShape="0">
+                  <a:prstClr val="black">
+                    <a:alpha val="48000"/>
+                  </a:prstClr>
+                </a:outerShdw>
+              </a:effectLst>
+            </p:spPr>
+            <p:style>
+              <a:lnRef idx="2">
+                <a:schemeClr val="dk1">
+                  <a:shade val="50000"/>
+                </a:schemeClr>
+              </a:lnRef>
+              <a:fillRef idx="1">
+                <a:schemeClr val="dk1"/>
+              </a:fillRef>
+              <a:effectRef idx="0">
+                <a:schemeClr val="dk1"/>
+              </a:effectRef>
+              <a:fontRef idx="minor">
+                <a:schemeClr val="lt1"/>
+              </a:fontRef>
+            </p:style>
+            <p:txBody>
+              <a:bodyPr rtlCol="0" anchor="ctr"/>
+              <a:lstStyle/>
+              <a:p>
+                <a:pPr algn="ctr"/>
+                <a:r>
+                  <a:rPr lang="en-US" dirty="0" smtClean="0">
+                    <a:solidFill>
+                      <a:schemeClr val="tx1"/>
+                    </a:solidFill>
+                    <a:latin typeface="Segoe UI Black" panose="020B0A02040204020203" pitchFamily="34" charset="0"/>
+                    <a:ea typeface="Segoe UI Black" panose="020B0A02040204020203" pitchFamily="34" charset="0"/>
+                  </a:rPr>
+                  <a:t>Waiting for P2</a:t>
+                </a:r>
+                <a:endParaRPr lang="en-US" dirty="0">
+                  <a:solidFill>
+                    <a:schemeClr val="tx1"/>
+                  </a:solidFill>
+                  <a:latin typeface="Segoe UI Black" panose="020B0A02040204020203" pitchFamily="34" charset="0"/>
+                  <a:ea typeface="Segoe UI Black" panose="020B0A02040204020203" pitchFamily="34" charset="0"/>
+                </a:endParaRPr>
+              </a:p>
+            </p:txBody>
+          </p:sp>
+          <p:cxnSp>
+            <p:nvCxnSpPr>
+              <p:cNvPr id="26" name="Connecteur droit 25"/>
+              <p:cNvCxnSpPr/>
+              <p:nvPr/>
+            </p:nvCxnSpPr>
+            <p:spPr>
+              <a:xfrm>
+                <a:off x="11125554" y="2942747"/>
+                <a:ext cx="0" cy="783770"/>
+              </a:xfrm>
+              <a:prstGeom prst="line">
+                <a:avLst/>
+              </a:prstGeom>
+              <a:ln w="76200">
+                <a:solidFill>
+                  <a:schemeClr val="tx1"/>
+                </a:solidFill>
+              </a:ln>
+            </p:spPr>
+            <p:style>
+              <a:lnRef idx="1">
+                <a:schemeClr val="accent1"/>
+              </a:lnRef>
+              <a:fillRef idx="0">
+                <a:schemeClr val="accent1"/>
+              </a:fillRef>
+              <a:effectRef idx="0">
+                <a:schemeClr val="accent1"/>
+              </a:effectRef>
+              <a:fontRef idx="minor">
+                <a:schemeClr val="tx1"/>
+              </a:fontRef>
+            </p:style>
+          </p:cxnSp>
+        </p:grpSp>
+        <p:cxnSp>
+          <p:nvCxnSpPr>
+            <p:cNvPr id="24" name="Connecteur droit 23"/>
+            <p:cNvCxnSpPr/>
+            <p:nvPr/>
+          </p:nvCxnSpPr>
+          <p:spPr>
+            <a:xfrm>
+              <a:off x="7216541" y="3895494"/>
+              <a:ext cx="0" cy="783770"/>
+            </a:xfrm>
+            <a:prstGeom prst="line">
+              <a:avLst/>
+            </a:prstGeom>
+            <a:ln w="76200">
+              <a:solidFill>
+                <a:schemeClr val="tx1"/>
+              </a:solidFill>
+            </a:ln>
+          </p:spPr>
+          <p:style>
+            <a:lnRef idx="1">
+              <a:schemeClr val="accent1"/>
+            </a:lnRef>
+            <a:fillRef idx="0">
+              <a:schemeClr val="accent1"/>
+            </a:fillRef>
+            <a:effectRef idx="0">
+              <a:schemeClr val="accent1"/>
+            </a:effectRef>
+            <a:fontRef idx="minor">
+              <a:schemeClr val="tx1"/>
+            </a:fontRef>
+          </p:style>
+        </p:cxnSp>
+      </p:grpSp>
+      <p:grpSp>
+        <p:nvGrpSpPr>
+          <p:cNvPr id="27" name="Groupe 26"/>
+          <p:cNvGrpSpPr/>
+          <p:nvPr/>
+        </p:nvGrpSpPr>
+        <p:grpSpPr>
+          <a:xfrm>
+            <a:off x="6614515" y="2601402"/>
+            <a:ext cx="3814618" cy="786818"/>
+            <a:chOff x="7184491" y="3895494"/>
+            <a:chExt cx="3814618" cy="786818"/>
+          </a:xfrm>
+        </p:grpSpPr>
+        <p:grpSp>
+          <p:nvGrpSpPr>
+            <p:cNvPr id="28" name="Groupe 27"/>
+            <p:cNvGrpSpPr/>
+            <p:nvPr/>
+          </p:nvGrpSpPr>
+          <p:grpSpPr>
+            <a:xfrm>
+              <a:off x="7184491" y="3898542"/>
+              <a:ext cx="3814618" cy="783770"/>
+              <a:chOff x="7332272" y="2942747"/>
+              <a:chExt cx="3814618" cy="783770"/>
+            </a:xfrm>
+          </p:grpSpPr>
+          <p:sp>
+            <p:nvSpPr>
+              <p:cNvPr id="30" name="Rectangle à coins arrondis 29"/>
+              <p:cNvSpPr/>
+              <p:nvPr/>
+            </p:nvSpPr>
+            <p:spPr>
+              <a:xfrm>
+                <a:off x="7332272" y="3050403"/>
+                <a:ext cx="3814618" cy="555757"/>
+              </a:xfrm>
+              <a:prstGeom prst="roundRect">
+                <a:avLst>
+                  <a:gd name="adj" fmla="val 0"/>
+                </a:avLst>
+              </a:prstGeom>
+              <a:noFill/>
+              <a:ln>
+                <a:solidFill>
+                  <a:schemeClr val="tx1"/>
+                </a:solidFill>
+              </a:ln>
+              <a:effectLst>
+                <a:outerShdw blurRad="127000" dist="38100" dir="5400000" algn="t" rotWithShape="0">
+                  <a:prstClr val="black">
+                    <a:alpha val="48000"/>
+                  </a:prstClr>
+                </a:outerShdw>
+              </a:effectLst>
+            </p:spPr>
+            <p:style>
+              <a:lnRef idx="2">
+                <a:schemeClr val="dk1">
+                  <a:shade val="50000"/>
+                </a:schemeClr>
+              </a:lnRef>
+              <a:fillRef idx="1">
+                <a:schemeClr val="dk1"/>
+              </a:fillRef>
+              <a:effectRef idx="0">
+                <a:schemeClr val="dk1"/>
+              </a:effectRef>
+              <a:fontRef idx="minor">
+                <a:schemeClr val="lt1"/>
+              </a:fontRef>
+            </p:style>
+            <p:txBody>
+              <a:bodyPr rtlCol="0" anchor="ctr"/>
+              <a:lstStyle/>
+              <a:p>
+                <a:pPr algn="ctr"/>
+                <a:r>
+                  <a:rPr lang="en-US" dirty="0" err="1" smtClean="0">
+                    <a:solidFill>
+                      <a:schemeClr val="tx1"/>
+                    </a:solidFill>
+                    <a:latin typeface="Segoe UI Black" panose="020B0A02040204020203" pitchFamily="34" charset="0"/>
+                    <a:ea typeface="Segoe UI Black" panose="020B0A02040204020203" pitchFamily="34" charset="0"/>
+                  </a:rPr>
+                  <a:t>En</a:t>
+                </a:r>
+                <a:r>
+                  <a:rPr lang="en-US" dirty="0" smtClean="0">
+                    <a:solidFill>
+                      <a:schemeClr val="tx1"/>
+                    </a:solidFill>
+                    <a:latin typeface="Segoe UI Black" panose="020B0A02040204020203" pitchFamily="34" charset="0"/>
+                    <a:ea typeface="Segoe UI Black" panose="020B0A02040204020203" pitchFamily="34" charset="0"/>
+                  </a:rPr>
+                  <a:t> </a:t>
+                </a:r>
+                <a:r>
+                  <a:rPr lang="en-US" dirty="0" err="1" smtClean="0">
+                    <a:solidFill>
+                      <a:schemeClr val="tx1"/>
+                    </a:solidFill>
+                    <a:latin typeface="Segoe UI Black" panose="020B0A02040204020203" pitchFamily="34" charset="0"/>
+                    <a:ea typeface="Segoe UI Black" panose="020B0A02040204020203" pitchFamily="34" charset="0"/>
+                  </a:rPr>
+                  <a:t>attente</a:t>
+                </a:r>
+                <a:r>
+                  <a:rPr lang="en-US" dirty="0" smtClean="0">
+                    <a:solidFill>
+                      <a:schemeClr val="tx1"/>
+                    </a:solidFill>
+                    <a:latin typeface="Segoe UI Black" panose="020B0A02040204020203" pitchFamily="34" charset="0"/>
+                    <a:ea typeface="Segoe UI Black" panose="020B0A02040204020203" pitchFamily="34" charset="0"/>
+                  </a:rPr>
+                  <a:t> de P2</a:t>
+                </a:r>
+                <a:endParaRPr lang="en-US" dirty="0">
+                  <a:solidFill>
+                    <a:schemeClr val="tx1"/>
+                  </a:solidFill>
+                  <a:latin typeface="Segoe UI Black" panose="020B0A02040204020203" pitchFamily="34" charset="0"/>
+                  <a:ea typeface="Segoe UI Black" panose="020B0A02040204020203" pitchFamily="34" charset="0"/>
+                </a:endParaRPr>
+              </a:p>
+            </p:txBody>
+          </p:sp>
+          <p:cxnSp>
+            <p:nvCxnSpPr>
+              <p:cNvPr id="31" name="Connecteur droit 30"/>
+              <p:cNvCxnSpPr/>
+              <p:nvPr/>
+            </p:nvCxnSpPr>
+            <p:spPr>
+              <a:xfrm>
+                <a:off x="11125554" y="2942747"/>
+                <a:ext cx="0" cy="783770"/>
+              </a:xfrm>
+              <a:prstGeom prst="line">
+                <a:avLst/>
+              </a:prstGeom>
+              <a:ln w="76200">
+                <a:solidFill>
+                  <a:schemeClr val="tx1"/>
+                </a:solidFill>
+              </a:ln>
+            </p:spPr>
+            <p:style>
+              <a:lnRef idx="1">
+                <a:schemeClr val="accent1"/>
+              </a:lnRef>
+              <a:fillRef idx="0">
+                <a:schemeClr val="accent1"/>
+              </a:fillRef>
+              <a:effectRef idx="0">
+                <a:schemeClr val="accent1"/>
+              </a:effectRef>
+              <a:fontRef idx="minor">
+                <a:schemeClr val="tx1"/>
+              </a:fontRef>
+            </p:style>
+          </p:cxnSp>
+        </p:grpSp>
+        <p:cxnSp>
+          <p:nvCxnSpPr>
+            <p:cNvPr id="29" name="Connecteur droit 28"/>
+            <p:cNvCxnSpPr/>
+            <p:nvPr/>
+          </p:nvCxnSpPr>
+          <p:spPr>
+            <a:xfrm>
+              <a:off x="7216541" y="3895494"/>
+              <a:ext cx="0" cy="783770"/>
+            </a:xfrm>
+            <a:prstGeom prst="line">
+              <a:avLst/>
+            </a:prstGeom>
+            <a:ln w="76200">
+              <a:solidFill>
+                <a:schemeClr val="tx1"/>
+              </a:solidFill>
+            </a:ln>
+          </p:spPr>
+          <p:style>
+            <a:lnRef idx="1">
+              <a:schemeClr val="accent1"/>
+            </a:lnRef>
+            <a:fillRef idx="0">
+              <a:schemeClr val="accent1"/>
+            </a:fillRef>
+            <a:effectRef idx="0">
+              <a:schemeClr val="accent1"/>
+            </a:effectRef>
+            <a:fontRef idx="minor">
+              <a:schemeClr val="tx1"/>
+            </a:fontRef>
+          </p:style>
+        </p:cxnSp>
+      </p:grpSp>
+      <p:grpSp>
+        <p:nvGrpSpPr>
+          <p:cNvPr id="32" name="Groupe 31"/>
+          <p:cNvGrpSpPr/>
+          <p:nvPr/>
+        </p:nvGrpSpPr>
+        <p:grpSpPr>
+          <a:xfrm>
+            <a:off x="6614515" y="4838889"/>
+            <a:ext cx="3814618" cy="786818"/>
+            <a:chOff x="7184491" y="3895494"/>
+            <a:chExt cx="3814618" cy="786818"/>
+          </a:xfrm>
+        </p:grpSpPr>
+        <p:grpSp>
+          <p:nvGrpSpPr>
+            <p:cNvPr id="33" name="Groupe 32"/>
+            <p:cNvGrpSpPr/>
+            <p:nvPr/>
+          </p:nvGrpSpPr>
+          <p:grpSpPr>
+            <a:xfrm>
+              <a:off x="7184491" y="3898542"/>
+              <a:ext cx="3814618" cy="783770"/>
+              <a:chOff x="7332272" y="2942747"/>
+              <a:chExt cx="3814618" cy="783770"/>
+            </a:xfrm>
+          </p:grpSpPr>
+          <p:sp>
+            <p:nvSpPr>
+              <p:cNvPr id="35" name="Rectangle à coins arrondis 34"/>
+              <p:cNvSpPr/>
+              <p:nvPr/>
+            </p:nvSpPr>
+            <p:spPr>
+              <a:xfrm>
+                <a:off x="7332272" y="3050403"/>
+                <a:ext cx="3814618" cy="555757"/>
+              </a:xfrm>
+              <a:prstGeom prst="roundRect">
+                <a:avLst>
+                  <a:gd name="adj" fmla="val 0"/>
+                </a:avLst>
+              </a:prstGeom>
+              <a:noFill/>
+              <a:ln>
+                <a:solidFill>
+                  <a:schemeClr val="tx1">
+                    <a:lumMod val="95000"/>
+                    <a:lumOff val="5000"/>
+                  </a:schemeClr>
+                </a:solidFill>
+              </a:ln>
+              <a:effectLst>
+                <a:outerShdw blurRad="127000" dist="38100" dir="5400000" algn="t" rotWithShape="0">
+                  <a:prstClr val="black">
+                    <a:alpha val="48000"/>
+                  </a:prstClr>
+                </a:outerShdw>
+              </a:effectLst>
+            </p:spPr>
+            <p:style>
+              <a:lnRef idx="2">
+                <a:schemeClr val="dk1">
+                  <a:shade val="50000"/>
+                </a:schemeClr>
+              </a:lnRef>
+              <a:fillRef idx="1">
+                <a:schemeClr val="dk1"/>
+              </a:fillRef>
+              <a:effectRef idx="0">
+                <a:schemeClr val="dk1"/>
+              </a:effectRef>
+              <a:fontRef idx="minor">
+                <a:schemeClr val="lt1"/>
+              </a:fontRef>
+            </p:style>
+            <p:txBody>
+              <a:bodyPr rtlCol="0" anchor="ctr"/>
+              <a:lstStyle/>
+              <a:p>
+                <a:pPr algn="ctr"/>
+                <a:r>
+                  <a:rPr lang="en-US" dirty="0" err="1" smtClean="0">
+                    <a:solidFill>
+                      <a:schemeClr val="tx1"/>
+                    </a:solidFill>
+                    <a:latin typeface="Segoe UI Black" panose="020B0A02040204020203" pitchFamily="34" charset="0"/>
+                    <a:ea typeface="Segoe UI Black" panose="020B0A02040204020203" pitchFamily="34" charset="0"/>
+                  </a:rPr>
+                  <a:t>Turindiriye</a:t>
+                </a:r>
+                <a:r>
+                  <a:rPr lang="en-US" dirty="0" smtClean="0">
+                    <a:solidFill>
+                      <a:schemeClr val="tx1"/>
+                    </a:solidFill>
+                    <a:latin typeface="Segoe UI Black" panose="020B0A02040204020203" pitchFamily="34" charset="0"/>
+                    <a:ea typeface="Segoe UI Black" panose="020B0A02040204020203" pitchFamily="34" charset="0"/>
+                  </a:rPr>
+                  <a:t> </a:t>
+                </a:r>
+                <a:r>
+                  <a:rPr lang="en-US" dirty="0" err="1" smtClean="0">
+                    <a:solidFill>
+                      <a:schemeClr val="tx1"/>
+                    </a:solidFill>
+                    <a:latin typeface="Segoe UI Black" panose="020B0A02040204020203" pitchFamily="34" charset="0"/>
+                    <a:ea typeface="Segoe UI Black" panose="020B0A02040204020203" pitchFamily="34" charset="0"/>
+                  </a:rPr>
+                  <a:t>umukinyi</a:t>
+                </a:r>
+                <a:r>
+                  <a:rPr lang="en-US" dirty="0" smtClean="0">
+                    <a:solidFill>
+                      <a:schemeClr val="tx1"/>
+                    </a:solidFill>
+                    <a:latin typeface="Segoe UI Black" panose="020B0A02040204020203" pitchFamily="34" charset="0"/>
+                    <a:ea typeface="Segoe UI Black" panose="020B0A02040204020203" pitchFamily="34" charset="0"/>
+                  </a:rPr>
+                  <a:t> </a:t>
+                </a:r>
+                <a:r>
+                  <a:rPr lang="en-US" dirty="0" err="1" smtClean="0">
+                    <a:solidFill>
+                      <a:schemeClr val="tx1"/>
+                    </a:solidFill>
+                    <a:latin typeface="Segoe UI Black" panose="020B0A02040204020203" pitchFamily="34" charset="0"/>
+                    <a:ea typeface="Segoe UI Black" panose="020B0A02040204020203" pitchFamily="34" charset="0"/>
+                  </a:rPr>
+                  <a:t>wa</a:t>
+                </a:r>
+                <a:r>
+                  <a:rPr lang="en-US" dirty="0" smtClean="0">
+                    <a:solidFill>
+                      <a:schemeClr val="tx1"/>
+                    </a:solidFill>
+                    <a:latin typeface="Segoe UI Black" panose="020B0A02040204020203" pitchFamily="34" charset="0"/>
+                    <a:ea typeface="Segoe UI Black" panose="020B0A02040204020203" pitchFamily="34" charset="0"/>
+                  </a:rPr>
+                  <a:t> 2</a:t>
+                </a:r>
+                <a:endParaRPr lang="en-US" dirty="0">
+                  <a:solidFill>
+                    <a:schemeClr val="tx1"/>
+                  </a:solidFill>
+                  <a:latin typeface="Segoe UI Black" panose="020B0A02040204020203" pitchFamily="34" charset="0"/>
+                  <a:ea typeface="Segoe UI Black" panose="020B0A02040204020203" pitchFamily="34" charset="0"/>
+                </a:endParaRPr>
+              </a:p>
+            </p:txBody>
+          </p:sp>
+          <p:cxnSp>
+            <p:nvCxnSpPr>
+              <p:cNvPr id="36" name="Connecteur droit 35"/>
+              <p:cNvCxnSpPr/>
+              <p:nvPr/>
+            </p:nvCxnSpPr>
+            <p:spPr>
+              <a:xfrm>
+                <a:off x="11125554" y="2942747"/>
+                <a:ext cx="0" cy="783770"/>
+              </a:xfrm>
+              <a:prstGeom prst="line">
+                <a:avLst/>
+              </a:prstGeom>
+              <a:ln w="76200">
+                <a:solidFill>
+                  <a:schemeClr val="tx1"/>
+                </a:solidFill>
+              </a:ln>
+            </p:spPr>
+            <p:style>
+              <a:lnRef idx="1">
+                <a:schemeClr val="accent1"/>
+              </a:lnRef>
+              <a:fillRef idx="0">
+                <a:schemeClr val="accent1"/>
+              </a:fillRef>
+              <a:effectRef idx="0">
+                <a:schemeClr val="accent1"/>
+              </a:effectRef>
+              <a:fontRef idx="minor">
+                <a:schemeClr val="tx1"/>
+              </a:fontRef>
+            </p:style>
+          </p:cxnSp>
+        </p:grpSp>
+        <p:cxnSp>
+          <p:nvCxnSpPr>
+            <p:cNvPr id="34" name="Connecteur droit 33"/>
+            <p:cNvCxnSpPr/>
+            <p:nvPr/>
+          </p:nvCxnSpPr>
+          <p:spPr>
+            <a:xfrm>
+              <a:off x="7216541" y="3895494"/>
+              <a:ext cx="0" cy="783770"/>
+            </a:xfrm>
+            <a:prstGeom prst="line">
+              <a:avLst/>
+            </a:prstGeom>
+            <a:ln w="76200">
+              <a:solidFill>
+                <a:schemeClr val="tx1"/>
+              </a:solidFill>
+            </a:ln>
+          </p:spPr>
+          <p:style>
+            <a:lnRef idx="1">
+              <a:schemeClr val="accent1"/>
+            </a:lnRef>
+            <a:fillRef idx="0">
+              <a:schemeClr val="accent1"/>
+            </a:fillRef>
+            <a:effectRef idx="0">
+              <a:schemeClr val="accent1"/>
+            </a:effectRef>
+            <a:fontRef idx="minor">
+              <a:schemeClr val="tx1"/>
+            </a:fontRef>
+          </p:style>
+        </p:cxnSp>
+      </p:grpSp>
     </p:spTree>
     <p:extLst>
       <p:ext uri="{BB962C8B-B14F-4D97-AF65-F5344CB8AC3E}">

</xml_diff>

<commit_message>
updated : online event handler + minor refactoring
</commit_message>
<xml_diff>
--- a/assets/buttons.pptx
+++ b/assets/buttons.pptx
@@ -12507,7 +12507,7 @@
       </p:sp>
       <p:pic>
         <p:nvPicPr>
-          <p:cNvPr id="28" name="Image 27"/>
+          <p:cNvPr id="30" name="Image 29"/>
           <p:cNvPicPr>
             <a:picLocks noChangeAspect="1"/>
           </p:cNvPicPr>
@@ -12515,13 +12515,59 @@
         </p:nvPicPr>
         <p:blipFill rotWithShape="1">
           <a:blip r:embed="rId2" cstate="print">
-            <a:biLevel thresh="25000"/>
             <a:extLst>
               <a:ext uri="{BEBA8EAE-BF5A-486C-A8C5-ECC9F3942E4B}">
                 <a14:imgProps xmlns:a14="http://schemas.microsoft.com/office/drawing/2010/main">
                   <a14:imgLayer r:embed="rId3">
                     <a14:imgEffect>
                       <a14:sharpenSoften amount="100000"/>
+                    </a14:imgEffect>
+                    <a14:imgEffect>
+                      <a14:saturation sat="224000"/>
+                    </a14:imgEffect>
+                    <a14:imgEffect>
+                      <a14:brightnessContrast bright="100000" contrast="100000"/>
+                    </a14:imgEffect>
+                  </a14:imgLayer>
+                </a14:imgProps>
+              </a:ext>
+              <a:ext uri="{28A0092B-C50C-407E-A947-70E740481C1C}">
+                <a14:useLocalDpi xmlns:a14="http://schemas.microsoft.com/office/drawing/2010/main" val="0"/>
+              </a:ext>
+            </a:extLst>
+          </a:blip>
+          <a:srcRect t="4275" b="4275"/>
+          <a:stretch/>
+        </p:blipFill>
+        <p:spPr>
+          <a:xfrm>
+            <a:off x="1680897" y="5858134"/>
+            <a:ext cx="370133" cy="338483"/>
+          </a:xfrm>
+          <a:prstGeom prst="rect">
+            <a:avLst/>
+          </a:prstGeom>
+        </p:spPr>
+      </p:pic>
+      <p:pic>
+        <p:nvPicPr>
+          <p:cNvPr id="31" name="Image 30"/>
+          <p:cNvPicPr>
+            <a:picLocks noChangeAspect="1"/>
+          </p:cNvPicPr>
+          <p:nvPr/>
+        </p:nvPicPr>
+        <p:blipFill rotWithShape="1">
+          <a:blip r:embed="rId4" cstate="print">
+            <a:extLst>
+              <a:ext uri="{BEBA8EAE-BF5A-486C-A8C5-ECC9F3942E4B}">
+                <a14:imgProps xmlns:a14="http://schemas.microsoft.com/office/drawing/2010/main">
+                  <a14:imgLayer r:embed="rId3">
+                    <a14:imgEffect>
+                      <a14:sharpenSoften amount="100000"/>
+                    </a14:imgEffect>
+                    <a14:imgEffect>
+                      <a14:saturation sat="224000"/>
                     </a14:imgEffect>
                     <a14:imgEffect>
                       <a14:brightnessContrast bright="100000" contrast="-100000"/>
@@ -12539,49 +12585,7 @@
         </p:blipFill>
         <p:spPr>
           <a:xfrm>
-            <a:off x="1680897" y="5858134"/>
-            <a:ext cx="370133" cy="338483"/>
-          </a:xfrm>
-          <a:prstGeom prst="rect">
-            <a:avLst/>
-          </a:prstGeom>
-        </p:spPr>
-      </p:pic>
-      <p:pic>
-        <p:nvPicPr>
-          <p:cNvPr id="29" name="Image 28"/>
-          <p:cNvPicPr>
-            <a:picLocks noChangeAspect="1"/>
-          </p:cNvPicPr>
-          <p:nvPr/>
-        </p:nvPicPr>
-        <p:blipFill rotWithShape="1">
-          <a:blip r:embed="rId2" cstate="print">
-            <a:grayscl/>
-            <a:extLst>
-              <a:ext uri="{BEBA8EAE-BF5A-486C-A8C5-ECC9F3942E4B}">
-                <a14:imgProps xmlns:a14="http://schemas.microsoft.com/office/drawing/2010/main">
-                  <a14:imgLayer r:embed="rId3">
-                    <a14:imgEffect>
-                      <a14:sharpenSoften amount="100000"/>
-                    </a14:imgEffect>
-                    <a14:imgEffect>
-                      <a14:brightnessContrast bright="100000" contrast="-100000"/>
-                    </a14:imgEffect>
-                  </a14:imgLayer>
-                </a14:imgProps>
-              </a:ext>
-              <a:ext uri="{28A0092B-C50C-407E-A947-70E740481C1C}">
-                <a14:useLocalDpi xmlns:a14="http://schemas.microsoft.com/office/drawing/2010/main" val="0"/>
-              </a:ext>
-            </a:extLst>
-          </a:blip>
-          <a:srcRect t="4275" b="4275"/>
-          <a:stretch/>
-        </p:blipFill>
-        <p:spPr>
-          <a:xfrm>
-            <a:off x="4765843" y="5850082"/>
+            <a:off x="4766070" y="5860674"/>
             <a:ext cx="370133" cy="338483"/>
           </a:xfrm>
           <a:prstGeom prst="rect">
@@ -14065,7 +14069,7 @@
       </p:pic>
       <p:pic>
         <p:nvPicPr>
-          <p:cNvPr id="37" name="Image 36"/>
+          <p:cNvPr id="38" name="Image 37"/>
           <p:cNvPicPr>
             <a:picLocks noChangeAspect="1"/>
           </p:cNvPicPr>
@@ -14073,7 +14077,6 @@
         </p:nvPicPr>
         <p:blipFill rotWithShape="1">
           <a:blip r:embed="rId3" cstate="print">
-            <a:biLevel thresh="25000"/>
             <a:extLst>
               <a:ext uri="{BEBA8EAE-BF5A-486C-A8C5-ECC9F3942E4B}">
                 <a14:imgProps xmlns:a14="http://schemas.microsoft.com/office/drawing/2010/main">
@@ -14082,7 +14085,10 @@
                       <a14:sharpenSoften amount="100000"/>
                     </a14:imgEffect>
                     <a14:imgEffect>
-                      <a14:brightnessContrast bright="100000" contrast="-100000"/>
+                      <a14:saturation sat="224000"/>
+                    </a14:imgEffect>
+                    <a14:imgEffect>
+                      <a14:brightnessContrast bright="100000" contrast="100000"/>
                     </a14:imgEffect>
                   </a14:imgLayer>
                 </a14:imgProps>
@@ -14097,7 +14103,7 @@
         </p:blipFill>
         <p:spPr>
           <a:xfrm>
-            <a:off x="4869354" y="5202340"/>
+            <a:off x="4869354" y="5194559"/>
             <a:ext cx="370133" cy="338483"/>
           </a:xfrm>
           <a:prstGeom prst="rect">
@@ -14143,11 +14149,14 @@
         </p:nvGrpSpPr>
         <p:grpSpPr>
           <a:xfrm>
-            <a:off x="655675" y="493926"/>
+            <a:off x="1359868" y="2282927"/>
             <a:ext cx="3814618" cy="786818"/>
             <a:chOff x="7184491" y="3895494"/>
             <a:chExt cx="3814618" cy="786818"/>
           </a:xfrm>
+          <a:solidFill>
+            <a:schemeClr val="bg1"/>
+          </a:solidFill>
         </p:grpSpPr>
         <p:grpSp>
           <p:nvGrpSpPr>
@@ -14162,6 +14171,7 @@
               <a:chOff x="7332272" y="2942747"/>
               <a:chExt cx="3814618" cy="783770"/>
             </a:xfrm>
+            <a:grpFill/>
           </p:grpSpPr>
           <p:sp>
             <p:nvSpPr>
@@ -14179,7 +14189,7 @@
                   <a:gd name="adj" fmla="val 0"/>
                 </a:avLst>
               </a:prstGeom>
-              <a:noFill/>
+              <a:grpFill/>
               <a:ln>
                 <a:solidFill>
                   <a:schemeClr val="tx1">
@@ -14251,6 +14261,7 @@
               <a:prstGeom prst="line">
                 <a:avLst/>
               </a:prstGeom>
+              <a:grpFill/>
               <a:ln w="76200">
                 <a:solidFill>
                   <a:schemeClr val="tx1"/>
@@ -14281,12 +14292,13 @@
           </p:nvCxnSpPr>
           <p:spPr>
             <a:xfrm>
-              <a:off x="7225685" y="3895494"/>
+              <a:off x="7215175" y="3895494"/>
               <a:ext cx="0" cy="783770"/>
             </a:xfrm>
             <a:prstGeom prst="line">
               <a:avLst/>
             </a:prstGeom>
+            <a:grpFill/>
             <a:ln w="76200">
               <a:solidFill>
                 <a:schemeClr val="tx1"/>
@@ -14317,11 +14329,21 @@
         </p:nvGrpSpPr>
         <p:grpSpPr>
           <a:xfrm>
-            <a:off x="655675" y="2721759"/>
+            <a:off x="1359868" y="3709732"/>
             <a:ext cx="3814618" cy="786818"/>
             <a:chOff x="7184491" y="3895494"/>
             <a:chExt cx="3814618" cy="786818"/>
           </a:xfrm>
+          <a:solidFill>
+            <a:schemeClr val="bg1"/>
+          </a:solidFill>
+          <a:effectLst>
+            <a:outerShdw blurRad="50800" dist="38100" dir="5400000" algn="t" rotWithShape="0">
+              <a:prstClr val="black">
+                <a:alpha val="40000"/>
+              </a:prstClr>
+            </a:outerShdw>
+          </a:effectLst>
         </p:grpSpPr>
         <p:grpSp>
           <p:nvGrpSpPr>
@@ -14336,6 +14358,7 @@
               <a:chOff x="7332272" y="2942747"/>
               <a:chExt cx="3814618" cy="783770"/>
             </a:xfrm>
+            <a:grpFill/>
           </p:grpSpPr>
           <p:sp>
             <p:nvSpPr>
@@ -14353,7 +14376,7 @@
                   <a:gd name="adj" fmla="val 0"/>
                 </a:avLst>
               </a:prstGeom>
-              <a:noFill/>
+              <a:grpFill/>
               <a:ln>
                 <a:solidFill>
                   <a:schemeClr val="tx1"/>
@@ -14452,6 +14475,7 @@
               <a:prstGeom prst="line">
                 <a:avLst/>
               </a:prstGeom>
+              <a:grpFill/>
               <a:ln w="76200">
                 <a:solidFill>
                   <a:schemeClr val="tx1"/>
@@ -14482,12 +14506,13 @@
           </p:nvCxnSpPr>
           <p:spPr>
             <a:xfrm>
-              <a:off x="7225685" y="3895494"/>
+              <a:off x="7215175" y="3895494"/>
               <a:ext cx="0" cy="783770"/>
             </a:xfrm>
             <a:prstGeom prst="line">
               <a:avLst/>
             </a:prstGeom>
+            <a:grpFill/>
             <a:ln w="76200">
               <a:solidFill>
                 <a:schemeClr val="tx1"/>
@@ -14518,7 +14543,7 @@
         </p:nvGrpSpPr>
         <p:grpSpPr>
           <a:xfrm>
-            <a:off x="655675" y="4959246"/>
+            <a:off x="1359868" y="5016434"/>
             <a:ext cx="3814618" cy="786818"/>
             <a:chOff x="7184491" y="3895494"/>
             <a:chExt cx="3814618" cy="786818"/>
@@ -14554,7 +14579,9 @@
                   <a:gd name="adj" fmla="val 0"/>
                 </a:avLst>
               </a:prstGeom>
-              <a:noFill/>
+              <a:solidFill>
+                <a:schemeClr val="bg1"/>
+              </a:solidFill>
               <a:ln>
                 <a:solidFill>
                   <a:schemeClr val="tx1">
@@ -14681,6 +14708,13 @@
                   <a:schemeClr val="tx1"/>
                 </a:solidFill>
               </a:ln>
+              <a:effectLst>
+                <a:outerShdw blurRad="50800" dist="38100" dir="5400000" algn="t" rotWithShape="0">
+                  <a:prstClr val="black">
+                    <a:alpha val="40000"/>
+                  </a:prstClr>
+                </a:outerShdw>
+              </a:effectLst>
             </p:spPr>
             <p:style>
               <a:lnRef idx="1">
@@ -14717,6 +14751,13 @@
                 <a:schemeClr val="tx1"/>
               </a:solidFill>
             </a:ln>
+            <a:effectLst>
+              <a:outerShdw blurRad="50800" dist="38100" dir="5400000" algn="t" rotWithShape="0">
+                <a:prstClr val="black">
+                  <a:alpha val="40000"/>
+                </a:prstClr>
+              </a:outerShdw>
+            </a:effectLst>
           </p:spPr>
           <p:style>
             <a:lnRef idx="1">
@@ -14742,11 +14783,14 @@
         </p:nvGrpSpPr>
         <p:grpSpPr>
           <a:xfrm>
-            <a:off x="6614515" y="373569"/>
+            <a:off x="7318708" y="2157489"/>
             <a:ext cx="3814618" cy="786818"/>
             <a:chOff x="7184491" y="3895494"/>
             <a:chExt cx="3814618" cy="786818"/>
           </a:xfrm>
+          <a:solidFill>
+            <a:schemeClr val="bg1"/>
+          </a:solidFill>
         </p:grpSpPr>
         <p:grpSp>
           <p:nvGrpSpPr>
@@ -14761,6 +14805,7 @@
               <a:chOff x="7332272" y="2942747"/>
               <a:chExt cx="3814618" cy="783770"/>
             </a:xfrm>
+            <a:grpFill/>
           </p:grpSpPr>
           <p:sp>
             <p:nvSpPr>
@@ -14778,7 +14823,7 @@
                   <a:gd name="adj" fmla="val 0"/>
                 </a:avLst>
               </a:prstGeom>
-              <a:noFill/>
+              <a:grpFill/>
               <a:ln>
                 <a:solidFill>
                   <a:schemeClr val="tx1">
@@ -14850,6 +14895,7 @@
               <a:prstGeom prst="line">
                 <a:avLst/>
               </a:prstGeom>
+              <a:grpFill/>
               <a:ln w="76200">
                 <a:solidFill>
                   <a:schemeClr val="tx1"/>
@@ -14886,6 +14932,7 @@
             <a:prstGeom prst="line">
               <a:avLst/>
             </a:prstGeom>
+            <a:grpFill/>
             <a:ln w="76200">
               <a:solidFill>
                 <a:schemeClr val="tx1"/>
@@ -14916,11 +14963,18 @@
         </p:nvGrpSpPr>
         <p:grpSpPr>
           <a:xfrm>
-            <a:off x="6614515" y="2601402"/>
+            <a:off x="7318708" y="3589375"/>
             <a:ext cx="3814618" cy="786818"/>
             <a:chOff x="7184491" y="3895494"/>
             <a:chExt cx="3814618" cy="786818"/>
           </a:xfrm>
+          <a:effectLst>
+            <a:outerShdw blurRad="50800" dist="38100" dir="5400000" algn="t" rotWithShape="0">
+              <a:prstClr val="black">
+                <a:alpha val="40000"/>
+              </a:prstClr>
+            </a:outerShdw>
+          </a:effectLst>
         </p:grpSpPr>
         <p:grpSp>
           <p:nvGrpSpPr>
@@ -14952,7 +15006,9 @@
                   <a:gd name="adj" fmla="val 0"/>
                 </a:avLst>
               </a:prstGeom>
-              <a:noFill/>
+              <a:solidFill>
+                <a:schemeClr val="bg1"/>
+              </a:solidFill>
               <a:ln>
                 <a:solidFill>
                   <a:schemeClr val="tx1"/>
@@ -15117,11 +15173,18 @@
         </p:nvGrpSpPr>
         <p:grpSpPr>
           <a:xfrm>
-            <a:off x="6614515" y="4838889"/>
+            <a:off x="7318708" y="5021261"/>
             <a:ext cx="3814618" cy="786818"/>
             <a:chOff x="7184491" y="3895494"/>
             <a:chExt cx="3814618" cy="786818"/>
           </a:xfrm>
+          <a:effectLst>
+            <a:outerShdw blurRad="50800" dist="38100" dir="5400000" algn="t" rotWithShape="0">
+              <a:prstClr val="black">
+                <a:alpha val="40000"/>
+              </a:prstClr>
+            </a:outerShdw>
+          </a:effectLst>
         </p:grpSpPr>
         <p:grpSp>
           <p:nvGrpSpPr>
@@ -15153,7 +15216,9 @@
                   <a:gd name="adj" fmla="val 0"/>
                 </a:avLst>
               </a:prstGeom>
-              <a:noFill/>
+              <a:solidFill>
+                <a:schemeClr val="bg1"/>
+              </a:solidFill>
               <a:ln>
                 <a:solidFill>
                   <a:schemeClr val="tx1">
@@ -15333,6 +15398,59 @@
           </p:style>
         </p:cxnSp>
       </p:grpSp>
+      <p:sp>
+        <p:nvSpPr>
+          <p:cNvPr id="37" name="Titre 15"/>
+          <p:cNvSpPr txBox="1">
+            <a:spLocks/>
+          </p:cNvSpPr>
+          <p:nvPr/>
+        </p:nvSpPr>
+        <p:spPr>
+          <a:xfrm>
+            <a:off x="838200" y="365125"/>
+            <a:ext cx="10515600" cy="1325563"/>
+          </a:xfrm>
+          <a:prstGeom prst="rect">
+            <a:avLst/>
+          </a:prstGeom>
+        </p:spPr>
+        <p:txBody>
+          <a:bodyPr vert="horz" lIns="91440" tIns="45720" rIns="91440" bIns="45720" rtlCol="0" anchor="b">
+            <a:normAutofit fontScale="92500" lnSpcReduction="20000"/>
+          </a:bodyPr>
+          <a:lstStyle>
+            <a:lvl1pPr algn="ctr" defTabSz="914400" rtl="0" eaLnBrk="1" latinLnBrk="0" hangingPunct="1">
+              <a:lnSpc>
+                <a:spcPct val="90000"/>
+              </a:lnSpc>
+              <a:spcBef>
+                <a:spcPct val="0"/>
+              </a:spcBef>
+              <a:buNone/>
+              <a:defRPr sz="6000" kern="1200">
+                <a:solidFill>
+                  <a:schemeClr val="tx1"/>
+                </a:solidFill>
+                <a:latin typeface="+mj-lt"/>
+                <a:ea typeface="+mj-ea"/>
+                <a:cs typeface="+mj-cs"/>
+              </a:defRPr>
+            </a:lvl1pPr>
+          </a:lstStyle>
+          <a:p>
+            <a:r>
+              <a:rPr lang="en-US" dirty="0" smtClean="0">
+                <a:latin typeface="Arial Black" panose="020B0A04020102020204" pitchFamily="34" charset="0"/>
+              </a:rPr>
+              <a:t>Waiting for player state design 2</a:t>
+            </a:r>
+            <a:endParaRPr lang="en-US" dirty="0">
+              <a:latin typeface="Arial Black" panose="020B0A04020102020204" pitchFamily="34" charset="0"/>
+            </a:endParaRPr>
+          </a:p>
+        </p:txBody>
+      </p:sp>
     </p:spTree>
     <p:extLst>
       <p:ext uri="{BB962C8B-B14F-4D97-AF65-F5344CB8AC3E}">

</xml_diff>

<commit_message>
design change command + runtime optimization
</commit_message>
<xml_diff>
--- a/assets/buttons.pptx
+++ b/assets/buttons.pptx
@@ -5,15 +5,16 @@
     <p:sldMasterId id="2147483648" r:id="rId1"/>
   </p:sldMasterIdLst>
   <p:sldIdLst>
-    <p:sldId id="265" r:id="rId2"/>
-    <p:sldId id="266" r:id="rId3"/>
-    <p:sldId id="261" r:id="rId4"/>
-    <p:sldId id="260" r:id="rId5"/>
-    <p:sldId id="259" r:id="rId6"/>
-    <p:sldId id="256" r:id="rId7"/>
-    <p:sldId id="262" r:id="rId8"/>
-    <p:sldId id="263" r:id="rId9"/>
-    <p:sldId id="258" r:id="rId10"/>
+    <p:sldId id="258" r:id="rId2"/>
+    <p:sldId id="265" r:id="rId3"/>
+    <p:sldId id="266" r:id="rId4"/>
+    <p:sldId id="261" r:id="rId5"/>
+    <p:sldId id="260" r:id="rId6"/>
+    <p:sldId id="259" r:id="rId7"/>
+    <p:sldId id="256" r:id="rId8"/>
+    <p:sldId id="262" r:id="rId9"/>
+    <p:sldId id="263" r:id="rId10"/>
+    <p:sldId id="267" r:id="rId11"/>
   </p:sldIdLst>
   <p:sldSz cx="12192000" cy="6858000"/>
   <p:notesSz cx="6858000" cy="9144000"/>
@@ -251,7 +252,7 @@
           <a:p>
             <a:fld id="{2E40D743-7CB8-4D0B-882D-D502BAAD38FE}" type="datetimeFigureOut">
               <a:rPr lang="en-US" smtClean="0"/>
-              <a:t>4/18/2021</a:t>
+              <a:t>5/6/2021</a:t>
             </a:fld>
             <a:endParaRPr lang="en-US"/>
           </a:p>
@@ -421,7 +422,7 @@
           <a:p>
             <a:fld id="{2E40D743-7CB8-4D0B-882D-D502BAAD38FE}" type="datetimeFigureOut">
               <a:rPr lang="en-US" smtClean="0"/>
-              <a:t>4/18/2021</a:t>
+              <a:t>5/6/2021</a:t>
             </a:fld>
             <a:endParaRPr lang="en-US"/>
           </a:p>
@@ -601,7 +602,7 @@
           <a:p>
             <a:fld id="{2E40D743-7CB8-4D0B-882D-D502BAAD38FE}" type="datetimeFigureOut">
               <a:rPr lang="en-US" smtClean="0"/>
-              <a:t>4/18/2021</a:t>
+              <a:t>5/6/2021</a:t>
             </a:fld>
             <a:endParaRPr lang="en-US"/>
           </a:p>
@@ -771,7 +772,7 @@
           <a:p>
             <a:fld id="{2E40D743-7CB8-4D0B-882D-D502BAAD38FE}" type="datetimeFigureOut">
               <a:rPr lang="en-US" smtClean="0"/>
-              <a:t>4/18/2021</a:t>
+              <a:t>5/6/2021</a:t>
             </a:fld>
             <a:endParaRPr lang="en-US"/>
           </a:p>
@@ -1017,7 +1018,7 @@
           <a:p>
             <a:fld id="{2E40D743-7CB8-4D0B-882D-D502BAAD38FE}" type="datetimeFigureOut">
               <a:rPr lang="en-US" smtClean="0"/>
-              <a:t>4/18/2021</a:t>
+              <a:t>5/6/2021</a:t>
             </a:fld>
             <a:endParaRPr lang="en-US"/>
           </a:p>
@@ -1249,7 +1250,7 @@
           <a:p>
             <a:fld id="{2E40D743-7CB8-4D0B-882D-D502BAAD38FE}" type="datetimeFigureOut">
               <a:rPr lang="en-US" smtClean="0"/>
-              <a:t>4/18/2021</a:t>
+              <a:t>5/6/2021</a:t>
             </a:fld>
             <a:endParaRPr lang="en-US"/>
           </a:p>
@@ -1616,7 +1617,7 @@
           <a:p>
             <a:fld id="{2E40D743-7CB8-4D0B-882D-D502BAAD38FE}" type="datetimeFigureOut">
               <a:rPr lang="en-US" smtClean="0"/>
-              <a:t>4/18/2021</a:t>
+              <a:t>5/6/2021</a:t>
             </a:fld>
             <a:endParaRPr lang="en-US"/>
           </a:p>
@@ -1734,7 +1735,7 @@
           <a:p>
             <a:fld id="{2E40D743-7CB8-4D0B-882D-D502BAAD38FE}" type="datetimeFigureOut">
               <a:rPr lang="en-US" smtClean="0"/>
-              <a:t>4/18/2021</a:t>
+              <a:t>5/6/2021</a:t>
             </a:fld>
             <a:endParaRPr lang="en-US"/>
           </a:p>
@@ -1829,7 +1830,7 @@
           <a:p>
             <a:fld id="{2E40D743-7CB8-4D0B-882D-D502BAAD38FE}" type="datetimeFigureOut">
               <a:rPr lang="en-US" smtClean="0"/>
-              <a:t>4/18/2021</a:t>
+              <a:t>5/6/2021</a:t>
             </a:fld>
             <a:endParaRPr lang="en-US"/>
           </a:p>
@@ -2106,7 +2107,7 @@
           <a:p>
             <a:fld id="{2E40D743-7CB8-4D0B-882D-D502BAAD38FE}" type="datetimeFigureOut">
               <a:rPr lang="en-US" smtClean="0"/>
-              <a:t>4/18/2021</a:t>
+              <a:t>5/6/2021</a:t>
             </a:fld>
             <a:endParaRPr lang="en-US"/>
           </a:p>
@@ -2359,7 +2360,7 @@
           <a:p>
             <a:fld id="{2E40D743-7CB8-4D0B-882D-D502BAAD38FE}" type="datetimeFigureOut">
               <a:rPr lang="en-US" smtClean="0"/>
-              <a:t>4/18/2021</a:t>
+              <a:t>5/6/2021</a:t>
             </a:fld>
             <a:endParaRPr lang="en-US"/>
           </a:p>
@@ -2572,7 +2573,7 @@
           <a:p>
             <a:fld id="{2E40D743-7CB8-4D0B-882D-D502BAAD38FE}" type="datetimeFigureOut">
               <a:rPr lang="en-US" smtClean="0"/>
-              <a:t>4/18/2021</a:t>
+              <a:t>5/6/2021</a:t>
             </a:fld>
             <a:endParaRPr lang="en-US"/>
           </a:p>
@@ -2977,6 +2978,778 @@
           <a:chExt cx="0" cy="0"/>
         </a:xfrm>
       </p:grpSpPr>
+      <p:grpSp>
+        <p:nvGrpSpPr>
+          <p:cNvPr id="5" name="Groupe 4"/>
+          <p:cNvGrpSpPr/>
+          <p:nvPr/>
+        </p:nvGrpSpPr>
+        <p:grpSpPr>
+          <a:xfrm>
+            <a:off x="2784762" y="1967345"/>
+            <a:ext cx="4478777" cy="2078182"/>
+            <a:chOff x="2784762" y="1967345"/>
+            <a:chExt cx="4478777" cy="2078182"/>
+          </a:xfrm>
+        </p:grpSpPr>
+        <p:sp>
+          <p:nvSpPr>
+            <p:cNvPr id="2" name="Rectangle 1"/>
+            <p:cNvSpPr/>
+            <p:nvPr/>
+          </p:nvSpPr>
+          <p:spPr>
+            <a:xfrm rot="2724865">
+              <a:off x="1870362" y="2881745"/>
+              <a:ext cx="2078182" cy="249382"/>
+            </a:xfrm>
+            <a:prstGeom prst="rect">
+              <a:avLst/>
+            </a:prstGeom>
+            <a:solidFill>
+              <a:schemeClr val="tx1"/>
+            </a:solidFill>
+            <a:ln>
+              <a:solidFill>
+                <a:schemeClr val="tx1"/>
+              </a:solidFill>
+            </a:ln>
+          </p:spPr>
+          <p:style>
+            <a:lnRef idx="2">
+              <a:schemeClr val="accent1">
+                <a:shade val="50000"/>
+              </a:schemeClr>
+            </a:lnRef>
+            <a:fillRef idx="1">
+              <a:schemeClr val="accent1"/>
+            </a:fillRef>
+            <a:effectRef idx="0">
+              <a:schemeClr val="accent1"/>
+            </a:effectRef>
+            <a:fontRef idx="minor">
+              <a:schemeClr val="lt1"/>
+            </a:fontRef>
+          </p:style>
+          <p:txBody>
+            <a:bodyPr rtlCol="0" anchor="ctr"/>
+            <a:lstStyle/>
+            <a:p>
+              <a:pPr algn="ctr"/>
+              <a:endParaRPr lang="en-US"/>
+            </a:p>
+          </p:txBody>
+        </p:sp>
+        <p:sp>
+          <p:nvSpPr>
+            <p:cNvPr id="3" name="Rectangle 2"/>
+            <p:cNvSpPr/>
+            <p:nvPr/>
+          </p:nvSpPr>
+          <p:spPr>
+            <a:xfrm rot="8123004">
+              <a:off x="2839281" y="2066852"/>
+              <a:ext cx="4424258" cy="249382"/>
+            </a:xfrm>
+            <a:prstGeom prst="rect">
+              <a:avLst/>
+            </a:prstGeom>
+            <a:solidFill>
+              <a:schemeClr val="tx1"/>
+            </a:solidFill>
+            <a:ln>
+              <a:solidFill>
+                <a:schemeClr val="tx1"/>
+              </a:solidFill>
+            </a:ln>
+          </p:spPr>
+          <p:style>
+            <a:lnRef idx="2">
+              <a:schemeClr val="accent1">
+                <a:shade val="50000"/>
+              </a:schemeClr>
+            </a:lnRef>
+            <a:fillRef idx="1">
+              <a:schemeClr val="accent1"/>
+            </a:fillRef>
+            <a:effectRef idx="0">
+              <a:schemeClr val="accent1"/>
+            </a:effectRef>
+            <a:fontRef idx="minor">
+              <a:schemeClr val="lt1"/>
+            </a:fontRef>
+          </p:style>
+          <p:txBody>
+            <a:bodyPr rtlCol="0" anchor="ctr"/>
+            <a:lstStyle/>
+            <a:p>
+              <a:pPr algn="ctr"/>
+              <a:endParaRPr lang="en-US"/>
+            </a:p>
+          </p:txBody>
+        </p:sp>
+      </p:grpSp>
+      <p:sp>
+        <p:nvSpPr>
+          <p:cNvPr id="6" name="Rectangle 5"/>
+          <p:cNvSpPr/>
+          <p:nvPr/>
+        </p:nvSpPr>
+        <p:spPr>
+          <a:xfrm>
+            <a:off x="827314" y="290286"/>
+            <a:ext cx="6313715" cy="3773714"/>
+          </a:xfrm>
+          <a:prstGeom prst="rect">
+            <a:avLst/>
+          </a:prstGeom>
+          <a:noFill/>
+          <a:ln w="9525" cap="flat" cmpd="sng" algn="ctr">
+            <a:solidFill>
+              <a:schemeClr val="dk1"/>
+            </a:solidFill>
+            <a:prstDash val="solid"/>
+            <a:round/>
+            <a:headEnd type="none" w="med" len="med"/>
+            <a:tailEnd type="none" w="med" len="med"/>
+          </a:ln>
+        </p:spPr>
+        <p:style>
+          <a:lnRef idx="0">
+            <a:scrgbClr r="0" g="0" b="0"/>
+          </a:lnRef>
+          <a:fillRef idx="0">
+            <a:scrgbClr r="0" g="0" b="0"/>
+          </a:fillRef>
+          <a:effectRef idx="0">
+            <a:scrgbClr r="0" g="0" b="0"/>
+          </a:effectRef>
+          <a:fontRef idx="minor">
+            <a:schemeClr val="dk1"/>
+          </a:fontRef>
+        </p:style>
+        <p:txBody>
+          <a:bodyPr rtlCol="0" anchor="ctr"/>
+          <a:lstStyle/>
+          <a:p>
+            <a:pPr algn="ctr"/>
+            <a:endParaRPr lang="en-US"/>
+          </a:p>
+        </p:txBody>
+      </p:sp>
+      <p:sp>
+        <p:nvSpPr>
+          <p:cNvPr id="7" name="Rectangle à coins arrondis 6"/>
+          <p:cNvSpPr/>
+          <p:nvPr/>
+        </p:nvSpPr>
+        <p:spPr>
+          <a:xfrm>
+            <a:off x="4514897" y="5151194"/>
+            <a:ext cx="606378" cy="184637"/>
+          </a:xfrm>
+          <a:prstGeom prst="roundRect">
+            <a:avLst>
+              <a:gd name="adj" fmla="val 50000"/>
+            </a:avLst>
+          </a:prstGeom>
+          <a:noFill/>
+          <a:ln>
+            <a:solidFill>
+              <a:schemeClr val="tx1"/>
+            </a:solidFill>
+          </a:ln>
+        </p:spPr>
+        <p:style>
+          <a:lnRef idx="2">
+            <a:schemeClr val="accent1">
+              <a:shade val="50000"/>
+            </a:schemeClr>
+          </a:lnRef>
+          <a:fillRef idx="1">
+            <a:schemeClr val="accent1"/>
+          </a:fillRef>
+          <a:effectRef idx="0">
+            <a:schemeClr val="accent1"/>
+          </a:effectRef>
+          <a:fontRef idx="minor">
+            <a:schemeClr val="lt1"/>
+          </a:fontRef>
+        </p:style>
+        <p:txBody>
+          <a:bodyPr rtlCol="0" anchor="ctr"/>
+          <a:lstStyle/>
+          <a:p>
+            <a:pPr algn="ctr"/>
+            <a:endParaRPr lang="en-US"/>
+          </a:p>
+        </p:txBody>
+      </p:sp>
+      <p:sp>
+        <p:nvSpPr>
+          <p:cNvPr id="8" name="Ellipse 7"/>
+          <p:cNvSpPr/>
+          <p:nvPr/>
+        </p:nvSpPr>
+        <p:spPr>
+          <a:xfrm>
+            <a:off x="4514897" y="5048247"/>
+            <a:ext cx="416719" cy="390525"/>
+          </a:xfrm>
+          <a:prstGeom prst="ellipse">
+            <a:avLst/>
+          </a:prstGeom>
+          <a:solidFill>
+            <a:schemeClr val="bg1"/>
+          </a:solidFill>
+          <a:ln>
+            <a:solidFill>
+              <a:schemeClr val="tx1"/>
+            </a:solidFill>
+          </a:ln>
+        </p:spPr>
+        <p:style>
+          <a:lnRef idx="2">
+            <a:schemeClr val="accent1">
+              <a:shade val="50000"/>
+            </a:schemeClr>
+          </a:lnRef>
+          <a:fillRef idx="1">
+            <a:schemeClr val="accent1"/>
+          </a:fillRef>
+          <a:effectRef idx="0">
+            <a:schemeClr val="accent1"/>
+          </a:effectRef>
+          <a:fontRef idx="minor">
+            <a:schemeClr val="lt1"/>
+          </a:fontRef>
+        </p:style>
+        <p:txBody>
+          <a:bodyPr rtlCol="0" anchor="ctr"/>
+          <a:lstStyle/>
+          <a:p>
+            <a:pPr algn="ctr"/>
+            <a:endParaRPr lang="en-US"/>
+          </a:p>
+        </p:txBody>
+      </p:sp>
+      <p:sp>
+        <p:nvSpPr>
+          <p:cNvPr id="9" name="Rectangle à coins arrondis 8"/>
+          <p:cNvSpPr/>
+          <p:nvPr/>
+        </p:nvSpPr>
+        <p:spPr>
+          <a:xfrm>
+            <a:off x="5927772" y="5151193"/>
+            <a:ext cx="606378" cy="184637"/>
+          </a:xfrm>
+          <a:prstGeom prst="roundRect">
+            <a:avLst>
+              <a:gd name="adj" fmla="val 50000"/>
+            </a:avLst>
+          </a:prstGeom>
+          <a:solidFill>
+            <a:schemeClr val="bg2">
+              <a:lumMod val="75000"/>
+            </a:schemeClr>
+          </a:solidFill>
+          <a:ln>
+            <a:solidFill>
+              <a:schemeClr val="tx1"/>
+            </a:solidFill>
+          </a:ln>
+        </p:spPr>
+        <p:style>
+          <a:lnRef idx="2">
+            <a:schemeClr val="accent1">
+              <a:shade val="50000"/>
+            </a:schemeClr>
+          </a:lnRef>
+          <a:fillRef idx="1">
+            <a:schemeClr val="accent1"/>
+          </a:fillRef>
+          <a:effectRef idx="0">
+            <a:schemeClr val="accent1"/>
+          </a:effectRef>
+          <a:fontRef idx="minor">
+            <a:schemeClr val="lt1"/>
+          </a:fontRef>
+        </p:style>
+        <p:txBody>
+          <a:bodyPr rtlCol="0" anchor="ctr"/>
+          <a:lstStyle/>
+          <a:p>
+            <a:pPr algn="ctr"/>
+            <a:endParaRPr lang="en-US"/>
+          </a:p>
+        </p:txBody>
+      </p:sp>
+      <p:sp>
+        <p:nvSpPr>
+          <p:cNvPr id="10" name="Ellipse 9"/>
+          <p:cNvSpPr/>
+          <p:nvPr/>
+        </p:nvSpPr>
+        <p:spPr>
+          <a:xfrm>
+            <a:off x="6117431" y="5048248"/>
+            <a:ext cx="416719" cy="390525"/>
+          </a:xfrm>
+          <a:prstGeom prst="ellipse">
+            <a:avLst/>
+          </a:prstGeom>
+          <a:solidFill>
+            <a:schemeClr val="tx1"/>
+          </a:solidFill>
+          <a:ln>
+            <a:solidFill>
+              <a:schemeClr val="tx1"/>
+            </a:solidFill>
+          </a:ln>
+        </p:spPr>
+        <p:style>
+          <a:lnRef idx="2">
+            <a:schemeClr val="accent1">
+              <a:shade val="50000"/>
+            </a:schemeClr>
+          </a:lnRef>
+          <a:fillRef idx="1">
+            <a:schemeClr val="accent1"/>
+          </a:fillRef>
+          <a:effectRef idx="0">
+            <a:schemeClr val="accent1"/>
+          </a:effectRef>
+          <a:fontRef idx="minor">
+            <a:schemeClr val="lt1"/>
+          </a:fontRef>
+        </p:style>
+        <p:txBody>
+          <a:bodyPr rtlCol="0" anchor="ctr"/>
+          <a:lstStyle/>
+          <a:p>
+            <a:pPr algn="ctr"/>
+            <a:endParaRPr lang="en-US"/>
+          </a:p>
+        </p:txBody>
+      </p:sp>
+    </p:spTree>
+    <p:extLst>
+      <p:ext uri="{BB962C8B-B14F-4D97-AF65-F5344CB8AC3E}">
+        <p14:creationId xmlns:p14="http://schemas.microsoft.com/office/powerpoint/2010/main" val="4159037437"/>
+      </p:ext>
+    </p:extLst>
+  </p:cSld>
+  <p:clrMapOvr>
+    <a:masterClrMapping/>
+  </p:clrMapOvr>
+</p:sld>
+</file>
+
+<file path=ppt/slides/slide10.xml><?xml version="1.0" encoding="utf-8"?>
+<p:sld xmlns:a="http://schemas.openxmlformats.org/drawingml/2006/main" xmlns:r="http://schemas.openxmlformats.org/officeDocument/2006/relationships" xmlns:p="http://schemas.openxmlformats.org/presentationml/2006/main">
+  <p:cSld>
+    <p:spTree>
+      <p:nvGrpSpPr>
+        <p:cNvPr id="1" name=""/>
+        <p:cNvGrpSpPr/>
+        <p:nvPr/>
+      </p:nvGrpSpPr>
+      <p:grpSpPr>
+        <a:xfrm>
+          <a:off x="0" y="0"/>
+          <a:ext cx="0" cy="0"/>
+          <a:chOff x="0" y="0"/>
+          <a:chExt cx="0" cy="0"/>
+        </a:xfrm>
+      </p:grpSpPr>
+      <p:grpSp>
+        <p:nvGrpSpPr>
+          <p:cNvPr id="5" name="Groupe 4"/>
+          <p:cNvGrpSpPr/>
+          <p:nvPr/>
+        </p:nvGrpSpPr>
+        <p:grpSpPr>
+          <a:xfrm>
+            <a:off x="2784762" y="1967345"/>
+            <a:ext cx="4478777" cy="2078182"/>
+            <a:chOff x="2784762" y="1967345"/>
+            <a:chExt cx="4478777" cy="2078182"/>
+          </a:xfrm>
+        </p:grpSpPr>
+        <p:sp>
+          <p:nvSpPr>
+            <p:cNvPr id="2" name="Rectangle 1"/>
+            <p:cNvSpPr/>
+            <p:nvPr/>
+          </p:nvSpPr>
+          <p:spPr>
+            <a:xfrm rot="2724865">
+              <a:off x="1870362" y="2881745"/>
+              <a:ext cx="2078182" cy="249382"/>
+            </a:xfrm>
+            <a:prstGeom prst="rect">
+              <a:avLst/>
+            </a:prstGeom>
+            <a:solidFill>
+              <a:schemeClr val="tx1"/>
+            </a:solidFill>
+            <a:ln>
+              <a:solidFill>
+                <a:schemeClr val="tx1"/>
+              </a:solidFill>
+            </a:ln>
+          </p:spPr>
+          <p:style>
+            <a:lnRef idx="2">
+              <a:schemeClr val="accent1">
+                <a:shade val="50000"/>
+              </a:schemeClr>
+            </a:lnRef>
+            <a:fillRef idx="1">
+              <a:schemeClr val="accent1"/>
+            </a:fillRef>
+            <a:effectRef idx="0">
+              <a:schemeClr val="accent1"/>
+            </a:effectRef>
+            <a:fontRef idx="minor">
+              <a:schemeClr val="lt1"/>
+            </a:fontRef>
+          </p:style>
+          <p:txBody>
+            <a:bodyPr rtlCol="0" anchor="ctr"/>
+            <a:lstStyle/>
+            <a:p>
+              <a:pPr algn="ctr"/>
+              <a:endParaRPr lang="en-US"/>
+            </a:p>
+          </p:txBody>
+        </p:sp>
+        <p:sp>
+          <p:nvSpPr>
+            <p:cNvPr id="3" name="Rectangle 2"/>
+            <p:cNvSpPr/>
+            <p:nvPr/>
+          </p:nvSpPr>
+          <p:spPr>
+            <a:xfrm rot="8123004">
+              <a:off x="2839281" y="2066852"/>
+              <a:ext cx="4424258" cy="249382"/>
+            </a:xfrm>
+            <a:prstGeom prst="rect">
+              <a:avLst/>
+            </a:prstGeom>
+            <a:solidFill>
+              <a:schemeClr val="tx1"/>
+            </a:solidFill>
+            <a:ln>
+              <a:solidFill>
+                <a:schemeClr val="tx1"/>
+              </a:solidFill>
+            </a:ln>
+          </p:spPr>
+          <p:style>
+            <a:lnRef idx="2">
+              <a:schemeClr val="accent1">
+                <a:shade val="50000"/>
+              </a:schemeClr>
+            </a:lnRef>
+            <a:fillRef idx="1">
+              <a:schemeClr val="accent1"/>
+            </a:fillRef>
+            <a:effectRef idx="0">
+              <a:schemeClr val="accent1"/>
+            </a:effectRef>
+            <a:fontRef idx="minor">
+              <a:schemeClr val="lt1"/>
+            </a:fontRef>
+          </p:style>
+          <p:txBody>
+            <a:bodyPr rtlCol="0" anchor="ctr"/>
+            <a:lstStyle/>
+            <a:p>
+              <a:pPr algn="ctr"/>
+              <a:endParaRPr lang="en-US"/>
+            </a:p>
+          </p:txBody>
+        </p:sp>
+      </p:grpSp>
+      <p:sp>
+        <p:nvSpPr>
+          <p:cNvPr id="6" name="Rectangle 5"/>
+          <p:cNvSpPr/>
+          <p:nvPr/>
+        </p:nvSpPr>
+        <p:spPr>
+          <a:xfrm>
+            <a:off x="827314" y="290286"/>
+            <a:ext cx="6313715" cy="3773714"/>
+          </a:xfrm>
+          <a:prstGeom prst="rect">
+            <a:avLst/>
+          </a:prstGeom>
+          <a:noFill/>
+          <a:ln w="9525" cap="flat" cmpd="sng" algn="ctr">
+            <a:solidFill>
+              <a:schemeClr val="dk1"/>
+            </a:solidFill>
+            <a:prstDash val="solid"/>
+            <a:round/>
+            <a:headEnd type="none" w="med" len="med"/>
+            <a:tailEnd type="none" w="med" len="med"/>
+          </a:ln>
+        </p:spPr>
+        <p:style>
+          <a:lnRef idx="0">
+            <a:scrgbClr r="0" g="0" b="0"/>
+          </a:lnRef>
+          <a:fillRef idx="0">
+            <a:scrgbClr r="0" g="0" b="0"/>
+          </a:fillRef>
+          <a:effectRef idx="0">
+            <a:scrgbClr r="0" g="0" b="0"/>
+          </a:effectRef>
+          <a:fontRef idx="minor">
+            <a:schemeClr val="dk1"/>
+          </a:fontRef>
+        </p:style>
+        <p:txBody>
+          <a:bodyPr rtlCol="0" anchor="ctr"/>
+          <a:lstStyle/>
+          <a:p>
+            <a:pPr algn="ctr"/>
+            <a:endParaRPr lang="en-US"/>
+          </a:p>
+        </p:txBody>
+      </p:sp>
+      <p:sp>
+        <p:nvSpPr>
+          <p:cNvPr id="11" name="Rectangle à coins arrondis 10"/>
+          <p:cNvSpPr/>
+          <p:nvPr/>
+        </p:nvSpPr>
+        <p:spPr>
+          <a:xfrm>
+            <a:off x="4546601" y="5362575"/>
+            <a:ext cx="611188" cy="194163"/>
+          </a:xfrm>
+          <a:prstGeom prst="roundRect">
+            <a:avLst>
+              <a:gd name="adj" fmla="val 50000"/>
+            </a:avLst>
+          </a:prstGeom>
+          <a:solidFill>
+            <a:schemeClr val="bg1"/>
+          </a:solidFill>
+          <a:ln>
+            <a:solidFill>
+              <a:schemeClr val="tx1"/>
+            </a:solidFill>
+          </a:ln>
+        </p:spPr>
+        <p:style>
+          <a:lnRef idx="2">
+            <a:schemeClr val="accent1">
+              <a:shade val="50000"/>
+            </a:schemeClr>
+          </a:lnRef>
+          <a:fillRef idx="1">
+            <a:schemeClr val="accent1"/>
+          </a:fillRef>
+          <a:effectRef idx="0">
+            <a:schemeClr val="accent1"/>
+          </a:effectRef>
+          <a:fontRef idx="minor">
+            <a:schemeClr val="lt1"/>
+          </a:fontRef>
+        </p:style>
+        <p:txBody>
+          <a:bodyPr rtlCol="0" anchor="ctr"/>
+          <a:lstStyle/>
+          <a:p>
+            <a:pPr algn="ctr"/>
+            <a:endParaRPr lang="en-US"/>
+          </a:p>
+        </p:txBody>
+      </p:sp>
+      <p:sp>
+        <p:nvSpPr>
+          <p:cNvPr id="12" name="Ellipse 11"/>
+          <p:cNvSpPr/>
+          <p:nvPr/>
+        </p:nvSpPr>
+        <p:spPr>
+          <a:xfrm>
+            <a:off x="4546600" y="5251297"/>
+            <a:ext cx="426243" cy="416718"/>
+          </a:xfrm>
+          <a:prstGeom prst="ellipse">
+            <a:avLst/>
+          </a:prstGeom>
+          <a:solidFill>
+            <a:schemeClr val="bg1"/>
+          </a:solidFill>
+          <a:ln>
+            <a:solidFill>
+              <a:schemeClr val="tx1"/>
+            </a:solidFill>
+          </a:ln>
+        </p:spPr>
+        <p:style>
+          <a:lnRef idx="2">
+            <a:schemeClr val="accent1">
+              <a:shade val="50000"/>
+            </a:schemeClr>
+          </a:lnRef>
+          <a:fillRef idx="1">
+            <a:schemeClr val="accent1"/>
+          </a:fillRef>
+          <a:effectRef idx="0">
+            <a:schemeClr val="accent1"/>
+          </a:effectRef>
+          <a:fontRef idx="minor">
+            <a:schemeClr val="lt1"/>
+          </a:fontRef>
+        </p:style>
+        <p:txBody>
+          <a:bodyPr rtlCol="0" anchor="ctr"/>
+          <a:lstStyle/>
+          <a:p>
+            <a:pPr algn="ctr"/>
+            <a:endParaRPr lang="en-US"/>
+          </a:p>
+        </p:txBody>
+      </p:sp>
+      <p:sp>
+        <p:nvSpPr>
+          <p:cNvPr id="13" name="Rectangle à coins arrondis 12"/>
+          <p:cNvSpPr/>
+          <p:nvPr/>
+        </p:nvSpPr>
+        <p:spPr>
+          <a:xfrm>
+            <a:off x="5625308" y="5362575"/>
+            <a:ext cx="611188" cy="194163"/>
+          </a:xfrm>
+          <a:prstGeom prst="roundRect">
+            <a:avLst>
+              <a:gd name="adj" fmla="val 50000"/>
+            </a:avLst>
+          </a:prstGeom>
+          <a:solidFill>
+            <a:schemeClr val="bg2">
+              <a:lumMod val="75000"/>
+            </a:schemeClr>
+          </a:solidFill>
+          <a:ln>
+            <a:solidFill>
+              <a:schemeClr val="tx1"/>
+            </a:solidFill>
+          </a:ln>
+        </p:spPr>
+        <p:style>
+          <a:lnRef idx="2">
+            <a:schemeClr val="accent1">
+              <a:shade val="50000"/>
+            </a:schemeClr>
+          </a:lnRef>
+          <a:fillRef idx="1">
+            <a:schemeClr val="accent1"/>
+          </a:fillRef>
+          <a:effectRef idx="0">
+            <a:schemeClr val="accent1"/>
+          </a:effectRef>
+          <a:fontRef idx="minor">
+            <a:schemeClr val="lt1"/>
+          </a:fontRef>
+        </p:style>
+        <p:txBody>
+          <a:bodyPr rtlCol="0" anchor="ctr"/>
+          <a:lstStyle/>
+          <a:p>
+            <a:pPr algn="ctr"/>
+            <a:endParaRPr lang="en-US"/>
+          </a:p>
+        </p:txBody>
+      </p:sp>
+      <p:sp>
+        <p:nvSpPr>
+          <p:cNvPr id="14" name="Ellipse 13"/>
+          <p:cNvSpPr/>
+          <p:nvPr/>
+        </p:nvSpPr>
+        <p:spPr>
+          <a:xfrm>
+            <a:off x="5810253" y="5251297"/>
+            <a:ext cx="426243" cy="416718"/>
+          </a:xfrm>
+          <a:prstGeom prst="ellipse">
+            <a:avLst/>
+          </a:prstGeom>
+          <a:solidFill>
+            <a:schemeClr val="tx1"/>
+          </a:solidFill>
+          <a:ln>
+            <a:solidFill>
+              <a:schemeClr val="tx1"/>
+            </a:solidFill>
+          </a:ln>
+        </p:spPr>
+        <p:style>
+          <a:lnRef idx="2">
+            <a:schemeClr val="accent1">
+              <a:shade val="50000"/>
+            </a:schemeClr>
+          </a:lnRef>
+          <a:fillRef idx="1">
+            <a:schemeClr val="accent1"/>
+          </a:fillRef>
+          <a:effectRef idx="0">
+            <a:schemeClr val="accent1"/>
+          </a:effectRef>
+          <a:fontRef idx="minor">
+            <a:schemeClr val="lt1"/>
+          </a:fontRef>
+        </p:style>
+        <p:txBody>
+          <a:bodyPr rtlCol="0" anchor="ctr"/>
+          <a:lstStyle/>
+          <a:p>
+            <a:pPr algn="ctr"/>
+            <a:endParaRPr lang="en-US"/>
+          </a:p>
+        </p:txBody>
+      </p:sp>
+    </p:spTree>
+    <p:extLst>
+      <p:ext uri="{BB962C8B-B14F-4D97-AF65-F5344CB8AC3E}">
+        <p14:creationId xmlns:p14="http://schemas.microsoft.com/office/powerpoint/2010/main" val="369013773"/>
+      </p:ext>
+    </p:extLst>
+  </p:cSld>
+  <p:clrMapOvr>
+    <a:masterClrMapping/>
+  </p:clrMapOvr>
+</p:sld>
+</file>
+
+<file path=ppt/slides/slide2.xml><?xml version="1.0" encoding="utf-8"?>
+<p:sld xmlns:a="http://schemas.openxmlformats.org/drawingml/2006/main" xmlns:r="http://schemas.openxmlformats.org/officeDocument/2006/relationships" xmlns:p="http://schemas.openxmlformats.org/presentationml/2006/main">
+  <p:cSld>
+    <p:spTree>
+      <p:nvGrpSpPr>
+        <p:cNvPr id="1" name=""/>
+        <p:cNvGrpSpPr/>
+        <p:nvPr/>
+      </p:nvGrpSpPr>
+      <p:grpSpPr>
+        <a:xfrm>
+          <a:off x="0" y="0"/>
+          <a:ext cx="0" cy="0"/>
+          <a:chOff x="0" y="0"/>
+          <a:chExt cx="0" cy="0"/>
+        </a:xfrm>
+      </p:grpSpPr>
       <p:sp>
         <p:nvSpPr>
           <p:cNvPr id="4" name="Rectangle à coins arrondis 3"/>
@@ -5088,7 +5861,7 @@
 </p:sld>
 </file>
 
-<file path=ppt/slides/slide2.xml><?xml version="1.0" encoding="utf-8"?>
+<file path=ppt/slides/slide3.xml><?xml version="1.0" encoding="utf-8"?>
 <p:sld xmlns:a="http://schemas.openxmlformats.org/drawingml/2006/main" xmlns:r="http://schemas.openxmlformats.org/officeDocument/2006/relationships" xmlns:p="http://schemas.openxmlformats.org/presentationml/2006/main">
   <p:cSld>
     <p:spTree>
@@ -7504,7 +8277,7 @@
 </p:sld>
 </file>
 
-<file path=ppt/slides/slide3.xml><?xml version="1.0" encoding="utf-8"?>
+<file path=ppt/slides/slide4.xml><?xml version="1.0" encoding="utf-8"?>
 <p:sld xmlns:a="http://schemas.openxmlformats.org/drawingml/2006/main" xmlns:r="http://schemas.openxmlformats.org/officeDocument/2006/relationships" xmlns:p="http://schemas.openxmlformats.org/presentationml/2006/main">
   <p:cSld>
     <p:spTree>
@@ -8966,7 +9739,7 @@
 </p:sld>
 </file>
 
-<file path=ppt/slides/slide4.xml><?xml version="1.0" encoding="utf-8"?>
+<file path=ppt/slides/slide5.xml><?xml version="1.0" encoding="utf-8"?>
 <p:sld xmlns:a="http://schemas.openxmlformats.org/drawingml/2006/main" xmlns:r="http://schemas.openxmlformats.org/officeDocument/2006/relationships" xmlns:p="http://schemas.openxmlformats.org/presentationml/2006/main">
   <p:cSld>
     <p:spTree>
@@ -10883,7 +11656,7 @@
 </p:sld>
 </file>
 
-<file path=ppt/slides/slide5.xml><?xml version="1.0" encoding="utf-8"?>
+<file path=ppt/slides/slide6.xml><?xml version="1.0" encoding="utf-8"?>
 <p:sld xmlns:a="http://schemas.openxmlformats.org/drawingml/2006/main" xmlns:r="http://schemas.openxmlformats.org/officeDocument/2006/relationships" xmlns:p="http://schemas.openxmlformats.org/presentationml/2006/main">
   <p:cSld>
     <p:spTree>
@@ -11071,7 +11844,7 @@
 </p:sld>
 </file>
 
-<file path=ppt/slides/slide6.xml><?xml version="1.0" encoding="utf-8"?>
+<file path=ppt/slides/slide7.xml><?xml version="1.0" encoding="utf-8"?>
 <p:sld xmlns:a="http://schemas.openxmlformats.org/drawingml/2006/main" xmlns:r="http://schemas.openxmlformats.org/officeDocument/2006/relationships" xmlns:p="http://schemas.openxmlformats.org/presentationml/2006/main">
   <p:cSld>
     <p:spTree>
@@ -12613,7 +13386,7 @@
 </p:sld>
 </file>
 
-<file path=ppt/slides/slide7.xml><?xml version="1.0" encoding="utf-8"?>
+<file path=ppt/slides/slide8.xml><?xml version="1.0" encoding="utf-8"?>
 <p:sld xmlns:a="http://schemas.openxmlformats.org/drawingml/2006/main" xmlns:r="http://schemas.openxmlformats.org/officeDocument/2006/relationships" xmlns:p="http://schemas.openxmlformats.org/presentationml/2006/main">
   <p:cSld>
     <p:spTree>
@@ -14124,7 +14897,7 @@
 </p:sld>
 </file>
 
-<file path=ppt/slides/slide8.xml><?xml version="1.0" encoding="utf-8"?>
+<file path=ppt/slides/slide9.xml><?xml version="1.0" encoding="utf-8"?>
 <p:sld xmlns:a="http://schemas.openxmlformats.org/drawingml/2006/main" xmlns:r="http://schemas.openxmlformats.org/officeDocument/2006/relationships" xmlns:p="http://schemas.openxmlformats.org/presentationml/2006/main">
   <p:cSld>
     <p:spTree>
@@ -15455,195 +16228,6 @@
     <p:extLst>
       <p:ext uri="{BB962C8B-B14F-4D97-AF65-F5344CB8AC3E}">
         <p14:creationId xmlns:p14="http://schemas.microsoft.com/office/powerpoint/2010/main" val="312559596"/>
-      </p:ext>
-    </p:extLst>
-  </p:cSld>
-  <p:clrMapOvr>
-    <a:masterClrMapping/>
-  </p:clrMapOvr>
-</p:sld>
-</file>
-
-<file path=ppt/slides/slide9.xml><?xml version="1.0" encoding="utf-8"?>
-<p:sld xmlns:a="http://schemas.openxmlformats.org/drawingml/2006/main" xmlns:r="http://schemas.openxmlformats.org/officeDocument/2006/relationships" xmlns:p="http://schemas.openxmlformats.org/presentationml/2006/main">
-  <p:cSld>
-    <p:spTree>
-      <p:nvGrpSpPr>
-        <p:cNvPr id="1" name=""/>
-        <p:cNvGrpSpPr/>
-        <p:nvPr/>
-      </p:nvGrpSpPr>
-      <p:grpSpPr>
-        <a:xfrm>
-          <a:off x="0" y="0"/>
-          <a:ext cx="0" cy="0"/>
-          <a:chOff x="0" y="0"/>
-          <a:chExt cx="0" cy="0"/>
-        </a:xfrm>
-      </p:grpSpPr>
-      <p:grpSp>
-        <p:nvGrpSpPr>
-          <p:cNvPr id="5" name="Groupe 4"/>
-          <p:cNvGrpSpPr/>
-          <p:nvPr/>
-        </p:nvGrpSpPr>
-        <p:grpSpPr>
-          <a:xfrm>
-            <a:off x="2784762" y="1967345"/>
-            <a:ext cx="4478777" cy="2078182"/>
-            <a:chOff x="2784762" y="1967345"/>
-            <a:chExt cx="4478777" cy="2078182"/>
-          </a:xfrm>
-        </p:grpSpPr>
-        <p:sp>
-          <p:nvSpPr>
-            <p:cNvPr id="2" name="Rectangle 1"/>
-            <p:cNvSpPr/>
-            <p:nvPr/>
-          </p:nvSpPr>
-          <p:spPr>
-            <a:xfrm rot="2724865">
-              <a:off x="1870362" y="2881745"/>
-              <a:ext cx="2078182" cy="249382"/>
-            </a:xfrm>
-            <a:prstGeom prst="rect">
-              <a:avLst/>
-            </a:prstGeom>
-            <a:solidFill>
-              <a:schemeClr val="tx1"/>
-            </a:solidFill>
-            <a:ln>
-              <a:solidFill>
-                <a:schemeClr val="tx1"/>
-              </a:solidFill>
-            </a:ln>
-          </p:spPr>
-          <p:style>
-            <a:lnRef idx="2">
-              <a:schemeClr val="accent1">
-                <a:shade val="50000"/>
-              </a:schemeClr>
-            </a:lnRef>
-            <a:fillRef idx="1">
-              <a:schemeClr val="accent1"/>
-            </a:fillRef>
-            <a:effectRef idx="0">
-              <a:schemeClr val="accent1"/>
-            </a:effectRef>
-            <a:fontRef idx="minor">
-              <a:schemeClr val="lt1"/>
-            </a:fontRef>
-          </p:style>
-          <p:txBody>
-            <a:bodyPr rtlCol="0" anchor="ctr"/>
-            <a:lstStyle/>
-            <a:p>
-              <a:pPr algn="ctr"/>
-              <a:endParaRPr lang="en-US"/>
-            </a:p>
-          </p:txBody>
-        </p:sp>
-        <p:sp>
-          <p:nvSpPr>
-            <p:cNvPr id="3" name="Rectangle 2"/>
-            <p:cNvSpPr/>
-            <p:nvPr/>
-          </p:nvSpPr>
-          <p:spPr>
-            <a:xfrm rot="8123004">
-              <a:off x="2839281" y="2066852"/>
-              <a:ext cx="4424258" cy="249382"/>
-            </a:xfrm>
-            <a:prstGeom prst="rect">
-              <a:avLst/>
-            </a:prstGeom>
-            <a:solidFill>
-              <a:schemeClr val="tx1"/>
-            </a:solidFill>
-            <a:ln>
-              <a:solidFill>
-                <a:schemeClr val="tx1"/>
-              </a:solidFill>
-            </a:ln>
-          </p:spPr>
-          <p:style>
-            <a:lnRef idx="2">
-              <a:schemeClr val="accent1">
-                <a:shade val="50000"/>
-              </a:schemeClr>
-            </a:lnRef>
-            <a:fillRef idx="1">
-              <a:schemeClr val="accent1"/>
-            </a:fillRef>
-            <a:effectRef idx="0">
-              <a:schemeClr val="accent1"/>
-            </a:effectRef>
-            <a:fontRef idx="minor">
-              <a:schemeClr val="lt1"/>
-            </a:fontRef>
-          </p:style>
-          <p:txBody>
-            <a:bodyPr rtlCol="0" anchor="ctr"/>
-            <a:lstStyle/>
-            <a:p>
-              <a:pPr algn="ctr"/>
-              <a:endParaRPr lang="en-US"/>
-            </a:p>
-          </p:txBody>
-        </p:sp>
-      </p:grpSp>
-      <p:sp>
-        <p:nvSpPr>
-          <p:cNvPr id="6" name="Rectangle 5"/>
-          <p:cNvSpPr/>
-          <p:nvPr/>
-        </p:nvSpPr>
-        <p:spPr>
-          <a:xfrm>
-            <a:off x="827314" y="290286"/>
-            <a:ext cx="6313715" cy="3773714"/>
-          </a:xfrm>
-          <a:prstGeom prst="rect">
-            <a:avLst/>
-          </a:prstGeom>
-          <a:noFill/>
-          <a:ln w="9525" cap="flat" cmpd="sng" algn="ctr">
-            <a:solidFill>
-              <a:schemeClr val="dk1"/>
-            </a:solidFill>
-            <a:prstDash val="solid"/>
-            <a:round/>
-            <a:headEnd type="none" w="med" len="med"/>
-            <a:tailEnd type="none" w="med" len="med"/>
-          </a:ln>
-        </p:spPr>
-        <p:style>
-          <a:lnRef idx="0">
-            <a:scrgbClr r="0" g="0" b="0"/>
-          </a:lnRef>
-          <a:fillRef idx="0">
-            <a:scrgbClr r="0" g="0" b="0"/>
-          </a:fillRef>
-          <a:effectRef idx="0">
-            <a:scrgbClr r="0" g="0" b="0"/>
-          </a:effectRef>
-          <a:fontRef idx="minor">
-            <a:schemeClr val="dk1"/>
-          </a:fontRef>
-        </p:style>
-        <p:txBody>
-          <a:bodyPr rtlCol="0" anchor="ctr"/>
-          <a:lstStyle/>
-          <a:p>
-            <a:pPr algn="ctr"/>
-            <a:endParaRPr lang="en-US"/>
-          </a:p>
-        </p:txBody>
-      </p:sp>
-    </p:spTree>
-    <p:extLst>
-      <p:ext uri="{BB962C8B-B14F-4D97-AF65-F5344CB8AC3E}">
-        <p14:creationId xmlns:p14="http://schemas.microsoft.com/office/powerpoint/2010/main" val="4159037437"/>
       </p:ext>
     </p:extLst>
   </p:cSld>

</xml_diff>